<commit_message>
Some intro stuff done
</commit_message>
<xml_diff>
--- a/Presentation/RESTful APIs.pptx
+++ b/Presentation/RESTful APIs.pptx
@@ -6,6 +6,8 @@
   </p:sldMasterIdLst>
   <p:sldIdLst>
     <p:sldId id="256" r:id="rId2"/>
+    <p:sldId id="257" r:id="rId3"/>
+    <p:sldId id="258" r:id="rId4"/>
   </p:sldIdLst>
   <p:sldSz cx="12192000" cy="6858000"/>
   <p:notesSz cx="6858000" cy="9144000"/>
@@ -25655,6 +25657,230 @@
 </p:sld>
 </file>
 
+<file path=ppt/slides/slide2.xml><?xml version="1.0" encoding="utf-8"?>
+<p:sld xmlns:a="http://schemas.openxmlformats.org/drawingml/2006/main" xmlns:r="http://schemas.openxmlformats.org/officeDocument/2006/relationships" xmlns:p="http://schemas.openxmlformats.org/presentationml/2006/main">
+  <p:cSld>
+    <p:spTree>
+      <p:nvGrpSpPr>
+        <p:cNvPr id="1" name=""/>
+        <p:cNvGrpSpPr/>
+        <p:nvPr/>
+      </p:nvGrpSpPr>
+      <p:grpSpPr>
+        <a:xfrm>
+          <a:off x="0" y="0"/>
+          <a:ext cx="0" cy="0"/>
+          <a:chOff x="0" y="0"/>
+          <a:chExt cx="0" cy="0"/>
+        </a:xfrm>
+      </p:grpSpPr>
+      <p:sp>
+        <p:nvSpPr>
+          <p:cNvPr id="2" name="Title 1"/>
+          <p:cNvSpPr>
+            <a:spLocks noGrp="1"/>
+          </p:cNvSpPr>
+          <p:nvPr>
+            <p:ph type="title"/>
+          </p:nvPr>
+        </p:nvSpPr>
+        <p:spPr/>
+        <p:txBody>
+          <a:bodyPr/>
+          <a:lstStyle/>
+          <a:p>
+            <a:r>
+              <a:rPr lang="en-US" dirty="0" smtClean="0"/>
+              <a:t>Background</a:t>
+            </a:r>
+            <a:endParaRPr lang="en-US" dirty="0"/>
+          </a:p>
+        </p:txBody>
+      </p:sp>
+      <p:sp>
+        <p:nvSpPr>
+          <p:cNvPr id="3" name="Content Placeholder 2"/>
+          <p:cNvSpPr>
+            <a:spLocks noGrp="1"/>
+          </p:cNvSpPr>
+          <p:nvPr>
+            <p:ph idx="1"/>
+          </p:nvPr>
+        </p:nvSpPr>
+        <p:spPr/>
+        <p:txBody>
+          <a:bodyPr/>
+          <a:lstStyle/>
+          <a:p>
+            <a:r>
+              <a:rPr lang="en-US" dirty="0" smtClean="0"/>
+              <a:t>Described in Roy Fielding dissertation in 2000</a:t>
+            </a:r>
+          </a:p>
+          <a:p>
+            <a:pPr lvl="1"/>
+            <a:r>
+              <a:rPr lang="en-US" dirty="0" smtClean="0"/>
+              <a:t>Roots back to 1994</a:t>
+            </a:r>
+          </a:p>
+          <a:p>
+            <a:pPr lvl="1"/>
+            <a:r>
+              <a:rPr lang="en-US" dirty="0" smtClean="0"/>
+              <a:t>Roy was a key contributor to HTTP and URI</a:t>
+            </a:r>
+          </a:p>
+          <a:p>
+            <a:r>
+              <a:rPr lang="en-US" dirty="0" smtClean="0"/>
+              <a:t>Style of building APIs in distributed hypermedia systems</a:t>
+            </a:r>
+          </a:p>
+          <a:p>
+            <a:r>
+              <a:rPr lang="en-US" dirty="0" smtClean="0"/>
+              <a:t>It is not</a:t>
+            </a:r>
+          </a:p>
+          <a:p>
+            <a:pPr lvl="1"/>
+            <a:r>
+              <a:rPr lang="en-US" dirty="0" smtClean="0"/>
+              <a:t>Particular Framework or Implementation</a:t>
+            </a:r>
+          </a:p>
+          <a:p>
+            <a:pPr lvl="1"/>
+            <a:r>
+              <a:rPr lang="en-US" dirty="0" smtClean="0"/>
+              <a:t>Set of Standards</a:t>
+            </a:r>
+          </a:p>
+          <a:p>
+            <a:pPr lvl="1"/>
+            <a:endParaRPr lang="en-US" dirty="0" smtClean="0"/>
+          </a:p>
+        </p:txBody>
+      </p:sp>
+    </p:spTree>
+    <p:extLst>
+      <p:ext uri="{BB962C8B-B14F-4D97-AF65-F5344CB8AC3E}">
+        <p14:creationId xmlns:p14="http://schemas.microsoft.com/office/powerpoint/2010/main" val="2355275124"/>
+      </p:ext>
+    </p:extLst>
+  </p:cSld>
+  <p:clrMapOvr>
+    <a:masterClrMapping/>
+  </p:clrMapOvr>
+</p:sld>
+</file>
+
+<file path=ppt/slides/slide3.xml><?xml version="1.0" encoding="utf-8"?>
+<p:sld xmlns:a="http://schemas.openxmlformats.org/drawingml/2006/main" xmlns:r="http://schemas.openxmlformats.org/officeDocument/2006/relationships" xmlns:p="http://schemas.openxmlformats.org/presentationml/2006/main">
+  <p:cSld>
+    <p:spTree>
+      <p:nvGrpSpPr>
+        <p:cNvPr id="1" name=""/>
+        <p:cNvGrpSpPr/>
+        <p:nvPr/>
+      </p:nvGrpSpPr>
+      <p:grpSpPr>
+        <a:xfrm>
+          <a:off x="0" y="0"/>
+          <a:ext cx="0" cy="0"/>
+          <a:chOff x="0" y="0"/>
+          <a:chExt cx="0" cy="0"/>
+        </a:xfrm>
+      </p:grpSpPr>
+      <p:sp>
+        <p:nvSpPr>
+          <p:cNvPr id="2" name="Title 1"/>
+          <p:cNvSpPr>
+            <a:spLocks noGrp="1"/>
+          </p:cNvSpPr>
+          <p:nvPr>
+            <p:ph type="title"/>
+          </p:nvPr>
+        </p:nvSpPr>
+        <p:spPr/>
+        <p:txBody>
+          <a:bodyPr/>
+          <a:lstStyle/>
+          <a:p>
+            <a:r>
+              <a:rPr lang="en-US" dirty="0" smtClean="0"/>
+              <a:t>REST</a:t>
+            </a:r>
+            <a:endParaRPr lang="en-US" dirty="0"/>
+          </a:p>
+        </p:txBody>
+      </p:sp>
+      <p:sp>
+        <p:nvSpPr>
+          <p:cNvPr id="3" name="Content Placeholder 2"/>
+          <p:cNvSpPr>
+            <a:spLocks noGrp="1"/>
+          </p:cNvSpPr>
+          <p:nvPr>
+            <p:ph idx="1"/>
+          </p:nvPr>
+        </p:nvSpPr>
+        <p:spPr/>
+        <p:txBody>
+          <a:bodyPr/>
+          <a:lstStyle/>
+          <a:p>
+            <a:r>
+              <a:rPr lang="en-US" dirty="0" err="1" smtClean="0"/>
+              <a:t>REprestational</a:t>
+            </a:r>
+            <a:r>
+              <a:rPr lang="en-US" dirty="0" smtClean="0"/>
+              <a:t> State Transfer</a:t>
+            </a:r>
+          </a:p>
+          <a:p>
+            <a:pPr lvl="1"/>
+            <a:r>
+              <a:rPr lang="en-US" dirty="0" smtClean="0"/>
+              <a:t>Transfers representations of resources in a particular State</a:t>
+            </a:r>
+          </a:p>
+          <a:p>
+            <a:r>
+              <a:rPr lang="en-US" dirty="0" smtClean="0"/>
+              <a:t>Set of Constraints</a:t>
+            </a:r>
+          </a:p>
+          <a:p>
+            <a:r>
+              <a:rPr lang="en-US" dirty="0" smtClean="0"/>
+              <a:t>Based on architectural style of WWW</a:t>
+            </a:r>
+          </a:p>
+          <a:p>
+            <a:endParaRPr lang="en-US" dirty="0" smtClean="0"/>
+          </a:p>
+          <a:p>
+            <a:pPr lvl="1"/>
+            <a:endParaRPr lang="en-US" dirty="0" smtClean="0"/>
+          </a:p>
+        </p:txBody>
+      </p:sp>
+    </p:spTree>
+    <p:extLst>
+      <p:ext uri="{BB962C8B-B14F-4D97-AF65-F5344CB8AC3E}">
+        <p14:creationId xmlns:p14="http://schemas.microsoft.com/office/powerpoint/2010/main" val="1330424894"/>
+      </p:ext>
+    </p:extLst>
+  </p:cSld>
+  <p:clrMapOvr>
+    <a:masterClrMapping/>
+  </p:clrMapOvr>
+</p:sld>
+</file>
+
 <file path=ppt/theme/theme1.xml><?xml version="1.0" encoding="utf-8"?>
 <a:theme xmlns:a="http://schemas.openxmlformats.org/drawingml/2006/main" name="Greg Presentation Theme">
   <a:themeElements>

</xml_diff>

<commit_message>
Almost done with Constraints in PPT
</commit_message>
<xml_diff>
--- a/Presentation/RESTful APIs.pptx
+++ b/Presentation/RESTful APIs.pptx
@@ -8,6 +8,13 @@
     <p:sldId id="256" r:id="rId2"/>
     <p:sldId id="257" r:id="rId3"/>
     <p:sldId id="258" r:id="rId4"/>
+    <p:sldId id="259" r:id="rId5"/>
+    <p:sldId id="260" r:id="rId6"/>
+    <p:sldId id="261" r:id="rId7"/>
+    <p:sldId id="262" r:id="rId8"/>
+    <p:sldId id="263" r:id="rId9"/>
+    <p:sldId id="264" r:id="rId10"/>
+    <p:sldId id="265" r:id="rId11"/>
   </p:sldIdLst>
   <p:sldSz cx="12192000" cy="6858000"/>
   <p:notesSz cx="6858000" cy="9144000"/>
@@ -25654,6 +25661,88 @@
   <p:clrMapOvr>
     <a:masterClrMapping/>
   </p:clrMapOvr>
+  <p:timing>
+    <p:tnLst>
+      <p:par>
+        <p:cTn id="1" dur="indefinite" restart="never" nodeType="tmRoot"/>
+      </p:par>
+    </p:tnLst>
+  </p:timing>
+</p:sld>
+</file>
+
+<file path=ppt/slides/slide10.xml><?xml version="1.0" encoding="utf-8"?>
+<p:sld xmlns:a="http://schemas.openxmlformats.org/drawingml/2006/main" xmlns:r="http://schemas.openxmlformats.org/officeDocument/2006/relationships" xmlns:p="http://schemas.openxmlformats.org/presentationml/2006/main">
+  <p:cSld>
+    <p:spTree>
+      <p:nvGrpSpPr>
+        <p:cNvPr id="1" name=""/>
+        <p:cNvGrpSpPr/>
+        <p:nvPr/>
+      </p:nvGrpSpPr>
+      <p:grpSpPr>
+        <a:xfrm>
+          <a:off x="0" y="0"/>
+          <a:ext cx="0" cy="0"/>
+          <a:chOff x="0" y="0"/>
+          <a:chExt cx="0" cy="0"/>
+        </a:xfrm>
+      </p:grpSpPr>
+      <p:sp>
+        <p:nvSpPr>
+          <p:cNvPr id="2" name="Title 1"/>
+          <p:cNvSpPr>
+            <a:spLocks noGrp="1"/>
+          </p:cNvSpPr>
+          <p:nvPr>
+            <p:ph type="title"/>
+          </p:nvPr>
+        </p:nvSpPr>
+        <p:spPr/>
+        <p:txBody>
+          <a:bodyPr/>
+          <a:lstStyle/>
+          <a:p>
+            <a:endParaRPr lang="en-US"/>
+          </a:p>
+        </p:txBody>
+      </p:sp>
+      <p:sp>
+        <p:nvSpPr>
+          <p:cNvPr id="3" name="Content Placeholder 2"/>
+          <p:cNvSpPr>
+            <a:spLocks noGrp="1"/>
+          </p:cNvSpPr>
+          <p:nvPr>
+            <p:ph idx="1"/>
+          </p:nvPr>
+        </p:nvSpPr>
+        <p:spPr/>
+        <p:txBody>
+          <a:bodyPr/>
+          <a:lstStyle/>
+          <a:p>
+            <a:endParaRPr lang="en-US"/>
+          </a:p>
+        </p:txBody>
+      </p:sp>
+    </p:spTree>
+    <p:extLst>
+      <p:ext uri="{BB962C8B-B14F-4D97-AF65-F5344CB8AC3E}">
+        <p14:creationId xmlns:p14="http://schemas.microsoft.com/office/powerpoint/2010/main" val="928932281"/>
+      </p:ext>
+    </p:extLst>
+  </p:cSld>
+  <p:clrMapOvr>
+    <a:masterClrMapping/>
+  </p:clrMapOvr>
+  <p:timing>
+    <p:tnLst>
+      <p:par>
+        <p:cTn id="1" dur="indefinite" restart="never" nodeType="tmRoot"/>
+      </p:par>
+    </p:tnLst>
+  </p:timing>
 </p:sld>
 </file>
 
@@ -25747,7 +25836,7 @@
             <a:pPr lvl="1"/>
             <a:r>
               <a:rPr lang="en-US" dirty="0" smtClean="0"/>
-              <a:t>Particular Framework or Implementation</a:t>
+              <a:t>Particular Framework or Technology</a:t>
             </a:r>
           </a:p>
           <a:p>
@@ -25755,6 +25844,13 @@
             <a:r>
               <a:rPr lang="en-US" dirty="0" smtClean="0"/>
               <a:t>Set of Standards</a:t>
+            </a:r>
+          </a:p>
+          <a:p>
+            <a:pPr lvl="1"/>
+            <a:r>
+              <a:rPr lang="en-US" dirty="0" smtClean="0"/>
+              <a:t>Design Pattern</a:t>
             </a:r>
           </a:p>
           <a:p>
@@ -25773,6 +25869,341 @@
   <p:clrMapOvr>
     <a:masterClrMapping/>
   </p:clrMapOvr>
+  <p:timing>
+    <p:tnLst>
+      <p:par>
+        <p:cTn id="1" dur="indefinite" restart="never" nodeType="tmRoot">
+          <p:childTnLst>
+            <p:seq concurrent="1" nextAc="seek">
+              <p:cTn id="2" dur="indefinite" nodeType="mainSeq">
+                <p:childTnLst>
+                  <p:par>
+                    <p:cTn id="3" fill="hold">
+                      <p:stCondLst>
+                        <p:cond delay="indefinite"/>
+                      </p:stCondLst>
+                      <p:childTnLst>
+                        <p:par>
+                          <p:cTn id="4" fill="hold">
+                            <p:stCondLst>
+                              <p:cond delay="0"/>
+                            </p:stCondLst>
+                            <p:childTnLst>
+                              <p:par>
+                                <p:cTn id="5" presetID="1" presetClass="entr" presetSubtype="0" fill="hold" grpId="0" nodeType="clickEffect">
+                                  <p:stCondLst>
+                                    <p:cond delay="0"/>
+                                  </p:stCondLst>
+                                  <p:childTnLst>
+                                    <p:set>
+                                      <p:cBhvr>
+                                        <p:cTn id="6" dur="1" fill="hold">
+                                          <p:stCondLst>
+                                            <p:cond delay="0"/>
+                                          </p:stCondLst>
+                                        </p:cTn>
+                                        <p:tgtEl>
+                                          <p:spTgt spid="3">
+                                            <p:txEl>
+                                              <p:pRg st="0" end="0"/>
+                                            </p:txEl>
+                                          </p:spTgt>
+                                        </p:tgtEl>
+                                        <p:attrNameLst>
+                                          <p:attrName>style.visibility</p:attrName>
+                                        </p:attrNameLst>
+                                      </p:cBhvr>
+                                      <p:to>
+                                        <p:strVal val="visible"/>
+                                      </p:to>
+                                    </p:set>
+                                  </p:childTnLst>
+                                </p:cTn>
+                              </p:par>
+                              <p:par>
+                                <p:cTn id="7" presetID="1" presetClass="entr" presetSubtype="0" fill="hold" grpId="0" nodeType="withEffect">
+                                  <p:stCondLst>
+                                    <p:cond delay="0"/>
+                                  </p:stCondLst>
+                                  <p:childTnLst>
+                                    <p:set>
+                                      <p:cBhvr>
+                                        <p:cTn id="8" dur="1" fill="hold">
+                                          <p:stCondLst>
+                                            <p:cond delay="0"/>
+                                          </p:stCondLst>
+                                        </p:cTn>
+                                        <p:tgtEl>
+                                          <p:spTgt spid="3">
+                                            <p:txEl>
+                                              <p:pRg st="1" end="1"/>
+                                            </p:txEl>
+                                          </p:spTgt>
+                                        </p:tgtEl>
+                                        <p:attrNameLst>
+                                          <p:attrName>style.visibility</p:attrName>
+                                        </p:attrNameLst>
+                                      </p:cBhvr>
+                                      <p:to>
+                                        <p:strVal val="visible"/>
+                                      </p:to>
+                                    </p:set>
+                                  </p:childTnLst>
+                                </p:cTn>
+                              </p:par>
+                              <p:par>
+                                <p:cTn id="9" presetID="1" presetClass="entr" presetSubtype="0" fill="hold" grpId="0" nodeType="withEffect">
+                                  <p:stCondLst>
+                                    <p:cond delay="0"/>
+                                  </p:stCondLst>
+                                  <p:childTnLst>
+                                    <p:set>
+                                      <p:cBhvr>
+                                        <p:cTn id="10" dur="1" fill="hold">
+                                          <p:stCondLst>
+                                            <p:cond delay="0"/>
+                                          </p:stCondLst>
+                                        </p:cTn>
+                                        <p:tgtEl>
+                                          <p:spTgt spid="3">
+                                            <p:txEl>
+                                              <p:pRg st="2" end="2"/>
+                                            </p:txEl>
+                                          </p:spTgt>
+                                        </p:tgtEl>
+                                        <p:attrNameLst>
+                                          <p:attrName>style.visibility</p:attrName>
+                                        </p:attrNameLst>
+                                      </p:cBhvr>
+                                      <p:to>
+                                        <p:strVal val="visible"/>
+                                      </p:to>
+                                    </p:set>
+                                  </p:childTnLst>
+                                </p:cTn>
+                              </p:par>
+                            </p:childTnLst>
+                          </p:cTn>
+                        </p:par>
+                      </p:childTnLst>
+                    </p:cTn>
+                  </p:par>
+                  <p:par>
+                    <p:cTn id="11" fill="hold">
+                      <p:stCondLst>
+                        <p:cond delay="indefinite"/>
+                      </p:stCondLst>
+                      <p:childTnLst>
+                        <p:par>
+                          <p:cTn id="12" fill="hold">
+                            <p:stCondLst>
+                              <p:cond delay="0"/>
+                            </p:stCondLst>
+                            <p:childTnLst>
+                              <p:par>
+                                <p:cTn id="13" presetID="1" presetClass="entr" presetSubtype="0" fill="hold" grpId="0" nodeType="clickEffect">
+                                  <p:stCondLst>
+                                    <p:cond delay="0"/>
+                                  </p:stCondLst>
+                                  <p:childTnLst>
+                                    <p:set>
+                                      <p:cBhvr>
+                                        <p:cTn id="14" dur="1" fill="hold">
+                                          <p:stCondLst>
+                                            <p:cond delay="0"/>
+                                          </p:stCondLst>
+                                        </p:cTn>
+                                        <p:tgtEl>
+                                          <p:spTgt spid="3">
+                                            <p:txEl>
+                                              <p:pRg st="3" end="3"/>
+                                            </p:txEl>
+                                          </p:spTgt>
+                                        </p:tgtEl>
+                                        <p:attrNameLst>
+                                          <p:attrName>style.visibility</p:attrName>
+                                        </p:attrNameLst>
+                                      </p:cBhvr>
+                                      <p:to>
+                                        <p:strVal val="visible"/>
+                                      </p:to>
+                                    </p:set>
+                                  </p:childTnLst>
+                                </p:cTn>
+                              </p:par>
+                            </p:childTnLst>
+                          </p:cTn>
+                        </p:par>
+                      </p:childTnLst>
+                    </p:cTn>
+                  </p:par>
+                  <p:par>
+                    <p:cTn id="15" fill="hold">
+                      <p:stCondLst>
+                        <p:cond delay="indefinite"/>
+                      </p:stCondLst>
+                      <p:childTnLst>
+                        <p:par>
+                          <p:cTn id="16" fill="hold">
+                            <p:stCondLst>
+                              <p:cond delay="0"/>
+                            </p:stCondLst>
+                            <p:childTnLst>
+                              <p:par>
+                                <p:cTn id="17" presetID="1" presetClass="entr" presetSubtype="0" fill="hold" grpId="0" nodeType="clickEffect">
+                                  <p:stCondLst>
+                                    <p:cond delay="0"/>
+                                  </p:stCondLst>
+                                  <p:childTnLst>
+                                    <p:set>
+                                      <p:cBhvr>
+                                        <p:cTn id="18" dur="1" fill="hold">
+                                          <p:stCondLst>
+                                            <p:cond delay="0"/>
+                                          </p:stCondLst>
+                                        </p:cTn>
+                                        <p:tgtEl>
+                                          <p:spTgt spid="3">
+                                            <p:txEl>
+                                              <p:pRg st="4" end="4"/>
+                                            </p:txEl>
+                                          </p:spTgt>
+                                        </p:tgtEl>
+                                        <p:attrNameLst>
+                                          <p:attrName>style.visibility</p:attrName>
+                                        </p:attrNameLst>
+                                      </p:cBhvr>
+                                      <p:to>
+                                        <p:strVal val="visible"/>
+                                      </p:to>
+                                    </p:set>
+                                  </p:childTnLst>
+                                </p:cTn>
+                              </p:par>
+                              <p:par>
+                                <p:cTn id="19" presetID="1" presetClass="entr" presetSubtype="0" fill="hold" grpId="0" nodeType="withEffect">
+                                  <p:stCondLst>
+                                    <p:cond delay="0"/>
+                                  </p:stCondLst>
+                                  <p:childTnLst>
+                                    <p:set>
+                                      <p:cBhvr>
+                                        <p:cTn id="20" dur="1" fill="hold">
+                                          <p:stCondLst>
+                                            <p:cond delay="0"/>
+                                          </p:stCondLst>
+                                        </p:cTn>
+                                        <p:tgtEl>
+                                          <p:spTgt spid="3">
+                                            <p:txEl>
+                                              <p:pRg st="5" end="5"/>
+                                            </p:txEl>
+                                          </p:spTgt>
+                                        </p:tgtEl>
+                                        <p:attrNameLst>
+                                          <p:attrName>style.visibility</p:attrName>
+                                        </p:attrNameLst>
+                                      </p:cBhvr>
+                                      <p:to>
+                                        <p:strVal val="visible"/>
+                                      </p:to>
+                                    </p:set>
+                                  </p:childTnLst>
+                                </p:cTn>
+                              </p:par>
+                              <p:par>
+                                <p:cTn id="21" presetID="1" presetClass="entr" presetSubtype="0" fill="hold" grpId="0" nodeType="withEffect">
+                                  <p:stCondLst>
+                                    <p:cond delay="0"/>
+                                  </p:stCondLst>
+                                  <p:childTnLst>
+                                    <p:set>
+                                      <p:cBhvr>
+                                        <p:cTn id="22" dur="1" fill="hold">
+                                          <p:stCondLst>
+                                            <p:cond delay="0"/>
+                                          </p:stCondLst>
+                                        </p:cTn>
+                                        <p:tgtEl>
+                                          <p:spTgt spid="3">
+                                            <p:txEl>
+                                              <p:pRg st="6" end="6"/>
+                                            </p:txEl>
+                                          </p:spTgt>
+                                        </p:tgtEl>
+                                        <p:attrNameLst>
+                                          <p:attrName>style.visibility</p:attrName>
+                                        </p:attrNameLst>
+                                      </p:cBhvr>
+                                      <p:to>
+                                        <p:strVal val="visible"/>
+                                      </p:to>
+                                    </p:set>
+                                  </p:childTnLst>
+                                </p:cTn>
+                              </p:par>
+                              <p:par>
+                                <p:cTn id="23" presetID="1" presetClass="entr" presetSubtype="0" fill="hold" grpId="0" nodeType="withEffect">
+                                  <p:stCondLst>
+                                    <p:cond delay="0"/>
+                                  </p:stCondLst>
+                                  <p:childTnLst>
+                                    <p:set>
+                                      <p:cBhvr>
+                                        <p:cTn id="24" dur="1" fill="hold">
+                                          <p:stCondLst>
+                                            <p:cond delay="0"/>
+                                          </p:stCondLst>
+                                        </p:cTn>
+                                        <p:tgtEl>
+                                          <p:spTgt spid="3">
+                                            <p:txEl>
+                                              <p:pRg st="7" end="7"/>
+                                            </p:txEl>
+                                          </p:spTgt>
+                                        </p:tgtEl>
+                                        <p:attrNameLst>
+                                          <p:attrName>style.visibility</p:attrName>
+                                        </p:attrNameLst>
+                                      </p:cBhvr>
+                                      <p:to>
+                                        <p:strVal val="visible"/>
+                                      </p:to>
+                                    </p:set>
+                                  </p:childTnLst>
+                                </p:cTn>
+                              </p:par>
+                            </p:childTnLst>
+                          </p:cTn>
+                        </p:par>
+                      </p:childTnLst>
+                    </p:cTn>
+                  </p:par>
+                </p:childTnLst>
+              </p:cTn>
+              <p:prevCondLst>
+                <p:cond evt="onPrev" delay="0">
+                  <p:tgtEl>
+                    <p:sldTgt/>
+                  </p:tgtEl>
+                </p:cond>
+              </p:prevCondLst>
+              <p:nextCondLst>
+                <p:cond evt="onNext" delay="0">
+                  <p:tgtEl>
+                    <p:sldTgt/>
+                  </p:tgtEl>
+                </p:cond>
+              </p:nextCondLst>
+            </p:seq>
+          </p:childTnLst>
+        </p:cTn>
+      </p:par>
+    </p:tnLst>
+    <p:bldLst>
+      <p:bldP spid="3" grpId="0" build="p"/>
+    </p:bldLst>
+  </p:timing>
 </p:sld>
 </file>
 
@@ -25844,19 +26275,19 @@
             <a:pPr lvl="1"/>
             <a:r>
               <a:rPr lang="en-US" dirty="0" smtClean="0"/>
-              <a:t>Transfers representations of resources in a particular State</a:t>
+              <a:t>Transfer representations of resources in a particular State</a:t>
+            </a:r>
+          </a:p>
+          <a:p>
+            <a:r>
+              <a:rPr lang="en-US" dirty="0"/>
+              <a:t>Based on architectural style of WWW</a:t>
             </a:r>
           </a:p>
           <a:p>
             <a:r>
               <a:rPr lang="en-US" dirty="0" smtClean="0"/>
               <a:t>Set of Constraints</a:t>
-            </a:r>
-          </a:p>
-          <a:p>
-            <a:r>
-              <a:rPr lang="en-US" dirty="0" smtClean="0"/>
-              <a:t>Based on architectural style of WWW</a:t>
             </a:r>
           </a:p>
           <a:p>
@@ -25878,6 +26309,1707 @@
   <p:clrMapOvr>
     <a:masterClrMapping/>
   </p:clrMapOvr>
+  <p:timing>
+    <p:tnLst>
+      <p:par>
+        <p:cTn id="1" dur="indefinite" restart="never" nodeType="tmRoot">
+          <p:childTnLst>
+            <p:seq concurrent="1" nextAc="seek">
+              <p:cTn id="2" dur="indefinite" nodeType="mainSeq">
+                <p:childTnLst>
+                  <p:par>
+                    <p:cTn id="3" fill="hold">
+                      <p:stCondLst>
+                        <p:cond delay="indefinite"/>
+                      </p:stCondLst>
+                      <p:childTnLst>
+                        <p:par>
+                          <p:cTn id="4" fill="hold">
+                            <p:stCondLst>
+                              <p:cond delay="0"/>
+                            </p:stCondLst>
+                            <p:childTnLst>
+                              <p:par>
+                                <p:cTn id="5" presetID="1" presetClass="entr" presetSubtype="0" fill="hold" grpId="0" nodeType="clickEffect">
+                                  <p:stCondLst>
+                                    <p:cond delay="0"/>
+                                  </p:stCondLst>
+                                  <p:childTnLst>
+                                    <p:set>
+                                      <p:cBhvr>
+                                        <p:cTn id="6" dur="1" fill="hold">
+                                          <p:stCondLst>
+                                            <p:cond delay="0"/>
+                                          </p:stCondLst>
+                                        </p:cTn>
+                                        <p:tgtEl>
+                                          <p:spTgt spid="3">
+                                            <p:txEl>
+                                              <p:pRg st="0" end="0"/>
+                                            </p:txEl>
+                                          </p:spTgt>
+                                        </p:tgtEl>
+                                        <p:attrNameLst>
+                                          <p:attrName>style.visibility</p:attrName>
+                                        </p:attrNameLst>
+                                      </p:cBhvr>
+                                      <p:to>
+                                        <p:strVal val="visible"/>
+                                      </p:to>
+                                    </p:set>
+                                  </p:childTnLst>
+                                </p:cTn>
+                              </p:par>
+                              <p:par>
+                                <p:cTn id="7" presetID="1" presetClass="entr" presetSubtype="0" fill="hold" grpId="0" nodeType="withEffect">
+                                  <p:stCondLst>
+                                    <p:cond delay="0"/>
+                                  </p:stCondLst>
+                                  <p:childTnLst>
+                                    <p:set>
+                                      <p:cBhvr>
+                                        <p:cTn id="8" dur="1" fill="hold">
+                                          <p:stCondLst>
+                                            <p:cond delay="0"/>
+                                          </p:stCondLst>
+                                        </p:cTn>
+                                        <p:tgtEl>
+                                          <p:spTgt spid="3">
+                                            <p:txEl>
+                                              <p:pRg st="1" end="1"/>
+                                            </p:txEl>
+                                          </p:spTgt>
+                                        </p:tgtEl>
+                                        <p:attrNameLst>
+                                          <p:attrName>style.visibility</p:attrName>
+                                        </p:attrNameLst>
+                                      </p:cBhvr>
+                                      <p:to>
+                                        <p:strVal val="visible"/>
+                                      </p:to>
+                                    </p:set>
+                                  </p:childTnLst>
+                                </p:cTn>
+                              </p:par>
+                            </p:childTnLst>
+                          </p:cTn>
+                        </p:par>
+                      </p:childTnLst>
+                    </p:cTn>
+                  </p:par>
+                  <p:par>
+                    <p:cTn id="9" fill="hold">
+                      <p:stCondLst>
+                        <p:cond delay="indefinite"/>
+                      </p:stCondLst>
+                      <p:childTnLst>
+                        <p:par>
+                          <p:cTn id="10" fill="hold">
+                            <p:stCondLst>
+                              <p:cond delay="0"/>
+                            </p:stCondLst>
+                            <p:childTnLst>
+                              <p:par>
+                                <p:cTn id="11" presetID="1" presetClass="entr" presetSubtype="0" fill="hold" grpId="0" nodeType="clickEffect">
+                                  <p:stCondLst>
+                                    <p:cond delay="0"/>
+                                  </p:stCondLst>
+                                  <p:childTnLst>
+                                    <p:set>
+                                      <p:cBhvr>
+                                        <p:cTn id="12" dur="1" fill="hold">
+                                          <p:stCondLst>
+                                            <p:cond delay="0"/>
+                                          </p:stCondLst>
+                                        </p:cTn>
+                                        <p:tgtEl>
+                                          <p:spTgt spid="3">
+                                            <p:txEl>
+                                              <p:pRg st="2" end="2"/>
+                                            </p:txEl>
+                                          </p:spTgt>
+                                        </p:tgtEl>
+                                        <p:attrNameLst>
+                                          <p:attrName>style.visibility</p:attrName>
+                                        </p:attrNameLst>
+                                      </p:cBhvr>
+                                      <p:to>
+                                        <p:strVal val="visible"/>
+                                      </p:to>
+                                    </p:set>
+                                  </p:childTnLst>
+                                </p:cTn>
+                              </p:par>
+                            </p:childTnLst>
+                          </p:cTn>
+                        </p:par>
+                      </p:childTnLst>
+                    </p:cTn>
+                  </p:par>
+                  <p:par>
+                    <p:cTn id="13" fill="hold">
+                      <p:stCondLst>
+                        <p:cond delay="indefinite"/>
+                      </p:stCondLst>
+                      <p:childTnLst>
+                        <p:par>
+                          <p:cTn id="14" fill="hold">
+                            <p:stCondLst>
+                              <p:cond delay="0"/>
+                            </p:stCondLst>
+                            <p:childTnLst>
+                              <p:par>
+                                <p:cTn id="15" presetID="1" presetClass="entr" presetSubtype="0" fill="hold" grpId="0" nodeType="clickEffect">
+                                  <p:stCondLst>
+                                    <p:cond delay="0"/>
+                                  </p:stCondLst>
+                                  <p:childTnLst>
+                                    <p:set>
+                                      <p:cBhvr>
+                                        <p:cTn id="16" dur="1" fill="hold">
+                                          <p:stCondLst>
+                                            <p:cond delay="0"/>
+                                          </p:stCondLst>
+                                        </p:cTn>
+                                        <p:tgtEl>
+                                          <p:spTgt spid="3">
+                                            <p:txEl>
+                                              <p:pRg st="3" end="3"/>
+                                            </p:txEl>
+                                          </p:spTgt>
+                                        </p:tgtEl>
+                                        <p:attrNameLst>
+                                          <p:attrName>style.visibility</p:attrName>
+                                        </p:attrNameLst>
+                                      </p:cBhvr>
+                                      <p:to>
+                                        <p:strVal val="visible"/>
+                                      </p:to>
+                                    </p:set>
+                                  </p:childTnLst>
+                                </p:cTn>
+                              </p:par>
+                            </p:childTnLst>
+                          </p:cTn>
+                        </p:par>
+                      </p:childTnLst>
+                    </p:cTn>
+                  </p:par>
+                </p:childTnLst>
+              </p:cTn>
+              <p:prevCondLst>
+                <p:cond evt="onPrev" delay="0">
+                  <p:tgtEl>
+                    <p:sldTgt/>
+                  </p:tgtEl>
+                </p:cond>
+              </p:prevCondLst>
+              <p:nextCondLst>
+                <p:cond evt="onNext" delay="0">
+                  <p:tgtEl>
+                    <p:sldTgt/>
+                  </p:tgtEl>
+                </p:cond>
+              </p:nextCondLst>
+            </p:seq>
+          </p:childTnLst>
+        </p:cTn>
+      </p:par>
+    </p:tnLst>
+    <p:bldLst>
+      <p:bldP spid="3" grpId="0" build="p"/>
+    </p:bldLst>
+  </p:timing>
+</p:sld>
+</file>
+
+<file path=ppt/slides/slide4.xml><?xml version="1.0" encoding="utf-8"?>
+<p:sld xmlns:a="http://schemas.openxmlformats.org/drawingml/2006/main" xmlns:r="http://schemas.openxmlformats.org/officeDocument/2006/relationships" xmlns:p="http://schemas.openxmlformats.org/presentationml/2006/main">
+  <p:cSld>
+    <p:spTree>
+      <p:nvGrpSpPr>
+        <p:cNvPr id="1" name=""/>
+        <p:cNvGrpSpPr/>
+        <p:nvPr/>
+      </p:nvGrpSpPr>
+      <p:grpSpPr>
+        <a:xfrm>
+          <a:off x="0" y="0"/>
+          <a:ext cx="0" cy="0"/>
+          <a:chOff x="0" y="0"/>
+          <a:chExt cx="0" cy="0"/>
+        </a:xfrm>
+      </p:grpSpPr>
+      <p:sp>
+        <p:nvSpPr>
+          <p:cNvPr id="2" name="Title 1"/>
+          <p:cNvSpPr>
+            <a:spLocks noGrp="1"/>
+          </p:cNvSpPr>
+          <p:nvPr>
+            <p:ph type="title"/>
+          </p:nvPr>
+        </p:nvSpPr>
+        <p:spPr/>
+        <p:txBody>
+          <a:bodyPr/>
+          <a:lstStyle/>
+          <a:p>
+            <a:r>
+              <a:rPr lang="en-US" dirty="0" smtClean="0"/>
+              <a:t>Concepts</a:t>
+            </a:r>
+            <a:endParaRPr lang="en-US" dirty="0"/>
+          </a:p>
+        </p:txBody>
+      </p:sp>
+      <p:sp>
+        <p:nvSpPr>
+          <p:cNvPr id="3" name="Content Placeholder 2"/>
+          <p:cNvSpPr>
+            <a:spLocks noGrp="1"/>
+          </p:cNvSpPr>
+          <p:nvPr>
+            <p:ph idx="1"/>
+          </p:nvPr>
+        </p:nvSpPr>
+        <p:spPr/>
+        <p:txBody>
+          <a:bodyPr/>
+          <a:lstStyle/>
+          <a:p>
+            <a:r>
+              <a:rPr lang="en-US" dirty="0" smtClean="0"/>
+              <a:t>Resource</a:t>
+            </a:r>
+          </a:p>
+          <a:p>
+            <a:pPr lvl="1"/>
+            <a:r>
+              <a:rPr lang="en-US" dirty="0" smtClean="0"/>
+              <a:t>Has a URI</a:t>
+            </a:r>
+          </a:p>
+          <a:p>
+            <a:pPr lvl="1"/>
+            <a:r>
+              <a:rPr lang="en-US" dirty="0" smtClean="0"/>
+              <a:t>Conceptual mapping to one or more entities</a:t>
+            </a:r>
+          </a:p>
+          <a:p>
+            <a:endParaRPr lang="en-US" dirty="0" smtClean="0"/>
+          </a:p>
+          <a:p>
+            <a:r>
+              <a:rPr lang="en-US" dirty="0" smtClean="0"/>
+              <a:t>URI</a:t>
+            </a:r>
+          </a:p>
+          <a:p>
+            <a:pPr lvl="1"/>
+            <a:r>
+              <a:rPr lang="en-US" dirty="0" smtClean="0"/>
+              <a:t>Address to a resource, it’s primary key</a:t>
+            </a:r>
+          </a:p>
+          <a:p>
+            <a:endParaRPr lang="en-US" dirty="0"/>
+          </a:p>
+        </p:txBody>
+      </p:sp>
+    </p:spTree>
+    <p:extLst>
+      <p:ext uri="{BB962C8B-B14F-4D97-AF65-F5344CB8AC3E}">
+        <p14:creationId xmlns:p14="http://schemas.microsoft.com/office/powerpoint/2010/main" val="533015253"/>
+      </p:ext>
+    </p:extLst>
+  </p:cSld>
+  <p:clrMapOvr>
+    <a:masterClrMapping/>
+  </p:clrMapOvr>
+  <p:timing>
+    <p:tnLst>
+      <p:par>
+        <p:cTn id="1" dur="indefinite" restart="never" nodeType="tmRoot">
+          <p:childTnLst>
+            <p:seq concurrent="1" nextAc="seek">
+              <p:cTn id="2" dur="indefinite" nodeType="mainSeq">
+                <p:childTnLst>
+                  <p:par>
+                    <p:cTn id="3" fill="hold">
+                      <p:stCondLst>
+                        <p:cond delay="indefinite"/>
+                      </p:stCondLst>
+                      <p:childTnLst>
+                        <p:par>
+                          <p:cTn id="4" fill="hold">
+                            <p:stCondLst>
+                              <p:cond delay="0"/>
+                            </p:stCondLst>
+                            <p:childTnLst>
+                              <p:par>
+                                <p:cTn id="5" presetID="1" presetClass="entr" presetSubtype="0" fill="hold" grpId="0" nodeType="clickEffect">
+                                  <p:stCondLst>
+                                    <p:cond delay="0"/>
+                                  </p:stCondLst>
+                                  <p:childTnLst>
+                                    <p:set>
+                                      <p:cBhvr>
+                                        <p:cTn id="6" dur="1" fill="hold">
+                                          <p:stCondLst>
+                                            <p:cond delay="0"/>
+                                          </p:stCondLst>
+                                        </p:cTn>
+                                        <p:tgtEl>
+                                          <p:spTgt spid="3">
+                                            <p:txEl>
+                                              <p:pRg st="0" end="0"/>
+                                            </p:txEl>
+                                          </p:spTgt>
+                                        </p:tgtEl>
+                                        <p:attrNameLst>
+                                          <p:attrName>style.visibility</p:attrName>
+                                        </p:attrNameLst>
+                                      </p:cBhvr>
+                                      <p:to>
+                                        <p:strVal val="visible"/>
+                                      </p:to>
+                                    </p:set>
+                                  </p:childTnLst>
+                                </p:cTn>
+                              </p:par>
+                              <p:par>
+                                <p:cTn id="7" presetID="1" presetClass="entr" presetSubtype="0" fill="hold" grpId="0" nodeType="withEffect">
+                                  <p:stCondLst>
+                                    <p:cond delay="0"/>
+                                  </p:stCondLst>
+                                  <p:childTnLst>
+                                    <p:set>
+                                      <p:cBhvr>
+                                        <p:cTn id="8" dur="1" fill="hold">
+                                          <p:stCondLst>
+                                            <p:cond delay="0"/>
+                                          </p:stCondLst>
+                                        </p:cTn>
+                                        <p:tgtEl>
+                                          <p:spTgt spid="3">
+                                            <p:txEl>
+                                              <p:pRg st="1" end="1"/>
+                                            </p:txEl>
+                                          </p:spTgt>
+                                        </p:tgtEl>
+                                        <p:attrNameLst>
+                                          <p:attrName>style.visibility</p:attrName>
+                                        </p:attrNameLst>
+                                      </p:cBhvr>
+                                      <p:to>
+                                        <p:strVal val="visible"/>
+                                      </p:to>
+                                    </p:set>
+                                  </p:childTnLst>
+                                </p:cTn>
+                              </p:par>
+                              <p:par>
+                                <p:cTn id="9" presetID="1" presetClass="entr" presetSubtype="0" fill="hold" grpId="0" nodeType="withEffect">
+                                  <p:stCondLst>
+                                    <p:cond delay="0"/>
+                                  </p:stCondLst>
+                                  <p:childTnLst>
+                                    <p:set>
+                                      <p:cBhvr>
+                                        <p:cTn id="10" dur="1" fill="hold">
+                                          <p:stCondLst>
+                                            <p:cond delay="0"/>
+                                          </p:stCondLst>
+                                        </p:cTn>
+                                        <p:tgtEl>
+                                          <p:spTgt spid="3">
+                                            <p:txEl>
+                                              <p:pRg st="2" end="2"/>
+                                            </p:txEl>
+                                          </p:spTgt>
+                                        </p:tgtEl>
+                                        <p:attrNameLst>
+                                          <p:attrName>style.visibility</p:attrName>
+                                        </p:attrNameLst>
+                                      </p:cBhvr>
+                                      <p:to>
+                                        <p:strVal val="visible"/>
+                                      </p:to>
+                                    </p:set>
+                                  </p:childTnLst>
+                                </p:cTn>
+                              </p:par>
+                            </p:childTnLst>
+                          </p:cTn>
+                        </p:par>
+                      </p:childTnLst>
+                    </p:cTn>
+                  </p:par>
+                  <p:par>
+                    <p:cTn id="11" fill="hold">
+                      <p:stCondLst>
+                        <p:cond delay="indefinite"/>
+                      </p:stCondLst>
+                      <p:childTnLst>
+                        <p:par>
+                          <p:cTn id="12" fill="hold">
+                            <p:stCondLst>
+                              <p:cond delay="0"/>
+                            </p:stCondLst>
+                            <p:childTnLst>
+                              <p:par>
+                                <p:cTn id="13" presetID="1" presetClass="entr" presetSubtype="0" fill="hold" grpId="0" nodeType="clickEffect">
+                                  <p:stCondLst>
+                                    <p:cond delay="0"/>
+                                  </p:stCondLst>
+                                  <p:childTnLst>
+                                    <p:set>
+                                      <p:cBhvr>
+                                        <p:cTn id="14" dur="1" fill="hold">
+                                          <p:stCondLst>
+                                            <p:cond delay="0"/>
+                                          </p:stCondLst>
+                                        </p:cTn>
+                                        <p:tgtEl>
+                                          <p:spTgt spid="3">
+                                            <p:txEl>
+                                              <p:pRg st="4" end="4"/>
+                                            </p:txEl>
+                                          </p:spTgt>
+                                        </p:tgtEl>
+                                        <p:attrNameLst>
+                                          <p:attrName>style.visibility</p:attrName>
+                                        </p:attrNameLst>
+                                      </p:cBhvr>
+                                      <p:to>
+                                        <p:strVal val="visible"/>
+                                      </p:to>
+                                    </p:set>
+                                  </p:childTnLst>
+                                </p:cTn>
+                              </p:par>
+                              <p:par>
+                                <p:cTn id="15" presetID="1" presetClass="entr" presetSubtype="0" fill="hold" grpId="0" nodeType="withEffect">
+                                  <p:stCondLst>
+                                    <p:cond delay="0"/>
+                                  </p:stCondLst>
+                                  <p:childTnLst>
+                                    <p:set>
+                                      <p:cBhvr>
+                                        <p:cTn id="16" dur="1" fill="hold">
+                                          <p:stCondLst>
+                                            <p:cond delay="0"/>
+                                          </p:stCondLst>
+                                        </p:cTn>
+                                        <p:tgtEl>
+                                          <p:spTgt spid="3">
+                                            <p:txEl>
+                                              <p:pRg st="5" end="5"/>
+                                            </p:txEl>
+                                          </p:spTgt>
+                                        </p:tgtEl>
+                                        <p:attrNameLst>
+                                          <p:attrName>style.visibility</p:attrName>
+                                        </p:attrNameLst>
+                                      </p:cBhvr>
+                                      <p:to>
+                                        <p:strVal val="visible"/>
+                                      </p:to>
+                                    </p:set>
+                                  </p:childTnLst>
+                                </p:cTn>
+                              </p:par>
+                            </p:childTnLst>
+                          </p:cTn>
+                        </p:par>
+                      </p:childTnLst>
+                    </p:cTn>
+                  </p:par>
+                </p:childTnLst>
+              </p:cTn>
+              <p:prevCondLst>
+                <p:cond evt="onPrev" delay="0">
+                  <p:tgtEl>
+                    <p:sldTgt/>
+                  </p:tgtEl>
+                </p:cond>
+              </p:prevCondLst>
+              <p:nextCondLst>
+                <p:cond evt="onNext" delay="0">
+                  <p:tgtEl>
+                    <p:sldTgt/>
+                  </p:tgtEl>
+                </p:cond>
+              </p:nextCondLst>
+            </p:seq>
+          </p:childTnLst>
+        </p:cTn>
+      </p:par>
+    </p:tnLst>
+    <p:bldLst>
+      <p:bldP spid="3" grpId="0" build="p"/>
+    </p:bldLst>
+  </p:timing>
+</p:sld>
+</file>
+
+<file path=ppt/slides/slide5.xml><?xml version="1.0" encoding="utf-8"?>
+<p:sld xmlns:a="http://schemas.openxmlformats.org/drawingml/2006/main" xmlns:r="http://schemas.openxmlformats.org/officeDocument/2006/relationships" xmlns:p="http://schemas.openxmlformats.org/presentationml/2006/main">
+  <p:cSld>
+    <p:spTree>
+      <p:nvGrpSpPr>
+        <p:cNvPr id="1" name=""/>
+        <p:cNvGrpSpPr/>
+        <p:nvPr/>
+      </p:nvGrpSpPr>
+      <p:grpSpPr>
+        <a:xfrm>
+          <a:off x="0" y="0"/>
+          <a:ext cx="0" cy="0"/>
+          <a:chOff x="0" y="0"/>
+          <a:chExt cx="0" cy="0"/>
+        </a:xfrm>
+      </p:grpSpPr>
+      <p:sp>
+        <p:nvSpPr>
+          <p:cNvPr id="2" name="Title 1"/>
+          <p:cNvSpPr>
+            <a:spLocks noGrp="1"/>
+          </p:cNvSpPr>
+          <p:nvPr>
+            <p:ph type="title"/>
+          </p:nvPr>
+        </p:nvSpPr>
+        <p:spPr/>
+        <p:txBody>
+          <a:bodyPr/>
+          <a:lstStyle/>
+          <a:p>
+            <a:r>
+              <a:rPr lang="en-US" dirty="0" smtClean="0"/>
+              <a:t>Concepts</a:t>
+            </a:r>
+            <a:endParaRPr lang="en-US" dirty="0"/>
+          </a:p>
+        </p:txBody>
+      </p:sp>
+      <p:sp>
+        <p:nvSpPr>
+          <p:cNvPr id="3" name="Content Placeholder 2"/>
+          <p:cNvSpPr>
+            <a:spLocks noGrp="1"/>
+          </p:cNvSpPr>
+          <p:nvPr>
+            <p:ph idx="1"/>
+          </p:nvPr>
+        </p:nvSpPr>
+        <p:spPr/>
+        <p:txBody>
+          <a:bodyPr/>
+          <a:lstStyle/>
+          <a:p>
+            <a:r>
+              <a:rPr lang="en-US" dirty="0" smtClean="0"/>
+              <a:t>Representation</a:t>
+            </a:r>
+          </a:p>
+          <a:p>
+            <a:pPr lvl="1"/>
+            <a:r>
+              <a:rPr lang="en-US" dirty="0" smtClean="0"/>
+              <a:t>Snapshot of a resource</a:t>
+            </a:r>
+          </a:p>
+          <a:p>
+            <a:pPr lvl="1"/>
+            <a:r>
+              <a:rPr lang="en-US" dirty="0" smtClean="0"/>
+              <a:t>NOT the resource itself</a:t>
+            </a:r>
+          </a:p>
+          <a:p>
+            <a:pPr lvl="1"/>
+            <a:endParaRPr lang="en-US" dirty="0" smtClean="0"/>
+          </a:p>
+          <a:p>
+            <a:r>
+              <a:rPr lang="en-US" dirty="0" smtClean="0"/>
+              <a:t>Media Type</a:t>
+            </a:r>
+          </a:p>
+          <a:p>
+            <a:pPr lvl="1"/>
+            <a:r>
+              <a:rPr lang="en-US" dirty="0" smtClean="0"/>
+              <a:t>A format for the representation</a:t>
+            </a:r>
+          </a:p>
+          <a:p>
+            <a:pPr lvl="1"/>
+            <a:r>
+              <a:rPr lang="en-US" dirty="0" smtClean="0"/>
+              <a:t>Commonly JSON or XML – but no limits</a:t>
+            </a:r>
+            <a:endParaRPr lang="en-US" dirty="0"/>
+          </a:p>
+        </p:txBody>
+      </p:sp>
+    </p:spTree>
+    <p:extLst>
+      <p:ext uri="{BB962C8B-B14F-4D97-AF65-F5344CB8AC3E}">
+        <p14:creationId xmlns:p14="http://schemas.microsoft.com/office/powerpoint/2010/main" val="1897031879"/>
+      </p:ext>
+    </p:extLst>
+  </p:cSld>
+  <p:clrMapOvr>
+    <a:masterClrMapping/>
+  </p:clrMapOvr>
+  <p:timing>
+    <p:tnLst>
+      <p:par>
+        <p:cTn id="1" dur="indefinite" restart="never" nodeType="tmRoot">
+          <p:childTnLst>
+            <p:seq concurrent="1" nextAc="seek">
+              <p:cTn id="2" dur="indefinite" nodeType="mainSeq">
+                <p:childTnLst>
+                  <p:par>
+                    <p:cTn id="3" fill="hold">
+                      <p:stCondLst>
+                        <p:cond delay="indefinite"/>
+                      </p:stCondLst>
+                      <p:childTnLst>
+                        <p:par>
+                          <p:cTn id="4" fill="hold">
+                            <p:stCondLst>
+                              <p:cond delay="0"/>
+                            </p:stCondLst>
+                            <p:childTnLst>
+                              <p:par>
+                                <p:cTn id="5" presetID="1" presetClass="entr" presetSubtype="0" fill="hold" grpId="0" nodeType="clickEffect">
+                                  <p:stCondLst>
+                                    <p:cond delay="0"/>
+                                  </p:stCondLst>
+                                  <p:childTnLst>
+                                    <p:set>
+                                      <p:cBhvr>
+                                        <p:cTn id="6" dur="1" fill="hold">
+                                          <p:stCondLst>
+                                            <p:cond delay="0"/>
+                                          </p:stCondLst>
+                                        </p:cTn>
+                                        <p:tgtEl>
+                                          <p:spTgt spid="3">
+                                            <p:txEl>
+                                              <p:pRg st="0" end="0"/>
+                                            </p:txEl>
+                                          </p:spTgt>
+                                        </p:tgtEl>
+                                        <p:attrNameLst>
+                                          <p:attrName>style.visibility</p:attrName>
+                                        </p:attrNameLst>
+                                      </p:cBhvr>
+                                      <p:to>
+                                        <p:strVal val="visible"/>
+                                      </p:to>
+                                    </p:set>
+                                  </p:childTnLst>
+                                </p:cTn>
+                              </p:par>
+                              <p:par>
+                                <p:cTn id="7" presetID="1" presetClass="entr" presetSubtype="0" fill="hold" grpId="0" nodeType="withEffect">
+                                  <p:stCondLst>
+                                    <p:cond delay="0"/>
+                                  </p:stCondLst>
+                                  <p:childTnLst>
+                                    <p:set>
+                                      <p:cBhvr>
+                                        <p:cTn id="8" dur="1" fill="hold">
+                                          <p:stCondLst>
+                                            <p:cond delay="0"/>
+                                          </p:stCondLst>
+                                        </p:cTn>
+                                        <p:tgtEl>
+                                          <p:spTgt spid="3">
+                                            <p:txEl>
+                                              <p:pRg st="1" end="1"/>
+                                            </p:txEl>
+                                          </p:spTgt>
+                                        </p:tgtEl>
+                                        <p:attrNameLst>
+                                          <p:attrName>style.visibility</p:attrName>
+                                        </p:attrNameLst>
+                                      </p:cBhvr>
+                                      <p:to>
+                                        <p:strVal val="visible"/>
+                                      </p:to>
+                                    </p:set>
+                                  </p:childTnLst>
+                                </p:cTn>
+                              </p:par>
+                              <p:par>
+                                <p:cTn id="9" presetID="1" presetClass="entr" presetSubtype="0" fill="hold" grpId="0" nodeType="withEffect">
+                                  <p:stCondLst>
+                                    <p:cond delay="0"/>
+                                  </p:stCondLst>
+                                  <p:childTnLst>
+                                    <p:set>
+                                      <p:cBhvr>
+                                        <p:cTn id="10" dur="1" fill="hold">
+                                          <p:stCondLst>
+                                            <p:cond delay="0"/>
+                                          </p:stCondLst>
+                                        </p:cTn>
+                                        <p:tgtEl>
+                                          <p:spTgt spid="3">
+                                            <p:txEl>
+                                              <p:pRg st="2" end="2"/>
+                                            </p:txEl>
+                                          </p:spTgt>
+                                        </p:tgtEl>
+                                        <p:attrNameLst>
+                                          <p:attrName>style.visibility</p:attrName>
+                                        </p:attrNameLst>
+                                      </p:cBhvr>
+                                      <p:to>
+                                        <p:strVal val="visible"/>
+                                      </p:to>
+                                    </p:set>
+                                  </p:childTnLst>
+                                </p:cTn>
+                              </p:par>
+                            </p:childTnLst>
+                          </p:cTn>
+                        </p:par>
+                      </p:childTnLst>
+                    </p:cTn>
+                  </p:par>
+                  <p:par>
+                    <p:cTn id="11" fill="hold">
+                      <p:stCondLst>
+                        <p:cond delay="indefinite"/>
+                      </p:stCondLst>
+                      <p:childTnLst>
+                        <p:par>
+                          <p:cTn id="12" fill="hold">
+                            <p:stCondLst>
+                              <p:cond delay="0"/>
+                            </p:stCondLst>
+                            <p:childTnLst>
+                              <p:par>
+                                <p:cTn id="13" presetID="1" presetClass="entr" presetSubtype="0" fill="hold" grpId="0" nodeType="clickEffect">
+                                  <p:stCondLst>
+                                    <p:cond delay="0"/>
+                                  </p:stCondLst>
+                                  <p:childTnLst>
+                                    <p:set>
+                                      <p:cBhvr>
+                                        <p:cTn id="14" dur="1" fill="hold">
+                                          <p:stCondLst>
+                                            <p:cond delay="0"/>
+                                          </p:stCondLst>
+                                        </p:cTn>
+                                        <p:tgtEl>
+                                          <p:spTgt spid="3">
+                                            <p:txEl>
+                                              <p:pRg st="4" end="4"/>
+                                            </p:txEl>
+                                          </p:spTgt>
+                                        </p:tgtEl>
+                                        <p:attrNameLst>
+                                          <p:attrName>style.visibility</p:attrName>
+                                        </p:attrNameLst>
+                                      </p:cBhvr>
+                                      <p:to>
+                                        <p:strVal val="visible"/>
+                                      </p:to>
+                                    </p:set>
+                                  </p:childTnLst>
+                                </p:cTn>
+                              </p:par>
+                              <p:par>
+                                <p:cTn id="15" presetID="1" presetClass="entr" presetSubtype="0" fill="hold" grpId="0" nodeType="withEffect">
+                                  <p:stCondLst>
+                                    <p:cond delay="0"/>
+                                  </p:stCondLst>
+                                  <p:childTnLst>
+                                    <p:set>
+                                      <p:cBhvr>
+                                        <p:cTn id="16" dur="1" fill="hold">
+                                          <p:stCondLst>
+                                            <p:cond delay="0"/>
+                                          </p:stCondLst>
+                                        </p:cTn>
+                                        <p:tgtEl>
+                                          <p:spTgt spid="3">
+                                            <p:txEl>
+                                              <p:pRg st="5" end="5"/>
+                                            </p:txEl>
+                                          </p:spTgt>
+                                        </p:tgtEl>
+                                        <p:attrNameLst>
+                                          <p:attrName>style.visibility</p:attrName>
+                                        </p:attrNameLst>
+                                      </p:cBhvr>
+                                      <p:to>
+                                        <p:strVal val="visible"/>
+                                      </p:to>
+                                    </p:set>
+                                  </p:childTnLst>
+                                </p:cTn>
+                              </p:par>
+                              <p:par>
+                                <p:cTn id="17" presetID="1" presetClass="entr" presetSubtype="0" fill="hold" grpId="0" nodeType="withEffect">
+                                  <p:stCondLst>
+                                    <p:cond delay="0"/>
+                                  </p:stCondLst>
+                                  <p:childTnLst>
+                                    <p:set>
+                                      <p:cBhvr>
+                                        <p:cTn id="18" dur="1" fill="hold">
+                                          <p:stCondLst>
+                                            <p:cond delay="0"/>
+                                          </p:stCondLst>
+                                        </p:cTn>
+                                        <p:tgtEl>
+                                          <p:spTgt spid="3">
+                                            <p:txEl>
+                                              <p:pRg st="6" end="6"/>
+                                            </p:txEl>
+                                          </p:spTgt>
+                                        </p:tgtEl>
+                                        <p:attrNameLst>
+                                          <p:attrName>style.visibility</p:attrName>
+                                        </p:attrNameLst>
+                                      </p:cBhvr>
+                                      <p:to>
+                                        <p:strVal val="visible"/>
+                                      </p:to>
+                                    </p:set>
+                                  </p:childTnLst>
+                                </p:cTn>
+                              </p:par>
+                            </p:childTnLst>
+                          </p:cTn>
+                        </p:par>
+                      </p:childTnLst>
+                    </p:cTn>
+                  </p:par>
+                </p:childTnLst>
+              </p:cTn>
+              <p:prevCondLst>
+                <p:cond evt="onPrev" delay="0">
+                  <p:tgtEl>
+                    <p:sldTgt/>
+                  </p:tgtEl>
+                </p:cond>
+              </p:prevCondLst>
+              <p:nextCondLst>
+                <p:cond evt="onNext" delay="0">
+                  <p:tgtEl>
+                    <p:sldTgt/>
+                  </p:tgtEl>
+                </p:cond>
+              </p:nextCondLst>
+            </p:seq>
+          </p:childTnLst>
+        </p:cTn>
+      </p:par>
+    </p:tnLst>
+    <p:bldLst>
+      <p:bldP spid="3" grpId="0" build="p"/>
+    </p:bldLst>
+  </p:timing>
+</p:sld>
+</file>
+
+<file path=ppt/slides/slide6.xml><?xml version="1.0" encoding="utf-8"?>
+<p:sld xmlns:a="http://schemas.openxmlformats.org/drawingml/2006/main" xmlns:r="http://schemas.openxmlformats.org/officeDocument/2006/relationships" xmlns:p="http://schemas.openxmlformats.org/presentationml/2006/main">
+  <p:cSld>
+    <p:spTree>
+      <p:nvGrpSpPr>
+        <p:cNvPr id="1" name=""/>
+        <p:cNvGrpSpPr/>
+        <p:nvPr/>
+      </p:nvGrpSpPr>
+      <p:grpSpPr>
+        <a:xfrm>
+          <a:off x="0" y="0"/>
+          <a:ext cx="0" cy="0"/>
+          <a:chOff x="0" y="0"/>
+          <a:chExt cx="0" cy="0"/>
+        </a:xfrm>
+      </p:grpSpPr>
+      <p:sp>
+        <p:nvSpPr>
+          <p:cNvPr id="2" name="Title 1"/>
+          <p:cNvSpPr>
+            <a:spLocks noGrp="1"/>
+          </p:cNvSpPr>
+          <p:nvPr>
+            <p:ph type="title"/>
+          </p:nvPr>
+        </p:nvSpPr>
+        <p:spPr/>
+        <p:txBody>
+          <a:bodyPr/>
+          <a:lstStyle/>
+          <a:p>
+            <a:r>
+              <a:rPr lang="en-US" dirty="0" smtClean="0"/>
+              <a:t>Constraints</a:t>
+            </a:r>
+            <a:endParaRPr lang="en-US" dirty="0"/>
+          </a:p>
+        </p:txBody>
+      </p:sp>
+      <p:sp>
+        <p:nvSpPr>
+          <p:cNvPr id="3" name="Content Placeholder 2"/>
+          <p:cNvSpPr>
+            <a:spLocks noGrp="1"/>
+          </p:cNvSpPr>
+          <p:nvPr>
+            <p:ph idx="1"/>
+          </p:nvPr>
+        </p:nvSpPr>
+        <p:spPr/>
+        <p:txBody>
+          <a:bodyPr/>
+          <a:lstStyle/>
+          <a:p>
+            <a:r>
+              <a:rPr lang="en-US" dirty="0" smtClean="0"/>
+              <a:t>Client / Server</a:t>
+            </a:r>
+          </a:p>
+          <a:p>
+            <a:pPr lvl="1"/>
+            <a:r>
+              <a:rPr lang="en-US" dirty="0" smtClean="0"/>
+              <a:t>Duh, it’s an interface from one thing to another</a:t>
+            </a:r>
+          </a:p>
+          <a:p>
+            <a:pPr lvl="1"/>
+            <a:r>
+              <a:rPr lang="en-US" dirty="0" smtClean="0"/>
+              <a:t>Separation of Concerns</a:t>
+            </a:r>
+          </a:p>
+          <a:p>
+            <a:pPr lvl="1"/>
+            <a:r>
+              <a:rPr lang="en-US" dirty="0" smtClean="0"/>
+              <a:t>Independent evolution</a:t>
+            </a:r>
+          </a:p>
+          <a:p>
+            <a:pPr lvl="1"/>
+            <a:endParaRPr lang="en-US" dirty="0" smtClean="0"/>
+          </a:p>
+          <a:p>
+            <a:r>
+              <a:rPr lang="en-US" dirty="0" smtClean="0"/>
+              <a:t>Stateless</a:t>
+            </a:r>
+          </a:p>
+          <a:p>
+            <a:pPr lvl="1"/>
+            <a:r>
+              <a:rPr lang="en-US" dirty="0" smtClean="0"/>
+              <a:t>Each request is independent</a:t>
+            </a:r>
+          </a:p>
+          <a:p>
+            <a:pPr lvl="1"/>
+            <a:r>
+              <a:rPr lang="en-US" dirty="0" smtClean="0"/>
+              <a:t>No stored context on the server</a:t>
+            </a:r>
+          </a:p>
+          <a:p>
+            <a:pPr lvl="1"/>
+            <a:endParaRPr lang="en-US" dirty="0"/>
+          </a:p>
+        </p:txBody>
+      </p:sp>
+    </p:spTree>
+    <p:extLst>
+      <p:ext uri="{BB962C8B-B14F-4D97-AF65-F5344CB8AC3E}">
+        <p14:creationId xmlns:p14="http://schemas.microsoft.com/office/powerpoint/2010/main" val="154117003"/>
+      </p:ext>
+    </p:extLst>
+  </p:cSld>
+  <p:clrMapOvr>
+    <a:masterClrMapping/>
+  </p:clrMapOvr>
+  <p:timing>
+    <p:tnLst>
+      <p:par>
+        <p:cTn id="1" dur="indefinite" restart="never" nodeType="tmRoot">
+          <p:childTnLst>
+            <p:seq concurrent="1" nextAc="seek">
+              <p:cTn id="2" dur="indefinite" nodeType="mainSeq">
+                <p:childTnLst>
+                  <p:par>
+                    <p:cTn id="3" fill="hold">
+                      <p:stCondLst>
+                        <p:cond delay="indefinite"/>
+                      </p:stCondLst>
+                      <p:childTnLst>
+                        <p:par>
+                          <p:cTn id="4" fill="hold">
+                            <p:stCondLst>
+                              <p:cond delay="0"/>
+                            </p:stCondLst>
+                            <p:childTnLst>
+                              <p:par>
+                                <p:cTn id="5" presetID="1" presetClass="entr" presetSubtype="0" fill="hold" grpId="0" nodeType="clickEffect">
+                                  <p:stCondLst>
+                                    <p:cond delay="0"/>
+                                  </p:stCondLst>
+                                  <p:childTnLst>
+                                    <p:set>
+                                      <p:cBhvr>
+                                        <p:cTn id="6" dur="1" fill="hold">
+                                          <p:stCondLst>
+                                            <p:cond delay="0"/>
+                                          </p:stCondLst>
+                                        </p:cTn>
+                                        <p:tgtEl>
+                                          <p:spTgt spid="3">
+                                            <p:txEl>
+                                              <p:pRg st="0" end="0"/>
+                                            </p:txEl>
+                                          </p:spTgt>
+                                        </p:tgtEl>
+                                        <p:attrNameLst>
+                                          <p:attrName>style.visibility</p:attrName>
+                                        </p:attrNameLst>
+                                      </p:cBhvr>
+                                      <p:to>
+                                        <p:strVal val="visible"/>
+                                      </p:to>
+                                    </p:set>
+                                  </p:childTnLst>
+                                </p:cTn>
+                              </p:par>
+                              <p:par>
+                                <p:cTn id="7" presetID="1" presetClass="entr" presetSubtype="0" fill="hold" grpId="0" nodeType="withEffect">
+                                  <p:stCondLst>
+                                    <p:cond delay="0"/>
+                                  </p:stCondLst>
+                                  <p:childTnLst>
+                                    <p:set>
+                                      <p:cBhvr>
+                                        <p:cTn id="8" dur="1" fill="hold">
+                                          <p:stCondLst>
+                                            <p:cond delay="0"/>
+                                          </p:stCondLst>
+                                        </p:cTn>
+                                        <p:tgtEl>
+                                          <p:spTgt spid="3">
+                                            <p:txEl>
+                                              <p:pRg st="1" end="1"/>
+                                            </p:txEl>
+                                          </p:spTgt>
+                                        </p:tgtEl>
+                                        <p:attrNameLst>
+                                          <p:attrName>style.visibility</p:attrName>
+                                        </p:attrNameLst>
+                                      </p:cBhvr>
+                                      <p:to>
+                                        <p:strVal val="visible"/>
+                                      </p:to>
+                                    </p:set>
+                                  </p:childTnLst>
+                                </p:cTn>
+                              </p:par>
+                              <p:par>
+                                <p:cTn id="9" presetID="1" presetClass="entr" presetSubtype="0" fill="hold" grpId="0" nodeType="withEffect">
+                                  <p:stCondLst>
+                                    <p:cond delay="0"/>
+                                  </p:stCondLst>
+                                  <p:childTnLst>
+                                    <p:set>
+                                      <p:cBhvr>
+                                        <p:cTn id="10" dur="1" fill="hold">
+                                          <p:stCondLst>
+                                            <p:cond delay="0"/>
+                                          </p:stCondLst>
+                                        </p:cTn>
+                                        <p:tgtEl>
+                                          <p:spTgt spid="3">
+                                            <p:txEl>
+                                              <p:pRg st="2" end="2"/>
+                                            </p:txEl>
+                                          </p:spTgt>
+                                        </p:tgtEl>
+                                        <p:attrNameLst>
+                                          <p:attrName>style.visibility</p:attrName>
+                                        </p:attrNameLst>
+                                      </p:cBhvr>
+                                      <p:to>
+                                        <p:strVal val="visible"/>
+                                      </p:to>
+                                    </p:set>
+                                  </p:childTnLst>
+                                </p:cTn>
+                              </p:par>
+                              <p:par>
+                                <p:cTn id="11" presetID="1" presetClass="entr" presetSubtype="0" fill="hold" grpId="0" nodeType="withEffect">
+                                  <p:stCondLst>
+                                    <p:cond delay="0"/>
+                                  </p:stCondLst>
+                                  <p:childTnLst>
+                                    <p:set>
+                                      <p:cBhvr>
+                                        <p:cTn id="12" dur="1" fill="hold">
+                                          <p:stCondLst>
+                                            <p:cond delay="0"/>
+                                          </p:stCondLst>
+                                        </p:cTn>
+                                        <p:tgtEl>
+                                          <p:spTgt spid="3">
+                                            <p:txEl>
+                                              <p:pRg st="3" end="3"/>
+                                            </p:txEl>
+                                          </p:spTgt>
+                                        </p:tgtEl>
+                                        <p:attrNameLst>
+                                          <p:attrName>style.visibility</p:attrName>
+                                        </p:attrNameLst>
+                                      </p:cBhvr>
+                                      <p:to>
+                                        <p:strVal val="visible"/>
+                                      </p:to>
+                                    </p:set>
+                                  </p:childTnLst>
+                                </p:cTn>
+                              </p:par>
+                            </p:childTnLst>
+                          </p:cTn>
+                        </p:par>
+                      </p:childTnLst>
+                    </p:cTn>
+                  </p:par>
+                  <p:par>
+                    <p:cTn id="13" fill="hold">
+                      <p:stCondLst>
+                        <p:cond delay="indefinite"/>
+                      </p:stCondLst>
+                      <p:childTnLst>
+                        <p:par>
+                          <p:cTn id="14" fill="hold">
+                            <p:stCondLst>
+                              <p:cond delay="0"/>
+                            </p:stCondLst>
+                            <p:childTnLst>
+                              <p:par>
+                                <p:cTn id="15" presetID="1" presetClass="entr" presetSubtype="0" fill="hold" grpId="0" nodeType="clickEffect">
+                                  <p:stCondLst>
+                                    <p:cond delay="0"/>
+                                  </p:stCondLst>
+                                  <p:childTnLst>
+                                    <p:set>
+                                      <p:cBhvr>
+                                        <p:cTn id="16" dur="1" fill="hold">
+                                          <p:stCondLst>
+                                            <p:cond delay="0"/>
+                                          </p:stCondLst>
+                                        </p:cTn>
+                                        <p:tgtEl>
+                                          <p:spTgt spid="3">
+                                            <p:txEl>
+                                              <p:pRg st="5" end="5"/>
+                                            </p:txEl>
+                                          </p:spTgt>
+                                        </p:tgtEl>
+                                        <p:attrNameLst>
+                                          <p:attrName>style.visibility</p:attrName>
+                                        </p:attrNameLst>
+                                      </p:cBhvr>
+                                      <p:to>
+                                        <p:strVal val="visible"/>
+                                      </p:to>
+                                    </p:set>
+                                  </p:childTnLst>
+                                </p:cTn>
+                              </p:par>
+                              <p:par>
+                                <p:cTn id="17" presetID="1" presetClass="entr" presetSubtype="0" fill="hold" grpId="0" nodeType="withEffect">
+                                  <p:stCondLst>
+                                    <p:cond delay="0"/>
+                                  </p:stCondLst>
+                                  <p:childTnLst>
+                                    <p:set>
+                                      <p:cBhvr>
+                                        <p:cTn id="18" dur="1" fill="hold">
+                                          <p:stCondLst>
+                                            <p:cond delay="0"/>
+                                          </p:stCondLst>
+                                        </p:cTn>
+                                        <p:tgtEl>
+                                          <p:spTgt spid="3">
+                                            <p:txEl>
+                                              <p:pRg st="6" end="6"/>
+                                            </p:txEl>
+                                          </p:spTgt>
+                                        </p:tgtEl>
+                                        <p:attrNameLst>
+                                          <p:attrName>style.visibility</p:attrName>
+                                        </p:attrNameLst>
+                                      </p:cBhvr>
+                                      <p:to>
+                                        <p:strVal val="visible"/>
+                                      </p:to>
+                                    </p:set>
+                                  </p:childTnLst>
+                                </p:cTn>
+                              </p:par>
+                              <p:par>
+                                <p:cTn id="19" presetID="1" presetClass="entr" presetSubtype="0" fill="hold" grpId="0" nodeType="withEffect">
+                                  <p:stCondLst>
+                                    <p:cond delay="0"/>
+                                  </p:stCondLst>
+                                  <p:childTnLst>
+                                    <p:set>
+                                      <p:cBhvr>
+                                        <p:cTn id="20" dur="1" fill="hold">
+                                          <p:stCondLst>
+                                            <p:cond delay="0"/>
+                                          </p:stCondLst>
+                                        </p:cTn>
+                                        <p:tgtEl>
+                                          <p:spTgt spid="3">
+                                            <p:txEl>
+                                              <p:pRg st="7" end="7"/>
+                                            </p:txEl>
+                                          </p:spTgt>
+                                        </p:tgtEl>
+                                        <p:attrNameLst>
+                                          <p:attrName>style.visibility</p:attrName>
+                                        </p:attrNameLst>
+                                      </p:cBhvr>
+                                      <p:to>
+                                        <p:strVal val="visible"/>
+                                      </p:to>
+                                    </p:set>
+                                  </p:childTnLst>
+                                </p:cTn>
+                              </p:par>
+                            </p:childTnLst>
+                          </p:cTn>
+                        </p:par>
+                      </p:childTnLst>
+                    </p:cTn>
+                  </p:par>
+                </p:childTnLst>
+              </p:cTn>
+              <p:prevCondLst>
+                <p:cond evt="onPrev" delay="0">
+                  <p:tgtEl>
+                    <p:sldTgt/>
+                  </p:tgtEl>
+                </p:cond>
+              </p:prevCondLst>
+              <p:nextCondLst>
+                <p:cond evt="onNext" delay="0">
+                  <p:tgtEl>
+                    <p:sldTgt/>
+                  </p:tgtEl>
+                </p:cond>
+              </p:nextCondLst>
+            </p:seq>
+          </p:childTnLst>
+        </p:cTn>
+      </p:par>
+    </p:tnLst>
+    <p:bldLst>
+      <p:bldP spid="3" grpId="0" build="p"/>
+    </p:bldLst>
+  </p:timing>
+</p:sld>
+</file>
+
+<file path=ppt/slides/slide7.xml><?xml version="1.0" encoding="utf-8"?>
+<p:sld xmlns:a="http://schemas.openxmlformats.org/drawingml/2006/main" xmlns:r="http://schemas.openxmlformats.org/officeDocument/2006/relationships" xmlns:p="http://schemas.openxmlformats.org/presentationml/2006/main">
+  <p:cSld>
+    <p:spTree>
+      <p:nvGrpSpPr>
+        <p:cNvPr id="1" name=""/>
+        <p:cNvGrpSpPr/>
+        <p:nvPr/>
+      </p:nvGrpSpPr>
+      <p:grpSpPr>
+        <a:xfrm>
+          <a:off x="0" y="0"/>
+          <a:ext cx="0" cy="0"/>
+          <a:chOff x="0" y="0"/>
+          <a:chExt cx="0" cy="0"/>
+        </a:xfrm>
+      </p:grpSpPr>
+      <p:sp>
+        <p:nvSpPr>
+          <p:cNvPr id="2" name="Title 1"/>
+          <p:cNvSpPr>
+            <a:spLocks noGrp="1"/>
+          </p:cNvSpPr>
+          <p:nvPr>
+            <p:ph type="title"/>
+          </p:nvPr>
+        </p:nvSpPr>
+        <p:spPr/>
+        <p:txBody>
+          <a:bodyPr/>
+          <a:lstStyle/>
+          <a:p>
+            <a:r>
+              <a:rPr lang="en-US" dirty="0" smtClean="0"/>
+              <a:t>Constraints</a:t>
+            </a:r>
+            <a:endParaRPr lang="en-US" dirty="0"/>
+          </a:p>
+        </p:txBody>
+      </p:sp>
+      <p:sp>
+        <p:nvSpPr>
+          <p:cNvPr id="3" name="Content Placeholder 2"/>
+          <p:cNvSpPr>
+            <a:spLocks noGrp="1"/>
+          </p:cNvSpPr>
+          <p:nvPr>
+            <p:ph idx="1"/>
+          </p:nvPr>
+        </p:nvSpPr>
+        <p:spPr/>
+        <p:txBody>
+          <a:bodyPr/>
+          <a:lstStyle/>
+          <a:p>
+            <a:r>
+              <a:rPr lang="en-US" dirty="0" smtClean="0"/>
+              <a:t>Cache</a:t>
+            </a:r>
+          </a:p>
+          <a:p>
+            <a:pPr lvl="1"/>
+            <a:r>
+              <a:rPr lang="en-US" dirty="0" smtClean="0"/>
+              <a:t>Responses must indicate</a:t>
+            </a:r>
+          </a:p>
+          <a:p>
+            <a:pPr lvl="1"/>
+            <a:r>
+              <a:rPr lang="en-US" dirty="0" smtClean="0"/>
+              <a:t>Clients can choose to reuse</a:t>
+            </a:r>
+          </a:p>
+          <a:p>
+            <a:pPr lvl="2"/>
+            <a:endParaRPr lang="en-US" dirty="0" smtClean="0"/>
+          </a:p>
+          <a:p>
+            <a:r>
+              <a:rPr lang="en-US" dirty="0" smtClean="0"/>
+              <a:t>URIs</a:t>
+            </a:r>
+          </a:p>
+          <a:p>
+            <a:pPr lvl="1"/>
+            <a:r>
+              <a:rPr lang="en-US" dirty="0" smtClean="0"/>
+              <a:t>Resources are identified by URIs</a:t>
+            </a:r>
+          </a:p>
+          <a:p>
+            <a:pPr lvl="1"/>
+            <a:r>
+              <a:rPr lang="en-US" dirty="0" smtClean="0"/>
+              <a:t>Nouns instead of Verbs</a:t>
+            </a:r>
+          </a:p>
+          <a:p>
+            <a:pPr lvl="1"/>
+            <a:r>
+              <a:rPr lang="en-US" dirty="0" smtClean="0"/>
+              <a:t>Multiple URIs can refer to the same resource</a:t>
+            </a:r>
+            <a:endParaRPr lang="en-US" dirty="0"/>
+          </a:p>
+          <a:p>
+            <a:pPr lvl="1"/>
+            <a:endParaRPr lang="en-US" dirty="0"/>
+          </a:p>
+        </p:txBody>
+      </p:sp>
+    </p:spTree>
+    <p:extLst>
+      <p:ext uri="{BB962C8B-B14F-4D97-AF65-F5344CB8AC3E}">
+        <p14:creationId xmlns:p14="http://schemas.microsoft.com/office/powerpoint/2010/main" val="2938836956"/>
+      </p:ext>
+    </p:extLst>
+  </p:cSld>
+  <p:clrMapOvr>
+    <a:masterClrMapping/>
+  </p:clrMapOvr>
+  <p:timing>
+    <p:tnLst>
+      <p:par>
+        <p:cTn id="1" dur="indefinite" restart="never" nodeType="tmRoot"/>
+      </p:par>
+    </p:tnLst>
+  </p:timing>
+</p:sld>
+</file>
+
+<file path=ppt/slides/slide8.xml><?xml version="1.0" encoding="utf-8"?>
+<p:sld xmlns:a="http://schemas.openxmlformats.org/drawingml/2006/main" xmlns:r="http://schemas.openxmlformats.org/officeDocument/2006/relationships" xmlns:p="http://schemas.openxmlformats.org/presentationml/2006/main">
+  <p:cSld>
+    <p:spTree>
+      <p:nvGrpSpPr>
+        <p:cNvPr id="1" name=""/>
+        <p:cNvGrpSpPr/>
+        <p:nvPr/>
+      </p:nvGrpSpPr>
+      <p:grpSpPr>
+        <a:xfrm>
+          <a:off x="0" y="0"/>
+          <a:ext cx="0" cy="0"/>
+          <a:chOff x="0" y="0"/>
+          <a:chExt cx="0" cy="0"/>
+        </a:xfrm>
+      </p:grpSpPr>
+      <p:sp>
+        <p:nvSpPr>
+          <p:cNvPr id="2" name="Title 1"/>
+          <p:cNvSpPr>
+            <a:spLocks noGrp="1"/>
+          </p:cNvSpPr>
+          <p:nvPr>
+            <p:ph type="title"/>
+          </p:nvPr>
+        </p:nvSpPr>
+        <p:spPr/>
+        <p:txBody>
+          <a:bodyPr/>
+          <a:lstStyle/>
+          <a:p>
+            <a:r>
+              <a:rPr lang="en-US" dirty="0" smtClean="0"/>
+              <a:t>Constraints</a:t>
+            </a:r>
+            <a:endParaRPr lang="en-US" dirty="0"/>
+          </a:p>
+        </p:txBody>
+      </p:sp>
+      <p:sp>
+        <p:nvSpPr>
+          <p:cNvPr id="3" name="Content Placeholder 2"/>
+          <p:cNvSpPr>
+            <a:spLocks noGrp="1"/>
+          </p:cNvSpPr>
+          <p:nvPr>
+            <p:ph idx="1"/>
+          </p:nvPr>
+        </p:nvSpPr>
+        <p:spPr/>
+        <p:txBody>
+          <a:bodyPr/>
+          <a:lstStyle/>
+          <a:p>
+            <a:r>
+              <a:rPr lang="en-US" dirty="0"/>
+              <a:t>Uniform Interface</a:t>
+            </a:r>
+          </a:p>
+          <a:p>
+            <a:pPr lvl="1"/>
+            <a:r>
+              <a:rPr lang="en-US" dirty="0"/>
+              <a:t>Resource based</a:t>
+            </a:r>
+          </a:p>
+          <a:p>
+            <a:pPr lvl="2"/>
+            <a:r>
+              <a:rPr lang="en-US" dirty="0"/>
+              <a:t>HTTP verbs</a:t>
+            </a:r>
+          </a:p>
+          <a:p>
+            <a:pPr lvl="2"/>
+            <a:r>
+              <a:rPr lang="en-US" dirty="0"/>
+              <a:t>POST, PUT, GET, DELETE, HEAD (for conditional GETs)</a:t>
+            </a:r>
+          </a:p>
+          <a:p>
+            <a:pPr lvl="2"/>
+            <a:r>
+              <a:rPr lang="en-US" dirty="0"/>
+              <a:t>Generally ignore others, e.g. OPTIONS, PATCH and TRACE</a:t>
+            </a:r>
+          </a:p>
+          <a:p>
+            <a:pPr lvl="1"/>
+            <a:r>
+              <a:rPr lang="en-US" dirty="0"/>
+              <a:t>HTTP result codes</a:t>
+            </a:r>
+          </a:p>
+          <a:p>
+            <a:pPr lvl="1"/>
+            <a:r>
+              <a:rPr lang="en-US" dirty="0"/>
+              <a:t>Self-descriptive </a:t>
+            </a:r>
+            <a:r>
+              <a:rPr lang="en-US" dirty="0" smtClean="0"/>
+              <a:t>messages</a:t>
+            </a:r>
+          </a:p>
+          <a:p>
+            <a:pPr lvl="1"/>
+            <a:r>
+              <a:rPr lang="en-US" dirty="0" smtClean="0"/>
+              <a:t>Generalized media types</a:t>
+            </a:r>
+            <a:endParaRPr lang="en-US" dirty="0"/>
+          </a:p>
+          <a:p>
+            <a:pPr lvl="1"/>
+            <a:endParaRPr lang="en-US" dirty="0"/>
+          </a:p>
+          <a:p>
+            <a:endParaRPr lang="en-US" dirty="0"/>
+          </a:p>
+        </p:txBody>
+      </p:sp>
+    </p:spTree>
+    <p:extLst>
+      <p:ext uri="{BB962C8B-B14F-4D97-AF65-F5344CB8AC3E}">
+        <p14:creationId xmlns:p14="http://schemas.microsoft.com/office/powerpoint/2010/main" val="2136929217"/>
+      </p:ext>
+    </p:extLst>
+  </p:cSld>
+  <p:clrMapOvr>
+    <a:masterClrMapping/>
+  </p:clrMapOvr>
+  <p:timing>
+    <p:tnLst>
+      <p:par>
+        <p:cTn id="1" dur="indefinite" restart="never" nodeType="tmRoot"/>
+      </p:par>
+    </p:tnLst>
+  </p:timing>
+</p:sld>
+</file>
+
+<file path=ppt/slides/slide9.xml><?xml version="1.0" encoding="utf-8"?>
+<p:sld xmlns:a="http://schemas.openxmlformats.org/drawingml/2006/main" xmlns:r="http://schemas.openxmlformats.org/officeDocument/2006/relationships" xmlns:p="http://schemas.openxmlformats.org/presentationml/2006/main">
+  <p:cSld>
+    <p:spTree>
+      <p:nvGrpSpPr>
+        <p:cNvPr id="1" name=""/>
+        <p:cNvGrpSpPr/>
+        <p:nvPr/>
+      </p:nvGrpSpPr>
+      <p:grpSpPr>
+        <a:xfrm>
+          <a:off x="0" y="0"/>
+          <a:ext cx="0" cy="0"/>
+          <a:chOff x="0" y="0"/>
+          <a:chExt cx="0" cy="0"/>
+        </a:xfrm>
+      </p:grpSpPr>
+      <p:sp>
+        <p:nvSpPr>
+          <p:cNvPr id="2" name="Title 1"/>
+          <p:cNvSpPr>
+            <a:spLocks noGrp="1"/>
+          </p:cNvSpPr>
+          <p:nvPr>
+            <p:ph type="title"/>
+          </p:nvPr>
+        </p:nvSpPr>
+        <p:spPr/>
+        <p:txBody>
+          <a:bodyPr/>
+          <a:lstStyle/>
+          <a:p>
+            <a:r>
+              <a:rPr lang="en-US" smtClean="0"/>
+              <a:t>Constraints</a:t>
+            </a:r>
+            <a:endParaRPr lang="en-US"/>
+          </a:p>
+        </p:txBody>
+      </p:sp>
+      <p:sp>
+        <p:nvSpPr>
+          <p:cNvPr id="3" name="Content Placeholder 2"/>
+          <p:cNvSpPr>
+            <a:spLocks noGrp="1"/>
+          </p:cNvSpPr>
+          <p:nvPr>
+            <p:ph idx="1"/>
+          </p:nvPr>
+        </p:nvSpPr>
+        <p:spPr/>
+        <p:txBody>
+          <a:bodyPr/>
+          <a:lstStyle/>
+          <a:p>
+            <a:r>
+              <a:rPr lang="en-US" dirty="0" smtClean="0"/>
+              <a:t>Layered System</a:t>
+            </a:r>
+          </a:p>
+          <a:p>
+            <a:pPr lvl="1"/>
+            <a:r>
+              <a:rPr lang="en-US" dirty="0" smtClean="0"/>
+              <a:t>Client not necessarily talking directly to server</a:t>
+            </a:r>
+          </a:p>
+          <a:p>
+            <a:pPr lvl="1"/>
+            <a:r>
+              <a:rPr lang="en-US" dirty="0" smtClean="0"/>
+              <a:t>Layers can only “see” each other</a:t>
+            </a:r>
+          </a:p>
+          <a:p>
+            <a:pPr lvl="1"/>
+            <a:r>
+              <a:rPr lang="en-US" dirty="0" smtClean="0"/>
+              <a:t>Supports firewalls, proxies, etc.</a:t>
+            </a:r>
+            <a:endParaRPr lang="en-US" dirty="0"/>
+          </a:p>
+        </p:txBody>
+      </p:sp>
+    </p:spTree>
+    <p:extLst>
+      <p:ext uri="{BB962C8B-B14F-4D97-AF65-F5344CB8AC3E}">
+        <p14:creationId xmlns:p14="http://schemas.microsoft.com/office/powerpoint/2010/main" val="747035740"/>
+      </p:ext>
+    </p:extLst>
+  </p:cSld>
+  <p:clrMapOvr>
+    <a:masterClrMapping/>
+  </p:clrMapOvr>
+  <p:timing>
+    <p:tnLst>
+      <p:par>
+        <p:cTn id="1" dur="indefinite" restart="never" nodeType="tmRoot"/>
+      </p:par>
+    </p:tnLst>
+  </p:timing>
 </p:sld>
 </file>
 

</xml_diff>

<commit_message>
All constraints in PPT
</commit_message>
<xml_diff>
--- a/Presentation/RESTful APIs.pptx
+++ b/Presentation/RESTful APIs.pptx
@@ -25703,7 +25703,11 @@
           <a:bodyPr/>
           <a:lstStyle/>
           <a:p>
-            <a:endParaRPr lang="en-US"/>
+            <a:r>
+              <a:rPr lang="en-US" dirty="0" smtClean="0"/>
+              <a:t>Constraints</a:t>
+            </a:r>
+            <a:endParaRPr lang="en-US" dirty="0"/>
           </a:p>
         </p:txBody>
       </p:sp>
@@ -25722,7 +25726,37 @@
           <a:bodyPr/>
           <a:lstStyle/>
           <a:p>
-            <a:endParaRPr lang="en-US"/>
+            <a:r>
+              <a:rPr lang="en-US" dirty="0" smtClean="0"/>
+              <a:t>Code on Demand</a:t>
+            </a:r>
+          </a:p>
+          <a:p>
+            <a:pPr lvl="1"/>
+            <a:r>
+              <a:rPr lang="en-US" dirty="0" smtClean="0"/>
+              <a:t>Server can download code – change client behavior</a:t>
+            </a:r>
+          </a:p>
+          <a:p>
+            <a:pPr lvl="1"/>
+            <a:r>
+              <a:rPr lang="en-US" dirty="0" smtClean="0"/>
+              <a:t>Simplify client </a:t>
+            </a:r>
+            <a:r>
+              <a:rPr lang="en-US" dirty="0" err="1" smtClean="0"/>
+              <a:t>dev</a:t>
+            </a:r>
+            <a:endParaRPr lang="en-US" dirty="0" smtClean="0"/>
+          </a:p>
+          <a:p>
+            <a:pPr lvl="1"/>
+            <a:r>
+              <a:rPr lang="en-US" smtClean="0"/>
+              <a:t>Optional constraint</a:t>
+            </a:r>
+            <a:endParaRPr lang="en-US" dirty="0"/>
           </a:p>
         </p:txBody>
       </p:sp>
@@ -27942,10 +27976,10 @@
           <a:lstStyle/>
           <a:p>
             <a:r>
-              <a:rPr lang="en-US" smtClean="0"/>
+              <a:rPr lang="en-US" dirty="0" smtClean="0"/>
               <a:t>Constraints</a:t>
             </a:r>
-            <a:endParaRPr lang="en-US"/>
+            <a:endParaRPr lang="en-US" dirty="0"/>
           </a:p>
         </p:txBody>
       </p:sp>
@@ -27993,6 +28027,47 @@
           </a:p>
         </p:txBody>
       </p:sp>
+      <p:pic>
+        <p:nvPicPr>
+          <p:cNvPr id="1026" name="Picture 2" descr="HTTP intermediaries"/>
+          <p:cNvPicPr>
+            <a:picLocks noChangeAspect="1" noChangeArrowheads="1"/>
+          </p:cNvPicPr>
+          <p:nvPr/>
+        </p:nvPicPr>
+        <p:blipFill>
+          <a:blip r:embed="rId2">
+            <a:extLst>
+              <a:ext uri="{28A0092B-C50C-407E-A947-70E740481C1C}">
+                <a14:useLocalDpi xmlns:a14="http://schemas.microsoft.com/office/drawing/2010/main" val="0"/>
+              </a:ext>
+            </a:extLst>
+          </a:blip>
+          <a:srcRect/>
+          <a:stretch>
+            <a:fillRect/>
+          </a:stretch>
+        </p:blipFill>
+        <p:spPr bwMode="auto">
+          <a:xfrm>
+            <a:off x="2923511" y="2216075"/>
+            <a:ext cx="8750302" cy="4383517"/>
+          </a:xfrm>
+          <a:prstGeom prst="rect">
+            <a:avLst/>
+          </a:prstGeom>
+          <a:noFill/>
+          <a:extLst>
+            <a:ext uri="{909E8E84-426E-40DD-AFC4-6F175D3DCCD1}">
+              <a14:hiddenFill xmlns:a14="http://schemas.microsoft.com/office/drawing/2010/main">
+                <a:solidFill>
+                  <a:srgbClr val="FFFFFF"/>
+                </a:solidFill>
+              </a14:hiddenFill>
+            </a:ext>
+          </a:extLst>
+        </p:spPr>
+      </p:pic>
     </p:spTree>
     <p:extLst>
       <p:ext uri="{BB962C8B-B14F-4D97-AF65-F5344CB8AC3E}">
@@ -28006,7 +28081,121 @@
   <p:timing>
     <p:tnLst>
       <p:par>
-        <p:cTn id="1" dur="indefinite" restart="never" nodeType="tmRoot"/>
+        <p:cTn id="1" dur="indefinite" restart="never" nodeType="tmRoot">
+          <p:childTnLst>
+            <p:seq concurrent="1" nextAc="seek">
+              <p:cTn id="2" dur="indefinite" nodeType="mainSeq">
+                <p:childTnLst>
+                  <p:par>
+                    <p:cTn id="3" fill="hold">
+                      <p:stCondLst>
+                        <p:cond delay="indefinite"/>
+                      </p:stCondLst>
+                      <p:childTnLst>
+                        <p:par>
+                          <p:cTn id="4" fill="hold">
+                            <p:stCondLst>
+                              <p:cond delay="0"/>
+                            </p:stCondLst>
+                            <p:childTnLst>
+                              <p:par>
+                                <p:cTn id="5" presetID="2" presetClass="entr" presetSubtype="4" fill="hold" nodeType="clickEffect">
+                                  <p:stCondLst>
+                                    <p:cond delay="0"/>
+                                  </p:stCondLst>
+                                  <p:childTnLst>
+                                    <p:set>
+                                      <p:cBhvr>
+                                        <p:cTn id="6" dur="1" fill="hold">
+                                          <p:stCondLst>
+                                            <p:cond delay="0"/>
+                                          </p:stCondLst>
+                                        </p:cTn>
+                                        <p:tgtEl>
+                                          <p:spTgt spid="1026"/>
+                                        </p:tgtEl>
+                                        <p:attrNameLst>
+                                          <p:attrName>style.visibility</p:attrName>
+                                        </p:attrNameLst>
+                                      </p:cBhvr>
+                                      <p:to>
+                                        <p:strVal val="visible"/>
+                                      </p:to>
+                                    </p:set>
+                                    <p:anim calcmode="lin" valueType="num">
+                                      <p:cBhvr additive="base">
+                                        <p:cTn id="7" dur="500" fill="hold"/>
+                                        <p:tgtEl>
+                                          <p:spTgt spid="1026"/>
+                                        </p:tgtEl>
+                                        <p:attrNameLst>
+                                          <p:attrName>ppt_x</p:attrName>
+                                        </p:attrNameLst>
+                                      </p:cBhvr>
+                                      <p:tavLst>
+                                        <p:tav tm="0">
+                                          <p:val>
+                                            <p:strVal val="#ppt_x"/>
+                                          </p:val>
+                                        </p:tav>
+                                        <p:tav tm="100000">
+                                          <p:val>
+                                            <p:strVal val="#ppt_x"/>
+                                          </p:val>
+                                        </p:tav>
+                                      </p:tavLst>
+                                    </p:anim>
+                                    <p:anim calcmode="lin" valueType="num">
+                                      <p:cBhvr additive="base">
+                                        <p:cTn id="8" dur="500" fill="hold"/>
+                                        <p:tgtEl>
+                                          <p:spTgt spid="1026"/>
+                                        </p:tgtEl>
+                                        <p:attrNameLst>
+                                          <p:attrName>ppt_y</p:attrName>
+                                        </p:attrNameLst>
+                                      </p:cBhvr>
+                                      <p:tavLst>
+                                        <p:tav tm="0">
+                                          <p:val>
+                                            <p:strVal val="1+#ppt_h/2"/>
+                                          </p:val>
+                                        </p:tav>
+                                        <p:tav tm="100000">
+                                          <p:val>
+                                            <p:strVal val="#ppt_y"/>
+                                          </p:val>
+                                        </p:tav>
+                                      </p:tavLst>
+                                    </p:anim>
+                                  </p:childTnLst>
+                                </p:cTn>
+                              </p:par>
+                            </p:childTnLst>
+                          </p:cTn>
+                        </p:par>
+                      </p:childTnLst>
+                    </p:cTn>
+                  </p:par>
+                </p:childTnLst>
+              </p:cTn>
+              <p:prevCondLst>
+                <p:cond evt="onPrev" delay="0">
+                  <p:tgtEl>
+                    <p:sldTgt/>
+                  </p:tgtEl>
+                </p:cond>
+              </p:prevCondLst>
+              <p:nextCondLst>
+                <p:cond evt="onNext" delay="0">
+                  <p:tgtEl>
+                    <p:sldTgt/>
+                  </p:tgtEl>
+                </p:cond>
+              </p:nextCondLst>
+            </p:seq>
+          </p:childTnLst>
+        </p:cTn>
       </p:par>
     </p:tnLst>
   </p:timing>

</xml_diff>

<commit_message>
Added info on URI format and contrast to SOAP in presentation
</commit_message>
<xml_diff>
--- a/Presentation/RESTful APIs.pptx
+++ b/Presentation/RESTful APIs.pptx
@@ -15,6 +15,9 @@
     <p:sldId id="263" r:id="rId9"/>
     <p:sldId id="264" r:id="rId10"/>
     <p:sldId id="265" r:id="rId11"/>
+    <p:sldId id="266" r:id="rId12"/>
+    <p:sldId id="267" r:id="rId13"/>
+    <p:sldId id="268" r:id="rId14"/>
   </p:sldIdLst>
   <p:sldSz cx="12192000" cy="6858000"/>
   <p:notesSz cx="6858000" cy="9144000"/>
@@ -25753,7 +25756,7 @@
           <a:p>
             <a:pPr lvl="1"/>
             <a:r>
-              <a:rPr lang="en-US" smtClean="0"/>
+              <a:rPr lang="en-US" dirty="0" smtClean="0"/>
               <a:t>Optional constraint</a:t>
             </a:r>
             <a:endParaRPr lang="en-US" dirty="0"/>
@@ -25764,6 +25767,444 @@
     <p:extLst>
       <p:ext uri="{BB962C8B-B14F-4D97-AF65-F5344CB8AC3E}">
         <p14:creationId xmlns:p14="http://schemas.microsoft.com/office/powerpoint/2010/main" val="928932281"/>
+      </p:ext>
+    </p:extLst>
+  </p:cSld>
+  <p:clrMapOvr>
+    <a:masterClrMapping/>
+  </p:clrMapOvr>
+  <p:timing>
+    <p:tnLst>
+      <p:par>
+        <p:cTn id="1" dur="indefinite" restart="never" nodeType="tmRoot"/>
+      </p:par>
+    </p:tnLst>
+  </p:timing>
+</p:sld>
+</file>
+
+<file path=ppt/slides/slide11.xml><?xml version="1.0" encoding="utf-8"?>
+<p:sld xmlns:a="http://schemas.openxmlformats.org/drawingml/2006/main" xmlns:r="http://schemas.openxmlformats.org/officeDocument/2006/relationships" xmlns:p="http://schemas.openxmlformats.org/presentationml/2006/main">
+  <p:cSld>
+    <p:spTree>
+      <p:nvGrpSpPr>
+        <p:cNvPr id="1" name=""/>
+        <p:cNvGrpSpPr/>
+        <p:nvPr/>
+      </p:nvGrpSpPr>
+      <p:grpSpPr>
+        <a:xfrm>
+          <a:off x="0" y="0"/>
+          <a:ext cx="0" cy="0"/>
+          <a:chOff x="0" y="0"/>
+          <a:chExt cx="0" cy="0"/>
+        </a:xfrm>
+      </p:grpSpPr>
+      <p:sp>
+        <p:nvSpPr>
+          <p:cNvPr id="2" name="Title 1"/>
+          <p:cNvSpPr>
+            <a:spLocks noGrp="1"/>
+          </p:cNvSpPr>
+          <p:nvPr>
+            <p:ph type="title"/>
+          </p:nvPr>
+        </p:nvSpPr>
+        <p:spPr/>
+        <p:txBody>
+          <a:bodyPr/>
+          <a:lstStyle/>
+          <a:p>
+            <a:r>
+              <a:rPr lang="en-US" dirty="0" smtClean="0"/>
+              <a:t>URIs</a:t>
+            </a:r>
+            <a:endParaRPr lang="en-US" dirty="0"/>
+          </a:p>
+        </p:txBody>
+      </p:sp>
+      <p:sp>
+        <p:nvSpPr>
+          <p:cNvPr id="3" name="Content Placeholder 2"/>
+          <p:cNvSpPr>
+            <a:spLocks noGrp="1"/>
+          </p:cNvSpPr>
+          <p:nvPr>
+            <p:ph idx="1"/>
+          </p:nvPr>
+        </p:nvSpPr>
+        <p:spPr/>
+        <p:txBody>
+          <a:bodyPr/>
+          <a:lstStyle/>
+          <a:p>
+            <a:r>
+              <a:rPr lang="en-US" dirty="0" smtClean="0"/>
+              <a:t>URIs are resource based – nouns</a:t>
+            </a:r>
+          </a:p>
+          <a:p>
+            <a:pPr lvl="1"/>
+            <a:r>
+              <a:rPr lang="en-US" dirty="0" smtClean="0"/>
+              <a:t>Verbs come from HTTP methods, GET, POST, PUT, DELETE</a:t>
+            </a:r>
+          </a:p>
+          <a:p>
+            <a:pPr lvl="1"/>
+            <a:r>
+              <a:rPr lang="en-US" dirty="0" smtClean="0"/>
+              <a:t>Use slashes to indicate resource hierarchy</a:t>
+            </a:r>
+          </a:p>
+          <a:p>
+            <a:pPr marL="914400" lvl="2" indent="0">
+              <a:buNone/>
+            </a:pPr>
+            <a:endParaRPr lang="en-US" dirty="0" smtClean="0"/>
+          </a:p>
+          <a:p>
+            <a:pPr marL="914400" lvl="2" indent="0">
+              <a:buNone/>
+            </a:pPr>
+            <a:endParaRPr lang="en-US" dirty="0"/>
+          </a:p>
+          <a:p>
+            <a:pPr lvl="1"/>
+            <a:endParaRPr lang="en-US" dirty="0" smtClean="0"/>
+          </a:p>
+          <a:p>
+            <a:pPr lvl="2"/>
+            <a:endParaRPr lang="en-US" dirty="0"/>
+          </a:p>
+        </p:txBody>
+      </p:sp>
+    </p:spTree>
+    <p:extLst>
+      <p:ext uri="{BB962C8B-B14F-4D97-AF65-F5344CB8AC3E}">
+        <p14:creationId xmlns:p14="http://schemas.microsoft.com/office/powerpoint/2010/main" val="2542710091"/>
+      </p:ext>
+    </p:extLst>
+  </p:cSld>
+  <p:clrMapOvr>
+    <a:masterClrMapping/>
+  </p:clrMapOvr>
+  <p:timing>
+    <p:tnLst>
+      <p:par>
+        <p:cTn id="1" dur="indefinite" restart="never" nodeType="tmRoot"/>
+      </p:par>
+    </p:tnLst>
+  </p:timing>
+</p:sld>
+</file>
+
+<file path=ppt/slides/slide12.xml><?xml version="1.0" encoding="utf-8"?>
+<p:sld xmlns:a="http://schemas.openxmlformats.org/drawingml/2006/main" xmlns:r="http://schemas.openxmlformats.org/officeDocument/2006/relationships" xmlns:p="http://schemas.openxmlformats.org/presentationml/2006/main">
+  <p:cSld>
+    <p:spTree>
+      <p:nvGrpSpPr>
+        <p:cNvPr id="1" name=""/>
+        <p:cNvGrpSpPr/>
+        <p:nvPr/>
+      </p:nvGrpSpPr>
+      <p:grpSpPr>
+        <a:xfrm>
+          <a:off x="0" y="0"/>
+          <a:ext cx="0" cy="0"/>
+          <a:chOff x="0" y="0"/>
+          <a:chExt cx="0" cy="0"/>
+        </a:xfrm>
+      </p:grpSpPr>
+      <p:sp>
+        <p:nvSpPr>
+          <p:cNvPr id="2" name="Title 1"/>
+          <p:cNvSpPr>
+            <a:spLocks noGrp="1"/>
+          </p:cNvSpPr>
+          <p:nvPr>
+            <p:ph type="title"/>
+          </p:nvPr>
+        </p:nvSpPr>
+        <p:spPr/>
+        <p:txBody>
+          <a:bodyPr/>
+          <a:lstStyle/>
+          <a:p>
+            <a:r>
+              <a:rPr lang="en-US" dirty="0" smtClean="0"/>
+              <a:t>URIs</a:t>
+            </a:r>
+            <a:endParaRPr lang="en-US" dirty="0"/>
+          </a:p>
+        </p:txBody>
+      </p:sp>
+      <p:sp>
+        <p:nvSpPr>
+          <p:cNvPr id="3" name="Content Placeholder 2"/>
+          <p:cNvSpPr>
+            <a:spLocks noGrp="1"/>
+          </p:cNvSpPr>
+          <p:nvPr>
+            <p:ph idx="1"/>
+          </p:nvPr>
+        </p:nvSpPr>
+        <p:spPr/>
+        <p:txBody>
+          <a:bodyPr/>
+          <a:lstStyle/>
+          <a:p>
+            <a:r>
+              <a:rPr lang="en-US" dirty="0" smtClean="0"/>
+              <a:t>SOAP </a:t>
+            </a:r>
+            <a:r>
+              <a:rPr lang="en-US" dirty="0"/>
+              <a:t>methods</a:t>
+            </a:r>
+          </a:p>
+          <a:p>
+            <a:pPr lvl="1"/>
+            <a:r>
+              <a:rPr lang="en-US" dirty="0" err="1"/>
+              <a:t>GetCustomerList</a:t>
+            </a:r>
+            <a:r>
+              <a:rPr lang="en-US" dirty="0"/>
+              <a:t>()</a:t>
+            </a:r>
+          </a:p>
+          <a:p>
+            <a:pPr lvl="1"/>
+            <a:r>
+              <a:rPr lang="en-US" dirty="0" err="1" smtClean="0"/>
+              <a:t>AddNewCustomer</a:t>
+            </a:r>
+            <a:r>
+              <a:rPr lang="en-US" dirty="0"/>
+              <a:t>()</a:t>
+            </a:r>
+          </a:p>
+          <a:p>
+            <a:pPr lvl="1"/>
+            <a:r>
+              <a:rPr lang="en-US" dirty="0" err="1"/>
+              <a:t>GetCustomerInfo</a:t>
+            </a:r>
+            <a:r>
+              <a:rPr lang="en-US" dirty="0"/>
+              <a:t>()</a:t>
+            </a:r>
+          </a:p>
+          <a:p>
+            <a:pPr lvl="1"/>
+            <a:r>
+              <a:rPr lang="en-US" dirty="0" err="1" smtClean="0"/>
+              <a:t>UpdateCustomer</a:t>
+            </a:r>
+            <a:r>
+              <a:rPr lang="en-US" dirty="0"/>
+              <a:t>()</a:t>
+            </a:r>
+          </a:p>
+          <a:p>
+            <a:pPr lvl="1"/>
+            <a:r>
+              <a:rPr lang="en-US" dirty="0" err="1"/>
+              <a:t>DeleteCustomer</a:t>
+            </a:r>
+            <a:r>
+              <a:rPr lang="en-US" dirty="0"/>
+              <a:t>()</a:t>
+            </a:r>
+          </a:p>
+        </p:txBody>
+      </p:sp>
+    </p:spTree>
+    <p:extLst>
+      <p:ext uri="{BB962C8B-B14F-4D97-AF65-F5344CB8AC3E}">
+        <p14:creationId xmlns:p14="http://schemas.microsoft.com/office/powerpoint/2010/main" val="1537083221"/>
+      </p:ext>
+    </p:extLst>
+  </p:cSld>
+  <p:clrMapOvr>
+    <a:masterClrMapping/>
+  </p:clrMapOvr>
+  <p:timing>
+    <p:tnLst>
+      <p:par>
+        <p:cTn id="1" dur="indefinite" restart="never" nodeType="tmRoot"/>
+      </p:par>
+    </p:tnLst>
+  </p:timing>
+</p:sld>
+</file>
+
+<file path=ppt/slides/slide13.xml><?xml version="1.0" encoding="utf-8"?>
+<p:sld xmlns:a="http://schemas.openxmlformats.org/drawingml/2006/main" xmlns:r="http://schemas.openxmlformats.org/officeDocument/2006/relationships" xmlns:p="http://schemas.openxmlformats.org/presentationml/2006/main">
+  <p:cSld>
+    <p:spTree>
+      <p:nvGrpSpPr>
+        <p:cNvPr id="1" name=""/>
+        <p:cNvGrpSpPr/>
+        <p:nvPr/>
+      </p:nvGrpSpPr>
+      <p:grpSpPr>
+        <a:xfrm>
+          <a:off x="0" y="0"/>
+          <a:ext cx="0" cy="0"/>
+          <a:chOff x="0" y="0"/>
+          <a:chExt cx="0" cy="0"/>
+        </a:xfrm>
+      </p:grpSpPr>
+      <p:sp>
+        <p:nvSpPr>
+          <p:cNvPr id="2" name="Title 1"/>
+          <p:cNvSpPr>
+            <a:spLocks noGrp="1"/>
+          </p:cNvSpPr>
+          <p:nvPr>
+            <p:ph type="title"/>
+          </p:nvPr>
+        </p:nvSpPr>
+        <p:spPr/>
+        <p:txBody>
+          <a:bodyPr/>
+          <a:lstStyle/>
+          <a:p>
+            <a:r>
+              <a:rPr lang="en-US" dirty="0" smtClean="0"/>
+              <a:t>URIs</a:t>
+            </a:r>
+            <a:endParaRPr lang="en-US" dirty="0"/>
+          </a:p>
+        </p:txBody>
+      </p:sp>
+      <p:sp>
+        <p:nvSpPr>
+          <p:cNvPr id="3" name="Content Placeholder 2"/>
+          <p:cNvSpPr>
+            <a:spLocks noGrp="1"/>
+          </p:cNvSpPr>
+          <p:nvPr>
+            <p:ph idx="1"/>
+          </p:nvPr>
+        </p:nvSpPr>
+        <p:spPr/>
+        <p:txBody>
+          <a:bodyPr/>
+          <a:lstStyle/>
+          <a:p>
+            <a:r>
+              <a:rPr lang="en-US" dirty="0"/>
+              <a:t>SOAP methods</a:t>
+            </a:r>
+          </a:p>
+          <a:p>
+            <a:pPr marL="400050" lvl="1" indent="0">
+              <a:buNone/>
+            </a:pPr>
+            <a:r>
+              <a:rPr lang="en-US" dirty="0" smtClean="0"/>
+              <a:t>/</a:t>
+            </a:r>
+            <a:r>
+              <a:rPr lang="en-US" dirty="0"/>
+              <a:t>customers</a:t>
+            </a:r>
+          </a:p>
+          <a:p>
+            <a:pPr marL="800100" lvl="2" indent="0">
+              <a:buNone/>
+            </a:pPr>
+            <a:r>
+              <a:rPr lang="en-US" dirty="0" smtClean="0"/>
+              <a:t>GET </a:t>
+            </a:r>
+            <a:r>
+              <a:rPr lang="en-US" dirty="0"/>
+              <a:t>- retrieve a list of </a:t>
+            </a:r>
+            <a:r>
+              <a:rPr lang="en-US" dirty="0" smtClean="0"/>
+              <a:t>customers</a:t>
+            </a:r>
+          </a:p>
+          <a:p>
+            <a:pPr marL="800100" lvl="2" indent="0">
+              <a:buNone/>
+            </a:pPr>
+            <a:r>
+              <a:rPr lang="en-US" dirty="0"/>
+              <a:t>POST - create a new </a:t>
+            </a:r>
+            <a:r>
+              <a:rPr lang="en-US" dirty="0" smtClean="0"/>
+              <a:t>customer</a:t>
+            </a:r>
+            <a:endParaRPr lang="en-US" dirty="0"/>
+          </a:p>
+          <a:p>
+            <a:pPr marL="400050" lvl="1" indent="0">
+              <a:buNone/>
+            </a:pPr>
+            <a:r>
+              <a:rPr lang="en-US" dirty="0" smtClean="0"/>
+              <a:t>/</a:t>
+            </a:r>
+            <a:r>
+              <a:rPr lang="en-US" dirty="0"/>
+              <a:t>customers/{customer id}</a:t>
+            </a:r>
+          </a:p>
+          <a:p>
+            <a:pPr marL="800100" lvl="2" indent="0">
+              <a:buNone/>
+            </a:pPr>
+            <a:r>
+              <a:rPr lang="en-US" dirty="0" smtClean="0"/>
+              <a:t>GET </a:t>
+            </a:r>
+            <a:r>
+              <a:rPr lang="en-US" dirty="0"/>
+              <a:t>- retrieve information about a customer</a:t>
+            </a:r>
+          </a:p>
+          <a:p>
+            <a:pPr marL="800100" lvl="2" indent="0">
+              <a:buNone/>
+            </a:pPr>
+            <a:r>
+              <a:rPr lang="en-US" dirty="0" smtClean="0"/>
+              <a:t>PUT </a:t>
+            </a:r>
+            <a:r>
+              <a:rPr lang="en-US" dirty="0"/>
+              <a:t>- update a customer's information</a:t>
+            </a:r>
+          </a:p>
+          <a:p>
+            <a:pPr marL="800100" lvl="2" indent="0">
+              <a:buNone/>
+            </a:pPr>
+            <a:r>
+              <a:rPr lang="en-US" dirty="0" smtClean="0"/>
+              <a:t>DELETE </a:t>
+            </a:r>
+            <a:r>
+              <a:rPr lang="en-US" dirty="0"/>
+              <a:t>- remove a customer</a:t>
+            </a:r>
+          </a:p>
+          <a:p>
+            <a:endParaRPr lang="en-US" dirty="0"/>
+          </a:p>
+        </p:txBody>
+      </p:sp>
+    </p:spTree>
+    <p:extLst>
+      <p:ext uri="{BB962C8B-B14F-4D97-AF65-F5344CB8AC3E}">
+        <p14:creationId xmlns:p14="http://schemas.microsoft.com/office/powerpoint/2010/main" val="3720984704"/>
       </p:ext>
     </p:extLst>
   </p:cSld>
@@ -28050,13 +28491,44 @@
         </p:blipFill>
         <p:spPr bwMode="auto">
           <a:xfrm>
-            <a:off x="2923511" y="2216075"/>
+            <a:off x="1720849" y="1933145"/>
             <a:ext cx="8750302" cy="4383517"/>
           </a:xfrm>
           <a:prstGeom prst="rect">
             <a:avLst/>
           </a:prstGeom>
-          <a:noFill/>
+          <a:solidFill>
+            <a:srgbClr val="FFFFFF">
+              <a:shade val="85000"/>
+            </a:srgbClr>
+          </a:solidFill>
+          <a:ln w="190500" cap="sq">
+            <a:solidFill>
+              <a:srgbClr val="FFFFFF"/>
+            </a:solidFill>
+            <a:miter lim="800000"/>
+          </a:ln>
+          <a:effectLst>
+            <a:outerShdw blurRad="65000" dist="50800" dir="12900000" kx="195000" ky="145000" algn="tl" rotWithShape="0">
+              <a:srgbClr val="000000">
+                <a:alpha val="30000"/>
+              </a:srgbClr>
+            </a:outerShdw>
+          </a:effectLst>
+          <a:scene3d>
+            <a:camera prst="orthographicFront">
+              <a:rot lat="0" lon="0" rev="360000"/>
+            </a:camera>
+            <a:lightRig rig="twoPt" dir="t">
+              <a:rot lat="0" lon="0" rev="7200000"/>
+            </a:lightRig>
+          </a:scene3d>
+          <a:sp3d contourW="12700">
+            <a:bevelT w="25400" h="19050"/>
+            <a:contourClr>
+              <a:srgbClr val="969696"/>
+            </a:contourClr>
+          </a:sp3d>
           <a:extLst>
             <a:ext uri="{909E8E84-426E-40DD-AFC4-6F175D3DCCD1}">
               <a14:hiddenFill xmlns:a14="http://schemas.microsoft.com/office/drawing/2010/main">
@@ -28099,7 +28571,7 @@
                             </p:stCondLst>
                             <p:childTnLst>
                               <p:par>
-                                <p:cTn id="5" presetID="2" presetClass="entr" presetSubtype="4" fill="hold" nodeType="clickEffect">
+                                <p:cTn id="5" presetID="10" presetClass="entr" presetSubtype="0" fill="hold" nodeType="clickEffect">
                                   <p:stCondLst>
                                     <p:cond delay="0"/>
                                   </p:stCondLst>
@@ -28122,52 +28594,14 @@
                                         <p:strVal val="visible"/>
                                       </p:to>
                                     </p:set>
-                                    <p:anim calcmode="lin" valueType="num">
-                                      <p:cBhvr additive="base">
-                                        <p:cTn id="7" dur="500" fill="hold"/>
+                                    <p:animEffect transition="in" filter="fade">
+                                      <p:cBhvr>
+                                        <p:cTn id="7" dur="500"/>
                                         <p:tgtEl>
                                           <p:spTgt spid="1026"/>
                                         </p:tgtEl>
-                                        <p:attrNameLst>
-                                          <p:attrName>ppt_x</p:attrName>
-                                        </p:attrNameLst>
                                       </p:cBhvr>
-                                      <p:tavLst>
-                                        <p:tav tm="0">
-                                          <p:val>
-                                            <p:strVal val="#ppt_x"/>
-                                          </p:val>
-                                        </p:tav>
-                                        <p:tav tm="100000">
-                                          <p:val>
-                                            <p:strVal val="#ppt_x"/>
-                                          </p:val>
-                                        </p:tav>
-                                      </p:tavLst>
-                                    </p:anim>
-                                    <p:anim calcmode="lin" valueType="num">
-                                      <p:cBhvr additive="base">
-                                        <p:cTn id="8" dur="500" fill="hold"/>
-                                        <p:tgtEl>
-                                          <p:spTgt spid="1026"/>
-                                        </p:tgtEl>
-                                        <p:attrNameLst>
-                                          <p:attrName>ppt_y</p:attrName>
-                                        </p:attrNameLst>
-                                      </p:cBhvr>
-                                      <p:tavLst>
-                                        <p:tav tm="0">
-                                          <p:val>
-                                            <p:strVal val="1+#ppt_h/2"/>
-                                          </p:val>
-                                        </p:tav>
-                                        <p:tav tm="100000">
-                                          <p:val>
-                                            <p:strVal val="#ppt_y"/>
-                                          </p:val>
-                                        </p:tav>
-                                      </p:tavLst>
-                                    </p:anim>
+                                    </p:animEffect>
                                   </p:childTnLst>
                                 </p:cTn>
                               </p:par>

</xml_diff>

<commit_message>
Added HTTP Verb info to presentation
</commit_message>
<xml_diff>
--- a/Presentation/RESTful APIs.pptx
+++ b/Presentation/RESTful APIs.pptx
@@ -6,18 +6,20 @@
   </p:sldMasterIdLst>
   <p:sldIdLst>
     <p:sldId id="256" r:id="rId2"/>
-    <p:sldId id="257" r:id="rId3"/>
-    <p:sldId id="258" r:id="rId4"/>
-    <p:sldId id="259" r:id="rId5"/>
-    <p:sldId id="260" r:id="rId6"/>
-    <p:sldId id="261" r:id="rId7"/>
-    <p:sldId id="262" r:id="rId8"/>
-    <p:sldId id="263" r:id="rId9"/>
-    <p:sldId id="264" r:id="rId10"/>
-    <p:sldId id="265" r:id="rId11"/>
-    <p:sldId id="266" r:id="rId12"/>
-    <p:sldId id="267" r:id="rId13"/>
-    <p:sldId id="268" r:id="rId14"/>
+    <p:sldId id="270" r:id="rId3"/>
+    <p:sldId id="257" r:id="rId4"/>
+    <p:sldId id="258" r:id="rId5"/>
+    <p:sldId id="259" r:id="rId6"/>
+    <p:sldId id="260" r:id="rId7"/>
+    <p:sldId id="261" r:id="rId8"/>
+    <p:sldId id="262" r:id="rId9"/>
+    <p:sldId id="263" r:id="rId10"/>
+    <p:sldId id="264" r:id="rId11"/>
+    <p:sldId id="265" r:id="rId12"/>
+    <p:sldId id="266" r:id="rId13"/>
+    <p:sldId id="267" r:id="rId14"/>
+    <p:sldId id="268" r:id="rId15"/>
+    <p:sldId id="269" r:id="rId16"/>
   </p:sldIdLst>
   <p:sldSz cx="12192000" cy="6858000"/>
   <p:notesSz cx="6858000" cy="9144000"/>
@@ -25731,6 +25733,258 @@
           <a:p>
             <a:r>
               <a:rPr lang="en-US" dirty="0" smtClean="0"/>
+              <a:t>Layered System</a:t>
+            </a:r>
+          </a:p>
+          <a:p>
+            <a:pPr lvl="1"/>
+            <a:r>
+              <a:rPr lang="en-US" dirty="0" smtClean="0"/>
+              <a:t>Client not necessarily talking directly to server</a:t>
+            </a:r>
+          </a:p>
+          <a:p>
+            <a:pPr lvl="1"/>
+            <a:r>
+              <a:rPr lang="en-US" dirty="0" smtClean="0"/>
+              <a:t>Layers can only “see” each other</a:t>
+            </a:r>
+          </a:p>
+          <a:p>
+            <a:pPr lvl="1"/>
+            <a:r>
+              <a:rPr lang="en-US" dirty="0" smtClean="0"/>
+              <a:t>Supports firewalls, proxies, etc.</a:t>
+            </a:r>
+            <a:endParaRPr lang="en-US" dirty="0"/>
+          </a:p>
+        </p:txBody>
+      </p:sp>
+      <p:pic>
+        <p:nvPicPr>
+          <p:cNvPr id="1026" name="Picture 2" descr="HTTP intermediaries"/>
+          <p:cNvPicPr>
+            <a:picLocks noChangeAspect="1" noChangeArrowheads="1"/>
+          </p:cNvPicPr>
+          <p:nvPr/>
+        </p:nvPicPr>
+        <p:blipFill>
+          <a:blip r:embed="rId2">
+            <a:extLst>
+              <a:ext uri="{28A0092B-C50C-407E-A947-70E740481C1C}">
+                <a14:useLocalDpi xmlns:a14="http://schemas.microsoft.com/office/drawing/2010/main" val="0"/>
+              </a:ext>
+            </a:extLst>
+          </a:blip>
+          <a:srcRect/>
+          <a:stretch>
+            <a:fillRect/>
+          </a:stretch>
+        </p:blipFill>
+        <p:spPr bwMode="auto">
+          <a:xfrm>
+            <a:off x="1720849" y="1933145"/>
+            <a:ext cx="8750302" cy="4383517"/>
+          </a:xfrm>
+          <a:prstGeom prst="rect">
+            <a:avLst/>
+          </a:prstGeom>
+          <a:solidFill>
+            <a:srgbClr val="FFFFFF">
+              <a:shade val="85000"/>
+            </a:srgbClr>
+          </a:solidFill>
+          <a:ln w="190500" cap="sq">
+            <a:solidFill>
+              <a:srgbClr val="FFFFFF"/>
+            </a:solidFill>
+            <a:miter lim="800000"/>
+          </a:ln>
+          <a:effectLst>
+            <a:outerShdw blurRad="65000" dist="50800" dir="12900000" kx="195000" ky="145000" algn="tl" rotWithShape="0">
+              <a:srgbClr val="000000">
+                <a:alpha val="30000"/>
+              </a:srgbClr>
+            </a:outerShdw>
+          </a:effectLst>
+          <a:scene3d>
+            <a:camera prst="orthographicFront">
+              <a:rot lat="0" lon="0" rev="360000"/>
+            </a:camera>
+            <a:lightRig rig="twoPt" dir="t">
+              <a:rot lat="0" lon="0" rev="7200000"/>
+            </a:lightRig>
+          </a:scene3d>
+          <a:sp3d contourW="12700">
+            <a:bevelT w="25400" h="19050"/>
+            <a:contourClr>
+              <a:srgbClr val="969696"/>
+            </a:contourClr>
+          </a:sp3d>
+          <a:extLst>
+            <a:ext uri="{909E8E84-426E-40DD-AFC4-6F175D3DCCD1}">
+              <a14:hiddenFill xmlns:a14="http://schemas.microsoft.com/office/drawing/2010/main">
+                <a:solidFill>
+                  <a:srgbClr val="FFFFFF"/>
+                </a:solidFill>
+              </a14:hiddenFill>
+            </a:ext>
+          </a:extLst>
+        </p:spPr>
+      </p:pic>
+    </p:spTree>
+    <p:extLst>
+      <p:ext uri="{BB962C8B-B14F-4D97-AF65-F5344CB8AC3E}">
+        <p14:creationId xmlns:p14="http://schemas.microsoft.com/office/powerpoint/2010/main" val="747035740"/>
+      </p:ext>
+    </p:extLst>
+  </p:cSld>
+  <p:clrMapOvr>
+    <a:masterClrMapping/>
+  </p:clrMapOvr>
+  <p:timing>
+    <p:tnLst>
+      <p:par>
+        <p:cTn id="1" dur="indefinite" restart="never" nodeType="tmRoot">
+          <p:childTnLst>
+            <p:seq concurrent="1" nextAc="seek">
+              <p:cTn id="2" dur="indefinite" nodeType="mainSeq">
+                <p:childTnLst>
+                  <p:par>
+                    <p:cTn id="3" fill="hold">
+                      <p:stCondLst>
+                        <p:cond delay="indefinite"/>
+                      </p:stCondLst>
+                      <p:childTnLst>
+                        <p:par>
+                          <p:cTn id="4" fill="hold">
+                            <p:stCondLst>
+                              <p:cond delay="0"/>
+                            </p:stCondLst>
+                            <p:childTnLst>
+                              <p:par>
+                                <p:cTn id="5" presetID="10" presetClass="entr" presetSubtype="0" fill="hold" nodeType="clickEffect">
+                                  <p:stCondLst>
+                                    <p:cond delay="0"/>
+                                  </p:stCondLst>
+                                  <p:childTnLst>
+                                    <p:set>
+                                      <p:cBhvr>
+                                        <p:cTn id="6" dur="1" fill="hold">
+                                          <p:stCondLst>
+                                            <p:cond delay="0"/>
+                                          </p:stCondLst>
+                                        </p:cTn>
+                                        <p:tgtEl>
+                                          <p:spTgt spid="1026"/>
+                                        </p:tgtEl>
+                                        <p:attrNameLst>
+                                          <p:attrName>style.visibility</p:attrName>
+                                        </p:attrNameLst>
+                                      </p:cBhvr>
+                                      <p:to>
+                                        <p:strVal val="visible"/>
+                                      </p:to>
+                                    </p:set>
+                                    <p:animEffect transition="in" filter="fade">
+                                      <p:cBhvr>
+                                        <p:cTn id="7" dur="500"/>
+                                        <p:tgtEl>
+                                          <p:spTgt spid="1026"/>
+                                        </p:tgtEl>
+                                      </p:cBhvr>
+                                    </p:animEffect>
+                                  </p:childTnLst>
+                                </p:cTn>
+                              </p:par>
+                            </p:childTnLst>
+                          </p:cTn>
+                        </p:par>
+                      </p:childTnLst>
+                    </p:cTn>
+                  </p:par>
+                </p:childTnLst>
+              </p:cTn>
+              <p:prevCondLst>
+                <p:cond evt="onPrev" delay="0">
+                  <p:tgtEl>
+                    <p:sldTgt/>
+                  </p:tgtEl>
+                </p:cond>
+              </p:prevCondLst>
+              <p:nextCondLst>
+                <p:cond evt="onNext" delay="0">
+                  <p:tgtEl>
+                    <p:sldTgt/>
+                  </p:tgtEl>
+                </p:cond>
+              </p:nextCondLst>
+            </p:seq>
+          </p:childTnLst>
+        </p:cTn>
+      </p:par>
+    </p:tnLst>
+  </p:timing>
+</p:sld>
+</file>
+
+<file path=ppt/slides/slide11.xml><?xml version="1.0" encoding="utf-8"?>
+<p:sld xmlns:a="http://schemas.openxmlformats.org/drawingml/2006/main" xmlns:r="http://schemas.openxmlformats.org/officeDocument/2006/relationships" xmlns:p="http://schemas.openxmlformats.org/presentationml/2006/main">
+  <p:cSld>
+    <p:spTree>
+      <p:nvGrpSpPr>
+        <p:cNvPr id="1" name=""/>
+        <p:cNvGrpSpPr/>
+        <p:nvPr/>
+      </p:nvGrpSpPr>
+      <p:grpSpPr>
+        <a:xfrm>
+          <a:off x="0" y="0"/>
+          <a:ext cx="0" cy="0"/>
+          <a:chOff x="0" y="0"/>
+          <a:chExt cx="0" cy="0"/>
+        </a:xfrm>
+      </p:grpSpPr>
+      <p:sp>
+        <p:nvSpPr>
+          <p:cNvPr id="2" name="Title 1"/>
+          <p:cNvSpPr>
+            <a:spLocks noGrp="1"/>
+          </p:cNvSpPr>
+          <p:nvPr>
+            <p:ph type="title"/>
+          </p:nvPr>
+        </p:nvSpPr>
+        <p:spPr/>
+        <p:txBody>
+          <a:bodyPr/>
+          <a:lstStyle/>
+          <a:p>
+            <a:r>
+              <a:rPr lang="en-US" dirty="0" smtClean="0"/>
+              <a:t>Constraints</a:t>
+            </a:r>
+            <a:endParaRPr lang="en-US" dirty="0"/>
+          </a:p>
+        </p:txBody>
+      </p:sp>
+      <p:sp>
+        <p:nvSpPr>
+          <p:cNvPr id="3" name="Content Placeholder 2"/>
+          <p:cNvSpPr>
+            <a:spLocks noGrp="1"/>
+          </p:cNvSpPr>
+          <p:nvPr>
+            <p:ph idx="1"/>
+          </p:nvPr>
+        </p:nvSpPr>
+        <p:spPr/>
+        <p:txBody>
+          <a:bodyPr/>
+          <a:lstStyle/>
+          <a:p>
+            <a:r>
+              <a:rPr lang="en-US" dirty="0" smtClean="0"/>
               <a:t>Code on Demand</a:t>
             </a:r>
           </a:p>
@@ -25783,7 +26037,7 @@
 </p:sld>
 </file>
 
-<file path=ppt/slides/slide11.xml><?xml version="1.0" encoding="utf-8"?>
+<file path=ppt/slides/slide12.xml><?xml version="1.0" encoding="utf-8"?>
 <p:sld xmlns:a="http://schemas.openxmlformats.org/drawingml/2006/main" xmlns:r="http://schemas.openxmlformats.org/officeDocument/2006/relationships" xmlns:p="http://schemas.openxmlformats.org/presentationml/2006/main">
   <p:cSld>
     <p:spTree>
@@ -25899,7 +26153,7 @@
 </p:sld>
 </file>
 
-<file path=ppt/slides/slide12.xml><?xml version="1.0" encoding="utf-8"?>
+<file path=ppt/slides/slide13.xml><?xml version="1.0" encoding="utf-8"?>
 <p:sld xmlns:a="http://schemas.openxmlformats.org/drawingml/2006/main" xmlns:r="http://schemas.openxmlformats.org/officeDocument/2006/relationships" xmlns:p="http://schemas.openxmlformats.org/presentationml/2006/main">
   <p:cSld>
     <p:spTree>
@@ -26040,7 +26294,7 @@
 </p:sld>
 </file>
 
-<file path=ppt/slides/slide13.xml><?xml version="1.0" encoding="utf-8"?>
+<file path=ppt/slides/slide14.xml><?xml version="1.0" encoding="utf-8"?>
 <p:sld xmlns:a="http://schemas.openxmlformats.org/drawingml/2006/main" xmlns:r="http://schemas.openxmlformats.org/officeDocument/2006/relationships" xmlns:p="http://schemas.openxmlformats.org/presentationml/2006/main">
   <p:cSld>
     <p:spTree>
@@ -26221,7 +26475,574 @@
 </p:sld>
 </file>
 
+<file path=ppt/slides/slide15.xml><?xml version="1.0" encoding="utf-8"?>
+<p:sld xmlns:a="http://schemas.openxmlformats.org/drawingml/2006/main" xmlns:r="http://schemas.openxmlformats.org/officeDocument/2006/relationships" xmlns:p="http://schemas.openxmlformats.org/presentationml/2006/main">
+  <p:cSld>
+    <p:spTree>
+      <p:nvGrpSpPr>
+        <p:cNvPr id="1" name=""/>
+        <p:cNvGrpSpPr/>
+        <p:nvPr/>
+      </p:nvGrpSpPr>
+      <p:grpSpPr>
+        <a:xfrm>
+          <a:off x="0" y="0"/>
+          <a:ext cx="0" cy="0"/>
+          <a:chOff x="0" y="0"/>
+          <a:chExt cx="0" cy="0"/>
+        </a:xfrm>
+      </p:grpSpPr>
+      <p:sp>
+        <p:nvSpPr>
+          <p:cNvPr id="2" name="Title 1"/>
+          <p:cNvSpPr>
+            <a:spLocks noGrp="1"/>
+          </p:cNvSpPr>
+          <p:nvPr>
+            <p:ph type="title"/>
+          </p:nvPr>
+        </p:nvSpPr>
+        <p:spPr/>
+        <p:txBody>
+          <a:bodyPr/>
+          <a:lstStyle/>
+          <a:p>
+            <a:r>
+              <a:rPr lang="en-US" dirty="0" smtClean="0"/>
+              <a:t>HTTP Verbs</a:t>
+            </a:r>
+            <a:endParaRPr lang="en-US" dirty="0"/>
+          </a:p>
+        </p:txBody>
+      </p:sp>
+      <p:sp>
+        <p:nvSpPr>
+          <p:cNvPr id="3" name="Content Placeholder 2"/>
+          <p:cNvSpPr>
+            <a:spLocks noGrp="1"/>
+          </p:cNvSpPr>
+          <p:nvPr>
+            <p:ph idx="1"/>
+          </p:nvPr>
+        </p:nvSpPr>
+        <p:spPr/>
+        <p:txBody>
+          <a:bodyPr/>
+          <a:lstStyle/>
+          <a:p>
+            <a:r>
+              <a:rPr lang="en-US" dirty="0"/>
+              <a:t>HTTP </a:t>
+            </a:r>
+            <a:r>
+              <a:rPr lang="en-US" dirty="0" smtClean="0"/>
+              <a:t>Verbs</a:t>
+            </a:r>
+          </a:p>
+          <a:p>
+            <a:pPr marL="0" indent="0">
+              <a:buNone/>
+            </a:pPr>
+            <a:endParaRPr lang="en-US" dirty="0"/>
+          </a:p>
+        </p:txBody>
+      </p:sp>
+      <p:graphicFrame>
+        <p:nvGraphicFramePr>
+          <p:cNvPr id="5" name="Table 4"/>
+          <p:cNvGraphicFramePr>
+            <a:graphicFrameLocks noGrp="1"/>
+          </p:cNvGraphicFramePr>
+          <p:nvPr>
+            <p:extLst>
+              <p:ext uri="{D42A27DB-BD31-4B8C-83A1-F6EECF244321}">
+                <p14:modId xmlns:p14="http://schemas.microsoft.com/office/powerpoint/2010/main" val="1126061055"/>
+              </p:ext>
+            </p:extLst>
+          </p:nvPr>
+        </p:nvGraphicFramePr>
+        <p:xfrm>
+          <a:off x="1695450" y="2438400"/>
+          <a:ext cx="8801100" cy="3422650"/>
+        </p:xfrm>
+        <a:graphic>
+          <a:graphicData uri="http://schemas.openxmlformats.org/drawingml/2006/table">
+            <a:tbl>
+              <a:tblPr firstRow="1">
+                <a:effectLst>
+                  <a:outerShdw blurRad="76200" dir="13500000" sy="23000" kx="1200000" algn="br" rotWithShape="0">
+                    <a:prstClr val="black">
+                      <a:alpha val="20000"/>
+                    </a:prstClr>
+                  </a:outerShdw>
+                  <a:reflection blurRad="6350" stA="50000" endA="300" endPos="55500" dist="101600" dir="5400000" sy="-100000" algn="bl" rotWithShape="0"/>
+                </a:effectLst>
+                <a:tableStyleId>{08FB837D-C827-4EFA-A057-4D05807E0F7C}</a:tableStyleId>
+              </a:tblPr>
+              <a:tblGrid>
+                <a:gridCol w="2292872"/>
+                <a:gridCol w="6508228"/>
+              </a:tblGrid>
+              <a:tr h="488950">
+                <a:tc>
+                  <a:txBody>
+                    <a:bodyPr/>
+                    <a:lstStyle/>
+                    <a:p>
+                      <a:pPr algn="l" fontAlgn="b"/>
+                      <a:r>
+                        <a:rPr lang="en-US" sz="2400" u="none" strike="noStrike" dirty="0" smtClean="0">
+                          <a:effectLst/>
+                        </a:rPr>
+                        <a:t>Verb</a:t>
+                      </a:r>
+                      <a:endParaRPr lang="en-US" sz="2400" b="0" i="0" u="none" strike="noStrike" dirty="0">
+                        <a:solidFill>
+                          <a:srgbClr val="000000"/>
+                        </a:solidFill>
+                        <a:effectLst/>
+                        <a:latin typeface="Calibri" panose="020F0502020204030204" pitchFamily="34" charset="0"/>
+                      </a:endParaRPr>
+                    </a:p>
+                  </a:txBody>
+                  <a:tcPr marL="9525" marR="9525" marT="9525" marB="0" anchor="b"/>
+                </a:tc>
+                <a:tc>
+                  <a:txBody>
+                    <a:bodyPr/>
+                    <a:lstStyle/>
+                    <a:p>
+                      <a:pPr algn="l" fontAlgn="b"/>
+                      <a:r>
+                        <a:rPr lang="en-US" sz="2400" u="none" strike="noStrike" dirty="0" smtClean="0">
+                          <a:effectLst/>
+                        </a:rPr>
+                        <a:t>Usage</a:t>
+                      </a:r>
+                      <a:endParaRPr lang="en-US" sz="2400" b="0" i="0" u="none" strike="noStrike" dirty="0">
+                        <a:solidFill>
+                          <a:srgbClr val="000000"/>
+                        </a:solidFill>
+                        <a:effectLst/>
+                        <a:latin typeface="Calibri" panose="020F0502020204030204" pitchFamily="34" charset="0"/>
+                      </a:endParaRPr>
+                    </a:p>
+                  </a:txBody>
+                  <a:tcPr marL="9525" marR="9525" marT="9525" marB="0" anchor="b"/>
+                </a:tc>
+              </a:tr>
+              <a:tr h="488950">
+                <a:tc>
+                  <a:txBody>
+                    <a:bodyPr/>
+                    <a:lstStyle/>
+                    <a:p>
+                      <a:pPr algn="l" fontAlgn="b"/>
+                      <a:r>
+                        <a:rPr lang="en-US" sz="2400" u="none" strike="noStrike" dirty="0">
+                          <a:effectLst/>
+                        </a:rPr>
+                        <a:t>GET</a:t>
+                      </a:r>
+                      <a:endParaRPr lang="en-US" sz="2400" b="0" i="0" u="none" strike="noStrike" dirty="0">
+                        <a:solidFill>
+                          <a:srgbClr val="000000"/>
+                        </a:solidFill>
+                        <a:effectLst/>
+                        <a:latin typeface="Calibri" panose="020F0502020204030204" pitchFamily="34" charset="0"/>
+                      </a:endParaRPr>
+                    </a:p>
+                  </a:txBody>
+                  <a:tcPr marL="9525" marR="9525" marT="9525" marB="0" anchor="ctr"/>
+                </a:tc>
+                <a:tc>
+                  <a:txBody>
+                    <a:bodyPr/>
+                    <a:lstStyle/>
+                    <a:p>
+                      <a:pPr algn="l" fontAlgn="b"/>
+                      <a:r>
+                        <a:rPr lang="en-US" sz="2400" u="none" strike="noStrike" dirty="0">
+                          <a:effectLst/>
+                        </a:rPr>
+                        <a:t>read</a:t>
+                      </a:r>
+                      <a:endParaRPr lang="en-US" sz="2400" b="0" i="0" u="none" strike="noStrike" dirty="0">
+                        <a:solidFill>
+                          <a:srgbClr val="000000"/>
+                        </a:solidFill>
+                        <a:effectLst/>
+                        <a:latin typeface="Calibri" panose="020F0502020204030204" pitchFamily="34" charset="0"/>
+                      </a:endParaRPr>
+                    </a:p>
+                  </a:txBody>
+                  <a:tcPr marL="9525" marR="9525" marT="9525" marB="0" anchor="ctr"/>
+                </a:tc>
+              </a:tr>
+              <a:tr h="488950">
+                <a:tc>
+                  <a:txBody>
+                    <a:bodyPr/>
+                    <a:lstStyle/>
+                    <a:p>
+                      <a:pPr algn="l" fontAlgn="b"/>
+                      <a:r>
+                        <a:rPr lang="en-US" sz="2400" u="none" strike="noStrike" dirty="0" smtClean="0">
+                          <a:effectLst/>
+                        </a:rPr>
+                        <a:t>HEAD</a:t>
+                      </a:r>
+                      <a:endParaRPr lang="en-US" sz="2400" b="0" i="0" u="none" strike="noStrike" dirty="0">
+                        <a:solidFill>
+                          <a:srgbClr val="000000"/>
+                        </a:solidFill>
+                        <a:effectLst/>
+                        <a:latin typeface="Calibri" panose="020F0502020204030204" pitchFamily="34" charset="0"/>
+                      </a:endParaRPr>
+                    </a:p>
+                  </a:txBody>
+                  <a:tcPr marL="9525" marR="9525" marT="9525" marB="0" anchor="ctr"/>
+                </a:tc>
+                <a:tc>
+                  <a:txBody>
+                    <a:bodyPr/>
+                    <a:lstStyle/>
+                    <a:p>
+                      <a:pPr algn="l" fontAlgn="b"/>
+                      <a:r>
+                        <a:rPr lang="en-US" sz="2400" b="0" i="0" u="none" strike="noStrike" dirty="0" smtClean="0">
+                          <a:solidFill>
+                            <a:schemeClr val="dk1"/>
+                          </a:solidFill>
+                          <a:effectLst/>
+                          <a:latin typeface="+mn-lt"/>
+                        </a:rPr>
+                        <a:t>like</a:t>
+                      </a:r>
+                      <a:r>
+                        <a:rPr lang="en-US" sz="2400" b="0" i="0" u="none" strike="noStrike" baseline="0" dirty="0" smtClean="0">
+                          <a:solidFill>
+                            <a:schemeClr val="dk1"/>
+                          </a:solidFill>
+                          <a:effectLst/>
+                          <a:latin typeface="+mn-lt"/>
+                        </a:rPr>
+                        <a:t> GET, but returns only headers</a:t>
+                      </a:r>
+                      <a:endParaRPr lang="en-US" sz="2400" b="0" i="0" u="none" strike="noStrike" dirty="0">
+                        <a:solidFill>
+                          <a:srgbClr val="000000"/>
+                        </a:solidFill>
+                        <a:effectLst/>
+                        <a:latin typeface="Calibri" panose="020F0502020204030204" pitchFamily="34" charset="0"/>
+                      </a:endParaRPr>
+                    </a:p>
+                  </a:txBody>
+                  <a:tcPr marL="9525" marR="9525" marT="9525" marB="0" anchor="ctr"/>
+                </a:tc>
+              </a:tr>
+              <a:tr h="488950">
+                <a:tc>
+                  <a:txBody>
+                    <a:bodyPr/>
+                    <a:lstStyle/>
+                    <a:p>
+                      <a:pPr algn="l" fontAlgn="b"/>
+                      <a:r>
+                        <a:rPr lang="en-US" sz="2400" u="none" strike="noStrike">
+                          <a:effectLst/>
+                        </a:rPr>
+                        <a:t>POST</a:t>
+                      </a:r>
+                      <a:endParaRPr lang="en-US" sz="2400" b="0" i="0" u="none" strike="noStrike">
+                        <a:solidFill>
+                          <a:srgbClr val="000000"/>
+                        </a:solidFill>
+                        <a:effectLst/>
+                        <a:latin typeface="Calibri" panose="020F0502020204030204" pitchFamily="34" charset="0"/>
+                      </a:endParaRPr>
+                    </a:p>
+                  </a:txBody>
+                  <a:tcPr marL="9525" marR="9525" marT="9525" marB="0" anchor="ctr"/>
+                </a:tc>
+                <a:tc>
+                  <a:txBody>
+                    <a:bodyPr/>
+                    <a:lstStyle/>
+                    <a:p>
+                      <a:pPr algn="l" fontAlgn="b"/>
+                      <a:r>
+                        <a:rPr lang="en-US" sz="2400" u="none" strike="noStrike" dirty="0">
+                          <a:effectLst/>
+                        </a:rPr>
+                        <a:t>create and other uses</a:t>
+                      </a:r>
+                      <a:endParaRPr lang="en-US" sz="2400" b="0" i="0" u="none" strike="noStrike" dirty="0">
+                        <a:solidFill>
+                          <a:srgbClr val="000000"/>
+                        </a:solidFill>
+                        <a:effectLst/>
+                        <a:latin typeface="Calibri" panose="020F0502020204030204" pitchFamily="34" charset="0"/>
+                      </a:endParaRPr>
+                    </a:p>
+                  </a:txBody>
+                  <a:tcPr marL="9525" marR="9525" marT="9525" marB="0" anchor="ctr"/>
+                </a:tc>
+              </a:tr>
+              <a:tr h="488950">
+                <a:tc>
+                  <a:txBody>
+                    <a:bodyPr/>
+                    <a:lstStyle/>
+                    <a:p>
+                      <a:pPr algn="l" fontAlgn="b"/>
+                      <a:r>
+                        <a:rPr lang="en-US" sz="2400" u="none" strike="noStrike">
+                          <a:effectLst/>
+                        </a:rPr>
+                        <a:t>PUT</a:t>
+                      </a:r>
+                      <a:endParaRPr lang="en-US" sz="2400" b="0" i="0" u="none" strike="noStrike">
+                        <a:solidFill>
+                          <a:srgbClr val="000000"/>
+                        </a:solidFill>
+                        <a:effectLst/>
+                        <a:latin typeface="Calibri" panose="020F0502020204030204" pitchFamily="34" charset="0"/>
+                      </a:endParaRPr>
+                    </a:p>
+                  </a:txBody>
+                  <a:tcPr marL="9525" marR="9525" marT="9525" marB="0" anchor="ctr"/>
+                </a:tc>
+                <a:tc>
+                  <a:txBody>
+                    <a:bodyPr/>
+                    <a:lstStyle/>
+                    <a:p>
+                      <a:pPr algn="l" fontAlgn="b"/>
+                      <a:r>
+                        <a:rPr lang="en-US" sz="2400" u="none" strike="noStrike" dirty="0">
+                          <a:effectLst/>
+                        </a:rPr>
+                        <a:t>update</a:t>
+                      </a:r>
+                      <a:endParaRPr lang="en-US" sz="2400" b="0" i="0" u="none" strike="noStrike" dirty="0">
+                        <a:solidFill>
+                          <a:srgbClr val="000000"/>
+                        </a:solidFill>
+                        <a:effectLst/>
+                        <a:latin typeface="Calibri" panose="020F0502020204030204" pitchFamily="34" charset="0"/>
+                      </a:endParaRPr>
+                    </a:p>
+                  </a:txBody>
+                  <a:tcPr marL="9525" marR="9525" marT="9525" marB="0" anchor="ctr"/>
+                </a:tc>
+              </a:tr>
+              <a:tr h="488950">
+                <a:tc>
+                  <a:txBody>
+                    <a:bodyPr/>
+                    <a:lstStyle/>
+                    <a:p>
+                      <a:pPr algn="l" fontAlgn="b"/>
+                      <a:r>
+                        <a:rPr lang="en-US" sz="2400" u="none" strike="noStrike">
+                          <a:effectLst/>
+                        </a:rPr>
+                        <a:t>DELETE</a:t>
+                      </a:r>
+                      <a:endParaRPr lang="en-US" sz="2400" b="0" i="0" u="none" strike="noStrike">
+                        <a:solidFill>
+                          <a:srgbClr val="000000"/>
+                        </a:solidFill>
+                        <a:effectLst/>
+                        <a:latin typeface="Calibri" panose="020F0502020204030204" pitchFamily="34" charset="0"/>
+                      </a:endParaRPr>
+                    </a:p>
+                  </a:txBody>
+                  <a:tcPr marL="9525" marR="9525" marT="9525" marB="0" anchor="ctr"/>
+                </a:tc>
+                <a:tc>
+                  <a:txBody>
+                    <a:bodyPr/>
+                    <a:lstStyle/>
+                    <a:p>
+                      <a:pPr algn="l" fontAlgn="b"/>
+                      <a:r>
+                        <a:rPr lang="en-US" sz="2400" u="none" strike="noStrike" dirty="0">
+                          <a:effectLst/>
+                        </a:rPr>
+                        <a:t>remove</a:t>
+                      </a:r>
+                      <a:endParaRPr lang="en-US" sz="2400" b="0" i="0" u="none" strike="noStrike" dirty="0">
+                        <a:solidFill>
+                          <a:srgbClr val="000000"/>
+                        </a:solidFill>
+                        <a:effectLst/>
+                        <a:latin typeface="Calibri" panose="020F0502020204030204" pitchFamily="34" charset="0"/>
+                      </a:endParaRPr>
+                    </a:p>
+                  </a:txBody>
+                  <a:tcPr marL="9525" marR="9525" marT="9525" marB="0" anchor="ctr"/>
+                </a:tc>
+              </a:tr>
+              <a:tr h="488950">
+                <a:tc>
+                  <a:txBody>
+                    <a:bodyPr/>
+                    <a:lstStyle/>
+                    <a:p>
+                      <a:pPr algn="l" fontAlgn="b"/>
+                      <a:r>
+                        <a:rPr lang="en-US" sz="2400" u="none" strike="noStrike">
+                          <a:effectLst/>
+                        </a:rPr>
+                        <a:t>OPTIONS</a:t>
+                      </a:r>
+                      <a:endParaRPr lang="en-US" sz="2400" b="0" i="0" u="none" strike="noStrike">
+                        <a:solidFill>
+                          <a:srgbClr val="000000"/>
+                        </a:solidFill>
+                        <a:effectLst/>
+                        <a:latin typeface="Calibri" panose="020F0502020204030204" pitchFamily="34" charset="0"/>
+                      </a:endParaRPr>
+                    </a:p>
+                  </a:txBody>
+                  <a:tcPr marL="9525" marR="9525" marT="9525" marB="0" anchor="ctr"/>
+                </a:tc>
+                <a:tc>
+                  <a:txBody>
+                    <a:bodyPr/>
+                    <a:lstStyle/>
+                    <a:p>
+                      <a:pPr algn="l" fontAlgn="b"/>
+                      <a:r>
+                        <a:rPr lang="en-US" sz="2400" u="none" strike="noStrike" dirty="0">
+                          <a:effectLst/>
+                        </a:rPr>
+                        <a:t>documentation</a:t>
+                      </a:r>
+                      <a:endParaRPr lang="en-US" sz="2400" b="0" i="0" u="none" strike="noStrike" dirty="0">
+                        <a:solidFill>
+                          <a:srgbClr val="000000"/>
+                        </a:solidFill>
+                        <a:effectLst/>
+                        <a:latin typeface="Calibri" panose="020F0502020204030204" pitchFamily="34" charset="0"/>
+                      </a:endParaRPr>
+                    </a:p>
+                  </a:txBody>
+                  <a:tcPr marL="9525" marR="9525" marT="9525" marB="0" anchor="ctr"/>
+                </a:tc>
+              </a:tr>
+            </a:tbl>
+          </a:graphicData>
+        </a:graphic>
+      </p:graphicFrame>
+    </p:spTree>
+    <p:extLst>
+      <p:ext uri="{BB962C8B-B14F-4D97-AF65-F5344CB8AC3E}">
+        <p14:creationId xmlns:p14="http://schemas.microsoft.com/office/powerpoint/2010/main" val="2216012876"/>
+      </p:ext>
+    </p:extLst>
+  </p:cSld>
+  <p:clrMapOvr>
+    <a:masterClrMapping/>
+  </p:clrMapOvr>
+  <p:timing>
+    <p:tnLst>
+      <p:par>
+        <p:cTn id="1" dur="indefinite" restart="never" nodeType="tmRoot"/>
+      </p:par>
+    </p:tnLst>
+  </p:timing>
+</p:sld>
+</file>
+
 <file path=ppt/slides/slide2.xml><?xml version="1.0" encoding="utf-8"?>
+<p:sld xmlns:a="http://schemas.openxmlformats.org/drawingml/2006/main" xmlns:r="http://schemas.openxmlformats.org/officeDocument/2006/relationships" xmlns:p="http://schemas.openxmlformats.org/presentationml/2006/main">
+  <p:cSld>
+    <p:spTree>
+      <p:nvGrpSpPr>
+        <p:cNvPr id="1" name=""/>
+        <p:cNvGrpSpPr/>
+        <p:nvPr/>
+      </p:nvGrpSpPr>
+      <p:grpSpPr>
+        <a:xfrm>
+          <a:off x="0" y="0"/>
+          <a:ext cx="0" cy="0"/>
+          <a:chOff x="0" y="0"/>
+          <a:chExt cx="0" cy="0"/>
+        </a:xfrm>
+      </p:grpSpPr>
+      <p:sp>
+        <p:nvSpPr>
+          <p:cNvPr id="2" name="Title 1"/>
+          <p:cNvSpPr>
+            <a:spLocks noGrp="1"/>
+          </p:cNvSpPr>
+          <p:nvPr>
+            <p:ph type="title"/>
+          </p:nvPr>
+        </p:nvSpPr>
+        <p:spPr/>
+        <p:txBody>
+          <a:bodyPr/>
+          <a:lstStyle/>
+          <a:p>
+            <a:r>
+              <a:rPr lang="en-US" dirty="0" smtClean="0"/>
+              <a:t>Assumptions</a:t>
+            </a:r>
+            <a:endParaRPr lang="en-US" dirty="0"/>
+          </a:p>
+        </p:txBody>
+      </p:sp>
+      <p:sp>
+        <p:nvSpPr>
+          <p:cNvPr id="3" name="Content Placeholder 2"/>
+          <p:cNvSpPr>
+            <a:spLocks noGrp="1"/>
+          </p:cNvSpPr>
+          <p:nvPr>
+            <p:ph idx="1"/>
+          </p:nvPr>
+        </p:nvSpPr>
+        <p:spPr/>
+        <p:txBody>
+          <a:bodyPr/>
+          <a:lstStyle/>
+          <a:p>
+            <a:r>
+              <a:rPr lang="en-US" dirty="0" smtClean="0"/>
+              <a:t>Basic understanding of HTTP</a:t>
+            </a:r>
+          </a:p>
+          <a:p>
+            <a:endParaRPr lang="en-US" dirty="0"/>
+          </a:p>
+        </p:txBody>
+      </p:sp>
+    </p:spTree>
+    <p:extLst>
+      <p:ext uri="{BB962C8B-B14F-4D97-AF65-F5344CB8AC3E}">
+        <p14:creationId xmlns:p14="http://schemas.microsoft.com/office/powerpoint/2010/main" val="2906641828"/>
+      </p:ext>
+    </p:extLst>
+  </p:cSld>
+  <p:clrMapOvr>
+    <a:masterClrMapping/>
+  </p:clrMapOvr>
+  <p:timing>
+    <p:tnLst>
+      <p:par>
+        <p:cTn id="1" dur="indefinite" restart="never" nodeType="tmRoot"/>
+      </p:par>
+    </p:tnLst>
+  </p:timing>
+</p:sld>
+</file>
+
+<file path=ppt/slides/slide3.xml><?xml version="1.0" encoding="utf-8"?>
 <p:sld xmlns:a="http://schemas.openxmlformats.org/drawingml/2006/main" xmlns:r="http://schemas.openxmlformats.org/officeDocument/2006/relationships" xmlns:p="http://schemas.openxmlformats.org/presentationml/2006/main">
   <p:cSld>
     <p:spTree>
@@ -26682,7 +27503,7 @@
 </p:sld>
 </file>
 
-<file path=ppt/slides/slide3.xml><?xml version="1.0" encoding="utf-8"?>
+<file path=ppt/slides/slide4.xml><?xml version="1.0" encoding="utf-8"?>
 <p:sld xmlns:a="http://schemas.openxmlformats.org/drawingml/2006/main" xmlns:r="http://schemas.openxmlformats.org/officeDocument/2006/relationships" xmlns:p="http://schemas.openxmlformats.org/presentationml/2006/main">
   <p:cSld>
     <p:spTree>
@@ -26998,7 +27819,7 @@
 </p:sld>
 </file>
 
-<file path=ppt/slides/slide4.xml><?xml version="1.0" encoding="utf-8"?>
+<file path=ppt/slides/slide5.xml><?xml version="1.0" encoding="utf-8"?>
 <p:sld xmlns:a="http://schemas.openxmlformats.org/drawingml/2006/main" xmlns:r="http://schemas.openxmlformats.org/officeDocument/2006/relationships" xmlns:p="http://schemas.openxmlformats.org/presentationml/2006/main">
   <p:cSld>
     <p:spTree>
@@ -27330,7 +28151,7 @@
 </p:sld>
 </file>
 
-<file path=ppt/slides/slide5.xml><?xml version="1.0" encoding="utf-8"?>
+<file path=ppt/slides/slide6.xml><?xml version="1.0" encoding="utf-8"?>
 <p:sld xmlns:a="http://schemas.openxmlformats.org/drawingml/2006/main" xmlns:r="http://schemas.openxmlformats.org/officeDocument/2006/relationships" xmlns:p="http://schemas.openxmlformats.org/presentationml/2006/main">
   <p:cSld>
     <p:spTree>
@@ -27699,7 +28520,7 @@
 </p:sld>
 </file>
 
-<file path=ppt/slides/slide6.xml><?xml version="1.0" encoding="utf-8"?>
+<file path=ppt/slides/slide7.xml><?xml version="1.0" encoding="utf-8"?>
 <p:sld xmlns:a="http://schemas.openxmlformats.org/drawingml/2006/main" xmlns:r="http://schemas.openxmlformats.org/officeDocument/2006/relationships" xmlns:p="http://schemas.openxmlformats.org/presentationml/2006/main">
   <p:cSld>
     <p:spTree>
@@ -28109,7 +28930,7 @@
 </p:sld>
 </file>
 
-<file path=ppt/slides/slide7.xml><?xml version="1.0" encoding="utf-8"?>
+<file path=ppt/slides/slide8.xml><?xml version="1.0" encoding="utf-8"?>
 <p:sld xmlns:a="http://schemas.openxmlformats.org/drawingml/2006/main" xmlns:r="http://schemas.openxmlformats.org/officeDocument/2006/relationships" xmlns:p="http://schemas.openxmlformats.org/presentationml/2006/main">
   <p:cSld>
     <p:spTree>
@@ -28241,7 +29062,7 @@
 </p:sld>
 </file>
 
-<file path=ppt/slides/slide8.xml><?xml version="1.0" encoding="utf-8"?>
+<file path=ppt/slides/slide9.xml><?xml version="1.0" encoding="utf-8"?>
 <p:sld xmlns:a="http://schemas.openxmlformats.org/drawingml/2006/main" xmlns:r="http://schemas.openxmlformats.org/officeDocument/2006/relationships" xmlns:p="http://schemas.openxmlformats.org/presentationml/2006/main">
   <p:cSld>
     <p:spTree>
@@ -28378,258 +29199,6 @@
     <p:tnLst>
       <p:par>
         <p:cTn id="1" dur="indefinite" restart="never" nodeType="tmRoot"/>
-      </p:par>
-    </p:tnLst>
-  </p:timing>
-</p:sld>
-</file>
-
-<file path=ppt/slides/slide9.xml><?xml version="1.0" encoding="utf-8"?>
-<p:sld xmlns:a="http://schemas.openxmlformats.org/drawingml/2006/main" xmlns:r="http://schemas.openxmlformats.org/officeDocument/2006/relationships" xmlns:p="http://schemas.openxmlformats.org/presentationml/2006/main">
-  <p:cSld>
-    <p:spTree>
-      <p:nvGrpSpPr>
-        <p:cNvPr id="1" name=""/>
-        <p:cNvGrpSpPr/>
-        <p:nvPr/>
-      </p:nvGrpSpPr>
-      <p:grpSpPr>
-        <a:xfrm>
-          <a:off x="0" y="0"/>
-          <a:ext cx="0" cy="0"/>
-          <a:chOff x="0" y="0"/>
-          <a:chExt cx="0" cy="0"/>
-        </a:xfrm>
-      </p:grpSpPr>
-      <p:sp>
-        <p:nvSpPr>
-          <p:cNvPr id="2" name="Title 1"/>
-          <p:cNvSpPr>
-            <a:spLocks noGrp="1"/>
-          </p:cNvSpPr>
-          <p:nvPr>
-            <p:ph type="title"/>
-          </p:nvPr>
-        </p:nvSpPr>
-        <p:spPr/>
-        <p:txBody>
-          <a:bodyPr/>
-          <a:lstStyle/>
-          <a:p>
-            <a:r>
-              <a:rPr lang="en-US" dirty="0" smtClean="0"/>
-              <a:t>Constraints</a:t>
-            </a:r>
-            <a:endParaRPr lang="en-US" dirty="0"/>
-          </a:p>
-        </p:txBody>
-      </p:sp>
-      <p:sp>
-        <p:nvSpPr>
-          <p:cNvPr id="3" name="Content Placeholder 2"/>
-          <p:cNvSpPr>
-            <a:spLocks noGrp="1"/>
-          </p:cNvSpPr>
-          <p:nvPr>
-            <p:ph idx="1"/>
-          </p:nvPr>
-        </p:nvSpPr>
-        <p:spPr/>
-        <p:txBody>
-          <a:bodyPr/>
-          <a:lstStyle/>
-          <a:p>
-            <a:r>
-              <a:rPr lang="en-US" dirty="0" smtClean="0"/>
-              <a:t>Layered System</a:t>
-            </a:r>
-          </a:p>
-          <a:p>
-            <a:pPr lvl="1"/>
-            <a:r>
-              <a:rPr lang="en-US" dirty="0" smtClean="0"/>
-              <a:t>Client not necessarily talking directly to server</a:t>
-            </a:r>
-          </a:p>
-          <a:p>
-            <a:pPr lvl="1"/>
-            <a:r>
-              <a:rPr lang="en-US" dirty="0" smtClean="0"/>
-              <a:t>Layers can only “see” each other</a:t>
-            </a:r>
-          </a:p>
-          <a:p>
-            <a:pPr lvl="1"/>
-            <a:r>
-              <a:rPr lang="en-US" dirty="0" smtClean="0"/>
-              <a:t>Supports firewalls, proxies, etc.</a:t>
-            </a:r>
-            <a:endParaRPr lang="en-US" dirty="0"/>
-          </a:p>
-        </p:txBody>
-      </p:sp>
-      <p:pic>
-        <p:nvPicPr>
-          <p:cNvPr id="1026" name="Picture 2" descr="HTTP intermediaries"/>
-          <p:cNvPicPr>
-            <a:picLocks noChangeAspect="1" noChangeArrowheads="1"/>
-          </p:cNvPicPr>
-          <p:nvPr/>
-        </p:nvPicPr>
-        <p:blipFill>
-          <a:blip r:embed="rId2">
-            <a:extLst>
-              <a:ext uri="{28A0092B-C50C-407E-A947-70E740481C1C}">
-                <a14:useLocalDpi xmlns:a14="http://schemas.microsoft.com/office/drawing/2010/main" val="0"/>
-              </a:ext>
-            </a:extLst>
-          </a:blip>
-          <a:srcRect/>
-          <a:stretch>
-            <a:fillRect/>
-          </a:stretch>
-        </p:blipFill>
-        <p:spPr bwMode="auto">
-          <a:xfrm>
-            <a:off x="1720849" y="1933145"/>
-            <a:ext cx="8750302" cy="4383517"/>
-          </a:xfrm>
-          <a:prstGeom prst="rect">
-            <a:avLst/>
-          </a:prstGeom>
-          <a:solidFill>
-            <a:srgbClr val="FFFFFF">
-              <a:shade val="85000"/>
-            </a:srgbClr>
-          </a:solidFill>
-          <a:ln w="190500" cap="sq">
-            <a:solidFill>
-              <a:srgbClr val="FFFFFF"/>
-            </a:solidFill>
-            <a:miter lim="800000"/>
-          </a:ln>
-          <a:effectLst>
-            <a:outerShdw blurRad="65000" dist="50800" dir="12900000" kx="195000" ky="145000" algn="tl" rotWithShape="0">
-              <a:srgbClr val="000000">
-                <a:alpha val="30000"/>
-              </a:srgbClr>
-            </a:outerShdw>
-          </a:effectLst>
-          <a:scene3d>
-            <a:camera prst="orthographicFront">
-              <a:rot lat="0" lon="0" rev="360000"/>
-            </a:camera>
-            <a:lightRig rig="twoPt" dir="t">
-              <a:rot lat="0" lon="0" rev="7200000"/>
-            </a:lightRig>
-          </a:scene3d>
-          <a:sp3d contourW="12700">
-            <a:bevelT w="25400" h="19050"/>
-            <a:contourClr>
-              <a:srgbClr val="969696"/>
-            </a:contourClr>
-          </a:sp3d>
-          <a:extLst>
-            <a:ext uri="{909E8E84-426E-40DD-AFC4-6F175D3DCCD1}">
-              <a14:hiddenFill xmlns:a14="http://schemas.microsoft.com/office/drawing/2010/main">
-                <a:solidFill>
-                  <a:srgbClr val="FFFFFF"/>
-                </a:solidFill>
-              </a14:hiddenFill>
-            </a:ext>
-          </a:extLst>
-        </p:spPr>
-      </p:pic>
-    </p:spTree>
-    <p:extLst>
-      <p:ext uri="{BB962C8B-B14F-4D97-AF65-F5344CB8AC3E}">
-        <p14:creationId xmlns:p14="http://schemas.microsoft.com/office/powerpoint/2010/main" val="747035740"/>
-      </p:ext>
-    </p:extLst>
-  </p:cSld>
-  <p:clrMapOvr>
-    <a:masterClrMapping/>
-  </p:clrMapOvr>
-  <p:timing>
-    <p:tnLst>
-      <p:par>
-        <p:cTn id="1" dur="indefinite" restart="never" nodeType="tmRoot">
-          <p:childTnLst>
-            <p:seq concurrent="1" nextAc="seek">
-              <p:cTn id="2" dur="indefinite" nodeType="mainSeq">
-                <p:childTnLst>
-                  <p:par>
-                    <p:cTn id="3" fill="hold">
-                      <p:stCondLst>
-                        <p:cond delay="indefinite"/>
-                      </p:stCondLst>
-                      <p:childTnLst>
-                        <p:par>
-                          <p:cTn id="4" fill="hold">
-                            <p:stCondLst>
-                              <p:cond delay="0"/>
-                            </p:stCondLst>
-                            <p:childTnLst>
-                              <p:par>
-                                <p:cTn id="5" presetID="10" presetClass="entr" presetSubtype="0" fill="hold" nodeType="clickEffect">
-                                  <p:stCondLst>
-                                    <p:cond delay="0"/>
-                                  </p:stCondLst>
-                                  <p:childTnLst>
-                                    <p:set>
-                                      <p:cBhvr>
-                                        <p:cTn id="6" dur="1" fill="hold">
-                                          <p:stCondLst>
-                                            <p:cond delay="0"/>
-                                          </p:stCondLst>
-                                        </p:cTn>
-                                        <p:tgtEl>
-                                          <p:spTgt spid="1026"/>
-                                        </p:tgtEl>
-                                        <p:attrNameLst>
-                                          <p:attrName>style.visibility</p:attrName>
-                                        </p:attrNameLst>
-                                      </p:cBhvr>
-                                      <p:to>
-                                        <p:strVal val="visible"/>
-                                      </p:to>
-                                    </p:set>
-                                    <p:animEffect transition="in" filter="fade">
-                                      <p:cBhvr>
-                                        <p:cTn id="7" dur="500"/>
-                                        <p:tgtEl>
-                                          <p:spTgt spid="1026"/>
-                                        </p:tgtEl>
-                                      </p:cBhvr>
-                                    </p:animEffect>
-                                  </p:childTnLst>
-                                </p:cTn>
-                              </p:par>
-                            </p:childTnLst>
-                          </p:cTn>
-                        </p:par>
-                      </p:childTnLst>
-                    </p:cTn>
-                  </p:par>
-                </p:childTnLst>
-              </p:cTn>
-              <p:prevCondLst>
-                <p:cond evt="onPrev" delay="0">
-                  <p:tgtEl>
-                    <p:sldTgt/>
-                  </p:tgtEl>
-                </p:cond>
-              </p:prevCondLst>
-              <p:nextCondLst>
-                <p:cond evt="onNext" delay="0">
-                  <p:tgtEl>
-                    <p:sldTgt/>
-                  </p:tgtEl>
-                </p:cond>
-              </p:nextCondLst>
-            </p:seq>
-          </p:childTnLst>
-        </p:cTn>
       </p:par>
     </p:tnLst>
   </p:timing>

</xml_diff>

<commit_message>
Basics in presentation - to first demo
</commit_message>
<xml_diff>
--- a/Presentation/RESTful APIs.pptx
+++ b/Presentation/RESTful APIs.pptx
@@ -26112,6 +26112,37 @@
             </a:r>
           </a:p>
           <a:p>
+            <a:pPr lvl="1"/>
+            <a:endParaRPr lang="en-US" dirty="0"/>
+          </a:p>
+          <a:p>
+            <a:pPr marL="857250" lvl="2" indent="0">
+              <a:buNone/>
+            </a:pPr>
+            <a:r>
+              <a:rPr lang="en-US" sz="3200" i="1" dirty="0" smtClean="0"/>
+              <a:t>http://myapi.com/{resource}</a:t>
+            </a:r>
+          </a:p>
+          <a:p>
+            <a:pPr marL="857250" lvl="2" indent="0">
+              <a:buNone/>
+            </a:pPr>
+            <a:r>
+              <a:rPr lang="en-US" sz="3200" i="1" dirty="0" smtClean="0"/>
+              <a:t>http://myapi.com/{resource}/{id}/{document}</a:t>
+            </a:r>
+          </a:p>
+          <a:p>
+            <a:pPr marL="857250" lvl="2" indent="0">
+              <a:buNone/>
+            </a:pPr>
+            <a:r>
+              <a:rPr lang="en-US" sz="3200" i="1" dirty="0" smtClean="0"/>
+              <a:t>http://myapi.com/{resource}/{id}/{child resource}</a:t>
+            </a:r>
+          </a:p>
+          <a:p>
             <a:pPr marL="914400" lvl="2" indent="0">
               <a:buNone/>
             </a:pPr>
@@ -26146,7 +26177,177 @@
   <p:timing>
     <p:tnLst>
       <p:par>
-        <p:cTn id="1" dur="indefinite" restart="never" nodeType="tmRoot"/>
+        <p:cTn id="1" dur="indefinite" restart="never" nodeType="tmRoot">
+          <p:childTnLst>
+            <p:seq concurrent="1" nextAc="seek">
+              <p:cTn id="2" dur="indefinite" nodeType="mainSeq">
+                <p:childTnLst>
+                  <p:par>
+                    <p:cTn id="3" fill="hold">
+                      <p:stCondLst>
+                        <p:cond delay="indefinite"/>
+                      </p:stCondLst>
+                      <p:childTnLst>
+                        <p:par>
+                          <p:cTn id="4" fill="hold">
+                            <p:stCondLst>
+                              <p:cond delay="0"/>
+                            </p:stCondLst>
+                            <p:childTnLst>
+                              <p:par>
+                                <p:cTn id="5" presetID="1" presetClass="entr" presetSubtype="0" fill="hold" nodeType="clickEffect">
+                                  <p:stCondLst>
+                                    <p:cond delay="0"/>
+                                  </p:stCondLst>
+                                  <p:childTnLst>
+                                    <p:set>
+                                      <p:cBhvr>
+                                        <p:cTn id="6" dur="1" fill="hold">
+                                          <p:stCondLst>
+                                            <p:cond delay="0"/>
+                                          </p:stCondLst>
+                                        </p:cTn>
+                                        <p:tgtEl>
+                                          <p:spTgt spid="3">
+                                            <p:txEl>
+                                              <p:pRg st="4" end="4"/>
+                                            </p:txEl>
+                                          </p:spTgt>
+                                        </p:tgtEl>
+                                        <p:attrNameLst>
+                                          <p:attrName>style.visibility</p:attrName>
+                                        </p:attrNameLst>
+                                      </p:cBhvr>
+                                      <p:to>
+                                        <p:strVal val="visible"/>
+                                      </p:to>
+                                    </p:set>
+                                  </p:childTnLst>
+                                </p:cTn>
+                              </p:par>
+                            </p:childTnLst>
+                          </p:cTn>
+                        </p:par>
+                      </p:childTnLst>
+                    </p:cTn>
+                  </p:par>
+                  <p:par>
+                    <p:cTn id="7" fill="hold">
+                      <p:stCondLst>
+                        <p:cond delay="indefinite"/>
+                      </p:stCondLst>
+                      <p:childTnLst>
+                        <p:par>
+                          <p:cTn id="8" fill="hold">
+                            <p:stCondLst>
+                              <p:cond delay="0"/>
+                            </p:stCondLst>
+                            <p:childTnLst>
+                              <p:par>
+                                <p:cTn id="9" presetID="1" presetClass="entr" presetSubtype="0" fill="hold" nodeType="clickEffect">
+                                  <p:stCondLst>
+                                    <p:cond delay="0"/>
+                                  </p:stCondLst>
+                                  <p:childTnLst>
+                                    <p:set>
+                                      <p:cBhvr>
+                                        <p:cTn id="10" dur="1" fill="hold">
+                                          <p:stCondLst>
+                                            <p:cond delay="0"/>
+                                          </p:stCondLst>
+                                        </p:cTn>
+                                        <p:tgtEl>
+                                          <p:spTgt spid="3">
+                                            <p:txEl>
+                                              <p:pRg st="5" end="5"/>
+                                            </p:txEl>
+                                          </p:spTgt>
+                                        </p:tgtEl>
+                                        <p:attrNameLst>
+                                          <p:attrName>style.visibility</p:attrName>
+                                        </p:attrNameLst>
+                                      </p:cBhvr>
+                                      <p:to>
+                                        <p:strVal val="visible"/>
+                                      </p:to>
+                                    </p:set>
+                                  </p:childTnLst>
+                                </p:cTn>
+                              </p:par>
+                            </p:childTnLst>
+                          </p:cTn>
+                        </p:par>
+                      </p:childTnLst>
+                    </p:cTn>
+                  </p:par>
+                  <p:par>
+                    <p:cTn id="11" fill="hold">
+                      <p:stCondLst>
+                        <p:cond delay="indefinite"/>
+                      </p:stCondLst>
+                      <p:childTnLst>
+                        <p:par>
+                          <p:cTn id="12" fill="hold">
+                            <p:stCondLst>
+                              <p:cond delay="0"/>
+                            </p:stCondLst>
+                            <p:childTnLst>
+                              <p:par>
+                                <p:cTn id="13" presetID="1" presetClass="entr" presetSubtype="0" fill="hold" nodeType="clickEffect">
+                                  <p:stCondLst>
+                                    <p:cond delay="0"/>
+                                  </p:stCondLst>
+                                  <p:childTnLst>
+                                    <p:set>
+                                      <p:cBhvr>
+                                        <p:cTn id="14" dur="1" fill="hold">
+                                          <p:stCondLst>
+                                            <p:cond delay="0"/>
+                                          </p:stCondLst>
+                                        </p:cTn>
+                                        <p:tgtEl>
+                                          <p:spTgt spid="3">
+                                            <p:txEl>
+                                              <p:pRg st="6" end="6"/>
+                                            </p:txEl>
+                                          </p:spTgt>
+                                        </p:tgtEl>
+                                        <p:attrNameLst>
+                                          <p:attrName>style.visibility</p:attrName>
+                                        </p:attrNameLst>
+                                      </p:cBhvr>
+                                      <p:to>
+                                        <p:strVal val="visible"/>
+                                      </p:to>
+                                    </p:set>
+                                  </p:childTnLst>
+                                </p:cTn>
+                              </p:par>
+                            </p:childTnLst>
+                          </p:cTn>
+                        </p:par>
+                      </p:childTnLst>
+                    </p:cTn>
+                  </p:par>
+                </p:childTnLst>
+              </p:cTn>
+              <p:prevCondLst>
+                <p:cond evt="onPrev" delay="0">
+                  <p:tgtEl>
+                    <p:sldTgt/>
+                  </p:tgtEl>
+                </p:cond>
+              </p:prevCondLst>
+              <p:nextCondLst>
+                <p:cond evt="onNext" delay="0">
+                  <p:tgtEl>
+                    <p:sldTgt/>
+                  </p:tgtEl>
+                </p:cond>
+              </p:nextCondLst>
+            </p:seq>
+          </p:childTnLst>
+        </p:cTn>
       </p:par>
     </p:tnLst>
   </p:timing>
@@ -26187,7 +26388,7 @@
           <a:p>
             <a:r>
               <a:rPr lang="en-US" dirty="0" smtClean="0"/>
-              <a:t>URIs</a:t>
+              <a:t>URIs - Contrast to SOAP</a:t>
             </a:r>
             <a:endParaRPr lang="en-US" dirty="0"/>
           </a:p>
@@ -26328,9 +26529,12 @@
           <a:p>
             <a:r>
               <a:rPr lang="en-US" dirty="0" smtClean="0"/>
-              <a:t>URIs</a:t>
+              <a:t>URIs - </a:t>
             </a:r>
-            <a:endParaRPr lang="en-US" dirty="0"/>
+            <a:r>
+              <a:rPr lang="en-US" dirty="0"/>
+              <a:t>Contrast to SOAP</a:t>
+            </a:r>
           </a:p>
         </p:txBody>
       </p:sp>
@@ -26556,7 +26760,7 @@
           <p:nvPr>
             <p:extLst>
               <p:ext uri="{D42A27DB-BD31-4B8C-83A1-F6EECF244321}">
-                <p14:modId xmlns:p14="http://schemas.microsoft.com/office/powerpoint/2010/main" val="1126061055"/>
+                <p14:modId xmlns:p14="http://schemas.microsoft.com/office/powerpoint/2010/main" val="3481980243"/>
               </p:ext>
             </p:extLst>
           </p:nvPr>
@@ -26605,7 +26809,7 @@
                       </a:endParaRPr>
                     </a:p>
                   </a:txBody>
-                  <a:tcPr marL="9525" marR="9525" marT="9525" marB="0" anchor="b"/>
+                  <a:tcPr marL="45720" marR="45720" anchor="b"/>
                 </a:tc>
                 <a:tc>
                   <a:txBody>
@@ -26628,7 +26832,7 @@
                       </a:endParaRPr>
                     </a:p>
                   </a:txBody>
-                  <a:tcPr marL="9525" marR="9525" marT="9525" marB="0" anchor="b"/>
+                  <a:tcPr marL="45720" marR="45720" anchor="b"/>
                 </a:tc>
               </a:tr>
               <a:tr h="488950">
@@ -26653,7 +26857,7 @@
                       </a:endParaRPr>
                     </a:p>
                   </a:txBody>
-                  <a:tcPr marL="9525" marR="9525" marT="9525" marB="0" anchor="ctr"/>
+                  <a:tcPr marL="45720" marR="45720" anchor="ctr"/>
                 </a:tc>
                 <a:tc>
                   <a:txBody>
@@ -26676,7 +26880,7 @@
                       </a:endParaRPr>
                     </a:p>
                   </a:txBody>
-                  <a:tcPr marL="9525" marR="9525" marT="9525" marB="0" anchor="ctr"/>
+                  <a:tcPr marL="45720" marR="45720" anchor="ctr"/>
                 </a:tc>
               </a:tr>
               <a:tr h="488950">
@@ -26701,7 +26905,7 @@
                       </a:endParaRPr>
                     </a:p>
                   </a:txBody>
-                  <a:tcPr marL="9525" marR="9525" marT="9525" marB="0" anchor="ctr"/>
+                  <a:tcPr marL="45720" marR="45720" anchor="ctr"/>
                 </a:tc>
                 <a:tc>
                   <a:txBody>
@@ -26738,7 +26942,7 @@
                       </a:endParaRPr>
                     </a:p>
                   </a:txBody>
-                  <a:tcPr marL="9525" marR="9525" marT="9525" marB="0" anchor="ctr"/>
+                  <a:tcPr marL="45720" marR="45720" anchor="ctr"/>
                 </a:tc>
               </a:tr>
               <a:tr h="488950">
@@ -26763,7 +26967,7 @@
                       </a:endParaRPr>
                     </a:p>
                   </a:txBody>
-                  <a:tcPr marL="9525" marR="9525" marT="9525" marB="0" anchor="ctr"/>
+                  <a:tcPr marL="45720" marR="45720" anchor="ctr"/>
                 </a:tc>
                 <a:tc>
                   <a:txBody>
@@ -26786,7 +26990,7 @@
                       </a:endParaRPr>
                     </a:p>
                   </a:txBody>
-                  <a:tcPr marL="9525" marR="9525" marT="9525" marB="0" anchor="ctr"/>
+                  <a:tcPr marL="45720" marR="45720" anchor="ctr"/>
                 </a:tc>
               </a:tr>
               <a:tr h="488950">
@@ -26811,7 +27015,7 @@
                       </a:endParaRPr>
                     </a:p>
                   </a:txBody>
-                  <a:tcPr marL="9525" marR="9525" marT="9525" marB="0" anchor="ctr"/>
+                  <a:tcPr marL="45720" marR="45720" anchor="ctr"/>
                 </a:tc>
                 <a:tc>
                   <a:txBody>
@@ -26834,7 +27038,7 @@
                       </a:endParaRPr>
                     </a:p>
                   </a:txBody>
-                  <a:tcPr marL="9525" marR="9525" marT="9525" marB="0" anchor="ctr"/>
+                  <a:tcPr marL="45720" marR="45720" anchor="ctr"/>
                 </a:tc>
               </a:tr>
               <a:tr h="488950">
@@ -26859,7 +27063,7 @@
                       </a:endParaRPr>
                     </a:p>
                   </a:txBody>
-                  <a:tcPr marL="9525" marR="9525" marT="9525" marB="0" anchor="ctr"/>
+                  <a:tcPr marL="45720" marR="45720" anchor="ctr"/>
                 </a:tc>
                 <a:tc>
                   <a:txBody>
@@ -26882,7 +27086,7 @@
                       </a:endParaRPr>
                     </a:p>
                   </a:txBody>
-                  <a:tcPr marL="9525" marR="9525" marT="9525" marB="0" anchor="ctr"/>
+                  <a:tcPr marL="45720" marR="45720" anchor="ctr"/>
                 </a:tc>
               </a:tr>
               <a:tr h="488950">
@@ -26907,7 +27111,7 @@
                       </a:endParaRPr>
                     </a:p>
                   </a:txBody>
-                  <a:tcPr marL="9525" marR="9525" marT="9525" marB="0" anchor="ctr"/>
+                  <a:tcPr marL="45720" marR="45720" anchor="ctr"/>
                 </a:tc>
                 <a:tc>
                   <a:txBody>
@@ -26930,7 +27134,7 @@
                       </a:endParaRPr>
                     </a:p>
                   </a:txBody>
-                  <a:tcPr marL="9525" marR="9525" marT="9525" marB="0" anchor="ctr"/>
+                  <a:tcPr marL="45720" marR="45720" anchor="ctr"/>
                 </a:tc>
               </a:tr>
             </a:tbl>

</xml_diff>

<commit_message>
Intro to ASP.NET Web API in presentation - ready to write first demo
</commit_message>
<xml_diff>
--- a/Presentation/RESTful APIs.pptx
+++ b/Presentation/RESTful APIs.pptx
@@ -20,6 +20,7 @@
     <p:sldId id="267" r:id="rId14"/>
     <p:sldId id="268" r:id="rId15"/>
     <p:sldId id="269" r:id="rId16"/>
+    <p:sldId id="271" r:id="rId17"/>
   </p:sldIdLst>
   <p:sldSz cx="12192000" cy="6858000"/>
   <p:notesSz cx="6858000" cy="9144000"/>
@@ -27161,6 +27162,116 @@
 </p:sld>
 </file>
 
+<file path=ppt/slides/slide16.xml><?xml version="1.0" encoding="utf-8"?>
+<p:sld xmlns:a="http://schemas.openxmlformats.org/drawingml/2006/main" xmlns:r="http://schemas.openxmlformats.org/officeDocument/2006/relationships" xmlns:p="http://schemas.openxmlformats.org/presentationml/2006/main">
+  <p:cSld>
+    <p:spTree>
+      <p:nvGrpSpPr>
+        <p:cNvPr id="1" name=""/>
+        <p:cNvGrpSpPr/>
+        <p:nvPr/>
+      </p:nvGrpSpPr>
+      <p:grpSpPr>
+        <a:xfrm>
+          <a:off x="0" y="0"/>
+          <a:ext cx="0" cy="0"/>
+          <a:chOff x="0" y="0"/>
+          <a:chExt cx="0" cy="0"/>
+        </a:xfrm>
+      </p:grpSpPr>
+      <p:sp>
+        <p:nvSpPr>
+          <p:cNvPr id="2" name="Title 1"/>
+          <p:cNvSpPr>
+            <a:spLocks noGrp="1"/>
+          </p:cNvSpPr>
+          <p:nvPr>
+            <p:ph type="title"/>
+          </p:nvPr>
+        </p:nvSpPr>
+        <p:spPr/>
+        <p:txBody>
+          <a:bodyPr/>
+          <a:lstStyle/>
+          <a:p>
+            <a:r>
+              <a:rPr lang="en-US" dirty="0" smtClean="0"/>
+              <a:t>Building a </a:t>
+            </a:r>
+            <a:r>
+              <a:rPr lang="en-US" dirty="0" err="1" smtClean="0"/>
+              <a:t>RESTful</a:t>
+            </a:r>
+            <a:r>
+              <a:rPr lang="en-US" dirty="0" smtClean="0"/>
+              <a:t> API in .NET</a:t>
+            </a:r>
+            <a:endParaRPr lang="en-US" dirty="0"/>
+          </a:p>
+        </p:txBody>
+      </p:sp>
+      <p:sp>
+        <p:nvSpPr>
+          <p:cNvPr id="3" name="Content Placeholder 2"/>
+          <p:cNvSpPr>
+            <a:spLocks noGrp="1"/>
+          </p:cNvSpPr>
+          <p:nvPr>
+            <p:ph idx="1"/>
+          </p:nvPr>
+        </p:nvSpPr>
+        <p:spPr/>
+        <p:txBody>
+          <a:bodyPr/>
+          <a:lstStyle/>
+          <a:p>
+            <a:r>
+              <a:rPr lang="en-US" dirty="0" smtClean="0"/>
+              <a:t>ASP.NET - Great platform for REST style</a:t>
+            </a:r>
+          </a:p>
+          <a:p>
+            <a:r>
+              <a:rPr lang="en-US" dirty="0" smtClean="0"/>
+              <a:t>Web API is specifically built for REST</a:t>
+            </a:r>
+          </a:p>
+          <a:p>
+            <a:pPr lvl="1"/>
+            <a:r>
+              <a:rPr lang="en-US" dirty="0" smtClean="0"/>
+              <a:t>Many facilities and </a:t>
+            </a:r>
+            <a:r>
+              <a:rPr lang="en-US" smtClean="0"/>
+              <a:t>helpers built in</a:t>
+            </a:r>
+          </a:p>
+          <a:p>
+            <a:endParaRPr lang="en-US" dirty="0"/>
+          </a:p>
+        </p:txBody>
+      </p:sp>
+    </p:spTree>
+    <p:extLst>
+      <p:ext uri="{BB962C8B-B14F-4D97-AF65-F5344CB8AC3E}">
+        <p14:creationId xmlns:p14="http://schemas.microsoft.com/office/powerpoint/2010/main" val="2077646639"/>
+      </p:ext>
+    </p:extLst>
+  </p:cSld>
+  <p:clrMapOvr>
+    <a:masterClrMapping/>
+  </p:clrMapOvr>
+  <p:timing>
+    <p:tnLst>
+      <p:par>
+        <p:cTn id="1" dur="indefinite" restart="never" nodeType="tmRoot"/>
+      </p:par>
+    </p:tnLst>
+  </p:timing>
+</p:sld>
+</file>
+
 <file path=ppt/slides/slide2.xml><?xml version="1.0" encoding="utf-8"?>
 <p:sld xmlns:a="http://schemas.openxmlformats.org/drawingml/2006/main" xmlns:r="http://schemas.openxmlformats.org/officeDocument/2006/relationships" xmlns:p="http://schemas.openxmlformats.org/presentationml/2006/main">
   <p:cSld>

</xml_diff>

<commit_message>
Added info on HTTP error codes to presentation
</commit_message>
<xml_diff>
--- a/Presentation/RESTful APIs.pptx
+++ b/Presentation/RESTful APIs.pptx
@@ -21,6 +21,9 @@
     <p:sldId id="268" r:id="rId15"/>
     <p:sldId id="269" r:id="rId16"/>
     <p:sldId id="271" r:id="rId17"/>
+    <p:sldId id="272" r:id="rId18"/>
+    <p:sldId id="273" r:id="rId19"/>
+    <p:sldId id="274" r:id="rId20"/>
   </p:sldIdLst>
   <p:sldSz cx="12192000" cy="6858000"/>
   <p:notesSz cx="6858000" cy="9144000"/>
@@ -27240,11 +27243,7 @@
             <a:pPr lvl="1"/>
             <a:r>
               <a:rPr lang="en-US" dirty="0" smtClean="0"/>
-              <a:t>Many facilities and </a:t>
-            </a:r>
-            <a:r>
-              <a:rPr lang="en-US" smtClean="0"/>
-              <a:t>helpers built in</a:t>
+              <a:t>Many facilities and helpers built in</a:t>
             </a:r>
           </a:p>
           <a:p>
@@ -27256,6 +27255,336 @@
     <p:extLst>
       <p:ext uri="{BB962C8B-B14F-4D97-AF65-F5344CB8AC3E}">
         <p14:creationId xmlns:p14="http://schemas.microsoft.com/office/powerpoint/2010/main" val="2077646639"/>
+      </p:ext>
+    </p:extLst>
+  </p:cSld>
+  <p:clrMapOvr>
+    <a:masterClrMapping/>
+  </p:clrMapOvr>
+  <p:timing>
+    <p:tnLst>
+      <p:par>
+        <p:cTn id="1" dur="indefinite" restart="never" nodeType="tmRoot"/>
+      </p:par>
+    </p:tnLst>
+  </p:timing>
+</p:sld>
+</file>
+
+<file path=ppt/slides/slide17.xml><?xml version="1.0" encoding="utf-8"?>
+<p:sld xmlns:a="http://schemas.openxmlformats.org/drawingml/2006/main" xmlns:r="http://schemas.openxmlformats.org/officeDocument/2006/relationships" xmlns:p="http://schemas.openxmlformats.org/presentationml/2006/main">
+  <p:cSld>
+    <p:spTree>
+      <p:nvGrpSpPr>
+        <p:cNvPr id="1" name=""/>
+        <p:cNvGrpSpPr/>
+        <p:nvPr/>
+      </p:nvGrpSpPr>
+      <p:grpSpPr>
+        <a:xfrm>
+          <a:off x="0" y="0"/>
+          <a:ext cx="0" cy="0"/>
+          <a:chOff x="0" y="0"/>
+          <a:chExt cx="0" cy="0"/>
+        </a:xfrm>
+      </p:grpSpPr>
+      <p:sp>
+        <p:nvSpPr>
+          <p:cNvPr id="2" name="Title 1"/>
+          <p:cNvSpPr>
+            <a:spLocks noGrp="1"/>
+          </p:cNvSpPr>
+          <p:nvPr>
+            <p:ph type="title"/>
+          </p:nvPr>
+        </p:nvSpPr>
+        <p:spPr/>
+        <p:txBody>
+          <a:bodyPr/>
+          <a:lstStyle/>
+          <a:p>
+            <a:r>
+              <a:rPr lang="en-US" dirty="0" smtClean="0"/>
+              <a:t>HTTP Status Codes</a:t>
+            </a:r>
+            <a:endParaRPr lang="en-US" dirty="0"/>
+          </a:p>
+        </p:txBody>
+      </p:sp>
+      <p:sp>
+        <p:nvSpPr>
+          <p:cNvPr id="3" name="Content Placeholder 2"/>
+          <p:cNvSpPr>
+            <a:spLocks noGrp="1"/>
+          </p:cNvSpPr>
+          <p:nvPr>
+            <p:ph idx="1"/>
+          </p:nvPr>
+        </p:nvSpPr>
+        <p:spPr/>
+        <p:txBody>
+          <a:bodyPr/>
+          <a:lstStyle/>
+          <a:p>
+            <a:r>
+              <a:rPr lang="en-US" dirty="0" smtClean="0"/>
+              <a:t>1xx – Informational – seldom used</a:t>
+            </a:r>
+          </a:p>
+          <a:p>
+            <a:r>
+              <a:rPr lang="en-US" dirty="0" smtClean="0"/>
+              <a:t>2xx – Success</a:t>
+            </a:r>
+          </a:p>
+          <a:p>
+            <a:r>
+              <a:rPr lang="en-US" dirty="0" smtClean="0"/>
+              <a:t>3xx – Redirection, unchanged. Client should do something different to complete the request.</a:t>
+            </a:r>
+          </a:p>
+          <a:p>
+            <a:r>
+              <a:rPr lang="en-US" dirty="0" smtClean="0"/>
+              <a:t>4xx – Client action caused an error</a:t>
+            </a:r>
+          </a:p>
+          <a:p>
+            <a:r>
+              <a:rPr lang="en-US" dirty="0" smtClean="0"/>
+              <a:t>5xx – Server error</a:t>
+            </a:r>
+            <a:endParaRPr lang="en-US" dirty="0"/>
+          </a:p>
+        </p:txBody>
+      </p:sp>
+    </p:spTree>
+    <p:extLst>
+      <p:ext uri="{BB962C8B-B14F-4D97-AF65-F5344CB8AC3E}">
+        <p14:creationId xmlns:p14="http://schemas.microsoft.com/office/powerpoint/2010/main" val="1482888372"/>
+      </p:ext>
+    </p:extLst>
+  </p:cSld>
+  <p:clrMapOvr>
+    <a:masterClrMapping/>
+  </p:clrMapOvr>
+  <p:timing>
+    <p:tnLst>
+      <p:par>
+        <p:cTn id="1" dur="indefinite" restart="never" nodeType="tmRoot"/>
+      </p:par>
+    </p:tnLst>
+  </p:timing>
+</p:sld>
+</file>
+
+<file path=ppt/slides/slide18.xml><?xml version="1.0" encoding="utf-8"?>
+<p:sld xmlns:a="http://schemas.openxmlformats.org/drawingml/2006/main" xmlns:r="http://schemas.openxmlformats.org/officeDocument/2006/relationships" xmlns:p="http://schemas.openxmlformats.org/presentationml/2006/main">
+  <p:cSld>
+    <p:spTree>
+      <p:nvGrpSpPr>
+        <p:cNvPr id="1" name=""/>
+        <p:cNvGrpSpPr/>
+        <p:nvPr/>
+      </p:nvGrpSpPr>
+      <p:grpSpPr>
+        <a:xfrm>
+          <a:off x="0" y="0"/>
+          <a:ext cx="0" cy="0"/>
+          <a:chOff x="0" y="0"/>
+          <a:chExt cx="0" cy="0"/>
+        </a:xfrm>
+      </p:grpSpPr>
+      <p:sp>
+        <p:nvSpPr>
+          <p:cNvPr id="2" name="Title 1"/>
+          <p:cNvSpPr>
+            <a:spLocks noGrp="1"/>
+          </p:cNvSpPr>
+          <p:nvPr>
+            <p:ph type="title"/>
+          </p:nvPr>
+        </p:nvSpPr>
+        <p:spPr/>
+        <p:txBody>
+          <a:bodyPr/>
+          <a:lstStyle/>
+          <a:p>
+            <a:r>
+              <a:rPr lang="en-US" dirty="0" smtClean="0"/>
+              <a:t>Common HTTP Status Codes</a:t>
+            </a:r>
+            <a:endParaRPr lang="en-US" dirty="0"/>
+          </a:p>
+        </p:txBody>
+      </p:sp>
+      <p:sp>
+        <p:nvSpPr>
+          <p:cNvPr id="3" name="Content Placeholder 2"/>
+          <p:cNvSpPr>
+            <a:spLocks noGrp="1"/>
+          </p:cNvSpPr>
+          <p:nvPr>
+            <p:ph idx="1"/>
+          </p:nvPr>
+        </p:nvSpPr>
+        <p:spPr/>
+        <p:txBody>
+          <a:bodyPr/>
+          <a:lstStyle/>
+          <a:p>
+            <a:r>
+              <a:rPr lang="en-US" dirty="0" smtClean="0"/>
+              <a:t>200 OK – Request worked. Nothing to report</a:t>
+            </a:r>
+          </a:p>
+          <a:p>
+            <a:r>
+              <a:rPr lang="en-US" dirty="0" smtClean="0"/>
+              <a:t>201 Created – Indicate new resource created</a:t>
+            </a:r>
+          </a:p>
+          <a:p>
+            <a:r>
+              <a:rPr lang="en-US" dirty="0" smtClean="0"/>
+              <a:t>204 No Content – Used with conditional GETs</a:t>
+            </a:r>
+          </a:p>
+          <a:p>
+            <a:endParaRPr lang="en-US" dirty="0" smtClean="0"/>
+          </a:p>
+          <a:p>
+            <a:r>
+              <a:rPr lang="en-US" dirty="0" smtClean="0"/>
+              <a:t>304 Not Modified – Used with </a:t>
+            </a:r>
+          </a:p>
+          <a:p>
+            <a:pPr marL="0" indent="0">
+              <a:buNone/>
+            </a:pPr>
+            <a:endParaRPr lang="en-US" sz="3000" dirty="0"/>
+          </a:p>
+        </p:txBody>
+      </p:sp>
+    </p:spTree>
+    <p:extLst>
+      <p:ext uri="{BB962C8B-B14F-4D97-AF65-F5344CB8AC3E}">
+        <p14:creationId xmlns:p14="http://schemas.microsoft.com/office/powerpoint/2010/main" val="3824719"/>
+      </p:ext>
+    </p:extLst>
+  </p:cSld>
+  <p:clrMapOvr>
+    <a:masterClrMapping/>
+  </p:clrMapOvr>
+  <p:timing>
+    <p:tnLst>
+      <p:par>
+        <p:cTn id="1" dur="indefinite" restart="never" nodeType="tmRoot"/>
+      </p:par>
+    </p:tnLst>
+  </p:timing>
+</p:sld>
+</file>
+
+<file path=ppt/slides/slide19.xml><?xml version="1.0" encoding="utf-8"?>
+<p:sld xmlns:a="http://schemas.openxmlformats.org/drawingml/2006/main" xmlns:r="http://schemas.openxmlformats.org/officeDocument/2006/relationships" xmlns:p="http://schemas.openxmlformats.org/presentationml/2006/main">
+  <p:cSld>
+    <p:spTree>
+      <p:nvGrpSpPr>
+        <p:cNvPr id="1" name=""/>
+        <p:cNvGrpSpPr/>
+        <p:nvPr/>
+      </p:nvGrpSpPr>
+      <p:grpSpPr>
+        <a:xfrm>
+          <a:off x="0" y="0"/>
+          <a:ext cx="0" cy="0"/>
+          <a:chOff x="0" y="0"/>
+          <a:chExt cx="0" cy="0"/>
+        </a:xfrm>
+      </p:grpSpPr>
+      <p:sp>
+        <p:nvSpPr>
+          <p:cNvPr id="2" name="Title 1"/>
+          <p:cNvSpPr>
+            <a:spLocks noGrp="1"/>
+          </p:cNvSpPr>
+          <p:nvPr>
+            <p:ph type="title"/>
+          </p:nvPr>
+        </p:nvSpPr>
+        <p:spPr/>
+        <p:txBody>
+          <a:bodyPr/>
+          <a:lstStyle/>
+          <a:p>
+            <a:r>
+              <a:rPr lang="en-US" dirty="0" smtClean="0"/>
+              <a:t>Common HTTP Status Codes</a:t>
+            </a:r>
+            <a:endParaRPr lang="en-US" dirty="0"/>
+          </a:p>
+        </p:txBody>
+      </p:sp>
+      <p:sp>
+        <p:nvSpPr>
+          <p:cNvPr id="3" name="Content Placeholder 2"/>
+          <p:cNvSpPr>
+            <a:spLocks noGrp="1"/>
+          </p:cNvSpPr>
+          <p:nvPr>
+            <p:ph idx="1"/>
+          </p:nvPr>
+        </p:nvSpPr>
+        <p:spPr/>
+        <p:txBody>
+          <a:bodyPr/>
+          <a:lstStyle/>
+          <a:p>
+            <a:r>
+              <a:rPr lang="en-US" dirty="0" smtClean="0"/>
+              <a:t>401 Unauthorized</a:t>
+            </a:r>
+          </a:p>
+          <a:p>
+            <a:r>
+              <a:rPr lang="en-US" dirty="0" smtClean="0"/>
+              <a:t>404 Not found</a:t>
+            </a:r>
+          </a:p>
+          <a:p>
+            <a:endParaRPr lang="en-US" dirty="0" smtClean="0"/>
+          </a:p>
+          <a:p>
+            <a:r>
+              <a:rPr lang="en-US" dirty="0" smtClean="0"/>
+              <a:t>500 Internal Server Error – Include details in body</a:t>
+            </a:r>
+          </a:p>
+          <a:p>
+            <a:r>
+              <a:rPr lang="en-US" dirty="0" smtClean="0"/>
+              <a:t>503 Service Unavailable – Under </a:t>
+            </a:r>
+            <a:r>
+              <a:rPr lang="en-US" dirty="0" err="1" smtClean="0"/>
+              <a:t>maint</a:t>
+            </a:r>
+            <a:r>
+              <a:rPr lang="en-US" dirty="0" smtClean="0"/>
+              <a:t>, etc.</a:t>
+            </a:r>
+          </a:p>
+          <a:p>
+            <a:endParaRPr lang="en-US" dirty="0"/>
+          </a:p>
+        </p:txBody>
+      </p:sp>
+    </p:spTree>
+    <p:extLst>
+      <p:ext uri="{BB962C8B-B14F-4D97-AF65-F5344CB8AC3E}">
+        <p14:creationId xmlns:p14="http://schemas.microsoft.com/office/powerpoint/2010/main" val="344503696"/>
       </p:ext>
     </p:extLst>
   </p:cSld>

</xml_diff>

<commit_message>
Presentation has some Web API overview
</commit_message>
<xml_diff>
--- a/Presentation/RESTful APIs.pptx
+++ b/Presentation/RESTful APIs.pptx
@@ -123,6 +123,3804 @@
     </a:lvl9pPr>
   </p:defaultTextStyle>
 </p:presentation>
+</file>
+
+<file path=ppt/diagrams/colors1.xml><?xml version="1.0" encoding="utf-8"?>
+<dgm:colorsDef xmlns:dgm="http://schemas.openxmlformats.org/drawingml/2006/diagram" xmlns:a="http://schemas.openxmlformats.org/drawingml/2006/main" uniqueId="urn:microsoft.com/office/officeart/2005/8/colors/accent6_3">
+  <dgm:title val=""/>
+  <dgm:desc val=""/>
+  <dgm:catLst>
+    <dgm:cat type="accent6" pri="11300"/>
+  </dgm:catLst>
+  <dgm:styleLbl name="node0">
+    <dgm:fillClrLst meth="repeat">
+      <a:schemeClr val="accent6">
+        <a:shade val="80000"/>
+      </a:schemeClr>
+    </dgm:fillClrLst>
+    <dgm:linClrLst meth="repeat">
+      <a:schemeClr val="lt1"/>
+    </dgm:linClrLst>
+    <dgm:effectClrLst/>
+    <dgm:txLinClrLst/>
+    <dgm:txFillClrLst/>
+    <dgm:txEffectClrLst/>
+  </dgm:styleLbl>
+  <dgm:styleLbl name="node1">
+    <dgm:fillClrLst>
+      <a:schemeClr val="accent6">
+        <a:shade val="80000"/>
+      </a:schemeClr>
+      <a:schemeClr val="accent6">
+        <a:tint val="70000"/>
+      </a:schemeClr>
+    </dgm:fillClrLst>
+    <dgm:linClrLst meth="repeat">
+      <a:schemeClr val="lt1"/>
+    </dgm:linClrLst>
+    <dgm:effectClrLst/>
+    <dgm:txLinClrLst/>
+    <dgm:txFillClrLst/>
+    <dgm:txEffectClrLst/>
+  </dgm:styleLbl>
+  <dgm:styleLbl name="alignNode1">
+    <dgm:fillClrLst>
+      <a:schemeClr val="accent6">
+        <a:shade val="80000"/>
+      </a:schemeClr>
+      <a:schemeClr val="accent6">
+        <a:tint val="70000"/>
+      </a:schemeClr>
+    </dgm:fillClrLst>
+    <dgm:linClrLst>
+      <a:schemeClr val="accent6">
+        <a:shade val="80000"/>
+      </a:schemeClr>
+      <a:schemeClr val="accent6">
+        <a:tint val="70000"/>
+      </a:schemeClr>
+    </dgm:linClrLst>
+    <dgm:effectClrLst/>
+    <dgm:txLinClrLst/>
+    <dgm:txFillClrLst/>
+    <dgm:txEffectClrLst/>
+  </dgm:styleLbl>
+  <dgm:styleLbl name="lnNode1">
+    <dgm:fillClrLst>
+      <a:schemeClr val="accent6">
+        <a:shade val="80000"/>
+      </a:schemeClr>
+      <a:schemeClr val="accent6">
+        <a:tint val="70000"/>
+      </a:schemeClr>
+    </dgm:fillClrLst>
+    <dgm:linClrLst meth="repeat">
+      <a:schemeClr val="lt1"/>
+    </dgm:linClrLst>
+    <dgm:effectClrLst/>
+    <dgm:txLinClrLst/>
+    <dgm:txFillClrLst/>
+    <dgm:txEffectClrLst/>
+  </dgm:styleLbl>
+  <dgm:styleLbl name="vennNode1">
+    <dgm:fillClrLst>
+      <a:schemeClr val="accent6">
+        <a:shade val="80000"/>
+        <a:alpha val="50000"/>
+      </a:schemeClr>
+      <a:schemeClr val="accent6">
+        <a:tint val="70000"/>
+        <a:alpha val="50000"/>
+      </a:schemeClr>
+    </dgm:fillClrLst>
+    <dgm:linClrLst meth="repeat">
+      <a:schemeClr val="lt1"/>
+    </dgm:linClrLst>
+    <dgm:effectClrLst/>
+    <dgm:txLinClrLst/>
+    <dgm:txFillClrLst/>
+    <dgm:txEffectClrLst/>
+  </dgm:styleLbl>
+  <dgm:styleLbl name="node2">
+    <dgm:fillClrLst>
+      <a:schemeClr val="accent6">
+        <a:tint val="99000"/>
+      </a:schemeClr>
+    </dgm:fillClrLst>
+    <dgm:linClrLst meth="repeat">
+      <a:schemeClr val="lt1"/>
+    </dgm:linClrLst>
+    <dgm:effectClrLst/>
+    <dgm:txLinClrLst/>
+    <dgm:txFillClrLst/>
+    <dgm:txEffectClrLst/>
+  </dgm:styleLbl>
+  <dgm:styleLbl name="node3">
+    <dgm:fillClrLst>
+      <a:schemeClr val="accent6">
+        <a:tint val="80000"/>
+      </a:schemeClr>
+    </dgm:fillClrLst>
+    <dgm:linClrLst meth="repeat">
+      <a:schemeClr val="lt1"/>
+    </dgm:linClrLst>
+    <dgm:effectClrLst/>
+    <dgm:txLinClrLst/>
+    <dgm:txFillClrLst/>
+    <dgm:txEffectClrLst/>
+  </dgm:styleLbl>
+  <dgm:styleLbl name="node4">
+    <dgm:fillClrLst>
+      <a:schemeClr val="accent6">
+        <a:tint val="70000"/>
+      </a:schemeClr>
+    </dgm:fillClrLst>
+    <dgm:linClrLst meth="repeat">
+      <a:schemeClr val="lt1"/>
+    </dgm:linClrLst>
+    <dgm:effectClrLst/>
+    <dgm:txLinClrLst/>
+    <dgm:txFillClrLst/>
+    <dgm:txEffectClrLst/>
+  </dgm:styleLbl>
+  <dgm:styleLbl name="fgImgPlace1">
+    <dgm:fillClrLst>
+      <a:schemeClr val="accent6">
+        <a:tint val="50000"/>
+      </a:schemeClr>
+      <a:schemeClr val="accent6">
+        <a:tint val="20000"/>
+      </a:schemeClr>
+    </dgm:fillClrLst>
+    <dgm:linClrLst meth="repeat">
+      <a:schemeClr val="lt1"/>
+    </dgm:linClrLst>
+    <dgm:effectClrLst/>
+    <dgm:txLinClrLst/>
+    <dgm:txFillClrLst meth="repeat">
+      <a:schemeClr val="lt1"/>
+    </dgm:txFillClrLst>
+    <dgm:txEffectClrLst/>
+  </dgm:styleLbl>
+  <dgm:styleLbl name="alignImgPlace1">
+    <dgm:fillClrLst>
+      <a:schemeClr val="accent6">
+        <a:tint val="50000"/>
+      </a:schemeClr>
+      <a:schemeClr val="accent6">
+        <a:tint val="20000"/>
+      </a:schemeClr>
+    </dgm:fillClrLst>
+    <dgm:linClrLst meth="repeat">
+      <a:schemeClr val="lt1"/>
+    </dgm:linClrLst>
+    <dgm:effectClrLst/>
+    <dgm:txLinClrLst/>
+    <dgm:txFillClrLst meth="repeat">
+      <a:schemeClr val="lt1"/>
+    </dgm:txFillClrLst>
+    <dgm:txEffectClrLst/>
+  </dgm:styleLbl>
+  <dgm:styleLbl name="bgImgPlace1">
+    <dgm:fillClrLst>
+      <a:schemeClr val="accent6">
+        <a:tint val="50000"/>
+      </a:schemeClr>
+      <a:schemeClr val="accent6">
+        <a:tint val="20000"/>
+      </a:schemeClr>
+    </dgm:fillClrLst>
+    <dgm:linClrLst meth="repeat">
+      <a:schemeClr val="lt1"/>
+    </dgm:linClrLst>
+    <dgm:effectClrLst/>
+    <dgm:txLinClrLst/>
+    <dgm:txFillClrLst meth="repeat">
+      <a:schemeClr val="lt1"/>
+    </dgm:txFillClrLst>
+    <dgm:txEffectClrLst/>
+  </dgm:styleLbl>
+  <dgm:styleLbl name="sibTrans2D1">
+    <dgm:fillClrLst>
+      <a:schemeClr val="accent6">
+        <a:shade val="90000"/>
+      </a:schemeClr>
+      <a:schemeClr val="accent6">
+        <a:tint val="70000"/>
+      </a:schemeClr>
+    </dgm:fillClrLst>
+    <dgm:linClrLst>
+      <a:schemeClr val="accent6">
+        <a:shade val="90000"/>
+      </a:schemeClr>
+      <a:schemeClr val="accent6">
+        <a:tint val="70000"/>
+      </a:schemeClr>
+    </dgm:linClrLst>
+    <dgm:effectClrLst/>
+    <dgm:txLinClrLst/>
+    <dgm:txFillClrLst/>
+    <dgm:txEffectClrLst/>
+  </dgm:styleLbl>
+  <dgm:styleLbl name="fgSibTrans2D1">
+    <dgm:fillClrLst>
+      <a:schemeClr val="accent6">
+        <a:shade val="90000"/>
+      </a:schemeClr>
+      <a:schemeClr val="accent6">
+        <a:tint val="70000"/>
+      </a:schemeClr>
+    </dgm:fillClrLst>
+    <dgm:linClrLst>
+      <a:schemeClr val="accent6">
+        <a:shade val="90000"/>
+      </a:schemeClr>
+      <a:schemeClr val="accent6">
+        <a:tint val="70000"/>
+      </a:schemeClr>
+    </dgm:linClrLst>
+    <dgm:effectClrLst/>
+    <dgm:txLinClrLst/>
+    <dgm:txFillClrLst meth="repeat">
+      <a:schemeClr val="lt1"/>
+    </dgm:txFillClrLst>
+    <dgm:txEffectClrLst/>
+  </dgm:styleLbl>
+  <dgm:styleLbl name="bgSibTrans2D1">
+    <dgm:fillClrLst>
+      <a:schemeClr val="accent6">
+        <a:shade val="90000"/>
+      </a:schemeClr>
+      <a:schemeClr val="accent6">
+        <a:tint val="70000"/>
+      </a:schemeClr>
+    </dgm:fillClrLst>
+    <dgm:linClrLst>
+      <a:schemeClr val="accent6">
+        <a:shade val="90000"/>
+      </a:schemeClr>
+      <a:schemeClr val="accent6">
+        <a:tint val="70000"/>
+      </a:schemeClr>
+    </dgm:linClrLst>
+    <dgm:effectClrLst/>
+    <dgm:txLinClrLst/>
+    <dgm:txFillClrLst meth="repeat">
+      <a:schemeClr val="lt1"/>
+    </dgm:txFillClrLst>
+    <dgm:txEffectClrLst/>
+  </dgm:styleLbl>
+  <dgm:styleLbl name="sibTrans1D1">
+    <dgm:fillClrLst>
+      <a:schemeClr val="accent6">
+        <a:shade val="90000"/>
+      </a:schemeClr>
+      <a:schemeClr val="accent6">
+        <a:tint val="70000"/>
+      </a:schemeClr>
+    </dgm:fillClrLst>
+    <dgm:linClrLst>
+      <a:schemeClr val="accent6">
+        <a:shade val="90000"/>
+      </a:schemeClr>
+      <a:schemeClr val="accent6">
+        <a:tint val="70000"/>
+      </a:schemeClr>
+    </dgm:linClrLst>
+    <dgm:effectClrLst/>
+    <dgm:txLinClrLst/>
+    <dgm:txFillClrLst meth="repeat">
+      <a:schemeClr val="tx1"/>
+    </dgm:txFillClrLst>
+    <dgm:txEffectClrLst/>
+  </dgm:styleLbl>
+  <dgm:styleLbl name="callout">
+    <dgm:fillClrLst meth="repeat">
+      <a:schemeClr val="accent6"/>
+    </dgm:fillClrLst>
+    <dgm:linClrLst meth="repeat">
+      <a:schemeClr val="accent6"/>
+    </dgm:linClrLst>
+    <dgm:effectClrLst/>
+    <dgm:txLinClrLst/>
+    <dgm:txFillClrLst meth="repeat">
+      <a:schemeClr val="tx1"/>
+    </dgm:txFillClrLst>
+    <dgm:txEffectClrLst/>
+  </dgm:styleLbl>
+  <dgm:styleLbl name="asst0">
+    <dgm:fillClrLst meth="repeat">
+      <a:schemeClr val="accent6">
+        <a:shade val="80000"/>
+      </a:schemeClr>
+    </dgm:fillClrLst>
+    <dgm:linClrLst meth="repeat">
+      <a:schemeClr val="lt1"/>
+    </dgm:linClrLst>
+    <dgm:effectClrLst/>
+    <dgm:txLinClrLst/>
+    <dgm:txFillClrLst/>
+    <dgm:txEffectClrLst/>
+  </dgm:styleLbl>
+  <dgm:styleLbl name="asst1">
+    <dgm:fillClrLst meth="repeat">
+      <a:schemeClr val="accent6">
+        <a:shade val="80000"/>
+      </a:schemeClr>
+    </dgm:fillClrLst>
+    <dgm:linClrLst meth="repeat">
+      <a:schemeClr val="lt1"/>
+    </dgm:linClrLst>
+    <dgm:effectClrLst/>
+    <dgm:txLinClrLst/>
+    <dgm:txFillClrLst/>
+    <dgm:txEffectClrLst/>
+  </dgm:styleLbl>
+  <dgm:styleLbl name="asst2">
+    <dgm:fillClrLst>
+      <a:schemeClr val="accent6">
+        <a:tint val="99000"/>
+      </a:schemeClr>
+    </dgm:fillClrLst>
+    <dgm:linClrLst meth="repeat">
+      <a:schemeClr val="lt1"/>
+    </dgm:linClrLst>
+    <dgm:effectClrLst/>
+    <dgm:txLinClrLst/>
+    <dgm:txFillClrLst/>
+    <dgm:txEffectClrLst/>
+  </dgm:styleLbl>
+  <dgm:styleLbl name="asst3">
+    <dgm:fillClrLst>
+      <a:schemeClr val="accent6">
+        <a:tint val="80000"/>
+      </a:schemeClr>
+    </dgm:fillClrLst>
+    <dgm:linClrLst meth="repeat">
+      <a:schemeClr val="lt1"/>
+    </dgm:linClrLst>
+    <dgm:effectClrLst/>
+    <dgm:txLinClrLst/>
+    <dgm:txFillClrLst/>
+    <dgm:txEffectClrLst/>
+  </dgm:styleLbl>
+  <dgm:styleLbl name="asst4">
+    <dgm:fillClrLst>
+      <a:schemeClr val="accent6">
+        <a:tint val="70000"/>
+      </a:schemeClr>
+    </dgm:fillClrLst>
+    <dgm:linClrLst meth="repeat">
+      <a:schemeClr val="lt1"/>
+    </dgm:linClrLst>
+    <dgm:effectClrLst/>
+    <dgm:txLinClrLst/>
+    <dgm:txFillClrLst/>
+    <dgm:txEffectClrLst/>
+  </dgm:styleLbl>
+  <dgm:styleLbl name="parChTrans2D1">
+    <dgm:fillClrLst meth="repeat">
+      <a:schemeClr val="accent6">
+        <a:tint val="60000"/>
+      </a:schemeClr>
+    </dgm:fillClrLst>
+    <dgm:linClrLst meth="repeat">
+      <a:schemeClr val="accent6">
+        <a:tint val="60000"/>
+      </a:schemeClr>
+    </dgm:linClrLst>
+    <dgm:effectClrLst/>
+    <dgm:txLinClrLst/>
+    <dgm:txFillClrLst meth="repeat">
+      <a:schemeClr val="lt1"/>
+    </dgm:txFillClrLst>
+    <dgm:txEffectClrLst/>
+  </dgm:styleLbl>
+  <dgm:styleLbl name="parChTrans2D2">
+    <dgm:fillClrLst meth="repeat">
+      <a:schemeClr val="accent6">
+        <a:tint val="90000"/>
+      </a:schemeClr>
+    </dgm:fillClrLst>
+    <dgm:linClrLst meth="repeat">
+      <a:schemeClr val="accent6">
+        <a:tint val="90000"/>
+      </a:schemeClr>
+    </dgm:linClrLst>
+    <dgm:effectClrLst/>
+    <dgm:txLinClrLst/>
+    <dgm:txFillClrLst/>
+    <dgm:txEffectClrLst/>
+  </dgm:styleLbl>
+  <dgm:styleLbl name="parChTrans2D3">
+    <dgm:fillClrLst meth="repeat">
+      <a:schemeClr val="accent6">
+        <a:tint val="70000"/>
+      </a:schemeClr>
+    </dgm:fillClrLst>
+    <dgm:linClrLst meth="repeat">
+      <a:schemeClr val="accent6">
+        <a:tint val="70000"/>
+      </a:schemeClr>
+    </dgm:linClrLst>
+    <dgm:effectClrLst/>
+    <dgm:txLinClrLst/>
+    <dgm:txFillClrLst/>
+    <dgm:txEffectClrLst/>
+  </dgm:styleLbl>
+  <dgm:styleLbl name="parChTrans2D4">
+    <dgm:fillClrLst meth="repeat">
+      <a:schemeClr val="accent6">
+        <a:tint val="50000"/>
+      </a:schemeClr>
+    </dgm:fillClrLst>
+    <dgm:linClrLst meth="repeat">
+      <a:schemeClr val="accent6">
+        <a:tint val="50000"/>
+      </a:schemeClr>
+    </dgm:linClrLst>
+    <dgm:effectClrLst/>
+    <dgm:txLinClrLst/>
+    <dgm:txFillClrLst meth="repeat">
+      <a:schemeClr val="lt1"/>
+    </dgm:txFillClrLst>
+    <dgm:txEffectClrLst/>
+  </dgm:styleLbl>
+  <dgm:styleLbl name="parChTrans1D1">
+    <dgm:fillClrLst meth="repeat">
+      <a:schemeClr val="accent6">
+        <a:shade val="80000"/>
+      </a:schemeClr>
+    </dgm:fillClrLst>
+    <dgm:linClrLst meth="repeat">
+      <a:schemeClr val="accent6">
+        <a:shade val="80000"/>
+      </a:schemeClr>
+    </dgm:linClrLst>
+    <dgm:effectClrLst/>
+    <dgm:txLinClrLst/>
+    <dgm:txFillClrLst meth="repeat">
+      <a:schemeClr val="tx1"/>
+    </dgm:txFillClrLst>
+    <dgm:txEffectClrLst/>
+  </dgm:styleLbl>
+  <dgm:styleLbl name="parChTrans1D2">
+    <dgm:fillClrLst meth="repeat">
+      <a:schemeClr val="accent6">
+        <a:tint val="99000"/>
+      </a:schemeClr>
+    </dgm:fillClrLst>
+    <dgm:linClrLst meth="repeat">
+      <a:schemeClr val="accent6">
+        <a:tint val="99000"/>
+      </a:schemeClr>
+    </dgm:linClrLst>
+    <dgm:effectClrLst/>
+    <dgm:txLinClrLst/>
+    <dgm:txFillClrLst meth="repeat">
+      <a:schemeClr val="tx1"/>
+    </dgm:txFillClrLst>
+    <dgm:txEffectClrLst/>
+  </dgm:styleLbl>
+  <dgm:styleLbl name="parChTrans1D3">
+    <dgm:fillClrLst meth="repeat">
+      <a:schemeClr val="accent6">
+        <a:tint val="80000"/>
+      </a:schemeClr>
+    </dgm:fillClrLst>
+    <dgm:linClrLst meth="repeat">
+      <a:schemeClr val="accent6">
+        <a:tint val="80000"/>
+      </a:schemeClr>
+    </dgm:linClrLst>
+    <dgm:effectClrLst/>
+    <dgm:txLinClrLst/>
+    <dgm:txFillClrLst meth="repeat">
+      <a:schemeClr val="tx1"/>
+    </dgm:txFillClrLst>
+    <dgm:txEffectClrLst/>
+  </dgm:styleLbl>
+  <dgm:styleLbl name="parChTrans1D4">
+    <dgm:fillClrLst meth="repeat">
+      <a:schemeClr val="accent6">
+        <a:tint val="70000"/>
+      </a:schemeClr>
+    </dgm:fillClrLst>
+    <dgm:linClrLst meth="repeat">
+      <a:schemeClr val="accent6">
+        <a:tint val="70000"/>
+      </a:schemeClr>
+    </dgm:linClrLst>
+    <dgm:effectClrLst/>
+    <dgm:txLinClrLst/>
+    <dgm:txFillClrLst meth="repeat">
+      <a:schemeClr val="tx1"/>
+    </dgm:txFillClrLst>
+    <dgm:txEffectClrLst/>
+  </dgm:styleLbl>
+  <dgm:styleLbl name="fgAcc1">
+    <dgm:fillClrLst meth="repeat">
+      <a:schemeClr val="lt1">
+        <a:alpha val="90000"/>
+      </a:schemeClr>
+    </dgm:fillClrLst>
+    <dgm:linClrLst>
+      <a:schemeClr val="accent6">
+        <a:shade val="80000"/>
+      </a:schemeClr>
+      <a:schemeClr val="accent6">
+        <a:tint val="70000"/>
+      </a:schemeClr>
+    </dgm:linClrLst>
+    <dgm:effectClrLst/>
+    <dgm:txLinClrLst/>
+    <dgm:txFillClrLst meth="repeat">
+      <a:schemeClr val="dk1"/>
+    </dgm:txFillClrLst>
+    <dgm:txEffectClrLst/>
+  </dgm:styleLbl>
+  <dgm:styleLbl name="conFgAcc1">
+    <dgm:fillClrLst meth="repeat">
+      <a:schemeClr val="lt1">
+        <a:alpha val="90000"/>
+      </a:schemeClr>
+    </dgm:fillClrLst>
+    <dgm:linClrLst>
+      <a:schemeClr val="accent6">
+        <a:shade val="80000"/>
+      </a:schemeClr>
+      <a:schemeClr val="accent6">
+        <a:tint val="70000"/>
+      </a:schemeClr>
+    </dgm:linClrLst>
+    <dgm:effectClrLst/>
+    <dgm:txLinClrLst/>
+    <dgm:txFillClrLst meth="repeat">
+      <a:schemeClr val="dk1"/>
+    </dgm:txFillClrLst>
+    <dgm:txEffectClrLst/>
+  </dgm:styleLbl>
+  <dgm:styleLbl name="alignAcc1">
+    <dgm:fillClrLst meth="repeat">
+      <a:schemeClr val="lt1">
+        <a:alpha val="90000"/>
+      </a:schemeClr>
+    </dgm:fillClrLst>
+    <dgm:linClrLst>
+      <a:schemeClr val="accent6">
+        <a:shade val="80000"/>
+      </a:schemeClr>
+      <a:schemeClr val="accent6">
+        <a:tint val="70000"/>
+      </a:schemeClr>
+    </dgm:linClrLst>
+    <dgm:effectClrLst/>
+    <dgm:txLinClrLst/>
+    <dgm:txFillClrLst meth="repeat">
+      <a:schemeClr val="dk1"/>
+    </dgm:txFillClrLst>
+    <dgm:txEffectClrLst/>
+  </dgm:styleLbl>
+  <dgm:styleLbl name="trAlignAcc1">
+    <dgm:fillClrLst meth="repeat">
+      <a:schemeClr val="lt1">
+        <a:alpha val="40000"/>
+      </a:schemeClr>
+    </dgm:fillClrLst>
+    <dgm:linClrLst meth="repeat">
+      <a:schemeClr val="accent6"/>
+    </dgm:linClrLst>
+    <dgm:effectClrLst/>
+    <dgm:txLinClrLst/>
+    <dgm:txFillClrLst meth="repeat">
+      <a:schemeClr val="dk1"/>
+    </dgm:txFillClrLst>
+    <dgm:txEffectClrLst/>
+  </dgm:styleLbl>
+  <dgm:styleLbl name="bgAcc1">
+    <dgm:fillClrLst meth="repeat">
+      <a:schemeClr val="lt1">
+        <a:alpha val="90000"/>
+      </a:schemeClr>
+    </dgm:fillClrLst>
+    <dgm:linClrLst>
+      <a:schemeClr val="accent6">
+        <a:shade val="80000"/>
+      </a:schemeClr>
+      <a:schemeClr val="accent6">
+        <a:tint val="70000"/>
+      </a:schemeClr>
+    </dgm:linClrLst>
+    <dgm:effectClrLst/>
+    <dgm:txLinClrLst/>
+    <dgm:txFillClrLst meth="repeat">
+      <a:schemeClr val="dk1"/>
+    </dgm:txFillClrLst>
+    <dgm:txEffectClrLst/>
+  </dgm:styleLbl>
+  <dgm:styleLbl name="solidFgAcc1">
+    <dgm:fillClrLst meth="repeat">
+      <a:schemeClr val="lt1"/>
+    </dgm:fillClrLst>
+    <dgm:linClrLst>
+      <a:schemeClr val="accent6">
+        <a:shade val="80000"/>
+      </a:schemeClr>
+      <a:schemeClr val="accent6">
+        <a:tint val="70000"/>
+      </a:schemeClr>
+    </dgm:linClrLst>
+    <dgm:effectClrLst/>
+    <dgm:txLinClrLst/>
+    <dgm:txFillClrLst meth="repeat">
+      <a:schemeClr val="dk1"/>
+    </dgm:txFillClrLst>
+    <dgm:txEffectClrLst/>
+  </dgm:styleLbl>
+  <dgm:styleLbl name="solidAlignAcc1">
+    <dgm:fillClrLst meth="repeat">
+      <a:schemeClr val="lt1"/>
+    </dgm:fillClrLst>
+    <dgm:linClrLst meth="repeat">
+      <a:schemeClr val="accent6"/>
+    </dgm:linClrLst>
+    <dgm:effectClrLst/>
+    <dgm:txLinClrLst/>
+    <dgm:txFillClrLst meth="repeat">
+      <a:schemeClr val="dk1"/>
+    </dgm:txFillClrLst>
+    <dgm:txEffectClrLst/>
+  </dgm:styleLbl>
+  <dgm:styleLbl name="solidBgAcc1">
+    <dgm:fillClrLst meth="repeat">
+      <a:schemeClr val="lt1"/>
+    </dgm:fillClrLst>
+    <dgm:linClrLst meth="repeat">
+      <a:schemeClr val="accent6"/>
+    </dgm:linClrLst>
+    <dgm:effectClrLst/>
+    <dgm:txLinClrLst/>
+    <dgm:txFillClrLst meth="repeat">
+      <a:schemeClr val="dk1"/>
+    </dgm:txFillClrLst>
+    <dgm:txEffectClrLst/>
+  </dgm:styleLbl>
+  <dgm:styleLbl name="fgAccFollowNode1">
+    <dgm:fillClrLst meth="repeat">
+      <a:schemeClr val="accent6">
+        <a:alpha val="90000"/>
+        <a:tint val="40000"/>
+      </a:schemeClr>
+    </dgm:fillClrLst>
+    <dgm:linClrLst meth="repeat">
+      <a:schemeClr val="accent6">
+        <a:alpha val="90000"/>
+        <a:tint val="40000"/>
+      </a:schemeClr>
+    </dgm:linClrLst>
+    <dgm:effectClrLst/>
+    <dgm:txLinClrLst/>
+    <dgm:txFillClrLst meth="repeat">
+      <a:schemeClr val="dk1"/>
+    </dgm:txFillClrLst>
+    <dgm:txEffectClrLst/>
+  </dgm:styleLbl>
+  <dgm:styleLbl name="alignAccFollowNode1">
+    <dgm:fillClrLst meth="repeat">
+      <a:schemeClr val="accent6">
+        <a:alpha val="90000"/>
+        <a:tint val="40000"/>
+      </a:schemeClr>
+    </dgm:fillClrLst>
+    <dgm:linClrLst meth="repeat">
+      <a:schemeClr val="accent6">
+        <a:alpha val="90000"/>
+        <a:tint val="40000"/>
+      </a:schemeClr>
+    </dgm:linClrLst>
+    <dgm:effectClrLst/>
+    <dgm:txLinClrLst/>
+    <dgm:txFillClrLst meth="repeat">
+      <a:schemeClr val="dk1"/>
+    </dgm:txFillClrLst>
+    <dgm:txEffectClrLst/>
+  </dgm:styleLbl>
+  <dgm:styleLbl name="bgAccFollowNode1">
+    <dgm:fillClrLst meth="repeat">
+      <a:schemeClr val="accent6">
+        <a:alpha val="90000"/>
+        <a:tint val="40000"/>
+      </a:schemeClr>
+    </dgm:fillClrLst>
+    <dgm:linClrLst meth="repeat">
+      <a:schemeClr val="lt1"/>
+    </dgm:linClrLst>
+    <dgm:effectClrLst/>
+    <dgm:txLinClrLst/>
+    <dgm:txFillClrLst meth="repeat">
+      <a:schemeClr val="dk1"/>
+    </dgm:txFillClrLst>
+    <dgm:txEffectClrLst/>
+  </dgm:styleLbl>
+  <dgm:styleLbl name="fgAcc0">
+    <dgm:fillClrLst meth="repeat">
+      <a:schemeClr val="lt1">
+        <a:alpha val="90000"/>
+      </a:schemeClr>
+    </dgm:fillClrLst>
+    <dgm:linClrLst meth="repeat">
+      <a:schemeClr val="accent6">
+        <a:shade val="80000"/>
+      </a:schemeClr>
+    </dgm:linClrLst>
+    <dgm:effectClrLst/>
+    <dgm:txLinClrLst/>
+    <dgm:txFillClrLst meth="repeat">
+      <a:schemeClr val="dk1"/>
+    </dgm:txFillClrLst>
+    <dgm:txEffectClrLst/>
+  </dgm:styleLbl>
+  <dgm:styleLbl name="fgAcc2">
+    <dgm:fillClrLst meth="repeat">
+      <a:schemeClr val="lt1">
+        <a:alpha val="90000"/>
+      </a:schemeClr>
+    </dgm:fillClrLst>
+    <dgm:linClrLst meth="repeat">
+      <a:schemeClr val="accent6">
+        <a:tint val="99000"/>
+      </a:schemeClr>
+    </dgm:linClrLst>
+    <dgm:effectClrLst/>
+    <dgm:txLinClrLst/>
+    <dgm:txFillClrLst meth="repeat">
+      <a:schemeClr val="dk1"/>
+    </dgm:txFillClrLst>
+    <dgm:txEffectClrLst/>
+  </dgm:styleLbl>
+  <dgm:styleLbl name="fgAcc3">
+    <dgm:fillClrLst meth="repeat">
+      <a:schemeClr val="lt1">
+        <a:alpha val="90000"/>
+      </a:schemeClr>
+    </dgm:fillClrLst>
+    <dgm:linClrLst meth="repeat">
+      <a:schemeClr val="accent6">
+        <a:tint val="80000"/>
+      </a:schemeClr>
+    </dgm:linClrLst>
+    <dgm:effectClrLst/>
+    <dgm:txLinClrLst/>
+    <dgm:txFillClrLst meth="repeat">
+      <a:schemeClr val="dk1"/>
+    </dgm:txFillClrLst>
+    <dgm:txEffectClrLst/>
+  </dgm:styleLbl>
+  <dgm:styleLbl name="fgAcc4">
+    <dgm:fillClrLst meth="repeat">
+      <a:schemeClr val="lt1">
+        <a:alpha val="90000"/>
+      </a:schemeClr>
+    </dgm:fillClrLst>
+    <dgm:linClrLst meth="repeat">
+      <a:schemeClr val="accent6">
+        <a:tint val="70000"/>
+      </a:schemeClr>
+    </dgm:linClrLst>
+    <dgm:effectClrLst/>
+    <dgm:txLinClrLst/>
+    <dgm:txFillClrLst meth="repeat">
+      <a:schemeClr val="dk1"/>
+    </dgm:txFillClrLst>
+    <dgm:txEffectClrLst/>
+  </dgm:styleLbl>
+  <dgm:styleLbl name="bgShp">
+    <dgm:fillClrLst meth="repeat">
+      <a:schemeClr val="accent6">
+        <a:tint val="40000"/>
+      </a:schemeClr>
+    </dgm:fillClrLst>
+    <dgm:linClrLst meth="repeat">
+      <a:schemeClr val="dk1"/>
+    </dgm:linClrLst>
+    <dgm:effectClrLst/>
+    <dgm:txLinClrLst/>
+    <dgm:txFillClrLst meth="repeat">
+      <a:schemeClr val="dk1"/>
+    </dgm:txFillClrLst>
+    <dgm:txEffectClrLst/>
+  </dgm:styleLbl>
+  <dgm:styleLbl name="dkBgShp">
+    <dgm:fillClrLst meth="repeat">
+      <a:schemeClr val="accent6">
+        <a:shade val="90000"/>
+      </a:schemeClr>
+    </dgm:fillClrLst>
+    <dgm:linClrLst meth="repeat">
+      <a:schemeClr val="dk1"/>
+    </dgm:linClrLst>
+    <dgm:effectClrLst/>
+    <dgm:txLinClrLst/>
+    <dgm:txFillClrLst meth="repeat">
+      <a:schemeClr val="lt1"/>
+    </dgm:txFillClrLst>
+    <dgm:txEffectClrLst/>
+  </dgm:styleLbl>
+  <dgm:styleLbl name="trBgShp">
+    <dgm:fillClrLst meth="repeat">
+      <a:schemeClr val="accent6">
+        <a:tint val="50000"/>
+        <a:alpha val="40000"/>
+      </a:schemeClr>
+    </dgm:fillClrLst>
+    <dgm:linClrLst meth="repeat">
+      <a:schemeClr val="accent6"/>
+    </dgm:linClrLst>
+    <dgm:effectClrLst/>
+    <dgm:txLinClrLst/>
+    <dgm:txFillClrLst meth="repeat">
+      <a:schemeClr val="lt1"/>
+    </dgm:txFillClrLst>
+    <dgm:txEffectClrLst/>
+  </dgm:styleLbl>
+  <dgm:styleLbl name="fgShp">
+    <dgm:fillClrLst meth="repeat">
+      <a:schemeClr val="accent6">
+        <a:tint val="40000"/>
+      </a:schemeClr>
+    </dgm:fillClrLst>
+    <dgm:linClrLst meth="repeat">
+      <a:schemeClr val="lt1"/>
+    </dgm:linClrLst>
+    <dgm:effectClrLst/>
+    <dgm:txLinClrLst/>
+    <dgm:txFillClrLst meth="repeat">
+      <a:schemeClr val="dk1"/>
+    </dgm:txFillClrLst>
+    <dgm:txEffectClrLst/>
+  </dgm:styleLbl>
+  <dgm:styleLbl name="revTx">
+    <dgm:fillClrLst meth="repeat">
+      <a:schemeClr val="lt1">
+        <a:alpha val="0"/>
+      </a:schemeClr>
+    </dgm:fillClrLst>
+    <dgm:linClrLst meth="repeat">
+      <a:schemeClr val="dk1">
+        <a:alpha val="0"/>
+      </a:schemeClr>
+    </dgm:linClrLst>
+    <dgm:effectClrLst/>
+    <dgm:txLinClrLst/>
+    <dgm:txFillClrLst meth="repeat">
+      <a:schemeClr val="tx1"/>
+    </dgm:txFillClrLst>
+    <dgm:txEffectClrLst/>
+  </dgm:styleLbl>
+</dgm:colorsDef>
+</file>
+
+<file path=ppt/diagrams/data1.xml><?xml version="1.0" encoding="utf-8"?>
+<dgm:dataModel xmlns:dgm="http://schemas.openxmlformats.org/drawingml/2006/diagram" xmlns:a="http://schemas.openxmlformats.org/drawingml/2006/main">
+  <dgm:ptLst>
+    <dgm:pt modelId="{CC13E33E-8078-45B8-BE8F-F140D4C86143}" type="doc">
+      <dgm:prSet loTypeId="urn:microsoft.com/office/officeart/2005/8/layout/hierarchy4" loCatId="hierarchy" qsTypeId="urn:microsoft.com/office/officeart/2005/8/quickstyle/simple1" qsCatId="simple" csTypeId="urn:microsoft.com/office/officeart/2005/8/colors/accent6_3" csCatId="accent6" phldr="1"/>
+      <dgm:spPr/>
+      <dgm:t>
+        <a:bodyPr/>
+        <a:lstStyle/>
+        <a:p>
+          <a:endParaRPr lang="en-US"/>
+        </a:p>
+      </dgm:t>
+    </dgm:pt>
+    <dgm:pt modelId="{68E506DF-75FE-4351-A575-DC8CFE003D4C}">
+      <dgm:prSet phldrT="[Text]"/>
+      <dgm:spPr/>
+      <dgm:t>
+        <a:bodyPr/>
+        <a:lstStyle/>
+        <a:p>
+          <a:r>
+            <a:rPr lang="en-US" dirty="0" smtClean="0"/>
+            <a:t>ASP.NET</a:t>
+          </a:r>
+          <a:endParaRPr lang="en-US" dirty="0"/>
+        </a:p>
+      </dgm:t>
+    </dgm:pt>
+    <dgm:pt modelId="{FCC71BF9-5DF8-4E42-9023-CDB66AC83EE1}" type="parTrans" cxnId="{BF11403C-E34E-4F4C-89B3-AF01D15A5746}">
+      <dgm:prSet/>
+      <dgm:spPr/>
+      <dgm:t>
+        <a:bodyPr/>
+        <a:lstStyle/>
+        <a:p>
+          <a:endParaRPr lang="en-US"/>
+        </a:p>
+      </dgm:t>
+    </dgm:pt>
+    <dgm:pt modelId="{A19D0D9A-8C6C-46B8-B9CA-6DD0CD77C946}" type="sibTrans" cxnId="{BF11403C-E34E-4F4C-89B3-AF01D15A5746}">
+      <dgm:prSet/>
+      <dgm:spPr/>
+      <dgm:t>
+        <a:bodyPr/>
+        <a:lstStyle/>
+        <a:p>
+          <a:endParaRPr lang="en-US"/>
+        </a:p>
+      </dgm:t>
+    </dgm:pt>
+    <dgm:pt modelId="{4D727B76-24D3-404B-92CF-41E9EB13F3ED}">
+      <dgm:prSet phldrT="[Text]"/>
+      <dgm:spPr/>
+      <dgm:t>
+        <a:bodyPr/>
+        <a:lstStyle/>
+        <a:p>
+          <a:r>
+            <a:rPr lang="en-US" dirty="0" smtClean="0"/>
+            <a:t>Sites</a:t>
+          </a:r>
+          <a:endParaRPr lang="en-US" dirty="0"/>
+        </a:p>
+      </dgm:t>
+    </dgm:pt>
+    <dgm:pt modelId="{BFD7331C-A985-425A-A0D2-65C19B3DADCA}" type="parTrans" cxnId="{05FDAC00-99C2-4AFC-9590-2CF3CB575005}">
+      <dgm:prSet/>
+      <dgm:spPr/>
+      <dgm:t>
+        <a:bodyPr/>
+        <a:lstStyle/>
+        <a:p>
+          <a:endParaRPr lang="en-US"/>
+        </a:p>
+      </dgm:t>
+    </dgm:pt>
+    <dgm:pt modelId="{D47D1FE4-9714-4E6C-99D1-97F703CDE9A5}" type="sibTrans" cxnId="{05FDAC00-99C2-4AFC-9590-2CF3CB575005}">
+      <dgm:prSet/>
+      <dgm:spPr/>
+      <dgm:t>
+        <a:bodyPr/>
+        <a:lstStyle/>
+        <a:p>
+          <a:endParaRPr lang="en-US"/>
+        </a:p>
+      </dgm:t>
+    </dgm:pt>
+    <dgm:pt modelId="{20720447-3429-4704-B3B1-49A9BA5E9382}">
+      <dgm:prSet phldrT="[Text]"/>
+      <dgm:spPr/>
+      <dgm:t>
+        <a:bodyPr/>
+        <a:lstStyle/>
+        <a:p>
+          <a:r>
+            <a:rPr lang="en-US" dirty="0" smtClean="0"/>
+            <a:t>MVC</a:t>
+          </a:r>
+          <a:endParaRPr lang="en-US" dirty="0"/>
+        </a:p>
+      </dgm:t>
+    </dgm:pt>
+    <dgm:pt modelId="{82F3EC30-1CF0-4F4D-A740-B008AEDED329}" type="parTrans" cxnId="{D970BBCA-3BEF-43A1-8D0F-AA2C54AAAC58}">
+      <dgm:prSet/>
+      <dgm:spPr/>
+      <dgm:t>
+        <a:bodyPr/>
+        <a:lstStyle/>
+        <a:p>
+          <a:endParaRPr lang="en-US"/>
+        </a:p>
+      </dgm:t>
+    </dgm:pt>
+    <dgm:pt modelId="{A685C032-35E3-413F-A80C-A0D9B3A10FD9}" type="sibTrans" cxnId="{D970BBCA-3BEF-43A1-8D0F-AA2C54AAAC58}">
+      <dgm:prSet/>
+      <dgm:spPr/>
+      <dgm:t>
+        <a:bodyPr/>
+        <a:lstStyle/>
+        <a:p>
+          <a:endParaRPr lang="en-US"/>
+        </a:p>
+      </dgm:t>
+    </dgm:pt>
+    <dgm:pt modelId="{839219F5-30D1-4100-B5E3-DDC95DB93E48}">
+      <dgm:prSet phldrT="[Text]"/>
+      <dgm:spPr/>
+      <dgm:t>
+        <a:bodyPr/>
+        <a:lstStyle/>
+        <a:p>
+          <a:r>
+            <a:rPr lang="en-US" dirty="0" smtClean="0"/>
+            <a:t>Web Forms</a:t>
+          </a:r>
+          <a:endParaRPr lang="en-US" dirty="0"/>
+        </a:p>
+      </dgm:t>
+    </dgm:pt>
+    <dgm:pt modelId="{CC21082F-17D0-4D2B-A794-DA29D57F1C57}" type="parTrans" cxnId="{E9FD21C6-7996-4781-8D44-8CF36448FA9C}">
+      <dgm:prSet/>
+      <dgm:spPr/>
+      <dgm:t>
+        <a:bodyPr/>
+        <a:lstStyle/>
+        <a:p>
+          <a:endParaRPr lang="en-US"/>
+        </a:p>
+      </dgm:t>
+    </dgm:pt>
+    <dgm:pt modelId="{E48F76B0-696D-4B17-8E56-4F41DF42F331}" type="sibTrans" cxnId="{E9FD21C6-7996-4781-8D44-8CF36448FA9C}">
+      <dgm:prSet/>
+      <dgm:spPr/>
+      <dgm:t>
+        <a:bodyPr/>
+        <a:lstStyle/>
+        <a:p>
+          <a:endParaRPr lang="en-US"/>
+        </a:p>
+      </dgm:t>
+    </dgm:pt>
+    <dgm:pt modelId="{835B3E8D-3AE1-4695-8FA4-C1F54406999A}">
+      <dgm:prSet phldrT="[Text]"/>
+      <dgm:spPr/>
+      <dgm:t>
+        <a:bodyPr/>
+        <a:lstStyle/>
+        <a:p>
+          <a:r>
+            <a:rPr lang="en-US" dirty="0" smtClean="0"/>
+            <a:t>Services</a:t>
+          </a:r>
+          <a:endParaRPr lang="en-US" dirty="0"/>
+        </a:p>
+      </dgm:t>
+    </dgm:pt>
+    <dgm:pt modelId="{7135DE73-D33F-4886-B6F9-4513EBA094E3}" type="parTrans" cxnId="{DDAAB080-5E6B-4D88-8C09-8AD36E104C92}">
+      <dgm:prSet/>
+      <dgm:spPr/>
+      <dgm:t>
+        <a:bodyPr/>
+        <a:lstStyle/>
+        <a:p>
+          <a:endParaRPr lang="en-US"/>
+        </a:p>
+      </dgm:t>
+    </dgm:pt>
+    <dgm:pt modelId="{E76305A4-8F6F-45A6-8CEF-A58D609ECF15}" type="sibTrans" cxnId="{DDAAB080-5E6B-4D88-8C09-8AD36E104C92}">
+      <dgm:prSet/>
+      <dgm:spPr/>
+      <dgm:t>
+        <a:bodyPr/>
+        <a:lstStyle/>
+        <a:p>
+          <a:endParaRPr lang="en-US"/>
+        </a:p>
+      </dgm:t>
+    </dgm:pt>
+    <dgm:pt modelId="{335B37E7-FFF7-463E-BDEB-7BC506E0543E}">
+      <dgm:prSet phldrT="[Text]"/>
+      <dgm:spPr/>
+      <dgm:t>
+        <a:bodyPr/>
+        <a:lstStyle/>
+        <a:p>
+          <a:r>
+            <a:rPr lang="en-US" dirty="0" smtClean="0"/>
+            <a:t>Web API</a:t>
+          </a:r>
+          <a:endParaRPr lang="en-US" dirty="0"/>
+        </a:p>
+      </dgm:t>
+    </dgm:pt>
+    <dgm:pt modelId="{CE03112B-B50F-45A2-A04A-D10E0CDC5522}" type="parTrans" cxnId="{B265CC04-2B6C-4EC3-9793-9C96892ED46C}">
+      <dgm:prSet/>
+      <dgm:spPr/>
+      <dgm:t>
+        <a:bodyPr/>
+        <a:lstStyle/>
+        <a:p>
+          <a:endParaRPr lang="en-US"/>
+        </a:p>
+      </dgm:t>
+    </dgm:pt>
+    <dgm:pt modelId="{6DF6810B-13CB-45B5-BEF5-DB554C934B9B}" type="sibTrans" cxnId="{B265CC04-2B6C-4EC3-9793-9C96892ED46C}">
+      <dgm:prSet/>
+      <dgm:spPr/>
+      <dgm:t>
+        <a:bodyPr/>
+        <a:lstStyle/>
+        <a:p>
+          <a:endParaRPr lang="en-US"/>
+        </a:p>
+      </dgm:t>
+    </dgm:pt>
+    <dgm:pt modelId="{CDD93539-3578-4D66-B104-52A9C9F8FA59}">
+      <dgm:prSet phldrT="[Text]"/>
+      <dgm:spPr/>
+      <dgm:t>
+        <a:bodyPr/>
+        <a:lstStyle/>
+        <a:p>
+          <a:r>
+            <a:rPr lang="en-US" dirty="0" smtClean="0"/>
+            <a:t>Web Pages</a:t>
+          </a:r>
+          <a:endParaRPr lang="en-US" dirty="0"/>
+        </a:p>
+      </dgm:t>
+    </dgm:pt>
+    <dgm:pt modelId="{F0ACAAE3-EE98-4F84-8D4D-61DF4E3B7A70}" type="parTrans" cxnId="{8E74649E-4ED7-448E-8B43-BF4AA3F37930}">
+      <dgm:prSet/>
+      <dgm:spPr/>
+      <dgm:t>
+        <a:bodyPr/>
+        <a:lstStyle/>
+        <a:p>
+          <a:endParaRPr lang="en-US"/>
+        </a:p>
+      </dgm:t>
+    </dgm:pt>
+    <dgm:pt modelId="{AE2EA8ED-B69B-4C1D-B3B5-689DB0691730}" type="sibTrans" cxnId="{8E74649E-4ED7-448E-8B43-BF4AA3F37930}">
+      <dgm:prSet/>
+      <dgm:spPr/>
+      <dgm:t>
+        <a:bodyPr/>
+        <a:lstStyle/>
+        <a:p>
+          <a:endParaRPr lang="en-US"/>
+        </a:p>
+      </dgm:t>
+    </dgm:pt>
+    <dgm:pt modelId="{D22C768E-2D5E-47F9-876D-BD993DCD1A9D}">
+      <dgm:prSet phldrT="[Text]"/>
+      <dgm:spPr/>
+      <dgm:t>
+        <a:bodyPr/>
+        <a:lstStyle/>
+        <a:p>
+          <a:r>
+            <a:rPr lang="en-US" dirty="0" smtClean="0"/>
+            <a:t>SPA</a:t>
+          </a:r>
+          <a:endParaRPr lang="en-US" dirty="0"/>
+        </a:p>
+      </dgm:t>
+    </dgm:pt>
+    <dgm:pt modelId="{8A5A52C0-F2D5-40EB-AE9D-C1D5C5B1FA3C}" type="parTrans" cxnId="{D9CBAA8E-79B3-4FE4-A1EA-D25669C4991F}">
+      <dgm:prSet/>
+      <dgm:spPr/>
+      <dgm:t>
+        <a:bodyPr/>
+        <a:lstStyle/>
+        <a:p>
+          <a:endParaRPr lang="en-US"/>
+        </a:p>
+      </dgm:t>
+    </dgm:pt>
+    <dgm:pt modelId="{12C649CC-1B55-46E2-A152-1A0CEDA49D75}" type="sibTrans" cxnId="{D9CBAA8E-79B3-4FE4-A1EA-D25669C4991F}">
+      <dgm:prSet/>
+      <dgm:spPr/>
+      <dgm:t>
+        <a:bodyPr/>
+        <a:lstStyle/>
+        <a:p>
+          <a:endParaRPr lang="en-US"/>
+        </a:p>
+      </dgm:t>
+    </dgm:pt>
+    <dgm:pt modelId="{680FEF57-7FBF-4925-8923-21E8BEA19479}">
+      <dgm:prSet phldrT="[Text]"/>
+      <dgm:spPr/>
+      <dgm:t>
+        <a:bodyPr/>
+        <a:lstStyle/>
+        <a:p>
+          <a:r>
+            <a:rPr lang="en-US" dirty="0" err="1" smtClean="0"/>
+            <a:t>SignalIR</a:t>
+          </a:r>
+          <a:endParaRPr lang="en-US" dirty="0"/>
+        </a:p>
+      </dgm:t>
+    </dgm:pt>
+    <dgm:pt modelId="{C37980B2-9F51-402A-BDE3-EBD9A84CB7C6}" type="parTrans" cxnId="{FB15249D-E6B7-4490-8442-F68A58BA7F3F}">
+      <dgm:prSet/>
+      <dgm:spPr/>
+      <dgm:t>
+        <a:bodyPr/>
+        <a:lstStyle/>
+        <a:p>
+          <a:endParaRPr lang="en-US"/>
+        </a:p>
+      </dgm:t>
+    </dgm:pt>
+    <dgm:pt modelId="{47BF4DB3-77AD-413D-9B99-B91C49A3C61E}" type="sibTrans" cxnId="{FB15249D-E6B7-4490-8442-F68A58BA7F3F}">
+      <dgm:prSet/>
+      <dgm:spPr/>
+      <dgm:t>
+        <a:bodyPr/>
+        <a:lstStyle/>
+        <a:p>
+          <a:endParaRPr lang="en-US"/>
+        </a:p>
+      </dgm:t>
+    </dgm:pt>
+    <dgm:pt modelId="{B27A10DC-A4FF-4676-A563-044ACAC40D70}" type="pres">
+      <dgm:prSet presAssocID="{CC13E33E-8078-45B8-BE8F-F140D4C86143}" presName="Name0" presStyleCnt="0">
+        <dgm:presLayoutVars>
+          <dgm:chPref val="1"/>
+          <dgm:dir/>
+          <dgm:animOne val="branch"/>
+          <dgm:animLvl val="lvl"/>
+          <dgm:resizeHandles/>
+        </dgm:presLayoutVars>
+      </dgm:prSet>
+      <dgm:spPr/>
+    </dgm:pt>
+    <dgm:pt modelId="{EE5133C1-91F9-4A80-AE42-E2BEDF1A3DE9}" type="pres">
+      <dgm:prSet presAssocID="{68E506DF-75FE-4351-A575-DC8CFE003D4C}" presName="vertOne" presStyleCnt="0"/>
+      <dgm:spPr/>
+    </dgm:pt>
+    <dgm:pt modelId="{771F8E64-BD7A-459D-9BE1-3D0FBFD0E830}" type="pres">
+      <dgm:prSet presAssocID="{68E506DF-75FE-4351-A575-DC8CFE003D4C}" presName="txOne" presStyleLbl="node0" presStyleIdx="0" presStyleCnt="1">
+        <dgm:presLayoutVars>
+          <dgm:chPref val="3"/>
+        </dgm:presLayoutVars>
+      </dgm:prSet>
+      <dgm:spPr/>
+    </dgm:pt>
+    <dgm:pt modelId="{E8512E14-2DBD-4DCC-90A1-5D3541A0BBAC}" type="pres">
+      <dgm:prSet presAssocID="{68E506DF-75FE-4351-A575-DC8CFE003D4C}" presName="parTransOne" presStyleCnt="0"/>
+      <dgm:spPr/>
+    </dgm:pt>
+    <dgm:pt modelId="{F8940377-CA39-4990-8FC6-2072448227AF}" type="pres">
+      <dgm:prSet presAssocID="{68E506DF-75FE-4351-A575-DC8CFE003D4C}" presName="horzOne" presStyleCnt="0"/>
+      <dgm:spPr/>
+    </dgm:pt>
+    <dgm:pt modelId="{3B4C01AB-1AEF-4FF0-AA6A-8A78D98B1746}" type="pres">
+      <dgm:prSet presAssocID="{4D727B76-24D3-404B-92CF-41E9EB13F3ED}" presName="vertTwo" presStyleCnt="0"/>
+      <dgm:spPr/>
+    </dgm:pt>
+    <dgm:pt modelId="{9C12E59D-27CE-4BE3-9AD2-29C87D1C6277}" type="pres">
+      <dgm:prSet presAssocID="{4D727B76-24D3-404B-92CF-41E9EB13F3ED}" presName="txTwo" presStyleLbl="node2" presStyleIdx="0" presStyleCnt="2">
+        <dgm:presLayoutVars>
+          <dgm:chPref val="3"/>
+        </dgm:presLayoutVars>
+      </dgm:prSet>
+      <dgm:spPr/>
+    </dgm:pt>
+    <dgm:pt modelId="{689E2280-D980-4AB4-B79A-770A6E489A95}" type="pres">
+      <dgm:prSet presAssocID="{4D727B76-24D3-404B-92CF-41E9EB13F3ED}" presName="parTransTwo" presStyleCnt="0"/>
+      <dgm:spPr/>
+    </dgm:pt>
+    <dgm:pt modelId="{29C83F72-83EF-4919-BA08-DF986FF10C19}" type="pres">
+      <dgm:prSet presAssocID="{4D727B76-24D3-404B-92CF-41E9EB13F3ED}" presName="horzTwo" presStyleCnt="0"/>
+      <dgm:spPr/>
+    </dgm:pt>
+    <dgm:pt modelId="{A25E3F3B-6136-414A-9E79-988C0E8F9579}" type="pres">
+      <dgm:prSet presAssocID="{20720447-3429-4704-B3B1-49A9BA5E9382}" presName="vertThree" presStyleCnt="0"/>
+      <dgm:spPr/>
+    </dgm:pt>
+    <dgm:pt modelId="{803DE8D0-82F1-42D4-95CC-A739006621D5}" type="pres">
+      <dgm:prSet presAssocID="{20720447-3429-4704-B3B1-49A9BA5E9382}" presName="txThree" presStyleLbl="node3" presStyleIdx="0" presStyleCnt="6">
+        <dgm:presLayoutVars>
+          <dgm:chPref val="3"/>
+        </dgm:presLayoutVars>
+      </dgm:prSet>
+      <dgm:spPr/>
+    </dgm:pt>
+    <dgm:pt modelId="{EB4090FA-957A-424A-B50D-6924582B56FD}" type="pres">
+      <dgm:prSet presAssocID="{20720447-3429-4704-B3B1-49A9BA5E9382}" presName="horzThree" presStyleCnt="0"/>
+      <dgm:spPr/>
+    </dgm:pt>
+    <dgm:pt modelId="{F9146F8D-1D7D-49FB-A65B-ED8BB2AE2E64}" type="pres">
+      <dgm:prSet presAssocID="{A685C032-35E3-413F-A80C-A0D9B3A10FD9}" presName="sibSpaceThree" presStyleCnt="0"/>
+      <dgm:spPr/>
+    </dgm:pt>
+    <dgm:pt modelId="{B06FBB0C-91BE-4A93-8524-ED1DC9E549FD}" type="pres">
+      <dgm:prSet presAssocID="{839219F5-30D1-4100-B5E3-DDC95DB93E48}" presName="vertThree" presStyleCnt="0"/>
+      <dgm:spPr/>
+    </dgm:pt>
+    <dgm:pt modelId="{69B7C66C-E849-48DF-A047-65A363886A52}" type="pres">
+      <dgm:prSet presAssocID="{839219F5-30D1-4100-B5E3-DDC95DB93E48}" presName="txThree" presStyleLbl="node3" presStyleIdx="1" presStyleCnt="6">
+        <dgm:presLayoutVars>
+          <dgm:chPref val="3"/>
+        </dgm:presLayoutVars>
+      </dgm:prSet>
+      <dgm:spPr/>
+      <dgm:t>
+        <a:bodyPr/>
+        <a:lstStyle/>
+        <a:p>
+          <a:endParaRPr lang="en-US"/>
+        </a:p>
+      </dgm:t>
+    </dgm:pt>
+    <dgm:pt modelId="{646AF4DE-8734-4F43-B514-8B823257DB21}" type="pres">
+      <dgm:prSet presAssocID="{839219F5-30D1-4100-B5E3-DDC95DB93E48}" presName="horzThree" presStyleCnt="0"/>
+      <dgm:spPr/>
+    </dgm:pt>
+    <dgm:pt modelId="{37E2BF9D-5B75-489B-B0C0-51355A688F4A}" type="pres">
+      <dgm:prSet presAssocID="{E48F76B0-696D-4B17-8E56-4F41DF42F331}" presName="sibSpaceThree" presStyleCnt="0"/>
+      <dgm:spPr/>
+    </dgm:pt>
+    <dgm:pt modelId="{93099091-6E8F-4A6B-815A-FF3FEE37407D}" type="pres">
+      <dgm:prSet presAssocID="{CDD93539-3578-4D66-B104-52A9C9F8FA59}" presName="vertThree" presStyleCnt="0"/>
+      <dgm:spPr/>
+    </dgm:pt>
+    <dgm:pt modelId="{FFC63C9E-F6F8-44C4-92C8-73982247B377}" type="pres">
+      <dgm:prSet presAssocID="{CDD93539-3578-4D66-B104-52A9C9F8FA59}" presName="txThree" presStyleLbl="node3" presStyleIdx="2" presStyleCnt="6">
+        <dgm:presLayoutVars>
+          <dgm:chPref val="3"/>
+        </dgm:presLayoutVars>
+      </dgm:prSet>
+      <dgm:spPr/>
+    </dgm:pt>
+    <dgm:pt modelId="{49F617C5-00A9-4ECB-B455-C3F3AFC4A376}" type="pres">
+      <dgm:prSet presAssocID="{CDD93539-3578-4D66-B104-52A9C9F8FA59}" presName="horzThree" presStyleCnt="0"/>
+      <dgm:spPr/>
+    </dgm:pt>
+    <dgm:pt modelId="{4635BA38-F14B-4167-BD0C-24A05B9E67FC}" type="pres">
+      <dgm:prSet presAssocID="{AE2EA8ED-B69B-4C1D-B3B5-689DB0691730}" presName="sibSpaceThree" presStyleCnt="0"/>
+      <dgm:spPr/>
+    </dgm:pt>
+    <dgm:pt modelId="{FA994287-A539-4BB5-ACCC-7E66854EEC89}" type="pres">
+      <dgm:prSet presAssocID="{D22C768E-2D5E-47F9-876D-BD993DCD1A9D}" presName="vertThree" presStyleCnt="0"/>
+      <dgm:spPr/>
+    </dgm:pt>
+    <dgm:pt modelId="{EC7C695C-9D3F-451B-A676-7ABBE6313BA2}" type="pres">
+      <dgm:prSet presAssocID="{D22C768E-2D5E-47F9-876D-BD993DCD1A9D}" presName="txThree" presStyleLbl="node3" presStyleIdx="3" presStyleCnt="6">
+        <dgm:presLayoutVars>
+          <dgm:chPref val="3"/>
+        </dgm:presLayoutVars>
+      </dgm:prSet>
+      <dgm:spPr/>
+    </dgm:pt>
+    <dgm:pt modelId="{3C180185-046A-4AC5-9E50-3200942BAE67}" type="pres">
+      <dgm:prSet presAssocID="{D22C768E-2D5E-47F9-876D-BD993DCD1A9D}" presName="horzThree" presStyleCnt="0"/>
+      <dgm:spPr/>
+    </dgm:pt>
+    <dgm:pt modelId="{8EC03A88-CA75-4616-83D4-7E163E7BF15E}" type="pres">
+      <dgm:prSet presAssocID="{D47D1FE4-9714-4E6C-99D1-97F703CDE9A5}" presName="sibSpaceTwo" presStyleCnt="0"/>
+      <dgm:spPr/>
+    </dgm:pt>
+    <dgm:pt modelId="{AAFF4AC9-8AB0-481A-A7C5-B8EA6A7AC5E7}" type="pres">
+      <dgm:prSet presAssocID="{835B3E8D-3AE1-4695-8FA4-C1F54406999A}" presName="vertTwo" presStyleCnt="0"/>
+      <dgm:spPr/>
+    </dgm:pt>
+    <dgm:pt modelId="{9A62CB40-02D8-4239-AC45-89C877E37746}" type="pres">
+      <dgm:prSet presAssocID="{835B3E8D-3AE1-4695-8FA4-C1F54406999A}" presName="txTwo" presStyleLbl="node2" presStyleIdx="1" presStyleCnt="2">
+        <dgm:presLayoutVars>
+          <dgm:chPref val="3"/>
+        </dgm:presLayoutVars>
+      </dgm:prSet>
+      <dgm:spPr/>
+    </dgm:pt>
+    <dgm:pt modelId="{9D1FA889-CD12-4B4C-B0CF-5B3D24DBA598}" type="pres">
+      <dgm:prSet presAssocID="{835B3E8D-3AE1-4695-8FA4-C1F54406999A}" presName="parTransTwo" presStyleCnt="0"/>
+      <dgm:spPr/>
+    </dgm:pt>
+    <dgm:pt modelId="{1A7FFB5F-D919-4C0A-82AC-A43D00B5371C}" type="pres">
+      <dgm:prSet presAssocID="{835B3E8D-3AE1-4695-8FA4-C1F54406999A}" presName="horzTwo" presStyleCnt="0"/>
+      <dgm:spPr/>
+    </dgm:pt>
+    <dgm:pt modelId="{DE0734A5-D073-451C-8582-356AEF652529}" type="pres">
+      <dgm:prSet presAssocID="{335B37E7-FFF7-463E-BDEB-7BC506E0543E}" presName="vertThree" presStyleCnt="0"/>
+      <dgm:spPr/>
+    </dgm:pt>
+    <dgm:pt modelId="{54DC7823-DFA6-486C-8C7E-1B917D501187}" type="pres">
+      <dgm:prSet presAssocID="{335B37E7-FFF7-463E-BDEB-7BC506E0543E}" presName="txThree" presStyleLbl="node3" presStyleIdx="4" presStyleCnt="6">
+        <dgm:presLayoutVars>
+          <dgm:chPref val="3"/>
+        </dgm:presLayoutVars>
+      </dgm:prSet>
+      <dgm:spPr/>
+      <dgm:t>
+        <a:bodyPr/>
+        <a:lstStyle/>
+        <a:p>
+          <a:endParaRPr lang="en-US"/>
+        </a:p>
+      </dgm:t>
+    </dgm:pt>
+    <dgm:pt modelId="{77CECB7E-5BDD-44AD-9567-A2186946692A}" type="pres">
+      <dgm:prSet presAssocID="{335B37E7-FFF7-463E-BDEB-7BC506E0543E}" presName="horzThree" presStyleCnt="0"/>
+      <dgm:spPr/>
+    </dgm:pt>
+    <dgm:pt modelId="{8CA418D3-B852-4F09-BE0F-9A627CE89942}" type="pres">
+      <dgm:prSet presAssocID="{6DF6810B-13CB-45B5-BEF5-DB554C934B9B}" presName="sibSpaceThree" presStyleCnt="0"/>
+      <dgm:spPr/>
+    </dgm:pt>
+    <dgm:pt modelId="{8243B18E-1DE7-4DE1-AE56-97621064EFDC}" type="pres">
+      <dgm:prSet presAssocID="{680FEF57-7FBF-4925-8923-21E8BEA19479}" presName="vertThree" presStyleCnt="0"/>
+      <dgm:spPr/>
+    </dgm:pt>
+    <dgm:pt modelId="{7FC12CFE-55CB-4438-B919-72E9FE6FFAAC}" type="pres">
+      <dgm:prSet presAssocID="{680FEF57-7FBF-4925-8923-21E8BEA19479}" presName="txThree" presStyleLbl="node3" presStyleIdx="5" presStyleCnt="6">
+        <dgm:presLayoutVars>
+          <dgm:chPref val="3"/>
+        </dgm:presLayoutVars>
+      </dgm:prSet>
+      <dgm:spPr/>
+      <dgm:t>
+        <a:bodyPr/>
+        <a:lstStyle/>
+        <a:p>
+          <a:endParaRPr lang="en-US"/>
+        </a:p>
+      </dgm:t>
+    </dgm:pt>
+    <dgm:pt modelId="{75508E26-EAE2-42E9-B002-FF884DB9EDFE}" type="pres">
+      <dgm:prSet presAssocID="{680FEF57-7FBF-4925-8923-21E8BEA19479}" presName="horzThree" presStyleCnt="0"/>
+      <dgm:spPr/>
+    </dgm:pt>
+  </dgm:ptLst>
+  <dgm:cxnLst>
+    <dgm:cxn modelId="{8E94A467-EDD1-4AFC-A1EF-1001075A649A}" type="presOf" srcId="{4D727B76-24D3-404B-92CF-41E9EB13F3ED}" destId="{9C12E59D-27CE-4BE3-9AD2-29C87D1C6277}" srcOrd="0" destOrd="0" presId="urn:microsoft.com/office/officeart/2005/8/layout/hierarchy4"/>
+    <dgm:cxn modelId="{D970BBCA-3BEF-43A1-8D0F-AA2C54AAAC58}" srcId="{4D727B76-24D3-404B-92CF-41E9EB13F3ED}" destId="{20720447-3429-4704-B3B1-49A9BA5E9382}" srcOrd="0" destOrd="0" parTransId="{82F3EC30-1CF0-4F4D-A740-B008AEDED329}" sibTransId="{A685C032-35E3-413F-A80C-A0D9B3A10FD9}"/>
+    <dgm:cxn modelId="{DDAAB080-5E6B-4D88-8C09-8AD36E104C92}" srcId="{68E506DF-75FE-4351-A575-DC8CFE003D4C}" destId="{835B3E8D-3AE1-4695-8FA4-C1F54406999A}" srcOrd="1" destOrd="0" parTransId="{7135DE73-D33F-4886-B6F9-4513EBA094E3}" sibTransId="{E76305A4-8F6F-45A6-8CEF-A58D609ECF15}"/>
+    <dgm:cxn modelId="{9C16E62A-441D-471C-B31D-5349A4B4DF0F}" type="presOf" srcId="{335B37E7-FFF7-463E-BDEB-7BC506E0543E}" destId="{54DC7823-DFA6-486C-8C7E-1B917D501187}" srcOrd="0" destOrd="0" presId="urn:microsoft.com/office/officeart/2005/8/layout/hierarchy4"/>
+    <dgm:cxn modelId="{B265CC04-2B6C-4EC3-9793-9C96892ED46C}" srcId="{835B3E8D-3AE1-4695-8FA4-C1F54406999A}" destId="{335B37E7-FFF7-463E-BDEB-7BC506E0543E}" srcOrd="0" destOrd="0" parTransId="{CE03112B-B50F-45A2-A04A-D10E0CDC5522}" sibTransId="{6DF6810B-13CB-45B5-BEF5-DB554C934B9B}"/>
+    <dgm:cxn modelId="{37BB7E52-AB20-4F84-AF72-95FC1A4675F8}" type="presOf" srcId="{CC13E33E-8078-45B8-BE8F-F140D4C86143}" destId="{B27A10DC-A4FF-4676-A563-044ACAC40D70}" srcOrd="0" destOrd="0" presId="urn:microsoft.com/office/officeart/2005/8/layout/hierarchy4"/>
+    <dgm:cxn modelId="{13A0DF00-0B8D-4F56-8F5E-7A340F59FBA9}" type="presOf" srcId="{835B3E8D-3AE1-4695-8FA4-C1F54406999A}" destId="{9A62CB40-02D8-4239-AC45-89C877E37746}" srcOrd="0" destOrd="0" presId="urn:microsoft.com/office/officeart/2005/8/layout/hierarchy4"/>
+    <dgm:cxn modelId="{BF11403C-E34E-4F4C-89B3-AF01D15A5746}" srcId="{CC13E33E-8078-45B8-BE8F-F140D4C86143}" destId="{68E506DF-75FE-4351-A575-DC8CFE003D4C}" srcOrd="0" destOrd="0" parTransId="{FCC71BF9-5DF8-4E42-9023-CDB66AC83EE1}" sibTransId="{A19D0D9A-8C6C-46B8-B9CA-6DD0CD77C946}"/>
+    <dgm:cxn modelId="{747EF8E4-5702-451B-AD63-E1F380F9CDA8}" type="presOf" srcId="{839219F5-30D1-4100-B5E3-DDC95DB93E48}" destId="{69B7C66C-E849-48DF-A047-65A363886A52}" srcOrd="0" destOrd="0" presId="urn:microsoft.com/office/officeart/2005/8/layout/hierarchy4"/>
+    <dgm:cxn modelId="{8DAA8148-BD60-48BC-8AD8-6EEB76329E62}" type="presOf" srcId="{CDD93539-3578-4D66-B104-52A9C9F8FA59}" destId="{FFC63C9E-F6F8-44C4-92C8-73982247B377}" srcOrd="0" destOrd="0" presId="urn:microsoft.com/office/officeart/2005/8/layout/hierarchy4"/>
+    <dgm:cxn modelId="{B38C6BBC-7655-4042-BD0A-70006CF56D5E}" type="presOf" srcId="{D22C768E-2D5E-47F9-876D-BD993DCD1A9D}" destId="{EC7C695C-9D3F-451B-A676-7ABBE6313BA2}" srcOrd="0" destOrd="0" presId="urn:microsoft.com/office/officeart/2005/8/layout/hierarchy4"/>
+    <dgm:cxn modelId="{972DAF1B-0B6A-41D6-A7B0-790B6B826716}" type="presOf" srcId="{20720447-3429-4704-B3B1-49A9BA5E9382}" destId="{803DE8D0-82F1-42D4-95CC-A739006621D5}" srcOrd="0" destOrd="0" presId="urn:microsoft.com/office/officeart/2005/8/layout/hierarchy4"/>
+    <dgm:cxn modelId="{8E74649E-4ED7-448E-8B43-BF4AA3F37930}" srcId="{4D727B76-24D3-404B-92CF-41E9EB13F3ED}" destId="{CDD93539-3578-4D66-B104-52A9C9F8FA59}" srcOrd="2" destOrd="0" parTransId="{F0ACAAE3-EE98-4F84-8D4D-61DF4E3B7A70}" sibTransId="{AE2EA8ED-B69B-4C1D-B3B5-689DB0691730}"/>
+    <dgm:cxn modelId="{8ADCD5BF-DB65-47F0-9C10-D827EF708CB6}" type="presOf" srcId="{68E506DF-75FE-4351-A575-DC8CFE003D4C}" destId="{771F8E64-BD7A-459D-9BE1-3D0FBFD0E830}" srcOrd="0" destOrd="0" presId="urn:microsoft.com/office/officeart/2005/8/layout/hierarchy4"/>
+    <dgm:cxn modelId="{E9FD21C6-7996-4781-8D44-8CF36448FA9C}" srcId="{4D727B76-24D3-404B-92CF-41E9EB13F3ED}" destId="{839219F5-30D1-4100-B5E3-DDC95DB93E48}" srcOrd="1" destOrd="0" parTransId="{CC21082F-17D0-4D2B-A794-DA29D57F1C57}" sibTransId="{E48F76B0-696D-4B17-8E56-4F41DF42F331}"/>
+    <dgm:cxn modelId="{D9CBAA8E-79B3-4FE4-A1EA-D25669C4991F}" srcId="{4D727B76-24D3-404B-92CF-41E9EB13F3ED}" destId="{D22C768E-2D5E-47F9-876D-BD993DCD1A9D}" srcOrd="3" destOrd="0" parTransId="{8A5A52C0-F2D5-40EB-AE9D-C1D5C5B1FA3C}" sibTransId="{12C649CC-1B55-46E2-A152-1A0CEDA49D75}"/>
+    <dgm:cxn modelId="{05FDAC00-99C2-4AFC-9590-2CF3CB575005}" srcId="{68E506DF-75FE-4351-A575-DC8CFE003D4C}" destId="{4D727B76-24D3-404B-92CF-41E9EB13F3ED}" srcOrd="0" destOrd="0" parTransId="{BFD7331C-A985-425A-A0D2-65C19B3DADCA}" sibTransId="{D47D1FE4-9714-4E6C-99D1-97F703CDE9A5}"/>
+    <dgm:cxn modelId="{49A49B24-D4C0-44A6-8F08-AE4EC9DEFBE6}" type="presOf" srcId="{680FEF57-7FBF-4925-8923-21E8BEA19479}" destId="{7FC12CFE-55CB-4438-B919-72E9FE6FFAAC}" srcOrd="0" destOrd="0" presId="urn:microsoft.com/office/officeart/2005/8/layout/hierarchy4"/>
+    <dgm:cxn modelId="{FB15249D-E6B7-4490-8442-F68A58BA7F3F}" srcId="{835B3E8D-3AE1-4695-8FA4-C1F54406999A}" destId="{680FEF57-7FBF-4925-8923-21E8BEA19479}" srcOrd="1" destOrd="0" parTransId="{C37980B2-9F51-402A-BDE3-EBD9A84CB7C6}" sibTransId="{47BF4DB3-77AD-413D-9B99-B91C49A3C61E}"/>
+    <dgm:cxn modelId="{3D2E3454-0591-49FC-A277-D1D84B761854}" type="presParOf" srcId="{B27A10DC-A4FF-4676-A563-044ACAC40D70}" destId="{EE5133C1-91F9-4A80-AE42-E2BEDF1A3DE9}" srcOrd="0" destOrd="0" presId="urn:microsoft.com/office/officeart/2005/8/layout/hierarchy4"/>
+    <dgm:cxn modelId="{6F511A75-305A-44F3-B89A-F91EE3FA419C}" type="presParOf" srcId="{EE5133C1-91F9-4A80-AE42-E2BEDF1A3DE9}" destId="{771F8E64-BD7A-459D-9BE1-3D0FBFD0E830}" srcOrd="0" destOrd="0" presId="urn:microsoft.com/office/officeart/2005/8/layout/hierarchy4"/>
+    <dgm:cxn modelId="{0E1E8BD3-6B27-42C4-8839-09C28982231C}" type="presParOf" srcId="{EE5133C1-91F9-4A80-AE42-E2BEDF1A3DE9}" destId="{E8512E14-2DBD-4DCC-90A1-5D3541A0BBAC}" srcOrd="1" destOrd="0" presId="urn:microsoft.com/office/officeart/2005/8/layout/hierarchy4"/>
+    <dgm:cxn modelId="{CF9047A5-AC0F-439C-BB7F-C8D75550D459}" type="presParOf" srcId="{EE5133C1-91F9-4A80-AE42-E2BEDF1A3DE9}" destId="{F8940377-CA39-4990-8FC6-2072448227AF}" srcOrd="2" destOrd="0" presId="urn:microsoft.com/office/officeart/2005/8/layout/hierarchy4"/>
+    <dgm:cxn modelId="{F61F9C35-EE99-45C0-A207-50D3DFEC5E0C}" type="presParOf" srcId="{F8940377-CA39-4990-8FC6-2072448227AF}" destId="{3B4C01AB-1AEF-4FF0-AA6A-8A78D98B1746}" srcOrd="0" destOrd="0" presId="urn:microsoft.com/office/officeart/2005/8/layout/hierarchy4"/>
+    <dgm:cxn modelId="{701B7ED5-0EAB-40E8-A124-2F536C1A586D}" type="presParOf" srcId="{3B4C01AB-1AEF-4FF0-AA6A-8A78D98B1746}" destId="{9C12E59D-27CE-4BE3-9AD2-29C87D1C6277}" srcOrd="0" destOrd="0" presId="urn:microsoft.com/office/officeart/2005/8/layout/hierarchy4"/>
+    <dgm:cxn modelId="{B6F9870A-CBEE-4532-B71B-535B1CBBA498}" type="presParOf" srcId="{3B4C01AB-1AEF-4FF0-AA6A-8A78D98B1746}" destId="{689E2280-D980-4AB4-B79A-770A6E489A95}" srcOrd="1" destOrd="0" presId="urn:microsoft.com/office/officeart/2005/8/layout/hierarchy4"/>
+    <dgm:cxn modelId="{72C1BE23-2D1E-4976-B546-A60D8B50F3FA}" type="presParOf" srcId="{3B4C01AB-1AEF-4FF0-AA6A-8A78D98B1746}" destId="{29C83F72-83EF-4919-BA08-DF986FF10C19}" srcOrd="2" destOrd="0" presId="urn:microsoft.com/office/officeart/2005/8/layout/hierarchy4"/>
+    <dgm:cxn modelId="{84A1C5E4-CEC1-450A-B8EE-360AA1F0C3A8}" type="presParOf" srcId="{29C83F72-83EF-4919-BA08-DF986FF10C19}" destId="{A25E3F3B-6136-414A-9E79-988C0E8F9579}" srcOrd="0" destOrd="0" presId="urn:microsoft.com/office/officeart/2005/8/layout/hierarchy4"/>
+    <dgm:cxn modelId="{62339F67-1D14-4A60-83ED-E3C5EFD72555}" type="presParOf" srcId="{A25E3F3B-6136-414A-9E79-988C0E8F9579}" destId="{803DE8D0-82F1-42D4-95CC-A739006621D5}" srcOrd="0" destOrd="0" presId="urn:microsoft.com/office/officeart/2005/8/layout/hierarchy4"/>
+    <dgm:cxn modelId="{36DC8A06-61B4-49F5-A425-CA33D016AB28}" type="presParOf" srcId="{A25E3F3B-6136-414A-9E79-988C0E8F9579}" destId="{EB4090FA-957A-424A-B50D-6924582B56FD}" srcOrd="1" destOrd="0" presId="urn:microsoft.com/office/officeart/2005/8/layout/hierarchy4"/>
+    <dgm:cxn modelId="{1D0169C4-DCE7-4085-B079-4C56837F5691}" type="presParOf" srcId="{29C83F72-83EF-4919-BA08-DF986FF10C19}" destId="{F9146F8D-1D7D-49FB-A65B-ED8BB2AE2E64}" srcOrd="1" destOrd="0" presId="urn:microsoft.com/office/officeart/2005/8/layout/hierarchy4"/>
+    <dgm:cxn modelId="{BB98D5E5-85B8-4189-AA47-DFC398FAB505}" type="presParOf" srcId="{29C83F72-83EF-4919-BA08-DF986FF10C19}" destId="{B06FBB0C-91BE-4A93-8524-ED1DC9E549FD}" srcOrd="2" destOrd="0" presId="urn:microsoft.com/office/officeart/2005/8/layout/hierarchy4"/>
+    <dgm:cxn modelId="{A5EF321F-97A0-42C1-AB66-230CD4B56A52}" type="presParOf" srcId="{B06FBB0C-91BE-4A93-8524-ED1DC9E549FD}" destId="{69B7C66C-E849-48DF-A047-65A363886A52}" srcOrd="0" destOrd="0" presId="urn:microsoft.com/office/officeart/2005/8/layout/hierarchy4"/>
+    <dgm:cxn modelId="{5F50944B-0D1D-4AD5-8B10-5A8C1EB7929C}" type="presParOf" srcId="{B06FBB0C-91BE-4A93-8524-ED1DC9E549FD}" destId="{646AF4DE-8734-4F43-B514-8B823257DB21}" srcOrd="1" destOrd="0" presId="urn:microsoft.com/office/officeart/2005/8/layout/hierarchy4"/>
+    <dgm:cxn modelId="{D0F09B45-DEC4-435D-B225-680A2FEB7832}" type="presParOf" srcId="{29C83F72-83EF-4919-BA08-DF986FF10C19}" destId="{37E2BF9D-5B75-489B-B0C0-51355A688F4A}" srcOrd="3" destOrd="0" presId="urn:microsoft.com/office/officeart/2005/8/layout/hierarchy4"/>
+    <dgm:cxn modelId="{D5117790-1A21-43AE-BED1-1281AA815E1C}" type="presParOf" srcId="{29C83F72-83EF-4919-BA08-DF986FF10C19}" destId="{93099091-6E8F-4A6B-815A-FF3FEE37407D}" srcOrd="4" destOrd="0" presId="urn:microsoft.com/office/officeart/2005/8/layout/hierarchy4"/>
+    <dgm:cxn modelId="{AD287EC9-DF10-4AFD-9B6A-B854C175A1AB}" type="presParOf" srcId="{93099091-6E8F-4A6B-815A-FF3FEE37407D}" destId="{FFC63C9E-F6F8-44C4-92C8-73982247B377}" srcOrd="0" destOrd="0" presId="urn:microsoft.com/office/officeart/2005/8/layout/hierarchy4"/>
+    <dgm:cxn modelId="{7600C03E-FE28-4854-B6FA-EF3A89089768}" type="presParOf" srcId="{93099091-6E8F-4A6B-815A-FF3FEE37407D}" destId="{49F617C5-00A9-4ECB-B455-C3F3AFC4A376}" srcOrd="1" destOrd="0" presId="urn:microsoft.com/office/officeart/2005/8/layout/hierarchy4"/>
+    <dgm:cxn modelId="{8FC0AB18-41D4-4A45-AFC3-36BC61638A64}" type="presParOf" srcId="{29C83F72-83EF-4919-BA08-DF986FF10C19}" destId="{4635BA38-F14B-4167-BD0C-24A05B9E67FC}" srcOrd="5" destOrd="0" presId="urn:microsoft.com/office/officeart/2005/8/layout/hierarchy4"/>
+    <dgm:cxn modelId="{AAE8F46D-8734-4E0E-83E7-F0004D60FF22}" type="presParOf" srcId="{29C83F72-83EF-4919-BA08-DF986FF10C19}" destId="{FA994287-A539-4BB5-ACCC-7E66854EEC89}" srcOrd="6" destOrd="0" presId="urn:microsoft.com/office/officeart/2005/8/layout/hierarchy4"/>
+    <dgm:cxn modelId="{67262382-EDD4-41F1-A2BD-9969C8464804}" type="presParOf" srcId="{FA994287-A539-4BB5-ACCC-7E66854EEC89}" destId="{EC7C695C-9D3F-451B-A676-7ABBE6313BA2}" srcOrd="0" destOrd="0" presId="urn:microsoft.com/office/officeart/2005/8/layout/hierarchy4"/>
+    <dgm:cxn modelId="{1F9B29D6-70C4-44B7-B9BB-EABD302FB74D}" type="presParOf" srcId="{FA994287-A539-4BB5-ACCC-7E66854EEC89}" destId="{3C180185-046A-4AC5-9E50-3200942BAE67}" srcOrd="1" destOrd="0" presId="urn:microsoft.com/office/officeart/2005/8/layout/hierarchy4"/>
+    <dgm:cxn modelId="{017C001E-A997-49C1-80F2-190098606E0B}" type="presParOf" srcId="{F8940377-CA39-4990-8FC6-2072448227AF}" destId="{8EC03A88-CA75-4616-83D4-7E163E7BF15E}" srcOrd="1" destOrd="0" presId="urn:microsoft.com/office/officeart/2005/8/layout/hierarchy4"/>
+    <dgm:cxn modelId="{E9EA7519-75A2-4131-9059-8E3EB12E3666}" type="presParOf" srcId="{F8940377-CA39-4990-8FC6-2072448227AF}" destId="{AAFF4AC9-8AB0-481A-A7C5-B8EA6A7AC5E7}" srcOrd="2" destOrd="0" presId="urn:microsoft.com/office/officeart/2005/8/layout/hierarchy4"/>
+    <dgm:cxn modelId="{ACF48869-32C2-4047-BC7C-54676970D5C1}" type="presParOf" srcId="{AAFF4AC9-8AB0-481A-A7C5-B8EA6A7AC5E7}" destId="{9A62CB40-02D8-4239-AC45-89C877E37746}" srcOrd="0" destOrd="0" presId="urn:microsoft.com/office/officeart/2005/8/layout/hierarchy4"/>
+    <dgm:cxn modelId="{A5D96DC0-94CF-43E6-BE70-57651F18CAE8}" type="presParOf" srcId="{AAFF4AC9-8AB0-481A-A7C5-B8EA6A7AC5E7}" destId="{9D1FA889-CD12-4B4C-B0CF-5B3D24DBA598}" srcOrd="1" destOrd="0" presId="urn:microsoft.com/office/officeart/2005/8/layout/hierarchy4"/>
+    <dgm:cxn modelId="{E70B2706-1BE3-4F70-A517-01F2EEC941CD}" type="presParOf" srcId="{AAFF4AC9-8AB0-481A-A7C5-B8EA6A7AC5E7}" destId="{1A7FFB5F-D919-4C0A-82AC-A43D00B5371C}" srcOrd="2" destOrd="0" presId="urn:microsoft.com/office/officeart/2005/8/layout/hierarchy4"/>
+    <dgm:cxn modelId="{8A48BC79-7E0E-4862-AAC1-50E2F1E5C6DD}" type="presParOf" srcId="{1A7FFB5F-D919-4C0A-82AC-A43D00B5371C}" destId="{DE0734A5-D073-451C-8582-356AEF652529}" srcOrd="0" destOrd="0" presId="urn:microsoft.com/office/officeart/2005/8/layout/hierarchy4"/>
+    <dgm:cxn modelId="{1329B5D7-5663-4C5E-B083-FCED77DBD4F1}" type="presParOf" srcId="{DE0734A5-D073-451C-8582-356AEF652529}" destId="{54DC7823-DFA6-486C-8C7E-1B917D501187}" srcOrd="0" destOrd="0" presId="urn:microsoft.com/office/officeart/2005/8/layout/hierarchy4"/>
+    <dgm:cxn modelId="{C2139964-ED44-419B-A89B-46CDF918E549}" type="presParOf" srcId="{DE0734A5-D073-451C-8582-356AEF652529}" destId="{77CECB7E-5BDD-44AD-9567-A2186946692A}" srcOrd="1" destOrd="0" presId="urn:microsoft.com/office/officeart/2005/8/layout/hierarchy4"/>
+    <dgm:cxn modelId="{2552DE7E-1DA3-4D51-91BF-A3206F65EFB1}" type="presParOf" srcId="{1A7FFB5F-D919-4C0A-82AC-A43D00B5371C}" destId="{8CA418D3-B852-4F09-BE0F-9A627CE89942}" srcOrd="1" destOrd="0" presId="urn:microsoft.com/office/officeart/2005/8/layout/hierarchy4"/>
+    <dgm:cxn modelId="{D8427AE5-CCCE-42BA-A9B1-FDDE9DE027E9}" type="presParOf" srcId="{1A7FFB5F-D919-4C0A-82AC-A43D00B5371C}" destId="{8243B18E-1DE7-4DE1-AE56-97621064EFDC}" srcOrd="2" destOrd="0" presId="urn:microsoft.com/office/officeart/2005/8/layout/hierarchy4"/>
+    <dgm:cxn modelId="{A7509317-5ADF-459F-A318-0D5711E221AB}" type="presParOf" srcId="{8243B18E-1DE7-4DE1-AE56-97621064EFDC}" destId="{7FC12CFE-55CB-4438-B919-72E9FE6FFAAC}" srcOrd="0" destOrd="0" presId="urn:microsoft.com/office/officeart/2005/8/layout/hierarchy4"/>
+    <dgm:cxn modelId="{82C23D16-5128-442A-9CE3-58F7C0596E46}" type="presParOf" srcId="{8243B18E-1DE7-4DE1-AE56-97621064EFDC}" destId="{75508E26-EAE2-42E9-B002-FF884DB9EDFE}" srcOrd="1" destOrd="0" presId="urn:microsoft.com/office/officeart/2005/8/layout/hierarchy4"/>
+  </dgm:cxnLst>
+  <dgm:bg>
+    <a:effectLst>
+      <a:outerShdw blurRad="76200" dir="13500000" sy="23000" kx="1200000" algn="br" rotWithShape="0">
+        <a:prstClr val="black">
+          <a:alpha val="20000"/>
+        </a:prstClr>
+      </a:outerShdw>
+    </a:effectLst>
+  </dgm:bg>
+  <dgm:whole>
+    <a:effectLst>
+      <a:reflection blurRad="6350" stA="50000" endA="275" endPos="40000" dist="101600" dir="5400000" sy="-100000" algn="bl" rotWithShape="0"/>
+    </a:effectLst>
+  </dgm:whole>
+  <dgm:extLst>
+    <a:ext uri="http://schemas.microsoft.com/office/drawing/2008/diagram">
+      <dsp:dataModelExt xmlns:dsp="http://schemas.microsoft.com/office/drawing/2008/diagram" relId="rId6" minVer="http://schemas.openxmlformats.org/drawingml/2006/diagram"/>
+    </a:ext>
+  </dgm:extLst>
+</dgm:dataModel>
+</file>
+
+<file path=ppt/diagrams/drawing1.xml><?xml version="1.0" encoding="utf-8"?>
+<dsp:drawing xmlns:dgm="http://schemas.openxmlformats.org/drawingml/2006/diagram" xmlns:dsp="http://schemas.microsoft.com/office/drawing/2008/diagram" xmlns:a="http://schemas.openxmlformats.org/drawingml/2006/main">
+  <dsp:spTree>
+    <dsp:nvGrpSpPr>
+      <dsp:cNvPr id="0" name=""/>
+      <dsp:cNvGrpSpPr/>
+    </dsp:nvGrpSpPr>
+    <dsp:grpSpPr/>
+    <dsp:sp modelId="{771F8E64-BD7A-459D-9BE1-3D0FBFD0E830}">
+      <dsp:nvSpPr>
+        <dsp:cNvPr id="0" name=""/>
+        <dsp:cNvSpPr/>
+      </dsp:nvSpPr>
+      <dsp:spPr>
+        <a:xfrm>
+          <a:off x="932" y="1947"/>
+          <a:ext cx="8126134" cy="1709208"/>
+        </a:xfrm>
+        <a:prstGeom prst="roundRect">
+          <a:avLst>
+            <a:gd name="adj" fmla="val 10000"/>
+          </a:avLst>
+        </a:prstGeom>
+        <a:solidFill>
+          <a:schemeClr val="accent6">
+            <a:shade val="80000"/>
+            <a:hueOff val="0"/>
+            <a:satOff val="0"/>
+            <a:lumOff val="0"/>
+            <a:alphaOff val="0"/>
+          </a:schemeClr>
+        </a:solidFill>
+        <a:ln w="25400" cap="flat" cmpd="sng" algn="ctr">
+          <a:solidFill>
+            <a:schemeClr val="lt1">
+              <a:hueOff val="0"/>
+              <a:satOff val="0"/>
+              <a:lumOff val="0"/>
+              <a:alphaOff val="0"/>
+            </a:schemeClr>
+          </a:solidFill>
+          <a:prstDash val="solid"/>
+        </a:ln>
+        <a:effectLst/>
+      </dsp:spPr>
+      <dsp:style>
+        <a:lnRef idx="2">
+          <a:scrgbClr r="0" g="0" b="0"/>
+        </a:lnRef>
+        <a:fillRef idx="1">
+          <a:scrgbClr r="0" g="0" b="0"/>
+        </a:fillRef>
+        <a:effectRef idx="0">
+          <a:scrgbClr r="0" g="0" b="0"/>
+        </a:effectRef>
+        <a:fontRef idx="minor">
+          <a:schemeClr val="lt1"/>
+        </a:fontRef>
+      </dsp:style>
+      <dsp:txBody>
+        <a:bodyPr spcFirstLastPara="0" vert="horz" wrap="square" lIns="247650" tIns="247650" rIns="247650" bIns="247650" numCol="1" spcCol="1270" anchor="ctr" anchorCtr="0">
+          <a:noAutofit/>
+        </a:bodyPr>
+        <a:lstStyle/>
+        <a:p>
+          <a:pPr lvl="0" algn="ctr" defTabSz="2889250">
+            <a:lnSpc>
+              <a:spcPct val="90000"/>
+            </a:lnSpc>
+            <a:spcBef>
+              <a:spcPct val="0"/>
+            </a:spcBef>
+            <a:spcAft>
+              <a:spcPct val="35000"/>
+            </a:spcAft>
+          </a:pPr>
+          <a:r>
+            <a:rPr lang="en-US" sz="6500" kern="1200" dirty="0" smtClean="0"/>
+            <a:t>ASP.NET</a:t>
+          </a:r>
+          <a:endParaRPr lang="en-US" sz="6500" kern="1200" dirty="0"/>
+        </a:p>
+      </dsp:txBody>
+      <dsp:txXfrm>
+        <a:off x="50993" y="52008"/>
+        <a:ext cx="8026012" cy="1609086"/>
+      </dsp:txXfrm>
+    </dsp:sp>
+    <dsp:sp modelId="{9C12E59D-27CE-4BE3-9AD2-29C87D1C6277}">
+      <dsp:nvSpPr>
+        <dsp:cNvPr id="0" name=""/>
+        <dsp:cNvSpPr/>
+      </dsp:nvSpPr>
+      <dsp:spPr>
+        <a:xfrm>
+          <a:off x="932" y="1854729"/>
+          <a:ext cx="5362832" cy="1709208"/>
+        </a:xfrm>
+        <a:prstGeom prst="roundRect">
+          <a:avLst>
+            <a:gd name="adj" fmla="val 10000"/>
+          </a:avLst>
+        </a:prstGeom>
+        <a:solidFill>
+          <a:schemeClr val="accent6">
+            <a:tint val="99000"/>
+            <a:hueOff val="0"/>
+            <a:satOff val="0"/>
+            <a:lumOff val="0"/>
+            <a:alphaOff val="0"/>
+          </a:schemeClr>
+        </a:solidFill>
+        <a:ln w="25400" cap="flat" cmpd="sng" algn="ctr">
+          <a:solidFill>
+            <a:schemeClr val="lt1">
+              <a:hueOff val="0"/>
+              <a:satOff val="0"/>
+              <a:lumOff val="0"/>
+              <a:alphaOff val="0"/>
+            </a:schemeClr>
+          </a:solidFill>
+          <a:prstDash val="solid"/>
+        </a:ln>
+        <a:effectLst/>
+      </dsp:spPr>
+      <dsp:style>
+        <a:lnRef idx="2">
+          <a:scrgbClr r="0" g="0" b="0"/>
+        </a:lnRef>
+        <a:fillRef idx="1">
+          <a:scrgbClr r="0" g="0" b="0"/>
+        </a:fillRef>
+        <a:effectRef idx="0">
+          <a:scrgbClr r="0" g="0" b="0"/>
+        </a:effectRef>
+        <a:fontRef idx="minor">
+          <a:schemeClr val="lt1"/>
+        </a:fontRef>
+      </dsp:style>
+      <dsp:txBody>
+        <a:bodyPr spcFirstLastPara="0" vert="horz" wrap="square" lIns="167640" tIns="167640" rIns="167640" bIns="167640" numCol="1" spcCol="1270" anchor="ctr" anchorCtr="0">
+          <a:noAutofit/>
+        </a:bodyPr>
+        <a:lstStyle/>
+        <a:p>
+          <a:pPr lvl="0" algn="ctr" defTabSz="1955800">
+            <a:lnSpc>
+              <a:spcPct val="90000"/>
+            </a:lnSpc>
+            <a:spcBef>
+              <a:spcPct val="0"/>
+            </a:spcBef>
+            <a:spcAft>
+              <a:spcPct val="35000"/>
+            </a:spcAft>
+          </a:pPr>
+          <a:r>
+            <a:rPr lang="en-US" sz="4400" kern="1200" dirty="0" smtClean="0"/>
+            <a:t>Sites</a:t>
+          </a:r>
+          <a:endParaRPr lang="en-US" sz="4400" kern="1200" dirty="0"/>
+        </a:p>
+      </dsp:txBody>
+      <dsp:txXfrm>
+        <a:off x="50993" y="1904790"/>
+        <a:ext cx="5262710" cy="1609086"/>
+      </dsp:txXfrm>
+    </dsp:sp>
+    <dsp:sp modelId="{803DE8D0-82F1-42D4-95CC-A739006621D5}">
+      <dsp:nvSpPr>
+        <dsp:cNvPr id="0" name=""/>
+        <dsp:cNvSpPr/>
+      </dsp:nvSpPr>
+      <dsp:spPr>
+        <a:xfrm>
+          <a:off x="932" y="3707511"/>
+          <a:ext cx="1299765" cy="1709208"/>
+        </a:xfrm>
+        <a:prstGeom prst="roundRect">
+          <a:avLst>
+            <a:gd name="adj" fmla="val 10000"/>
+          </a:avLst>
+        </a:prstGeom>
+        <a:solidFill>
+          <a:schemeClr val="accent6">
+            <a:tint val="80000"/>
+            <a:hueOff val="0"/>
+            <a:satOff val="0"/>
+            <a:lumOff val="0"/>
+            <a:alphaOff val="0"/>
+          </a:schemeClr>
+        </a:solidFill>
+        <a:ln w="25400" cap="flat" cmpd="sng" algn="ctr">
+          <a:solidFill>
+            <a:schemeClr val="lt1">
+              <a:hueOff val="0"/>
+              <a:satOff val="0"/>
+              <a:lumOff val="0"/>
+              <a:alphaOff val="0"/>
+            </a:schemeClr>
+          </a:solidFill>
+          <a:prstDash val="solid"/>
+        </a:ln>
+        <a:effectLst/>
+      </dsp:spPr>
+      <dsp:style>
+        <a:lnRef idx="2">
+          <a:scrgbClr r="0" g="0" b="0"/>
+        </a:lnRef>
+        <a:fillRef idx="1">
+          <a:scrgbClr r="0" g="0" b="0"/>
+        </a:fillRef>
+        <a:effectRef idx="0">
+          <a:scrgbClr r="0" g="0" b="0"/>
+        </a:effectRef>
+        <a:fontRef idx="minor">
+          <a:schemeClr val="lt1"/>
+        </a:fontRef>
+      </dsp:style>
+      <dsp:txBody>
+        <a:bodyPr spcFirstLastPara="0" vert="horz" wrap="square" lIns="80010" tIns="80010" rIns="80010" bIns="80010" numCol="1" spcCol="1270" anchor="ctr" anchorCtr="0">
+          <a:noAutofit/>
+        </a:bodyPr>
+        <a:lstStyle/>
+        <a:p>
+          <a:pPr lvl="0" algn="ctr" defTabSz="933450">
+            <a:lnSpc>
+              <a:spcPct val="90000"/>
+            </a:lnSpc>
+            <a:spcBef>
+              <a:spcPct val="0"/>
+            </a:spcBef>
+            <a:spcAft>
+              <a:spcPct val="35000"/>
+            </a:spcAft>
+          </a:pPr>
+          <a:r>
+            <a:rPr lang="en-US" sz="2100" kern="1200" dirty="0" smtClean="0"/>
+            <a:t>MVC</a:t>
+          </a:r>
+          <a:endParaRPr lang="en-US" sz="2100" kern="1200" dirty="0"/>
+        </a:p>
+      </dsp:txBody>
+      <dsp:txXfrm>
+        <a:off x="39001" y="3745580"/>
+        <a:ext cx="1223627" cy="1633070"/>
+      </dsp:txXfrm>
+    </dsp:sp>
+    <dsp:sp modelId="{69B7C66C-E849-48DF-A047-65A363886A52}">
+      <dsp:nvSpPr>
+        <dsp:cNvPr id="0" name=""/>
+        <dsp:cNvSpPr/>
+      </dsp:nvSpPr>
+      <dsp:spPr>
+        <a:xfrm>
+          <a:off x="1355288" y="3707511"/>
+          <a:ext cx="1299765" cy="1709208"/>
+        </a:xfrm>
+        <a:prstGeom prst="roundRect">
+          <a:avLst>
+            <a:gd name="adj" fmla="val 10000"/>
+          </a:avLst>
+        </a:prstGeom>
+        <a:solidFill>
+          <a:schemeClr val="accent6">
+            <a:tint val="80000"/>
+            <a:hueOff val="0"/>
+            <a:satOff val="0"/>
+            <a:lumOff val="0"/>
+            <a:alphaOff val="0"/>
+          </a:schemeClr>
+        </a:solidFill>
+        <a:ln w="25400" cap="flat" cmpd="sng" algn="ctr">
+          <a:solidFill>
+            <a:schemeClr val="lt1">
+              <a:hueOff val="0"/>
+              <a:satOff val="0"/>
+              <a:lumOff val="0"/>
+              <a:alphaOff val="0"/>
+            </a:schemeClr>
+          </a:solidFill>
+          <a:prstDash val="solid"/>
+        </a:ln>
+        <a:effectLst/>
+      </dsp:spPr>
+      <dsp:style>
+        <a:lnRef idx="2">
+          <a:scrgbClr r="0" g="0" b="0"/>
+        </a:lnRef>
+        <a:fillRef idx="1">
+          <a:scrgbClr r="0" g="0" b="0"/>
+        </a:fillRef>
+        <a:effectRef idx="0">
+          <a:scrgbClr r="0" g="0" b="0"/>
+        </a:effectRef>
+        <a:fontRef idx="minor">
+          <a:schemeClr val="lt1"/>
+        </a:fontRef>
+      </dsp:style>
+      <dsp:txBody>
+        <a:bodyPr spcFirstLastPara="0" vert="horz" wrap="square" lIns="80010" tIns="80010" rIns="80010" bIns="80010" numCol="1" spcCol="1270" anchor="ctr" anchorCtr="0">
+          <a:noAutofit/>
+        </a:bodyPr>
+        <a:lstStyle/>
+        <a:p>
+          <a:pPr lvl="0" algn="ctr" defTabSz="933450">
+            <a:lnSpc>
+              <a:spcPct val="90000"/>
+            </a:lnSpc>
+            <a:spcBef>
+              <a:spcPct val="0"/>
+            </a:spcBef>
+            <a:spcAft>
+              <a:spcPct val="35000"/>
+            </a:spcAft>
+          </a:pPr>
+          <a:r>
+            <a:rPr lang="en-US" sz="2100" kern="1200" dirty="0" smtClean="0"/>
+            <a:t>Web Forms</a:t>
+          </a:r>
+          <a:endParaRPr lang="en-US" sz="2100" kern="1200" dirty="0"/>
+        </a:p>
+      </dsp:txBody>
+      <dsp:txXfrm>
+        <a:off x="1393357" y="3745580"/>
+        <a:ext cx="1223627" cy="1633070"/>
+      </dsp:txXfrm>
+    </dsp:sp>
+    <dsp:sp modelId="{FFC63C9E-F6F8-44C4-92C8-73982247B377}">
+      <dsp:nvSpPr>
+        <dsp:cNvPr id="0" name=""/>
+        <dsp:cNvSpPr/>
+      </dsp:nvSpPr>
+      <dsp:spPr>
+        <a:xfrm>
+          <a:off x="2709644" y="3707511"/>
+          <a:ext cx="1299765" cy="1709208"/>
+        </a:xfrm>
+        <a:prstGeom prst="roundRect">
+          <a:avLst>
+            <a:gd name="adj" fmla="val 10000"/>
+          </a:avLst>
+        </a:prstGeom>
+        <a:solidFill>
+          <a:schemeClr val="accent6">
+            <a:tint val="80000"/>
+            <a:hueOff val="0"/>
+            <a:satOff val="0"/>
+            <a:lumOff val="0"/>
+            <a:alphaOff val="0"/>
+          </a:schemeClr>
+        </a:solidFill>
+        <a:ln w="25400" cap="flat" cmpd="sng" algn="ctr">
+          <a:solidFill>
+            <a:schemeClr val="lt1">
+              <a:hueOff val="0"/>
+              <a:satOff val="0"/>
+              <a:lumOff val="0"/>
+              <a:alphaOff val="0"/>
+            </a:schemeClr>
+          </a:solidFill>
+          <a:prstDash val="solid"/>
+        </a:ln>
+        <a:effectLst/>
+      </dsp:spPr>
+      <dsp:style>
+        <a:lnRef idx="2">
+          <a:scrgbClr r="0" g="0" b="0"/>
+        </a:lnRef>
+        <a:fillRef idx="1">
+          <a:scrgbClr r="0" g="0" b="0"/>
+        </a:fillRef>
+        <a:effectRef idx="0">
+          <a:scrgbClr r="0" g="0" b="0"/>
+        </a:effectRef>
+        <a:fontRef idx="minor">
+          <a:schemeClr val="lt1"/>
+        </a:fontRef>
+      </dsp:style>
+      <dsp:txBody>
+        <a:bodyPr spcFirstLastPara="0" vert="horz" wrap="square" lIns="80010" tIns="80010" rIns="80010" bIns="80010" numCol="1" spcCol="1270" anchor="ctr" anchorCtr="0">
+          <a:noAutofit/>
+        </a:bodyPr>
+        <a:lstStyle/>
+        <a:p>
+          <a:pPr lvl="0" algn="ctr" defTabSz="933450">
+            <a:lnSpc>
+              <a:spcPct val="90000"/>
+            </a:lnSpc>
+            <a:spcBef>
+              <a:spcPct val="0"/>
+            </a:spcBef>
+            <a:spcAft>
+              <a:spcPct val="35000"/>
+            </a:spcAft>
+          </a:pPr>
+          <a:r>
+            <a:rPr lang="en-US" sz="2100" kern="1200" dirty="0" smtClean="0"/>
+            <a:t>Web Pages</a:t>
+          </a:r>
+          <a:endParaRPr lang="en-US" sz="2100" kern="1200" dirty="0"/>
+        </a:p>
+      </dsp:txBody>
+      <dsp:txXfrm>
+        <a:off x="2747713" y="3745580"/>
+        <a:ext cx="1223627" cy="1633070"/>
+      </dsp:txXfrm>
+    </dsp:sp>
+    <dsp:sp modelId="{EC7C695C-9D3F-451B-A676-7ABBE6313BA2}">
+      <dsp:nvSpPr>
+        <dsp:cNvPr id="0" name=""/>
+        <dsp:cNvSpPr/>
+      </dsp:nvSpPr>
+      <dsp:spPr>
+        <a:xfrm>
+          <a:off x="4063999" y="3707511"/>
+          <a:ext cx="1299765" cy="1709208"/>
+        </a:xfrm>
+        <a:prstGeom prst="roundRect">
+          <a:avLst>
+            <a:gd name="adj" fmla="val 10000"/>
+          </a:avLst>
+        </a:prstGeom>
+        <a:solidFill>
+          <a:schemeClr val="accent6">
+            <a:tint val="80000"/>
+            <a:hueOff val="0"/>
+            <a:satOff val="0"/>
+            <a:lumOff val="0"/>
+            <a:alphaOff val="0"/>
+          </a:schemeClr>
+        </a:solidFill>
+        <a:ln w="25400" cap="flat" cmpd="sng" algn="ctr">
+          <a:solidFill>
+            <a:schemeClr val="lt1">
+              <a:hueOff val="0"/>
+              <a:satOff val="0"/>
+              <a:lumOff val="0"/>
+              <a:alphaOff val="0"/>
+            </a:schemeClr>
+          </a:solidFill>
+          <a:prstDash val="solid"/>
+        </a:ln>
+        <a:effectLst/>
+      </dsp:spPr>
+      <dsp:style>
+        <a:lnRef idx="2">
+          <a:scrgbClr r="0" g="0" b="0"/>
+        </a:lnRef>
+        <a:fillRef idx="1">
+          <a:scrgbClr r="0" g="0" b="0"/>
+        </a:fillRef>
+        <a:effectRef idx="0">
+          <a:scrgbClr r="0" g="0" b="0"/>
+        </a:effectRef>
+        <a:fontRef idx="minor">
+          <a:schemeClr val="lt1"/>
+        </a:fontRef>
+      </dsp:style>
+      <dsp:txBody>
+        <a:bodyPr spcFirstLastPara="0" vert="horz" wrap="square" lIns="80010" tIns="80010" rIns="80010" bIns="80010" numCol="1" spcCol="1270" anchor="ctr" anchorCtr="0">
+          <a:noAutofit/>
+        </a:bodyPr>
+        <a:lstStyle/>
+        <a:p>
+          <a:pPr lvl="0" algn="ctr" defTabSz="933450">
+            <a:lnSpc>
+              <a:spcPct val="90000"/>
+            </a:lnSpc>
+            <a:spcBef>
+              <a:spcPct val="0"/>
+            </a:spcBef>
+            <a:spcAft>
+              <a:spcPct val="35000"/>
+            </a:spcAft>
+          </a:pPr>
+          <a:r>
+            <a:rPr lang="en-US" sz="2100" kern="1200" dirty="0" smtClean="0"/>
+            <a:t>SPA</a:t>
+          </a:r>
+          <a:endParaRPr lang="en-US" sz="2100" kern="1200" dirty="0"/>
+        </a:p>
+      </dsp:txBody>
+      <dsp:txXfrm>
+        <a:off x="4102068" y="3745580"/>
+        <a:ext cx="1223627" cy="1633070"/>
+      </dsp:txXfrm>
+    </dsp:sp>
+    <dsp:sp modelId="{9A62CB40-02D8-4239-AC45-89C877E37746}">
+      <dsp:nvSpPr>
+        <dsp:cNvPr id="0" name=""/>
+        <dsp:cNvSpPr/>
+      </dsp:nvSpPr>
+      <dsp:spPr>
+        <a:xfrm>
+          <a:off x="5472945" y="1854729"/>
+          <a:ext cx="2654121" cy="1709208"/>
+        </a:xfrm>
+        <a:prstGeom prst="roundRect">
+          <a:avLst>
+            <a:gd name="adj" fmla="val 10000"/>
+          </a:avLst>
+        </a:prstGeom>
+        <a:solidFill>
+          <a:schemeClr val="accent6">
+            <a:tint val="99000"/>
+            <a:hueOff val="0"/>
+            <a:satOff val="0"/>
+            <a:lumOff val="0"/>
+            <a:alphaOff val="0"/>
+          </a:schemeClr>
+        </a:solidFill>
+        <a:ln w="25400" cap="flat" cmpd="sng" algn="ctr">
+          <a:solidFill>
+            <a:schemeClr val="lt1">
+              <a:hueOff val="0"/>
+              <a:satOff val="0"/>
+              <a:lumOff val="0"/>
+              <a:alphaOff val="0"/>
+            </a:schemeClr>
+          </a:solidFill>
+          <a:prstDash val="solid"/>
+        </a:ln>
+        <a:effectLst/>
+      </dsp:spPr>
+      <dsp:style>
+        <a:lnRef idx="2">
+          <a:scrgbClr r="0" g="0" b="0"/>
+        </a:lnRef>
+        <a:fillRef idx="1">
+          <a:scrgbClr r="0" g="0" b="0"/>
+        </a:fillRef>
+        <a:effectRef idx="0">
+          <a:scrgbClr r="0" g="0" b="0"/>
+        </a:effectRef>
+        <a:fontRef idx="minor">
+          <a:schemeClr val="lt1"/>
+        </a:fontRef>
+      </dsp:style>
+      <dsp:txBody>
+        <a:bodyPr spcFirstLastPara="0" vert="horz" wrap="square" lIns="167640" tIns="167640" rIns="167640" bIns="167640" numCol="1" spcCol="1270" anchor="ctr" anchorCtr="0">
+          <a:noAutofit/>
+        </a:bodyPr>
+        <a:lstStyle/>
+        <a:p>
+          <a:pPr lvl="0" algn="ctr" defTabSz="1955800">
+            <a:lnSpc>
+              <a:spcPct val="90000"/>
+            </a:lnSpc>
+            <a:spcBef>
+              <a:spcPct val="0"/>
+            </a:spcBef>
+            <a:spcAft>
+              <a:spcPct val="35000"/>
+            </a:spcAft>
+          </a:pPr>
+          <a:r>
+            <a:rPr lang="en-US" sz="4400" kern="1200" dirty="0" smtClean="0"/>
+            <a:t>Services</a:t>
+          </a:r>
+          <a:endParaRPr lang="en-US" sz="4400" kern="1200" dirty="0"/>
+        </a:p>
+      </dsp:txBody>
+      <dsp:txXfrm>
+        <a:off x="5523006" y="1904790"/>
+        <a:ext cx="2553999" cy="1609086"/>
+      </dsp:txXfrm>
+    </dsp:sp>
+    <dsp:sp modelId="{54DC7823-DFA6-486C-8C7E-1B917D501187}">
+      <dsp:nvSpPr>
+        <dsp:cNvPr id="0" name=""/>
+        <dsp:cNvSpPr/>
+      </dsp:nvSpPr>
+      <dsp:spPr>
+        <a:xfrm>
+          <a:off x="5472945" y="3707511"/>
+          <a:ext cx="1299765" cy="1709208"/>
+        </a:xfrm>
+        <a:prstGeom prst="roundRect">
+          <a:avLst>
+            <a:gd name="adj" fmla="val 10000"/>
+          </a:avLst>
+        </a:prstGeom>
+        <a:solidFill>
+          <a:schemeClr val="accent6">
+            <a:tint val="80000"/>
+            <a:hueOff val="0"/>
+            <a:satOff val="0"/>
+            <a:lumOff val="0"/>
+            <a:alphaOff val="0"/>
+          </a:schemeClr>
+        </a:solidFill>
+        <a:ln w="25400" cap="flat" cmpd="sng" algn="ctr">
+          <a:solidFill>
+            <a:schemeClr val="lt1">
+              <a:hueOff val="0"/>
+              <a:satOff val="0"/>
+              <a:lumOff val="0"/>
+              <a:alphaOff val="0"/>
+            </a:schemeClr>
+          </a:solidFill>
+          <a:prstDash val="solid"/>
+        </a:ln>
+        <a:effectLst/>
+      </dsp:spPr>
+      <dsp:style>
+        <a:lnRef idx="2">
+          <a:scrgbClr r="0" g="0" b="0"/>
+        </a:lnRef>
+        <a:fillRef idx="1">
+          <a:scrgbClr r="0" g="0" b="0"/>
+        </a:fillRef>
+        <a:effectRef idx="0">
+          <a:scrgbClr r="0" g="0" b="0"/>
+        </a:effectRef>
+        <a:fontRef idx="minor">
+          <a:schemeClr val="lt1"/>
+        </a:fontRef>
+      </dsp:style>
+      <dsp:txBody>
+        <a:bodyPr spcFirstLastPara="0" vert="horz" wrap="square" lIns="80010" tIns="80010" rIns="80010" bIns="80010" numCol="1" spcCol="1270" anchor="ctr" anchorCtr="0">
+          <a:noAutofit/>
+        </a:bodyPr>
+        <a:lstStyle/>
+        <a:p>
+          <a:pPr lvl="0" algn="ctr" defTabSz="933450">
+            <a:lnSpc>
+              <a:spcPct val="90000"/>
+            </a:lnSpc>
+            <a:spcBef>
+              <a:spcPct val="0"/>
+            </a:spcBef>
+            <a:spcAft>
+              <a:spcPct val="35000"/>
+            </a:spcAft>
+          </a:pPr>
+          <a:r>
+            <a:rPr lang="en-US" sz="2100" kern="1200" dirty="0" smtClean="0"/>
+            <a:t>Web API</a:t>
+          </a:r>
+          <a:endParaRPr lang="en-US" sz="2100" kern="1200" dirty="0"/>
+        </a:p>
+      </dsp:txBody>
+      <dsp:txXfrm>
+        <a:off x="5511014" y="3745580"/>
+        <a:ext cx="1223627" cy="1633070"/>
+      </dsp:txXfrm>
+    </dsp:sp>
+    <dsp:sp modelId="{7FC12CFE-55CB-4438-B919-72E9FE6FFAAC}">
+      <dsp:nvSpPr>
+        <dsp:cNvPr id="0" name=""/>
+        <dsp:cNvSpPr/>
+      </dsp:nvSpPr>
+      <dsp:spPr>
+        <a:xfrm>
+          <a:off x="6827301" y="3707511"/>
+          <a:ext cx="1299765" cy="1709208"/>
+        </a:xfrm>
+        <a:prstGeom prst="roundRect">
+          <a:avLst>
+            <a:gd name="adj" fmla="val 10000"/>
+          </a:avLst>
+        </a:prstGeom>
+        <a:solidFill>
+          <a:schemeClr val="accent6">
+            <a:tint val="80000"/>
+            <a:hueOff val="0"/>
+            <a:satOff val="0"/>
+            <a:lumOff val="0"/>
+            <a:alphaOff val="0"/>
+          </a:schemeClr>
+        </a:solidFill>
+        <a:ln w="25400" cap="flat" cmpd="sng" algn="ctr">
+          <a:solidFill>
+            <a:schemeClr val="lt1">
+              <a:hueOff val="0"/>
+              <a:satOff val="0"/>
+              <a:lumOff val="0"/>
+              <a:alphaOff val="0"/>
+            </a:schemeClr>
+          </a:solidFill>
+          <a:prstDash val="solid"/>
+        </a:ln>
+        <a:effectLst/>
+      </dsp:spPr>
+      <dsp:style>
+        <a:lnRef idx="2">
+          <a:scrgbClr r="0" g="0" b="0"/>
+        </a:lnRef>
+        <a:fillRef idx="1">
+          <a:scrgbClr r="0" g="0" b="0"/>
+        </a:fillRef>
+        <a:effectRef idx="0">
+          <a:scrgbClr r="0" g="0" b="0"/>
+        </a:effectRef>
+        <a:fontRef idx="minor">
+          <a:schemeClr val="lt1"/>
+        </a:fontRef>
+      </dsp:style>
+      <dsp:txBody>
+        <a:bodyPr spcFirstLastPara="0" vert="horz" wrap="square" lIns="80010" tIns="80010" rIns="80010" bIns="80010" numCol="1" spcCol="1270" anchor="ctr" anchorCtr="0">
+          <a:noAutofit/>
+        </a:bodyPr>
+        <a:lstStyle/>
+        <a:p>
+          <a:pPr lvl="0" algn="ctr" defTabSz="933450">
+            <a:lnSpc>
+              <a:spcPct val="90000"/>
+            </a:lnSpc>
+            <a:spcBef>
+              <a:spcPct val="0"/>
+            </a:spcBef>
+            <a:spcAft>
+              <a:spcPct val="35000"/>
+            </a:spcAft>
+          </a:pPr>
+          <a:r>
+            <a:rPr lang="en-US" sz="2100" kern="1200" dirty="0" err="1" smtClean="0"/>
+            <a:t>SignalIR</a:t>
+          </a:r>
+          <a:endParaRPr lang="en-US" sz="2100" kern="1200" dirty="0"/>
+        </a:p>
+      </dsp:txBody>
+      <dsp:txXfrm>
+        <a:off x="6865370" y="3745580"/>
+        <a:ext cx="1223627" cy="1633070"/>
+      </dsp:txXfrm>
+    </dsp:sp>
+  </dsp:spTree>
+</dsp:drawing>
+</file>
+
+<file path=ppt/diagrams/layout1.xml><?xml version="1.0" encoding="utf-8"?>
+<dgm:layoutDef xmlns:dgm="http://schemas.openxmlformats.org/drawingml/2006/diagram" xmlns:a="http://schemas.openxmlformats.org/drawingml/2006/main" uniqueId="urn:microsoft.com/office/officeart/2005/8/layout/hierarchy4">
+  <dgm:title val=""/>
+  <dgm:desc val=""/>
+  <dgm:catLst>
+    <dgm:cat type="hierarchy" pri="4000"/>
+    <dgm:cat type="list" pri="24000"/>
+    <dgm:cat type="relationship" pri="10000"/>
+  </dgm:catLst>
+  <dgm:sampData>
+    <dgm:dataModel>
+      <dgm:ptLst>
+        <dgm:pt modelId="0" type="doc"/>
+        <dgm:pt modelId="1">
+          <dgm:prSet phldr="1"/>
+        </dgm:pt>
+        <dgm:pt modelId="2">
+          <dgm:prSet phldr="1"/>
+        </dgm:pt>
+        <dgm:pt modelId="21">
+          <dgm:prSet phldr="1"/>
+        </dgm:pt>
+        <dgm:pt modelId="22">
+          <dgm:prSet phldr="1"/>
+        </dgm:pt>
+        <dgm:pt modelId="3">
+          <dgm:prSet phldr="1"/>
+        </dgm:pt>
+        <dgm:pt modelId="31">
+          <dgm:prSet phldr="1"/>
+        </dgm:pt>
+      </dgm:ptLst>
+      <dgm:cxnLst>
+        <dgm:cxn modelId="4" srcId="0" destId="1" srcOrd="0" destOrd="0"/>
+        <dgm:cxn modelId="5" srcId="1" destId="2" srcOrd="0" destOrd="0"/>
+        <dgm:cxn modelId="6" srcId="1" destId="3" srcOrd="1" destOrd="0"/>
+        <dgm:cxn modelId="23" srcId="2" destId="21" srcOrd="0" destOrd="0"/>
+        <dgm:cxn modelId="24" srcId="2" destId="22" srcOrd="1" destOrd="0"/>
+        <dgm:cxn modelId="33" srcId="3" destId="31" srcOrd="0" destOrd="0"/>
+      </dgm:cxnLst>
+      <dgm:bg/>
+      <dgm:whole/>
+    </dgm:dataModel>
+  </dgm:sampData>
+  <dgm:styleData>
+    <dgm:dataModel>
+      <dgm:ptLst>
+        <dgm:pt modelId="0" type="doc"/>
+        <dgm:pt modelId="1"/>
+        <dgm:pt modelId="11"/>
+        <dgm:pt modelId="12"/>
+      </dgm:ptLst>
+      <dgm:cxnLst>
+        <dgm:cxn modelId="2" srcId="0" destId="1" srcOrd="0" destOrd="0"/>
+        <dgm:cxn modelId="13" srcId="1" destId="11" srcOrd="0" destOrd="0"/>
+        <dgm:cxn modelId="14" srcId="1" destId="12" srcOrd="1" destOrd="0"/>
+      </dgm:cxnLst>
+      <dgm:bg/>
+      <dgm:whole/>
+    </dgm:dataModel>
+  </dgm:styleData>
+  <dgm:clrData>
+    <dgm:dataModel>
+      <dgm:ptLst>
+        <dgm:pt modelId="0" type="doc"/>
+        <dgm:pt modelId="1"/>
+        <dgm:pt modelId="2"/>
+        <dgm:pt modelId="21"/>
+        <dgm:pt modelId="211"/>
+        <dgm:pt modelId="3"/>
+        <dgm:pt modelId="31"/>
+        <dgm:pt modelId="311"/>
+      </dgm:ptLst>
+      <dgm:cxnLst>
+        <dgm:cxn modelId="4" srcId="0" destId="1" srcOrd="0" destOrd="0"/>
+        <dgm:cxn modelId="5" srcId="1" destId="2" srcOrd="0" destOrd="0"/>
+        <dgm:cxn modelId="6" srcId="1" destId="3" srcOrd="1" destOrd="0"/>
+        <dgm:cxn modelId="23" srcId="2" destId="21" srcOrd="0" destOrd="0"/>
+        <dgm:cxn modelId="24" srcId="21" destId="211" srcOrd="0" destOrd="0"/>
+        <dgm:cxn modelId="33" srcId="3" destId="31" srcOrd="0" destOrd="0"/>
+        <dgm:cxn modelId="34" srcId="31" destId="311" srcOrd="0" destOrd="0"/>
+      </dgm:cxnLst>
+      <dgm:bg/>
+      <dgm:whole/>
+    </dgm:dataModel>
+  </dgm:clrData>
+  <dgm:layoutNode name="Name0">
+    <dgm:varLst>
+      <dgm:chPref val="1"/>
+      <dgm:dir/>
+      <dgm:animOne val="branch"/>
+      <dgm:animLvl val="lvl"/>
+      <dgm:resizeHandles/>
+    </dgm:varLst>
+    <dgm:choose name="Name1">
+      <dgm:if name="Name2" func="var" arg="dir" op="equ" val="norm">
+        <dgm:alg type="lin">
+          <dgm:param type="linDir" val="fromL"/>
+          <dgm:param type="nodeVertAlign" val="t"/>
+        </dgm:alg>
+      </dgm:if>
+      <dgm:else name="Name3">
+        <dgm:alg type="lin">
+          <dgm:param type="linDir" val="fromR"/>
+          <dgm:param type="nodeVertAlign" val="t"/>
+        </dgm:alg>
+      </dgm:else>
+    </dgm:choose>
+    <dgm:shape xmlns:r="http://schemas.openxmlformats.org/officeDocument/2006/relationships" r:blip="">
+      <dgm:adjLst/>
+    </dgm:shape>
+    <dgm:presOf/>
+    <dgm:constrLst>
+      <dgm:constr type="w" for="ch" forName="vertOne" refType="w"/>
+      <dgm:constr type="w" for="des" forName="horzOne" refType="w"/>
+      <dgm:constr type="w" for="des" forName="txOne" refType="w"/>
+      <dgm:constr type="w" for="des" forName="vertTwo" refType="w"/>
+      <dgm:constr type="w" for="des" forName="horzTwo" refType="w"/>
+      <dgm:constr type="w" for="des" forName="txTwo" refType="w"/>
+      <dgm:constr type="w" for="des" forName="vertThree" refType="w"/>
+      <dgm:constr type="w" for="des" forName="horzThree" refType="w"/>
+      <dgm:constr type="w" for="des" forName="txThree" refType="w"/>
+      <dgm:constr type="w" for="des" forName="vertFour" refType="w"/>
+      <dgm:constr type="w" for="des" forName="horzFour" refType="w"/>
+      <dgm:constr type="w" for="des" forName="txFour" refType="w"/>
+      <dgm:constr type="h" for="des" ptType="node" op="equ"/>
+      <dgm:constr type="h" for="des" forName="txOne" refType="h"/>
+      <dgm:constr type="userH" for="des" ptType="node" refType="h" refFor="des" refForName="txOne"/>
+      <dgm:constr type="primFontSz" for="des" forName="txOne" val="65"/>
+      <dgm:constr type="primFontSz" for="des" forName="txTwo" val="65"/>
+      <dgm:constr type="primFontSz" for="des" forName="txTwo" refType="primFontSz" refFor="des" refForName="txOne" op="lte"/>
+      <dgm:constr type="primFontSz" for="des" forName="txThree" val="65"/>
+      <dgm:constr type="primFontSz" for="des" forName="txThree" refType="primFontSz" refFor="des" refForName="txOne" op="lte"/>
+      <dgm:constr type="primFontSz" for="des" forName="txThree" refType="primFontSz" refFor="des" refForName="txTwo" op="lte"/>
+      <dgm:constr type="primFontSz" for="des" forName="txFour" val="65"/>
+      <dgm:constr type="primFontSz" for="des" forName="txFour" refType="primFontSz" refFor="des" refForName="txOne" op="lte"/>
+      <dgm:constr type="primFontSz" for="des" forName="txFour" refType="primFontSz" refFor="des" refForName="txTwo" op="lte"/>
+      <dgm:constr type="primFontSz" for="des" forName="txFour" refType="primFontSz" refFor="des" refForName="txThree" op="lte"/>
+      <dgm:constr type="w" for="des" forName="sibSpaceOne" refType="w" fact="0.168"/>
+      <dgm:constr type="w" for="des" forName="sibSpaceTwo" refType="w" refFor="des" refForName="sibSpaceOne" op="equ" fact="0.5"/>
+      <dgm:constr type="w" for="des" forName="sibSpaceThree" refType="w" refFor="des" refForName="sibSpaceTwo" op="equ" fact="0.5"/>
+      <dgm:constr type="w" for="des" forName="sibSpaceFour" refType="w" refFor="des" refForName="sibSpaceThree" op="equ" fact="0.5"/>
+      <dgm:constr type="h" for="des" forName="parTransOne" refType="w" fact="0.056"/>
+      <dgm:constr type="h" for="des" forName="parTransTwo" refType="h" refFor="des" refForName="parTransOne" op="equ"/>
+      <dgm:constr type="h" for="des" forName="parTransThree" refType="h" refFor="des" refForName="parTransTwo" op="equ"/>
+      <dgm:constr type="h" for="des" forName="parTransFour" refType="h" refFor="des" refForName="parTransThree" op="equ"/>
+    </dgm:constrLst>
+    <dgm:ruleLst/>
+    <dgm:forEach name="Name4" axis="ch" ptType="node">
+      <dgm:layoutNode name="vertOne">
+        <dgm:alg type="lin">
+          <dgm:param type="linDir" val="fromT"/>
+        </dgm:alg>
+        <dgm:shape xmlns:r="http://schemas.openxmlformats.org/officeDocument/2006/relationships" r:blip="">
+          <dgm:adjLst/>
+        </dgm:shape>
+        <dgm:presOf/>
+        <dgm:constrLst>
+          <dgm:constr type="w" for="ch" forName="txOne" refType="w" refFor="ch" refForName="horzOne" op="gte"/>
+        </dgm:constrLst>
+        <dgm:ruleLst/>
+        <dgm:layoutNode name="txOne" styleLbl="node0">
+          <dgm:varLst>
+            <dgm:chPref val="3"/>
+          </dgm:varLst>
+          <dgm:alg type="tx"/>
+          <dgm:shape xmlns:r="http://schemas.openxmlformats.org/officeDocument/2006/relationships" type="roundRect" r:blip="">
+            <dgm:adjLst>
+              <dgm:adj idx="1" val="0.1"/>
+            </dgm:adjLst>
+          </dgm:shape>
+          <dgm:presOf axis="self"/>
+          <dgm:constrLst>
+            <dgm:constr type="tMarg" refType="primFontSz" fact="0.3"/>
+            <dgm:constr type="bMarg" refType="primFontSz" fact="0.3"/>
+            <dgm:constr type="lMarg" refType="primFontSz" fact="0.3"/>
+            <dgm:constr type="rMarg" refType="primFontSz" fact="0.3"/>
+          </dgm:constrLst>
+          <dgm:ruleLst>
+            <dgm:rule type="primFontSz" val="5" fact="NaN" max="NaN"/>
+          </dgm:ruleLst>
+        </dgm:layoutNode>
+        <dgm:choose name="Name5">
+          <dgm:if name="Name6" axis="des" ptType="node" func="cnt" op="gt" val="0">
+            <dgm:layoutNode name="parTransOne">
+              <dgm:alg type="sp"/>
+              <dgm:shape xmlns:r="http://schemas.openxmlformats.org/officeDocument/2006/relationships" r:blip="">
+                <dgm:adjLst/>
+              </dgm:shape>
+              <dgm:presOf/>
+              <dgm:constrLst/>
+              <dgm:ruleLst/>
+            </dgm:layoutNode>
+          </dgm:if>
+          <dgm:else name="Name7"/>
+        </dgm:choose>
+        <dgm:layoutNode name="horzOne">
+          <dgm:choose name="Name8">
+            <dgm:if name="Name9" func="var" arg="dir" op="equ" val="norm">
+              <dgm:alg type="lin">
+                <dgm:param type="linDir" val="fromL"/>
+                <dgm:param type="nodeVertAlign" val="t"/>
+              </dgm:alg>
+            </dgm:if>
+            <dgm:else name="Name10">
+              <dgm:alg type="lin">
+                <dgm:param type="linDir" val="fromR"/>
+                <dgm:param type="nodeVertAlign" val="t"/>
+              </dgm:alg>
+            </dgm:else>
+          </dgm:choose>
+          <dgm:shape xmlns:r="http://schemas.openxmlformats.org/officeDocument/2006/relationships" r:blip="">
+            <dgm:adjLst/>
+          </dgm:shape>
+          <dgm:presOf/>
+          <dgm:constrLst/>
+          <dgm:ruleLst>
+            <dgm:rule type="w" val="INF" fact="NaN" max="NaN"/>
+          </dgm:ruleLst>
+          <dgm:forEach name="Name11" axis="ch" ptType="node">
+            <dgm:layoutNode name="vertTwo">
+              <dgm:alg type="lin">
+                <dgm:param type="linDir" val="fromT"/>
+              </dgm:alg>
+              <dgm:shape xmlns:r="http://schemas.openxmlformats.org/officeDocument/2006/relationships" r:blip="">
+                <dgm:adjLst/>
+              </dgm:shape>
+              <dgm:presOf/>
+              <dgm:constrLst>
+                <dgm:constr type="w" for="ch" forName="txTwo" refType="w" refFor="ch" refForName="horzTwo" op="gte"/>
+              </dgm:constrLst>
+              <dgm:ruleLst/>
+              <dgm:layoutNode name="txTwo">
+                <dgm:varLst>
+                  <dgm:chPref val="3"/>
+                </dgm:varLst>
+                <dgm:alg type="tx"/>
+                <dgm:shape xmlns:r="http://schemas.openxmlformats.org/officeDocument/2006/relationships" type="roundRect" r:blip="">
+                  <dgm:adjLst>
+                    <dgm:adj idx="1" val="0.1"/>
+                  </dgm:adjLst>
+                </dgm:shape>
+                <dgm:presOf axis="self"/>
+                <dgm:constrLst>
+                  <dgm:constr type="userH"/>
+                  <dgm:constr type="h" refType="userH"/>
+                  <dgm:constr type="tMarg" refType="primFontSz" fact="0.3"/>
+                  <dgm:constr type="bMarg" refType="primFontSz" fact="0.3"/>
+                  <dgm:constr type="lMarg" refType="primFontSz" fact="0.3"/>
+                  <dgm:constr type="rMarg" refType="primFontSz" fact="0.3"/>
+                </dgm:constrLst>
+                <dgm:ruleLst>
+                  <dgm:rule type="primFontSz" val="5" fact="NaN" max="NaN"/>
+                </dgm:ruleLst>
+              </dgm:layoutNode>
+              <dgm:choose name="Name12">
+                <dgm:if name="Name13" axis="des" ptType="node" func="cnt" op="gt" val="0">
+                  <dgm:layoutNode name="parTransTwo">
+                    <dgm:alg type="sp"/>
+                    <dgm:shape xmlns:r="http://schemas.openxmlformats.org/officeDocument/2006/relationships" r:blip="">
+                      <dgm:adjLst/>
+                    </dgm:shape>
+                    <dgm:presOf/>
+                    <dgm:constrLst/>
+                    <dgm:ruleLst/>
+                  </dgm:layoutNode>
+                </dgm:if>
+                <dgm:else name="Name14"/>
+              </dgm:choose>
+              <dgm:layoutNode name="horzTwo">
+                <dgm:choose name="Name15">
+                  <dgm:if name="Name16" func="var" arg="dir" op="equ" val="norm">
+                    <dgm:alg type="lin">
+                      <dgm:param type="linDir" val="fromL"/>
+                      <dgm:param type="nodeVertAlign" val="t"/>
+                    </dgm:alg>
+                  </dgm:if>
+                  <dgm:else name="Name17">
+                    <dgm:alg type="lin">
+                      <dgm:param type="linDir" val="fromR"/>
+                      <dgm:param type="nodeVertAlign" val="t"/>
+                    </dgm:alg>
+                  </dgm:else>
+                </dgm:choose>
+                <dgm:shape xmlns:r="http://schemas.openxmlformats.org/officeDocument/2006/relationships" r:blip="">
+                  <dgm:adjLst/>
+                </dgm:shape>
+                <dgm:presOf/>
+                <dgm:constrLst/>
+                <dgm:ruleLst>
+                  <dgm:rule type="w" val="INF" fact="NaN" max="NaN"/>
+                </dgm:ruleLst>
+                <dgm:forEach name="Name18" axis="ch" ptType="node">
+                  <dgm:layoutNode name="vertThree">
+                    <dgm:alg type="lin">
+                      <dgm:param type="linDir" val="fromT"/>
+                    </dgm:alg>
+                    <dgm:shape xmlns:r="http://schemas.openxmlformats.org/officeDocument/2006/relationships" r:blip="">
+                      <dgm:adjLst/>
+                    </dgm:shape>
+                    <dgm:presOf/>
+                    <dgm:constrLst>
+                      <dgm:constr type="w" for="ch" forName="txThree" refType="w" refFor="ch" refForName="horzThree" op="gte"/>
+                    </dgm:constrLst>
+                    <dgm:ruleLst/>
+                    <dgm:layoutNode name="txThree">
+                      <dgm:varLst>
+                        <dgm:chPref val="3"/>
+                      </dgm:varLst>
+                      <dgm:alg type="tx"/>
+                      <dgm:shape xmlns:r="http://schemas.openxmlformats.org/officeDocument/2006/relationships" type="roundRect" r:blip="">
+                        <dgm:adjLst>
+                          <dgm:adj idx="1" val="0.1"/>
+                        </dgm:adjLst>
+                      </dgm:shape>
+                      <dgm:presOf axis="self"/>
+                      <dgm:constrLst>
+                        <dgm:constr type="userH"/>
+                        <dgm:constr type="h" refType="userH"/>
+                        <dgm:constr type="tMarg" refType="primFontSz" fact="0.3"/>
+                        <dgm:constr type="bMarg" refType="primFontSz" fact="0.3"/>
+                        <dgm:constr type="lMarg" refType="primFontSz" fact="0.3"/>
+                        <dgm:constr type="rMarg" refType="primFontSz" fact="0.3"/>
+                      </dgm:constrLst>
+                      <dgm:ruleLst>
+                        <dgm:rule type="primFontSz" val="5" fact="NaN" max="NaN"/>
+                      </dgm:ruleLst>
+                    </dgm:layoutNode>
+                    <dgm:choose name="Name19">
+                      <dgm:if name="Name20" axis="des" ptType="node" func="cnt" op="gt" val="0">
+                        <dgm:layoutNode name="parTransThree">
+                          <dgm:alg type="sp"/>
+                          <dgm:shape xmlns:r="http://schemas.openxmlformats.org/officeDocument/2006/relationships" r:blip="">
+                            <dgm:adjLst/>
+                          </dgm:shape>
+                          <dgm:presOf/>
+                          <dgm:constrLst/>
+                          <dgm:ruleLst/>
+                        </dgm:layoutNode>
+                      </dgm:if>
+                      <dgm:else name="Name21"/>
+                    </dgm:choose>
+                    <dgm:layoutNode name="horzThree">
+                      <dgm:choose name="Name22">
+                        <dgm:if name="Name23" func="var" arg="dir" op="equ" val="norm">
+                          <dgm:alg type="lin">
+                            <dgm:param type="linDir" val="fromL"/>
+                            <dgm:param type="nodeVertAlign" val="t"/>
+                          </dgm:alg>
+                        </dgm:if>
+                        <dgm:else name="Name24">
+                          <dgm:alg type="lin">
+                            <dgm:param type="linDir" val="fromR"/>
+                            <dgm:param type="nodeVertAlign" val="t"/>
+                          </dgm:alg>
+                        </dgm:else>
+                      </dgm:choose>
+                      <dgm:shape xmlns:r="http://schemas.openxmlformats.org/officeDocument/2006/relationships" r:blip="">
+                        <dgm:adjLst/>
+                      </dgm:shape>
+                      <dgm:presOf/>
+                      <dgm:constrLst/>
+                      <dgm:ruleLst>
+                        <dgm:rule type="w" val="INF" fact="NaN" max="NaN"/>
+                      </dgm:ruleLst>
+                      <dgm:forEach name="repeat" axis="ch" ptType="node">
+                        <dgm:layoutNode name="vertFour">
+                          <dgm:varLst>
+                            <dgm:chPref val="3"/>
+                          </dgm:varLst>
+                          <dgm:alg type="lin">
+                            <dgm:param type="linDir" val="fromT"/>
+                          </dgm:alg>
+                          <dgm:shape xmlns:r="http://schemas.openxmlformats.org/officeDocument/2006/relationships" r:blip="">
+                            <dgm:adjLst/>
+                          </dgm:shape>
+                          <dgm:presOf/>
+                          <dgm:constrLst>
+                            <dgm:constr type="w" for="ch" forName="txFour" refType="w" refFor="ch" refForName="horzFour" op="gte"/>
+                          </dgm:constrLst>
+                          <dgm:ruleLst/>
+                          <dgm:layoutNode name="txFour">
+                            <dgm:varLst>
+                              <dgm:chPref val="3"/>
+                            </dgm:varLst>
+                            <dgm:alg type="tx"/>
+                            <dgm:shape xmlns:r="http://schemas.openxmlformats.org/officeDocument/2006/relationships" type="roundRect" r:blip="">
+                              <dgm:adjLst>
+                                <dgm:adj idx="1" val="0.1"/>
+                              </dgm:adjLst>
+                            </dgm:shape>
+                            <dgm:presOf axis="self"/>
+                            <dgm:constrLst>
+                              <dgm:constr type="userH"/>
+                              <dgm:constr type="h" refType="userH"/>
+                              <dgm:constr type="tMarg" refType="primFontSz" fact="0.3"/>
+                              <dgm:constr type="bMarg" refType="primFontSz" fact="0.3"/>
+                              <dgm:constr type="lMarg" refType="primFontSz" fact="0.3"/>
+                              <dgm:constr type="rMarg" refType="primFontSz" fact="0.3"/>
+                            </dgm:constrLst>
+                            <dgm:ruleLst>
+                              <dgm:rule type="primFontSz" val="5" fact="NaN" max="NaN"/>
+                            </dgm:ruleLst>
+                          </dgm:layoutNode>
+                          <dgm:choose name="Name25">
+                            <dgm:if name="Name26" axis="des" ptType="node" func="cnt" op="gt" val="0">
+                              <dgm:layoutNode name="parTransFour">
+                                <dgm:alg type="sp"/>
+                                <dgm:shape xmlns:r="http://schemas.openxmlformats.org/officeDocument/2006/relationships" r:blip="">
+                                  <dgm:adjLst/>
+                                </dgm:shape>
+                                <dgm:presOf/>
+                                <dgm:constrLst/>
+                                <dgm:ruleLst/>
+                              </dgm:layoutNode>
+                            </dgm:if>
+                            <dgm:else name="Name27"/>
+                          </dgm:choose>
+                          <dgm:layoutNode name="horzFour">
+                            <dgm:choose name="Name28">
+                              <dgm:if name="Name29" func="var" arg="dir" op="equ" val="norm">
+                                <dgm:alg type="lin">
+                                  <dgm:param type="linDir" val="fromL"/>
+                                  <dgm:param type="nodeVertAlign" val="t"/>
+                                </dgm:alg>
+                              </dgm:if>
+                              <dgm:else name="Name30">
+                                <dgm:alg type="lin">
+                                  <dgm:param type="linDir" val="fromR"/>
+                                  <dgm:param type="nodeVertAlign" val="t"/>
+                                </dgm:alg>
+                              </dgm:else>
+                            </dgm:choose>
+                            <dgm:shape xmlns:r="http://schemas.openxmlformats.org/officeDocument/2006/relationships" r:blip="">
+                              <dgm:adjLst/>
+                            </dgm:shape>
+                            <dgm:presOf/>
+                            <dgm:constrLst/>
+                            <dgm:ruleLst>
+                              <dgm:rule type="w" val="INF" fact="NaN" max="NaN"/>
+                            </dgm:ruleLst>
+                            <dgm:forEach name="Name31" ref="repeat"/>
+                          </dgm:layoutNode>
+                        </dgm:layoutNode>
+                        <dgm:choose name="Name32">
+                          <dgm:if name="Name33" axis="self" ptType="node" func="revPos" op="gte" val="2">
+                            <dgm:forEach name="Name34" axis="followSib" ptType="sibTrans" cnt="1">
+                              <dgm:layoutNode name="sibSpaceFour">
+                                <dgm:alg type="sp"/>
+                                <dgm:shape xmlns:r="http://schemas.openxmlformats.org/officeDocument/2006/relationships" r:blip="">
+                                  <dgm:adjLst/>
+                                </dgm:shape>
+                                <dgm:presOf/>
+                                <dgm:constrLst/>
+                                <dgm:ruleLst/>
+                              </dgm:layoutNode>
+                            </dgm:forEach>
+                          </dgm:if>
+                          <dgm:else name="Name35"/>
+                        </dgm:choose>
+                      </dgm:forEach>
+                    </dgm:layoutNode>
+                  </dgm:layoutNode>
+                  <dgm:choose name="Name36">
+                    <dgm:if name="Name37" axis="self" ptType="node" func="revPos" op="gte" val="2">
+                      <dgm:forEach name="Name38" axis="followSib" ptType="sibTrans" cnt="1">
+                        <dgm:layoutNode name="sibSpaceThree">
+                          <dgm:alg type="sp"/>
+                          <dgm:shape xmlns:r="http://schemas.openxmlformats.org/officeDocument/2006/relationships" r:blip="">
+                            <dgm:adjLst/>
+                          </dgm:shape>
+                          <dgm:presOf/>
+                          <dgm:constrLst/>
+                          <dgm:ruleLst/>
+                        </dgm:layoutNode>
+                      </dgm:forEach>
+                    </dgm:if>
+                    <dgm:else name="Name39"/>
+                  </dgm:choose>
+                </dgm:forEach>
+              </dgm:layoutNode>
+            </dgm:layoutNode>
+            <dgm:choose name="Name40">
+              <dgm:if name="Name41" axis="self" ptType="node" func="revPos" op="gte" val="2">
+                <dgm:forEach name="Name42" axis="followSib" ptType="sibTrans" cnt="1">
+                  <dgm:layoutNode name="sibSpaceTwo">
+                    <dgm:alg type="sp"/>
+                    <dgm:shape xmlns:r="http://schemas.openxmlformats.org/officeDocument/2006/relationships" r:blip="">
+                      <dgm:adjLst/>
+                    </dgm:shape>
+                    <dgm:presOf/>
+                    <dgm:constrLst/>
+                    <dgm:ruleLst/>
+                  </dgm:layoutNode>
+                </dgm:forEach>
+              </dgm:if>
+              <dgm:else name="Name43"/>
+            </dgm:choose>
+          </dgm:forEach>
+        </dgm:layoutNode>
+      </dgm:layoutNode>
+      <dgm:choose name="Name44">
+        <dgm:if name="Name45" axis="self" ptType="node" func="revPos" op="gte" val="2">
+          <dgm:forEach name="Name46" axis="followSib" ptType="sibTrans" cnt="1">
+            <dgm:layoutNode name="sibSpaceOne">
+              <dgm:alg type="sp"/>
+              <dgm:shape xmlns:r="http://schemas.openxmlformats.org/officeDocument/2006/relationships" r:blip="">
+                <dgm:adjLst/>
+              </dgm:shape>
+              <dgm:presOf/>
+              <dgm:constrLst/>
+              <dgm:ruleLst/>
+            </dgm:layoutNode>
+          </dgm:forEach>
+        </dgm:if>
+        <dgm:else name="Name47"/>
+      </dgm:choose>
+    </dgm:forEach>
+  </dgm:layoutNode>
+</dgm:layoutDef>
+</file>
+
+<file path=ppt/diagrams/quickStyle1.xml><?xml version="1.0" encoding="utf-8"?>
+<dgm:styleDef xmlns:dgm="http://schemas.openxmlformats.org/drawingml/2006/diagram" xmlns:a="http://schemas.openxmlformats.org/drawingml/2006/main" uniqueId="urn:microsoft.com/office/officeart/2005/8/quickstyle/simple1">
+  <dgm:title val=""/>
+  <dgm:desc val=""/>
+  <dgm:catLst>
+    <dgm:cat type="simple" pri="10100"/>
+  </dgm:catLst>
+  <dgm:scene3d>
+    <a:camera prst="orthographicFront"/>
+    <a:lightRig rig="threePt" dir="t"/>
+  </dgm:scene3d>
+  <dgm:styleLbl name="node0">
+    <dgm:scene3d>
+      <a:camera prst="orthographicFront"/>
+      <a:lightRig rig="threePt" dir="t"/>
+    </dgm:scene3d>
+    <dgm:sp3d/>
+    <dgm:txPr/>
+    <dgm:style>
+      <a:lnRef idx="2">
+        <a:scrgbClr r="0" g="0" b="0"/>
+      </a:lnRef>
+      <a:fillRef idx="1">
+        <a:scrgbClr r="0" g="0" b="0"/>
+      </a:fillRef>
+      <a:effectRef idx="0">
+        <a:scrgbClr r="0" g="0" b="0"/>
+      </a:effectRef>
+      <a:fontRef idx="minor">
+        <a:schemeClr val="lt1"/>
+      </a:fontRef>
+    </dgm:style>
+  </dgm:styleLbl>
+  <dgm:styleLbl name="lnNode1">
+    <dgm:scene3d>
+      <a:camera prst="orthographicFront"/>
+      <a:lightRig rig="threePt" dir="t"/>
+    </dgm:scene3d>
+    <dgm:sp3d/>
+    <dgm:txPr/>
+    <dgm:style>
+      <a:lnRef idx="2">
+        <a:scrgbClr r="0" g="0" b="0"/>
+      </a:lnRef>
+      <a:fillRef idx="1">
+        <a:scrgbClr r="0" g="0" b="0"/>
+      </a:fillRef>
+      <a:effectRef idx="0">
+        <a:scrgbClr r="0" g="0" b="0"/>
+      </a:effectRef>
+      <a:fontRef idx="minor">
+        <a:schemeClr val="lt1"/>
+      </a:fontRef>
+    </dgm:style>
+  </dgm:styleLbl>
+  <dgm:styleLbl name="vennNode1">
+    <dgm:scene3d>
+      <a:camera prst="orthographicFront"/>
+      <a:lightRig rig="threePt" dir="t"/>
+    </dgm:scene3d>
+    <dgm:sp3d/>
+    <dgm:txPr/>
+    <dgm:style>
+      <a:lnRef idx="2">
+        <a:scrgbClr r="0" g="0" b="0"/>
+      </a:lnRef>
+      <a:fillRef idx="1">
+        <a:scrgbClr r="0" g="0" b="0"/>
+      </a:fillRef>
+      <a:effectRef idx="0">
+        <a:scrgbClr r="0" g="0" b="0"/>
+      </a:effectRef>
+      <a:fontRef idx="minor">
+        <a:schemeClr val="tx1"/>
+      </a:fontRef>
+    </dgm:style>
+  </dgm:styleLbl>
+  <dgm:styleLbl name="alignNode1">
+    <dgm:scene3d>
+      <a:camera prst="orthographicFront"/>
+      <a:lightRig rig="threePt" dir="t"/>
+    </dgm:scene3d>
+    <dgm:sp3d/>
+    <dgm:txPr/>
+    <dgm:style>
+      <a:lnRef idx="2">
+        <a:scrgbClr r="0" g="0" b="0"/>
+      </a:lnRef>
+      <a:fillRef idx="1">
+        <a:scrgbClr r="0" g="0" b="0"/>
+      </a:fillRef>
+      <a:effectRef idx="0">
+        <a:scrgbClr r="0" g="0" b="0"/>
+      </a:effectRef>
+      <a:fontRef idx="minor">
+        <a:schemeClr val="lt1"/>
+      </a:fontRef>
+    </dgm:style>
+  </dgm:styleLbl>
+  <dgm:styleLbl name="node1">
+    <dgm:scene3d>
+      <a:camera prst="orthographicFront"/>
+      <a:lightRig rig="threePt" dir="t"/>
+    </dgm:scene3d>
+    <dgm:sp3d/>
+    <dgm:txPr/>
+    <dgm:style>
+      <a:lnRef idx="2">
+        <a:scrgbClr r="0" g="0" b="0"/>
+      </a:lnRef>
+      <a:fillRef idx="1">
+        <a:scrgbClr r="0" g="0" b="0"/>
+      </a:fillRef>
+      <a:effectRef idx="0">
+        <a:scrgbClr r="0" g="0" b="0"/>
+      </a:effectRef>
+      <a:fontRef idx="minor">
+        <a:schemeClr val="lt1"/>
+      </a:fontRef>
+    </dgm:style>
+  </dgm:styleLbl>
+  <dgm:styleLbl name="node2">
+    <dgm:scene3d>
+      <a:camera prst="orthographicFront"/>
+      <a:lightRig rig="threePt" dir="t"/>
+    </dgm:scene3d>
+    <dgm:sp3d/>
+    <dgm:txPr/>
+    <dgm:style>
+      <a:lnRef idx="2">
+        <a:scrgbClr r="0" g="0" b="0"/>
+      </a:lnRef>
+      <a:fillRef idx="1">
+        <a:scrgbClr r="0" g="0" b="0"/>
+      </a:fillRef>
+      <a:effectRef idx="0">
+        <a:scrgbClr r="0" g="0" b="0"/>
+      </a:effectRef>
+      <a:fontRef idx="minor">
+        <a:schemeClr val="lt1"/>
+      </a:fontRef>
+    </dgm:style>
+  </dgm:styleLbl>
+  <dgm:styleLbl name="node3">
+    <dgm:scene3d>
+      <a:camera prst="orthographicFront"/>
+      <a:lightRig rig="threePt" dir="t"/>
+    </dgm:scene3d>
+    <dgm:sp3d/>
+    <dgm:txPr/>
+    <dgm:style>
+      <a:lnRef idx="2">
+        <a:scrgbClr r="0" g="0" b="0"/>
+      </a:lnRef>
+      <a:fillRef idx="1">
+        <a:scrgbClr r="0" g="0" b="0"/>
+      </a:fillRef>
+      <a:effectRef idx="0">
+        <a:scrgbClr r="0" g="0" b="0"/>
+      </a:effectRef>
+      <a:fontRef idx="minor">
+        <a:schemeClr val="lt1"/>
+      </a:fontRef>
+    </dgm:style>
+  </dgm:styleLbl>
+  <dgm:styleLbl name="node4">
+    <dgm:scene3d>
+      <a:camera prst="orthographicFront"/>
+      <a:lightRig rig="threePt" dir="t"/>
+    </dgm:scene3d>
+    <dgm:sp3d/>
+    <dgm:txPr/>
+    <dgm:style>
+      <a:lnRef idx="2">
+        <a:scrgbClr r="0" g="0" b="0"/>
+      </a:lnRef>
+      <a:fillRef idx="1">
+        <a:scrgbClr r="0" g="0" b="0"/>
+      </a:fillRef>
+      <a:effectRef idx="0">
+        <a:scrgbClr r="0" g="0" b="0"/>
+      </a:effectRef>
+      <a:fontRef idx="minor">
+        <a:schemeClr val="lt1"/>
+      </a:fontRef>
+    </dgm:style>
+  </dgm:styleLbl>
+  <dgm:styleLbl name="fgImgPlace1">
+    <dgm:scene3d>
+      <a:camera prst="orthographicFront"/>
+      <a:lightRig rig="threePt" dir="t"/>
+    </dgm:scene3d>
+    <dgm:sp3d/>
+    <dgm:txPr/>
+    <dgm:style>
+      <a:lnRef idx="2">
+        <a:scrgbClr r="0" g="0" b="0"/>
+      </a:lnRef>
+      <a:fillRef idx="1">
+        <a:scrgbClr r="0" g="0" b="0"/>
+      </a:fillRef>
+      <a:effectRef idx="0">
+        <a:scrgbClr r="0" g="0" b="0"/>
+      </a:effectRef>
+      <a:fontRef idx="minor"/>
+    </dgm:style>
+  </dgm:styleLbl>
+  <dgm:styleLbl name="alignImgPlace1">
+    <dgm:scene3d>
+      <a:camera prst="orthographicFront"/>
+      <a:lightRig rig="threePt" dir="t"/>
+    </dgm:scene3d>
+    <dgm:sp3d/>
+    <dgm:txPr/>
+    <dgm:style>
+      <a:lnRef idx="2">
+        <a:scrgbClr r="0" g="0" b="0"/>
+      </a:lnRef>
+      <a:fillRef idx="1">
+        <a:scrgbClr r="0" g="0" b="0"/>
+      </a:fillRef>
+      <a:effectRef idx="0">
+        <a:scrgbClr r="0" g="0" b="0"/>
+      </a:effectRef>
+      <a:fontRef idx="minor"/>
+    </dgm:style>
+  </dgm:styleLbl>
+  <dgm:styleLbl name="bgImgPlace1">
+    <dgm:scene3d>
+      <a:camera prst="orthographicFront"/>
+      <a:lightRig rig="threePt" dir="t"/>
+    </dgm:scene3d>
+    <dgm:sp3d/>
+    <dgm:txPr/>
+    <dgm:style>
+      <a:lnRef idx="2">
+        <a:scrgbClr r="0" g="0" b="0"/>
+      </a:lnRef>
+      <a:fillRef idx="1">
+        <a:scrgbClr r="0" g="0" b="0"/>
+      </a:fillRef>
+      <a:effectRef idx="0">
+        <a:scrgbClr r="0" g="0" b="0"/>
+      </a:effectRef>
+      <a:fontRef idx="minor"/>
+    </dgm:style>
+  </dgm:styleLbl>
+  <dgm:styleLbl name="sibTrans2D1">
+    <dgm:scene3d>
+      <a:camera prst="orthographicFront"/>
+      <a:lightRig rig="threePt" dir="t"/>
+    </dgm:scene3d>
+    <dgm:sp3d/>
+    <dgm:txPr/>
+    <dgm:style>
+      <a:lnRef idx="0">
+        <a:scrgbClr r="0" g="0" b="0"/>
+      </a:lnRef>
+      <a:fillRef idx="1">
+        <a:scrgbClr r="0" g="0" b="0"/>
+      </a:fillRef>
+      <a:effectRef idx="0">
+        <a:scrgbClr r="0" g="0" b="0"/>
+      </a:effectRef>
+      <a:fontRef idx="minor">
+        <a:schemeClr val="lt1"/>
+      </a:fontRef>
+    </dgm:style>
+  </dgm:styleLbl>
+  <dgm:styleLbl name="fgSibTrans2D1">
+    <dgm:scene3d>
+      <a:camera prst="orthographicFront"/>
+      <a:lightRig rig="threePt" dir="t"/>
+    </dgm:scene3d>
+    <dgm:sp3d/>
+    <dgm:txPr/>
+    <dgm:style>
+      <a:lnRef idx="0">
+        <a:scrgbClr r="0" g="0" b="0"/>
+      </a:lnRef>
+      <a:fillRef idx="1">
+        <a:scrgbClr r="0" g="0" b="0"/>
+      </a:fillRef>
+      <a:effectRef idx="0">
+        <a:scrgbClr r="0" g="0" b="0"/>
+      </a:effectRef>
+      <a:fontRef idx="minor">
+        <a:schemeClr val="lt1"/>
+      </a:fontRef>
+    </dgm:style>
+  </dgm:styleLbl>
+  <dgm:styleLbl name="bgSibTrans2D1">
+    <dgm:scene3d>
+      <a:camera prst="orthographicFront"/>
+      <a:lightRig rig="threePt" dir="t"/>
+    </dgm:scene3d>
+    <dgm:sp3d/>
+    <dgm:txPr/>
+    <dgm:style>
+      <a:lnRef idx="0">
+        <a:scrgbClr r="0" g="0" b="0"/>
+      </a:lnRef>
+      <a:fillRef idx="1">
+        <a:scrgbClr r="0" g="0" b="0"/>
+      </a:fillRef>
+      <a:effectRef idx="0">
+        <a:scrgbClr r="0" g="0" b="0"/>
+      </a:effectRef>
+      <a:fontRef idx="minor">
+        <a:schemeClr val="lt1"/>
+      </a:fontRef>
+    </dgm:style>
+  </dgm:styleLbl>
+  <dgm:styleLbl name="sibTrans1D1">
+    <dgm:scene3d>
+      <a:camera prst="orthographicFront"/>
+      <a:lightRig rig="threePt" dir="t"/>
+    </dgm:scene3d>
+    <dgm:sp3d/>
+    <dgm:txPr/>
+    <dgm:style>
+      <a:lnRef idx="1">
+        <a:scrgbClr r="0" g="0" b="0"/>
+      </a:lnRef>
+      <a:fillRef idx="0">
+        <a:scrgbClr r="0" g="0" b="0"/>
+      </a:fillRef>
+      <a:effectRef idx="0">
+        <a:scrgbClr r="0" g="0" b="0"/>
+      </a:effectRef>
+      <a:fontRef idx="minor"/>
+    </dgm:style>
+  </dgm:styleLbl>
+  <dgm:styleLbl name="callout">
+    <dgm:scene3d>
+      <a:camera prst="orthographicFront"/>
+      <a:lightRig rig="threePt" dir="t"/>
+    </dgm:scene3d>
+    <dgm:sp3d/>
+    <dgm:txPr/>
+    <dgm:style>
+      <a:lnRef idx="2">
+        <a:scrgbClr r="0" g="0" b="0"/>
+      </a:lnRef>
+      <a:fillRef idx="1">
+        <a:scrgbClr r="0" g="0" b="0"/>
+      </a:fillRef>
+      <a:effectRef idx="0">
+        <a:scrgbClr r="0" g="0" b="0"/>
+      </a:effectRef>
+      <a:fontRef idx="minor"/>
+    </dgm:style>
+  </dgm:styleLbl>
+  <dgm:styleLbl name="asst0">
+    <dgm:scene3d>
+      <a:camera prst="orthographicFront"/>
+      <a:lightRig rig="threePt" dir="t"/>
+    </dgm:scene3d>
+    <dgm:sp3d/>
+    <dgm:txPr/>
+    <dgm:style>
+      <a:lnRef idx="2">
+        <a:scrgbClr r="0" g="0" b="0"/>
+      </a:lnRef>
+      <a:fillRef idx="1">
+        <a:scrgbClr r="0" g="0" b="0"/>
+      </a:fillRef>
+      <a:effectRef idx="0">
+        <a:scrgbClr r="0" g="0" b="0"/>
+      </a:effectRef>
+      <a:fontRef idx="minor">
+        <a:schemeClr val="lt1"/>
+      </a:fontRef>
+    </dgm:style>
+  </dgm:styleLbl>
+  <dgm:styleLbl name="asst1">
+    <dgm:scene3d>
+      <a:camera prst="orthographicFront"/>
+      <a:lightRig rig="threePt" dir="t"/>
+    </dgm:scene3d>
+    <dgm:sp3d/>
+    <dgm:txPr/>
+    <dgm:style>
+      <a:lnRef idx="2">
+        <a:scrgbClr r="0" g="0" b="0"/>
+      </a:lnRef>
+      <a:fillRef idx="1">
+        <a:scrgbClr r="0" g="0" b="0"/>
+      </a:fillRef>
+      <a:effectRef idx="0">
+        <a:scrgbClr r="0" g="0" b="0"/>
+      </a:effectRef>
+      <a:fontRef idx="minor">
+        <a:schemeClr val="lt1"/>
+      </a:fontRef>
+    </dgm:style>
+  </dgm:styleLbl>
+  <dgm:styleLbl name="asst2">
+    <dgm:scene3d>
+      <a:camera prst="orthographicFront"/>
+      <a:lightRig rig="threePt" dir="t"/>
+    </dgm:scene3d>
+    <dgm:sp3d/>
+    <dgm:txPr/>
+    <dgm:style>
+      <a:lnRef idx="2">
+        <a:scrgbClr r="0" g="0" b="0"/>
+      </a:lnRef>
+      <a:fillRef idx="1">
+        <a:scrgbClr r="0" g="0" b="0"/>
+      </a:fillRef>
+      <a:effectRef idx="0">
+        <a:scrgbClr r="0" g="0" b="0"/>
+      </a:effectRef>
+      <a:fontRef idx="minor">
+        <a:schemeClr val="lt1"/>
+      </a:fontRef>
+    </dgm:style>
+  </dgm:styleLbl>
+  <dgm:styleLbl name="asst3">
+    <dgm:scene3d>
+      <a:camera prst="orthographicFront"/>
+      <a:lightRig rig="threePt" dir="t"/>
+    </dgm:scene3d>
+    <dgm:sp3d/>
+    <dgm:txPr/>
+    <dgm:style>
+      <a:lnRef idx="2">
+        <a:scrgbClr r="0" g="0" b="0"/>
+      </a:lnRef>
+      <a:fillRef idx="1">
+        <a:scrgbClr r="0" g="0" b="0"/>
+      </a:fillRef>
+      <a:effectRef idx="0">
+        <a:scrgbClr r="0" g="0" b="0"/>
+      </a:effectRef>
+      <a:fontRef idx="minor">
+        <a:schemeClr val="lt1"/>
+      </a:fontRef>
+    </dgm:style>
+  </dgm:styleLbl>
+  <dgm:styleLbl name="asst4">
+    <dgm:scene3d>
+      <a:camera prst="orthographicFront"/>
+      <a:lightRig rig="threePt" dir="t"/>
+    </dgm:scene3d>
+    <dgm:sp3d/>
+    <dgm:txPr/>
+    <dgm:style>
+      <a:lnRef idx="2">
+        <a:scrgbClr r="0" g="0" b="0"/>
+      </a:lnRef>
+      <a:fillRef idx="1">
+        <a:scrgbClr r="0" g="0" b="0"/>
+      </a:fillRef>
+      <a:effectRef idx="0">
+        <a:scrgbClr r="0" g="0" b="0"/>
+      </a:effectRef>
+      <a:fontRef idx="minor">
+        <a:schemeClr val="lt1"/>
+      </a:fontRef>
+    </dgm:style>
+  </dgm:styleLbl>
+  <dgm:styleLbl name="parChTrans2D1">
+    <dgm:scene3d>
+      <a:camera prst="orthographicFront"/>
+      <a:lightRig rig="threePt" dir="t"/>
+    </dgm:scene3d>
+    <dgm:sp3d/>
+    <dgm:txPr/>
+    <dgm:style>
+      <a:lnRef idx="2">
+        <a:scrgbClr r="0" g="0" b="0"/>
+      </a:lnRef>
+      <a:fillRef idx="1">
+        <a:scrgbClr r="0" g="0" b="0"/>
+      </a:fillRef>
+      <a:effectRef idx="0">
+        <a:scrgbClr r="0" g="0" b="0"/>
+      </a:effectRef>
+      <a:fontRef idx="minor">
+        <a:schemeClr val="lt1"/>
+      </a:fontRef>
+    </dgm:style>
+  </dgm:styleLbl>
+  <dgm:styleLbl name="parChTrans2D2">
+    <dgm:scene3d>
+      <a:camera prst="orthographicFront"/>
+      <a:lightRig rig="threePt" dir="t"/>
+    </dgm:scene3d>
+    <dgm:sp3d/>
+    <dgm:txPr/>
+    <dgm:style>
+      <a:lnRef idx="2">
+        <a:scrgbClr r="0" g="0" b="0"/>
+      </a:lnRef>
+      <a:fillRef idx="1">
+        <a:scrgbClr r="0" g="0" b="0"/>
+      </a:fillRef>
+      <a:effectRef idx="0">
+        <a:scrgbClr r="0" g="0" b="0"/>
+      </a:effectRef>
+      <a:fontRef idx="minor">
+        <a:schemeClr val="lt1"/>
+      </a:fontRef>
+    </dgm:style>
+  </dgm:styleLbl>
+  <dgm:styleLbl name="parChTrans2D3">
+    <dgm:scene3d>
+      <a:camera prst="orthographicFront"/>
+      <a:lightRig rig="threePt" dir="t"/>
+    </dgm:scene3d>
+    <dgm:sp3d/>
+    <dgm:txPr/>
+    <dgm:style>
+      <a:lnRef idx="2">
+        <a:scrgbClr r="0" g="0" b="0"/>
+      </a:lnRef>
+      <a:fillRef idx="1">
+        <a:scrgbClr r="0" g="0" b="0"/>
+      </a:fillRef>
+      <a:effectRef idx="0">
+        <a:scrgbClr r="0" g="0" b="0"/>
+      </a:effectRef>
+      <a:fontRef idx="minor">
+        <a:schemeClr val="lt1"/>
+      </a:fontRef>
+    </dgm:style>
+  </dgm:styleLbl>
+  <dgm:styleLbl name="parChTrans2D4">
+    <dgm:scene3d>
+      <a:camera prst="orthographicFront"/>
+      <a:lightRig rig="threePt" dir="t"/>
+    </dgm:scene3d>
+    <dgm:sp3d/>
+    <dgm:txPr/>
+    <dgm:style>
+      <a:lnRef idx="2">
+        <a:scrgbClr r="0" g="0" b="0"/>
+      </a:lnRef>
+      <a:fillRef idx="1">
+        <a:scrgbClr r="0" g="0" b="0"/>
+      </a:fillRef>
+      <a:effectRef idx="0">
+        <a:scrgbClr r="0" g="0" b="0"/>
+      </a:effectRef>
+      <a:fontRef idx="minor">
+        <a:schemeClr val="lt1"/>
+      </a:fontRef>
+    </dgm:style>
+  </dgm:styleLbl>
+  <dgm:styleLbl name="parChTrans1D1">
+    <dgm:scene3d>
+      <a:camera prst="orthographicFront"/>
+      <a:lightRig rig="threePt" dir="t"/>
+    </dgm:scene3d>
+    <dgm:sp3d/>
+    <dgm:txPr/>
+    <dgm:style>
+      <a:lnRef idx="2">
+        <a:scrgbClr r="0" g="0" b="0"/>
+      </a:lnRef>
+      <a:fillRef idx="0">
+        <a:scrgbClr r="0" g="0" b="0"/>
+      </a:fillRef>
+      <a:effectRef idx="0">
+        <a:scrgbClr r="0" g="0" b="0"/>
+      </a:effectRef>
+      <a:fontRef idx="minor"/>
+    </dgm:style>
+  </dgm:styleLbl>
+  <dgm:styleLbl name="parChTrans1D2">
+    <dgm:scene3d>
+      <a:camera prst="orthographicFront"/>
+      <a:lightRig rig="threePt" dir="t"/>
+    </dgm:scene3d>
+    <dgm:sp3d/>
+    <dgm:txPr/>
+    <dgm:style>
+      <a:lnRef idx="2">
+        <a:scrgbClr r="0" g="0" b="0"/>
+      </a:lnRef>
+      <a:fillRef idx="0">
+        <a:scrgbClr r="0" g="0" b="0"/>
+      </a:fillRef>
+      <a:effectRef idx="0">
+        <a:scrgbClr r="0" g="0" b="0"/>
+      </a:effectRef>
+      <a:fontRef idx="minor"/>
+    </dgm:style>
+  </dgm:styleLbl>
+  <dgm:styleLbl name="parChTrans1D3">
+    <dgm:scene3d>
+      <a:camera prst="orthographicFront"/>
+      <a:lightRig rig="threePt" dir="t"/>
+    </dgm:scene3d>
+    <dgm:sp3d/>
+    <dgm:txPr/>
+    <dgm:style>
+      <a:lnRef idx="2">
+        <a:scrgbClr r="0" g="0" b="0"/>
+      </a:lnRef>
+      <a:fillRef idx="0">
+        <a:scrgbClr r="0" g="0" b="0"/>
+      </a:fillRef>
+      <a:effectRef idx="0">
+        <a:scrgbClr r="0" g="0" b="0"/>
+      </a:effectRef>
+      <a:fontRef idx="minor"/>
+    </dgm:style>
+  </dgm:styleLbl>
+  <dgm:styleLbl name="parChTrans1D4">
+    <dgm:scene3d>
+      <a:camera prst="orthographicFront"/>
+      <a:lightRig rig="threePt" dir="t"/>
+    </dgm:scene3d>
+    <dgm:sp3d/>
+    <dgm:txPr/>
+    <dgm:style>
+      <a:lnRef idx="2">
+        <a:scrgbClr r="0" g="0" b="0"/>
+      </a:lnRef>
+      <a:fillRef idx="0">
+        <a:scrgbClr r="0" g="0" b="0"/>
+      </a:fillRef>
+      <a:effectRef idx="0">
+        <a:scrgbClr r="0" g="0" b="0"/>
+      </a:effectRef>
+      <a:fontRef idx="minor"/>
+    </dgm:style>
+  </dgm:styleLbl>
+  <dgm:styleLbl name="fgAcc1">
+    <dgm:scene3d>
+      <a:camera prst="orthographicFront"/>
+      <a:lightRig rig="threePt" dir="t"/>
+    </dgm:scene3d>
+    <dgm:sp3d/>
+    <dgm:txPr/>
+    <dgm:style>
+      <a:lnRef idx="2">
+        <a:scrgbClr r="0" g="0" b="0"/>
+      </a:lnRef>
+      <a:fillRef idx="1">
+        <a:scrgbClr r="0" g="0" b="0"/>
+      </a:fillRef>
+      <a:effectRef idx="0">
+        <a:scrgbClr r="0" g="0" b="0"/>
+      </a:effectRef>
+      <a:fontRef idx="minor"/>
+    </dgm:style>
+  </dgm:styleLbl>
+  <dgm:styleLbl name="conFgAcc1">
+    <dgm:scene3d>
+      <a:camera prst="orthographicFront"/>
+      <a:lightRig rig="threePt" dir="t"/>
+    </dgm:scene3d>
+    <dgm:sp3d/>
+    <dgm:txPr/>
+    <dgm:style>
+      <a:lnRef idx="2">
+        <a:scrgbClr r="0" g="0" b="0"/>
+      </a:lnRef>
+      <a:fillRef idx="1">
+        <a:scrgbClr r="0" g="0" b="0"/>
+      </a:fillRef>
+      <a:effectRef idx="0">
+        <a:scrgbClr r="0" g="0" b="0"/>
+      </a:effectRef>
+      <a:fontRef idx="minor"/>
+    </dgm:style>
+  </dgm:styleLbl>
+  <dgm:styleLbl name="alignAcc1">
+    <dgm:scene3d>
+      <a:camera prst="orthographicFront"/>
+      <a:lightRig rig="threePt" dir="t"/>
+    </dgm:scene3d>
+    <dgm:sp3d/>
+    <dgm:txPr/>
+    <dgm:style>
+      <a:lnRef idx="2">
+        <a:scrgbClr r="0" g="0" b="0"/>
+      </a:lnRef>
+      <a:fillRef idx="1">
+        <a:scrgbClr r="0" g="0" b="0"/>
+      </a:fillRef>
+      <a:effectRef idx="0">
+        <a:scrgbClr r="0" g="0" b="0"/>
+      </a:effectRef>
+      <a:fontRef idx="minor"/>
+    </dgm:style>
+  </dgm:styleLbl>
+  <dgm:styleLbl name="trAlignAcc1">
+    <dgm:scene3d>
+      <a:camera prst="orthographicFront"/>
+      <a:lightRig rig="threePt" dir="t"/>
+    </dgm:scene3d>
+    <dgm:sp3d/>
+    <dgm:txPr/>
+    <dgm:style>
+      <a:lnRef idx="1">
+        <a:scrgbClr r="0" g="0" b="0"/>
+      </a:lnRef>
+      <a:fillRef idx="1">
+        <a:scrgbClr r="0" g="0" b="0"/>
+      </a:fillRef>
+      <a:effectRef idx="0">
+        <a:scrgbClr r="0" g="0" b="0"/>
+      </a:effectRef>
+      <a:fontRef idx="minor"/>
+    </dgm:style>
+  </dgm:styleLbl>
+  <dgm:styleLbl name="bgAcc1">
+    <dgm:scene3d>
+      <a:camera prst="orthographicFront"/>
+      <a:lightRig rig="threePt" dir="t"/>
+    </dgm:scene3d>
+    <dgm:sp3d/>
+    <dgm:txPr/>
+    <dgm:style>
+      <a:lnRef idx="2">
+        <a:scrgbClr r="0" g="0" b="0"/>
+      </a:lnRef>
+      <a:fillRef idx="1">
+        <a:scrgbClr r="0" g="0" b="0"/>
+      </a:fillRef>
+      <a:effectRef idx="0">
+        <a:scrgbClr r="0" g="0" b="0"/>
+      </a:effectRef>
+      <a:fontRef idx="minor"/>
+    </dgm:style>
+  </dgm:styleLbl>
+  <dgm:styleLbl name="solidFgAcc1">
+    <dgm:scene3d>
+      <a:camera prst="orthographicFront"/>
+      <a:lightRig rig="threePt" dir="t"/>
+    </dgm:scene3d>
+    <dgm:sp3d/>
+    <dgm:txPr/>
+    <dgm:style>
+      <a:lnRef idx="2">
+        <a:scrgbClr r="0" g="0" b="0"/>
+      </a:lnRef>
+      <a:fillRef idx="1">
+        <a:scrgbClr r="0" g="0" b="0"/>
+      </a:fillRef>
+      <a:effectRef idx="0">
+        <a:scrgbClr r="0" g="0" b="0"/>
+      </a:effectRef>
+      <a:fontRef idx="minor"/>
+    </dgm:style>
+  </dgm:styleLbl>
+  <dgm:styleLbl name="solidAlignAcc1">
+    <dgm:scene3d>
+      <a:camera prst="orthographicFront"/>
+      <a:lightRig rig="threePt" dir="t"/>
+    </dgm:scene3d>
+    <dgm:sp3d/>
+    <dgm:txPr/>
+    <dgm:style>
+      <a:lnRef idx="2">
+        <a:scrgbClr r="0" g="0" b="0"/>
+      </a:lnRef>
+      <a:fillRef idx="1">
+        <a:scrgbClr r="0" g="0" b="0"/>
+      </a:fillRef>
+      <a:effectRef idx="0">
+        <a:scrgbClr r="0" g="0" b="0"/>
+      </a:effectRef>
+      <a:fontRef idx="minor"/>
+    </dgm:style>
+  </dgm:styleLbl>
+  <dgm:styleLbl name="solidBgAcc1">
+    <dgm:scene3d>
+      <a:camera prst="orthographicFront"/>
+      <a:lightRig rig="threePt" dir="t"/>
+    </dgm:scene3d>
+    <dgm:sp3d/>
+    <dgm:txPr/>
+    <dgm:style>
+      <a:lnRef idx="2">
+        <a:scrgbClr r="0" g="0" b="0"/>
+      </a:lnRef>
+      <a:fillRef idx="1">
+        <a:scrgbClr r="0" g="0" b="0"/>
+      </a:fillRef>
+      <a:effectRef idx="0">
+        <a:scrgbClr r="0" g="0" b="0"/>
+      </a:effectRef>
+      <a:fontRef idx="minor"/>
+    </dgm:style>
+  </dgm:styleLbl>
+  <dgm:styleLbl name="fgAccFollowNode1">
+    <dgm:scene3d>
+      <a:camera prst="orthographicFront"/>
+      <a:lightRig rig="threePt" dir="t"/>
+    </dgm:scene3d>
+    <dgm:sp3d/>
+    <dgm:txPr/>
+    <dgm:style>
+      <a:lnRef idx="2">
+        <a:scrgbClr r="0" g="0" b="0"/>
+      </a:lnRef>
+      <a:fillRef idx="1">
+        <a:scrgbClr r="0" g="0" b="0"/>
+      </a:fillRef>
+      <a:effectRef idx="0">
+        <a:scrgbClr r="0" g="0" b="0"/>
+      </a:effectRef>
+      <a:fontRef idx="minor"/>
+    </dgm:style>
+  </dgm:styleLbl>
+  <dgm:styleLbl name="alignAccFollowNode1">
+    <dgm:scene3d>
+      <a:camera prst="orthographicFront"/>
+      <a:lightRig rig="threePt" dir="t"/>
+    </dgm:scene3d>
+    <dgm:sp3d/>
+    <dgm:txPr/>
+    <dgm:style>
+      <a:lnRef idx="2">
+        <a:scrgbClr r="0" g="0" b="0"/>
+      </a:lnRef>
+      <a:fillRef idx="1">
+        <a:scrgbClr r="0" g="0" b="0"/>
+      </a:fillRef>
+      <a:effectRef idx="0">
+        <a:scrgbClr r="0" g="0" b="0"/>
+      </a:effectRef>
+      <a:fontRef idx="minor"/>
+    </dgm:style>
+  </dgm:styleLbl>
+  <dgm:styleLbl name="bgAccFollowNode1">
+    <dgm:scene3d>
+      <a:camera prst="orthographicFront"/>
+      <a:lightRig rig="threePt" dir="t"/>
+    </dgm:scene3d>
+    <dgm:sp3d/>
+    <dgm:txPr/>
+    <dgm:style>
+      <a:lnRef idx="2">
+        <a:scrgbClr r="0" g="0" b="0"/>
+      </a:lnRef>
+      <a:fillRef idx="1">
+        <a:scrgbClr r="0" g="0" b="0"/>
+      </a:fillRef>
+      <a:effectRef idx="0">
+        <a:scrgbClr r="0" g="0" b="0"/>
+      </a:effectRef>
+      <a:fontRef idx="minor"/>
+    </dgm:style>
+  </dgm:styleLbl>
+  <dgm:styleLbl name="fgAcc0">
+    <dgm:scene3d>
+      <a:camera prst="orthographicFront"/>
+      <a:lightRig rig="threePt" dir="t"/>
+    </dgm:scene3d>
+    <dgm:sp3d/>
+    <dgm:txPr/>
+    <dgm:style>
+      <a:lnRef idx="2">
+        <a:scrgbClr r="0" g="0" b="0"/>
+      </a:lnRef>
+      <a:fillRef idx="1">
+        <a:scrgbClr r="0" g="0" b="0"/>
+      </a:fillRef>
+      <a:effectRef idx="0">
+        <a:scrgbClr r="0" g="0" b="0"/>
+      </a:effectRef>
+      <a:fontRef idx="minor"/>
+    </dgm:style>
+  </dgm:styleLbl>
+  <dgm:styleLbl name="fgAcc2">
+    <dgm:scene3d>
+      <a:camera prst="orthographicFront"/>
+      <a:lightRig rig="threePt" dir="t"/>
+    </dgm:scene3d>
+    <dgm:sp3d/>
+    <dgm:txPr/>
+    <dgm:style>
+      <a:lnRef idx="2">
+        <a:scrgbClr r="0" g="0" b="0"/>
+      </a:lnRef>
+      <a:fillRef idx="1">
+        <a:scrgbClr r="0" g="0" b="0"/>
+      </a:fillRef>
+      <a:effectRef idx="0">
+        <a:scrgbClr r="0" g="0" b="0"/>
+      </a:effectRef>
+      <a:fontRef idx="minor"/>
+    </dgm:style>
+  </dgm:styleLbl>
+  <dgm:styleLbl name="fgAcc3">
+    <dgm:scene3d>
+      <a:camera prst="orthographicFront"/>
+      <a:lightRig rig="threePt" dir="t"/>
+    </dgm:scene3d>
+    <dgm:sp3d/>
+    <dgm:txPr/>
+    <dgm:style>
+      <a:lnRef idx="2">
+        <a:scrgbClr r="0" g="0" b="0"/>
+      </a:lnRef>
+      <a:fillRef idx="1">
+        <a:scrgbClr r="0" g="0" b="0"/>
+      </a:fillRef>
+      <a:effectRef idx="0">
+        <a:scrgbClr r="0" g="0" b="0"/>
+      </a:effectRef>
+      <a:fontRef idx="minor"/>
+    </dgm:style>
+  </dgm:styleLbl>
+  <dgm:styleLbl name="fgAcc4">
+    <dgm:scene3d>
+      <a:camera prst="orthographicFront"/>
+      <a:lightRig rig="threePt" dir="t"/>
+    </dgm:scene3d>
+    <dgm:sp3d/>
+    <dgm:txPr/>
+    <dgm:style>
+      <a:lnRef idx="2">
+        <a:scrgbClr r="0" g="0" b="0"/>
+      </a:lnRef>
+      <a:fillRef idx="1">
+        <a:scrgbClr r="0" g="0" b="0"/>
+      </a:fillRef>
+      <a:effectRef idx="0">
+        <a:scrgbClr r="0" g="0" b="0"/>
+      </a:effectRef>
+      <a:fontRef idx="minor"/>
+    </dgm:style>
+  </dgm:styleLbl>
+  <dgm:styleLbl name="bgShp">
+    <dgm:scene3d>
+      <a:camera prst="orthographicFront"/>
+      <a:lightRig rig="threePt" dir="t"/>
+    </dgm:scene3d>
+    <dgm:sp3d/>
+    <dgm:txPr/>
+    <dgm:style>
+      <a:lnRef idx="0">
+        <a:scrgbClr r="0" g="0" b="0"/>
+      </a:lnRef>
+      <a:fillRef idx="1">
+        <a:scrgbClr r="0" g="0" b="0"/>
+      </a:fillRef>
+      <a:effectRef idx="0">
+        <a:scrgbClr r="0" g="0" b="0"/>
+      </a:effectRef>
+      <a:fontRef idx="minor"/>
+    </dgm:style>
+  </dgm:styleLbl>
+  <dgm:styleLbl name="dkBgShp">
+    <dgm:scene3d>
+      <a:camera prst="orthographicFront"/>
+      <a:lightRig rig="threePt" dir="t"/>
+    </dgm:scene3d>
+    <dgm:sp3d/>
+    <dgm:txPr/>
+    <dgm:style>
+      <a:lnRef idx="0">
+        <a:scrgbClr r="0" g="0" b="0"/>
+      </a:lnRef>
+      <a:fillRef idx="1">
+        <a:scrgbClr r="0" g="0" b="0"/>
+      </a:fillRef>
+      <a:effectRef idx="0">
+        <a:scrgbClr r="0" g="0" b="0"/>
+      </a:effectRef>
+      <a:fontRef idx="minor"/>
+    </dgm:style>
+  </dgm:styleLbl>
+  <dgm:styleLbl name="trBgShp">
+    <dgm:scene3d>
+      <a:camera prst="orthographicFront"/>
+      <a:lightRig rig="threePt" dir="t"/>
+    </dgm:scene3d>
+    <dgm:sp3d/>
+    <dgm:txPr/>
+    <dgm:style>
+      <a:lnRef idx="0">
+        <a:scrgbClr r="0" g="0" b="0"/>
+      </a:lnRef>
+      <a:fillRef idx="1">
+        <a:scrgbClr r="0" g="0" b="0"/>
+      </a:fillRef>
+      <a:effectRef idx="0">
+        <a:scrgbClr r="0" g="0" b="0"/>
+      </a:effectRef>
+      <a:fontRef idx="minor"/>
+    </dgm:style>
+  </dgm:styleLbl>
+  <dgm:styleLbl name="fgShp">
+    <dgm:scene3d>
+      <a:camera prst="orthographicFront"/>
+      <a:lightRig rig="threePt" dir="t"/>
+    </dgm:scene3d>
+    <dgm:sp3d/>
+    <dgm:txPr/>
+    <dgm:style>
+      <a:lnRef idx="2">
+        <a:scrgbClr r="0" g="0" b="0"/>
+      </a:lnRef>
+      <a:fillRef idx="1">
+        <a:scrgbClr r="0" g="0" b="0"/>
+      </a:fillRef>
+      <a:effectRef idx="0">
+        <a:scrgbClr r="0" g="0" b="0"/>
+      </a:effectRef>
+      <a:fontRef idx="minor"/>
+    </dgm:style>
+  </dgm:styleLbl>
+  <dgm:styleLbl name="revTx">
+    <dgm:scene3d>
+      <a:camera prst="orthographicFront"/>
+      <a:lightRig rig="threePt" dir="t"/>
+    </dgm:scene3d>
+    <dgm:sp3d/>
+    <dgm:txPr/>
+    <dgm:style>
+      <a:lnRef idx="0">
+        <a:scrgbClr r="0" g="0" b="0"/>
+      </a:lnRef>
+      <a:fillRef idx="0">
+        <a:scrgbClr r="0" g="0" b="0"/>
+      </a:fillRef>
+      <a:effectRef idx="0">
+        <a:scrgbClr r="0" g="0" b="0"/>
+      </a:effectRef>
+      <a:fontRef idx="minor"/>
+    </dgm:style>
+  </dgm:styleLbl>
+</dgm:styleDef>
 </file>
 
 <file path=ppt/slideLayouts/slideLayout1.xml><?xml version="1.0" encoding="utf-8"?>
@@ -27251,6 +31049,28 @@
           </a:p>
         </p:txBody>
       </p:sp>
+      <p:graphicFrame>
+        <p:nvGraphicFramePr>
+          <p:cNvPr id="5" name="Diagram 4"/>
+          <p:cNvGraphicFramePr/>
+          <p:nvPr>
+            <p:extLst>
+              <p:ext uri="{D42A27DB-BD31-4B8C-83A1-F6EECF244321}">
+                <p14:modId xmlns:p14="http://schemas.microsoft.com/office/powerpoint/2010/main" val="2090576728"/>
+              </p:ext>
+            </p:extLst>
+          </p:nvPr>
+        </p:nvGraphicFramePr>
+        <p:xfrm>
+          <a:off x="2032000" y="719666"/>
+          <a:ext cx="8128000" cy="5418667"/>
+        </p:xfrm>
+        <a:graphic>
+          <a:graphicData uri="http://schemas.openxmlformats.org/drawingml/2006/diagram">
+            <dgm:relIds xmlns:dgm="http://schemas.openxmlformats.org/drawingml/2006/diagram" xmlns:r="http://schemas.openxmlformats.org/officeDocument/2006/relationships" r:dm="rId2" r:lo="rId3" r:qs="rId4" r:cs="rId5"/>
+          </a:graphicData>
+        </a:graphic>
+      </p:graphicFrame>
     </p:spTree>
     <p:extLst>
       <p:ext uri="{BB962C8B-B14F-4D97-AF65-F5344CB8AC3E}">
@@ -27264,9 +31084,90 @@
   <p:timing>
     <p:tnLst>
       <p:par>
-        <p:cTn id="1" dur="indefinite" restart="never" nodeType="tmRoot"/>
+        <p:cTn id="1" dur="indefinite" restart="never" nodeType="tmRoot">
+          <p:childTnLst>
+            <p:seq concurrent="1" nextAc="seek">
+              <p:cTn id="2" dur="indefinite" nodeType="mainSeq">
+                <p:childTnLst>
+                  <p:par>
+                    <p:cTn id="3" fill="hold">
+                      <p:stCondLst>
+                        <p:cond delay="indefinite"/>
+                      </p:stCondLst>
+                      <p:childTnLst>
+                        <p:par>
+                          <p:cTn id="4" fill="hold">
+                            <p:stCondLst>
+                              <p:cond delay="0"/>
+                            </p:stCondLst>
+                            <p:childTnLst>
+                              <p:par>
+                                <p:cTn id="5" presetID="10" presetClass="entr" presetSubtype="0" fill="hold" grpId="0" nodeType="clickEffect">
+                                  <p:stCondLst>
+                                    <p:cond delay="0"/>
+                                  </p:stCondLst>
+                                  <p:childTnLst>
+                                    <p:set>
+                                      <p:cBhvr>
+                                        <p:cTn id="6" dur="1" fill="hold">
+                                          <p:stCondLst>
+                                            <p:cond delay="0"/>
+                                          </p:stCondLst>
+                                        </p:cTn>
+                                        <p:tgtEl>
+                                          <p:spTgt spid="5"/>
+                                        </p:tgtEl>
+                                        <p:attrNameLst>
+                                          <p:attrName>style.visibility</p:attrName>
+                                        </p:attrNameLst>
+                                      </p:cBhvr>
+                                      <p:to>
+                                        <p:strVal val="visible"/>
+                                      </p:to>
+                                    </p:set>
+                                    <p:animEffect transition="in" filter="fade">
+                                      <p:cBhvr>
+                                        <p:cTn id="7" dur="500"/>
+                                        <p:tgtEl>
+                                          <p:spTgt spid="5"/>
+                                        </p:tgtEl>
+                                      </p:cBhvr>
+                                    </p:animEffect>
+                                  </p:childTnLst>
+                                </p:cTn>
+                              </p:par>
+                            </p:childTnLst>
+                          </p:cTn>
+                        </p:par>
+                      </p:childTnLst>
+                    </p:cTn>
+                  </p:par>
+                </p:childTnLst>
+              </p:cTn>
+              <p:prevCondLst>
+                <p:cond evt="onPrev" delay="0">
+                  <p:tgtEl>
+                    <p:sldTgt/>
+                  </p:tgtEl>
+                </p:cond>
+              </p:prevCondLst>
+              <p:nextCondLst>
+                <p:cond evt="onNext" delay="0">
+                  <p:tgtEl>
+                    <p:sldTgt/>
+                  </p:tgtEl>
+                </p:cond>
+              </p:nextCondLst>
+            </p:seq>
+          </p:childTnLst>
+        </p:cTn>
       </p:par>
     </p:tnLst>
+    <p:bldLst>
+      <p:bldGraphic spid="5" grpId="0">
+        <p:bldAsOne/>
+      </p:bldGraphic>
+    </p:bldLst>
   </p:timing>
 </p:sld>
 </file>

</xml_diff>

<commit_message>
Got the basic example working. Started API design info in presentation
</commit_message>
<xml_diff>
--- a/Presentation/RESTful APIs.pptx
+++ b/Presentation/RESTful APIs.pptx
@@ -24,6 +24,10 @@
     <p:sldId id="272" r:id="rId18"/>
     <p:sldId id="273" r:id="rId19"/>
     <p:sldId id="274" r:id="rId20"/>
+    <p:sldId id="275" r:id="rId21"/>
+    <p:sldId id="276" r:id="rId22"/>
+    <p:sldId id="277" r:id="rId23"/>
+    <p:sldId id="278" r:id="rId24"/>
   </p:sldIdLst>
   <p:sldSz cx="12192000" cy="6858000"/>
   <p:notesSz cx="6858000" cy="9144000"/>
@@ -31587,6 +31591,1251 @@
 </p:sld>
 </file>
 
+<file path=ppt/slides/slide20.xml><?xml version="1.0" encoding="utf-8"?>
+<p:sld xmlns:a="http://schemas.openxmlformats.org/drawingml/2006/main" xmlns:r="http://schemas.openxmlformats.org/officeDocument/2006/relationships" xmlns:p="http://schemas.openxmlformats.org/presentationml/2006/main">
+  <p:cSld>
+    <p:spTree>
+      <p:nvGrpSpPr>
+        <p:cNvPr id="1" name=""/>
+        <p:cNvGrpSpPr/>
+        <p:nvPr/>
+      </p:nvGrpSpPr>
+      <p:grpSpPr>
+        <a:xfrm>
+          <a:off x="0" y="0"/>
+          <a:ext cx="0" cy="0"/>
+          <a:chOff x="0" y="0"/>
+          <a:chExt cx="0" cy="0"/>
+        </a:xfrm>
+      </p:grpSpPr>
+      <p:sp>
+        <p:nvSpPr>
+          <p:cNvPr id="2" name="Title 1"/>
+          <p:cNvSpPr>
+            <a:spLocks noGrp="1"/>
+          </p:cNvSpPr>
+          <p:nvPr>
+            <p:ph type="title"/>
+          </p:nvPr>
+        </p:nvSpPr>
+        <p:spPr/>
+        <p:txBody>
+          <a:bodyPr/>
+          <a:lstStyle/>
+          <a:p>
+            <a:r>
+              <a:rPr lang="en-US" dirty="0" smtClean="0"/>
+              <a:t>API Design</a:t>
+            </a:r>
+            <a:endParaRPr lang="en-US" dirty="0"/>
+          </a:p>
+        </p:txBody>
+      </p:sp>
+      <p:sp>
+        <p:nvSpPr>
+          <p:cNvPr id="3" name="Content Placeholder 2"/>
+          <p:cNvSpPr>
+            <a:spLocks noGrp="1"/>
+          </p:cNvSpPr>
+          <p:nvPr>
+            <p:ph idx="1"/>
+          </p:nvPr>
+        </p:nvSpPr>
+        <p:spPr/>
+        <p:txBody>
+          <a:bodyPr/>
+          <a:lstStyle/>
+          <a:p>
+            <a:r>
+              <a:rPr lang="en-US" dirty="0" smtClean="0"/>
+              <a:t>Art or Science?</a:t>
+            </a:r>
+          </a:p>
+          <a:p>
+            <a:r>
+              <a:rPr lang="en-US" dirty="0" smtClean="0"/>
+              <a:t>Request Types</a:t>
+            </a:r>
+          </a:p>
+          <a:p>
+            <a:pPr lvl="1"/>
+            <a:r>
+              <a:rPr lang="en-US" dirty="0" smtClean="0"/>
+              <a:t>Safe – No side effects</a:t>
+            </a:r>
+          </a:p>
+          <a:p>
+            <a:pPr lvl="1"/>
+            <a:r>
+              <a:rPr lang="en-US" dirty="0" smtClean="0"/>
+              <a:t>Idempotent – Multiple requests have same effect</a:t>
+            </a:r>
+          </a:p>
+          <a:p>
+            <a:pPr marL="457200" lvl="1" indent="0">
+              <a:buNone/>
+            </a:pPr>
+            <a:endParaRPr lang="en-US" dirty="0" smtClean="0"/>
+          </a:p>
+        </p:txBody>
+      </p:sp>
+      <p:graphicFrame>
+        <p:nvGraphicFramePr>
+          <p:cNvPr id="4" name="Table 3"/>
+          <p:cNvGraphicFramePr>
+            <a:graphicFrameLocks noGrp="1"/>
+          </p:cNvGraphicFramePr>
+          <p:nvPr>
+            <p:extLst>
+              <p:ext uri="{D42A27DB-BD31-4B8C-83A1-F6EECF244321}">
+                <p14:modId xmlns:p14="http://schemas.microsoft.com/office/powerpoint/2010/main" val="1102810285"/>
+              </p:ext>
+            </p:extLst>
+          </p:nvPr>
+        </p:nvGraphicFramePr>
+        <p:xfrm>
+          <a:off x="3458362" y="3841750"/>
+          <a:ext cx="8301839" cy="2641600"/>
+        </p:xfrm>
+        <a:graphic>
+          <a:graphicData uri="http://schemas.openxmlformats.org/drawingml/2006/table">
+            <a:tbl>
+              <a:tblPr firstRow="1">
+                <a:tableStyleId>{08FB837D-C827-4EFA-A057-4D05807E0F7C}</a:tableStyleId>
+              </a:tblPr>
+              <a:tblGrid>
+                <a:gridCol w="1921672"/>
+                <a:gridCol w="1753429"/>
+                <a:gridCol w="2560480"/>
+                <a:gridCol w="2066258"/>
+              </a:tblGrid>
+              <a:tr h="0">
+                <a:tc>
+                  <a:txBody>
+                    <a:bodyPr/>
+                    <a:lstStyle/>
+                    <a:p>
+                      <a:pPr marL="0" marR="0" fontAlgn="t">
+                        <a:spcBef>
+                          <a:spcPts val="0"/>
+                        </a:spcBef>
+                        <a:spcAft>
+                          <a:spcPts val="0"/>
+                        </a:spcAft>
+                      </a:pPr>
+                      <a:r>
+                        <a:rPr lang="en-US" sz="2800" dirty="0">
+                          <a:effectLst/>
+                        </a:rPr>
+                        <a:t>Method</a:t>
+                      </a:r>
+                      <a:endParaRPr lang="en-US" sz="2800" dirty="0">
+                        <a:solidFill>
+                          <a:srgbClr val="000000"/>
+                        </a:solidFill>
+                        <a:effectLst/>
+                        <a:latin typeface="Calibri" panose="020F0502020204030204" pitchFamily="34" charset="0"/>
+                      </a:endParaRPr>
+                    </a:p>
+                  </a:txBody>
+                  <a:tcPr marL="50800" marR="50800" marT="50800" marB="50800"/>
+                </a:tc>
+                <a:tc>
+                  <a:txBody>
+                    <a:bodyPr/>
+                    <a:lstStyle/>
+                    <a:p>
+                      <a:pPr marL="0" marR="0" fontAlgn="t">
+                        <a:spcBef>
+                          <a:spcPts val="0"/>
+                        </a:spcBef>
+                        <a:spcAft>
+                          <a:spcPts val="0"/>
+                        </a:spcAft>
+                      </a:pPr>
+                      <a:r>
+                        <a:rPr lang="en-US" sz="2800" dirty="0">
+                          <a:effectLst/>
+                        </a:rPr>
+                        <a:t>Safe</a:t>
+                      </a:r>
+                      <a:endParaRPr lang="en-US" sz="2800" dirty="0">
+                        <a:solidFill>
+                          <a:srgbClr val="000000"/>
+                        </a:solidFill>
+                        <a:effectLst/>
+                        <a:latin typeface="Calibri" panose="020F0502020204030204" pitchFamily="34" charset="0"/>
+                      </a:endParaRPr>
+                    </a:p>
+                  </a:txBody>
+                  <a:tcPr marL="50800" marR="50800" marT="50800" marB="50800"/>
+                </a:tc>
+                <a:tc>
+                  <a:txBody>
+                    <a:bodyPr/>
+                    <a:lstStyle/>
+                    <a:p>
+                      <a:pPr marL="0" marR="0" fontAlgn="t">
+                        <a:spcBef>
+                          <a:spcPts val="0"/>
+                        </a:spcBef>
+                        <a:spcAft>
+                          <a:spcPts val="0"/>
+                        </a:spcAft>
+                      </a:pPr>
+                      <a:r>
+                        <a:rPr lang="en-US" sz="2800">
+                          <a:effectLst/>
+                        </a:rPr>
+                        <a:t>Idempotent</a:t>
+                      </a:r>
+                      <a:endParaRPr lang="en-US" sz="2800">
+                        <a:solidFill>
+                          <a:srgbClr val="000000"/>
+                        </a:solidFill>
+                        <a:effectLst/>
+                        <a:latin typeface="Calibri" panose="020F0502020204030204" pitchFamily="34" charset="0"/>
+                      </a:endParaRPr>
+                    </a:p>
+                  </a:txBody>
+                  <a:tcPr marL="50800" marR="50800" marT="50800" marB="50800"/>
+                </a:tc>
+                <a:tc>
+                  <a:txBody>
+                    <a:bodyPr/>
+                    <a:lstStyle/>
+                    <a:p>
+                      <a:pPr marL="0" marR="0" fontAlgn="t">
+                        <a:spcBef>
+                          <a:spcPts val="0"/>
+                        </a:spcBef>
+                        <a:spcAft>
+                          <a:spcPts val="0"/>
+                        </a:spcAft>
+                      </a:pPr>
+                      <a:r>
+                        <a:rPr lang="en-US" sz="2800">
+                          <a:effectLst/>
+                        </a:rPr>
+                        <a:t>Cachable</a:t>
+                      </a:r>
+                      <a:endParaRPr lang="en-US" sz="2800">
+                        <a:solidFill>
+                          <a:srgbClr val="000000"/>
+                        </a:solidFill>
+                        <a:effectLst/>
+                        <a:latin typeface="Calibri" panose="020F0502020204030204" pitchFamily="34" charset="0"/>
+                      </a:endParaRPr>
+                    </a:p>
+                  </a:txBody>
+                  <a:tcPr marL="50800" marR="50800" marT="50800" marB="50800"/>
+                </a:tc>
+              </a:tr>
+              <a:tr h="0">
+                <a:tc>
+                  <a:txBody>
+                    <a:bodyPr/>
+                    <a:lstStyle/>
+                    <a:p>
+                      <a:pPr marL="0" marR="0" fontAlgn="t">
+                        <a:spcBef>
+                          <a:spcPts val="0"/>
+                        </a:spcBef>
+                        <a:spcAft>
+                          <a:spcPts val="0"/>
+                        </a:spcAft>
+                      </a:pPr>
+                      <a:r>
+                        <a:rPr lang="en-US" sz="2800">
+                          <a:effectLst/>
+                        </a:rPr>
+                        <a:t>GET</a:t>
+                      </a:r>
+                      <a:endParaRPr lang="en-US" sz="2800">
+                        <a:solidFill>
+                          <a:srgbClr val="000000"/>
+                        </a:solidFill>
+                        <a:effectLst/>
+                        <a:latin typeface="Calibri" panose="020F0502020204030204" pitchFamily="34" charset="0"/>
+                      </a:endParaRPr>
+                    </a:p>
+                  </a:txBody>
+                  <a:tcPr marL="50800" marR="50800" marT="50800" marB="50800"/>
+                </a:tc>
+                <a:tc>
+                  <a:txBody>
+                    <a:bodyPr/>
+                    <a:lstStyle/>
+                    <a:p>
+                      <a:pPr marL="0" marR="0" fontAlgn="t">
+                        <a:spcBef>
+                          <a:spcPts val="0"/>
+                        </a:spcBef>
+                        <a:spcAft>
+                          <a:spcPts val="0"/>
+                        </a:spcAft>
+                      </a:pPr>
+                      <a:r>
+                        <a:rPr lang="en-US" sz="2800">
+                          <a:effectLst/>
+                        </a:rPr>
+                        <a:t>Yes</a:t>
+                      </a:r>
+                      <a:endParaRPr lang="en-US" sz="2800">
+                        <a:solidFill>
+                          <a:srgbClr val="000000"/>
+                        </a:solidFill>
+                        <a:effectLst/>
+                        <a:latin typeface="Calibri" panose="020F0502020204030204" pitchFamily="34" charset="0"/>
+                      </a:endParaRPr>
+                    </a:p>
+                  </a:txBody>
+                  <a:tcPr marL="50800" marR="50800" marT="50800" marB="50800"/>
+                </a:tc>
+                <a:tc>
+                  <a:txBody>
+                    <a:bodyPr/>
+                    <a:lstStyle/>
+                    <a:p>
+                      <a:pPr marL="0" marR="0" fontAlgn="t">
+                        <a:spcBef>
+                          <a:spcPts val="0"/>
+                        </a:spcBef>
+                        <a:spcAft>
+                          <a:spcPts val="0"/>
+                        </a:spcAft>
+                      </a:pPr>
+                      <a:r>
+                        <a:rPr lang="en-US" sz="2800">
+                          <a:effectLst/>
+                        </a:rPr>
+                        <a:t>Yes</a:t>
+                      </a:r>
+                      <a:endParaRPr lang="en-US" sz="2800">
+                        <a:solidFill>
+                          <a:srgbClr val="000000"/>
+                        </a:solidFill>
+                        <a:effectLst/>
+                        <a:latin typeface="Calibri" panose="020F0502020204030204" pitchFamily="34" charset="0"/>
+                      </a:endParaRPr>
+                    </a:p>
+                  </a:txBody>
+                  <a:tcPr marL="50800" marR="50800" marT="50800" marB="50800"/>
+                </a:tc>
+                <a:tc>
+                  <a:txBody>
+                    <a:bodyPr/>
+                    <a:lstStyle/>
+                    <a:p>
+                      <a:pPr marL="0" marR="0" fontAlgn="t">
+                        <a:spcBef>
+                          <a:spcPts val="0"/>
+                        </a:spcBef>
+                        <a:spcAft>
+                          <a:spcPts val="0"/>
+                        </a:spcAft>
+                      </a:pPr>
+                      <a:r>
+                        <a:rPr lang="en-US" sz="2800">
+                          <a:effectLst/>
+                        </a:rPr>
+                        <a:t>Yes</a:t>
+                      </a:r>
+                      <a:endParaRPr lang="en-US" sz="2800">
+                        <a:solidFill>
+                          <a:srgbClr val="000000"/>
+                        </a:solidFill>
+                        <a:effectLst/>
+                        <a:latin typeface="Calibri" panose="020F0502020204030204" pitchFamily="34" charset="0"/>
+                      </a:endParaRPr>
+                    </a:p>
+                  </a:txBody>
+                  <a:tcPr marL="50800" marR="50800" marT="50800" marB="50800"/>
+                </a:tc>
+              </a:tr>
+              <a:tr h="0">
+                <a:tc>
+                  <a:txBody>
+                    <a:bodyPr/>
+                    <a:lstStyle/>
+                    <a:p>
+                      <a:pPr marL="0" marR="0" fontAlgn="t">
+                        <a:spcBef>
+                          <a:spcPts val="0"/>
+                        </a:spcBef>
+                        <a:spcAft>
+                          <a:spcPts val="0"/>
+                        </a:spcAft>
+                      </a:pPr>
+                      <a:r>
+                        <a:rPr lang="en-US" sz="2800">
+                          <a:effectLst/>
+                        </a:rPr>
+                        <a:t>POST</a:t>
+                      </a:r>
+                      <a:endParaRPr lang="en-US" sz="2800">
+                        <a:solidFill>
+                          <a:srgbClr val="000000"/>
+                        </a:solidFill>
+                        <a:effectLst/>
+                        <a:latin typeface="Calibri" panose="020F0502020204030204" pitchFamily="34" charset="0"/>
+                      </a:endParaRPr>
+                    </a:p>
+                  </a:txBody>
+                  <a:tcPr marL="50800" marR="50800" marT="50800" marB="50800"/>
+                </a:tc>
+                <a:tc>
+                  <a:txBody>
+                    <a:bodyPr/>
+                    <a:lstStyle/>
+                    <a:p>
+                      <a:pPr marL="0" marR="0" fontAlgn="t">
+                        <a:spcBef>
+                          <a:spcPts val="0"/>
+                        </a:spcBef>
+                        <a:spcAft>
+                          <a:spcPts val="0"/>
+                        </a:spcAft>
+                      </a:pPr>
+                      <a:r>
+                        <a:rPr lang="en-US" sz="2800">
+                          <a:effectLst/>
+                        </a:rPr>
+                        <a:t>No</a:t>
+                      </a:r>
+                      <a:endParaRPr lang="en-US" sz="2800">
+                        <a:solidFill>
+                          <a:srgbClr val="000000"/>
+                        </a:solidFill>
+                        <a:effectLst/>
+                        <a:latin typeface="Calibri" panose="020F0502020204030204" pitchFamily="34" charset="0"/>
+                      </a:endParaRPr>
+                    </a:p>
+                  </a:txBody>
+                  <a:tcPr marL="50800" marR="50800" marT="50800" marB="50800"/>
+                </a:tc>
+                <a:tc>
+                  <a:txBody>
+                    <a:bodyPr/>
+                    <a:lstStyle/>
+                    <a:p>
+                      <a:pPr marL="0" marR="0" fontAlgn="t">
+                        <a:spcBef>
+                          <a:spcPts val="0"/>
+                        </a:spcBef>
+                        <a:spcAft>
+                          <a:spcPts val="0"/>
+                        </a:spcAft>
+                      </a:pPr>
+                      <a:r>
+                        <a:rPr lang="en-US" sz="2800">
+                          <a:effectLst/>
+                        </a:rPr>
+                        <a:t>No</a:t>
+                      </a:r>
+                      <a:endParaRPr lang="en-US" sz="2800">
+                        <a:solidFill>
+                          <a:srgbClr val="000000"/>
+                        </a:solidFill>
+                        <a:effectLst/>
+                        <a:latin typeface="Calibri" panose="020F0502020204030204" pitchFamily="34" charset="0"/>
+                      </a:endParaRPr>
+                    </a:p>
+                  </a:txBody>
+                  <a:tcPr marL="50800" marR="50800" marT="50800" marB="50800"/>
+                </a:tc>
+                <a:tc>
+                  <a:txBody>
+                    <a:bodyPr/>
+                    <a:lstStyle/>
+                    <a:p>
+                      <a:pPr marL="0" marR="0" fontAlgn="t">
+                        <a:spcBef>
+                          <a:spcPts val="0"/>
+                        </a:spcBef>
+                        <a:spcAft>
+                          <a:spcPts val="0"/>
+                        </a:spcAft>
+                      </a:pPr>
+                      <a:r>
+                        <a:rPr lang="en-US" sz="2800">
+                          <a:effectLst/>
+                        </a:rPr>
+                        <a:t>No</a:t>
+                      </a:r>
+                      <a:endParaRPr lang="en-US" sz="2800">
+                        <a:solidFill>
+                          <a:srgbClr val="000000"/>
+                        </a:solidFill>
+                        <a:effectLst/>
+                        <a:latin typeface="Calibri" panose="020F0502020204030204" pitchFamily="34" charset="0"/>
+                      </a:endParaRPr>
+                    </a:p>
+                  </a:txBody>
+                  <a:tcPr marL="50800" marR="50800" marT="50800" marB="50800"/>
+                </a:tc>
+              </a:tr>
+              <a:tr h="0">
+                <a:tc>
+                  <a:txBody>
+                    <a:bodyPr/>
+                    <a:lstStyle/>
+                    <a:p>
+                      <a:pPr marL="0" marR="0" fontAlgn="t">
+                        <a:spcBef>
+                          <a:spcPts val="0"/>
+                        </a:spcBef>
+                        <a:spcAft>
+                          <a:spcPts val="0"/>
+                        </a:spcAft>
+                      </a:pPr>
+                      <a:r>
+                        <a:rPr lang="en-US" sz="2800">
+                          <a:effectLst/>
+                        </a:rPr>
+                        <a:t>PUT</a:t>
+                      </a:r>
+                      <a:endParaRPr lang="en-US" sz="2800">
+                        <a:solidFill>
+                          <a:srgbClr val="000000"/>
+                        </a:solidFill>
+                        <a:effectLst/>
+                        <a:latin typeface="Calibri" panose="020F0502020204030204" pitchFamily="34" charset="0"/>
+                      </a:endParaRPr>
+                    </a:p>
+                  </a:txBody>
+                  <a:tcPr marL="50800" marR="50800" marT="50800" marB="50800"/>
+                </a:tc>
+                <a:tc>
+                  <a:txBody>
+                    <a:bodyPr/>
+                    <a:lstStyle/>
+                    <a:p>
+                      <a:pPr marL="0" marR="0" fontAlgn="t">
+                        <a:spcBef>
+                          <a:spcPts val="0"/>
+                        </a:spcBef>
+                        <a:spcAft>
+                          <a:spcPts val="0"/>
+                        </a:spcAft>
+                      </a:pPr>
+                      <a:r>
+                        <a:rPr lang="en-US" sz="2800">
+                          <a:effectLst/>
+                        </a:rPr>
+                        <a:t>No</a:t>
+                      </a:r>
+                      <a:endParaRPr lang="en-US" sz="2800">
+                        <a:solidFill>
+                          <a:srgbClr val="000000"/>
+                        </a:solidFill>
+                        <a:effectLst/>
+                        <a:latin typeface="Calibri" panose="020F0502020204030204" pitchFamily="34" charset="0"/>
+                      </a:endParaRPr>
+                    </a:p>
+                  </a:txBody>
+                  <a:tcPr marL="50800" marR="50800" marT="50800" marB="50800"/>
+                </a:tc>
+                <a:tc>
+                  <a:txBody>
+                    <a:bodyPr/>
+                    <a:lstStyle/>
+                    <a:p>
+                      <a:pPr marL="0" marR="0" fontAlgn="t">
+                        <a:spcBef>
+                          <a:spcPts val="0"/>
+                        </a:spcBef>
+                        <a:spcAft>
+                          <a:spcPts val="0"/>
+                        </a:spcAft>
+                      </a:pPr>
+                      <a:r>
+                        <a:rPr lang="en-US" sz="2800">
+                          <a:effectLst/>
+                        </a:rPr>
+                        <a:t>Yes</a:t>
+                      </a:r>
+                      <a:endParaRPr lang="en-US" sz="2800">
+                        <a:solidFill>
+                          <a:srgbClr val="000000"/>
+                        </a:solidFill>
+                        <a:effectLst/>
+                        <a:latin typeface="Calibri" panose="020F0502020204030204" pitchFamily="34" charset="0"/>
+                      </a:endParaRPr>
+                    </a:p>
+                  </a:txBody>
+                  <a:tcPr marL="50800" marR="50800" marT="50800" marB="50800"/>
+                </a:tc>
+                <a:tc>
+                  <a:txBody>
+                    <a:bodyPr/>
+                    <a:lstStyle/>
+                    <a:p>
+                      <a:pPr marL="0" marR="0" fontAlgn="t">
+                        <a:spcBef>
+                          <a:spcPts val="0"/>
+                        </a:spcBef>
+                        <a:spcAft>
+                          <a:spcPts val="0"/>
+                        </a:spcAft>
+                      </a:pPr>
+                      <a:r>
+                        <a:rPr lang="en-US" sz="2800">
+                          <a:effectLst/>
+                        </a:rPr>
+                        <a:t>No</a:t>
+                      </a:r>
+                      <a:endParaRPr lang="en-US" sz="2800">
+                        <a:solidFill>
+                          <a:srgbClr val="000000"/>
+                        </a:solidFill>
+                        <a:effectLst/>
+                        <a:latin typeface="Calibri" panose="020F0502020204030204" pitchFamily="34" charset="0"/>
+                      </a:endParaRPr>
+                    </a:p>
+                  </a:txBody>
+                  <a:tcPr marL="50800" marR="50800" marT="50800" marB="50800"/>
+                </a:tc>
+              </a:tr>
+              <a:tr h="0">
+                <a:tc>
+                  <a:txBody>
+                    <a:bodyPr/>
+                    <a:lstStyle/>
+                    <a:p>
+                      <a:pPr marL="0" marR="0" fontAlgn="t">
+                        <a:spcBef>
+                          <a:spcPts val="0"/>
+                        </a:spcBef>
+                        <a:spcAft>
+                          <a:spcPts val="0"/>
+                        </a:spcAft>
+                      </a:pPr>
+                      <a:r>
+                        <a:rPr lang="en-US" sz="2800">
+                          <a:effectLst/>
+                        </a:rPr>
+                        <a:t>DELETE</a:t>
+                      </a:r>
+                      <a:endParaRPr lang="en-US" sz="2800">
+                        <a:solidFill>
+                          <a:srgbClr val="000000"/>
+                        </a:solidFill>
+                        <a:effectLst/>
+                        <a:latin typeface="Calibri" panose="020F0502020204030204" pitchFamily="34" charset="0"/>
+                      </a:endParaRPr>
+                    </a:p>
+                  </a:txBody>
+                  <a:tcPr marL="50800" marR="50800" marT="50800" marB="50800"/>
+                </a:tc>
+                <a:tc>
+                  <a:txBody>
+                    <a:bodyPr/>
+                    <a:lstStyle/>
+                    <a:p>
+                      <a:pPr marL="0" marR="0" fontAlgn="t">
+                        <a:spcBef>
+                          <a:spcPts val="0"/>
+                        </a:spcBef>
+                        <a:spcAft>
+                          <a:spcPts val="0"/>
+                        </a:spcAft>
+                      </a:pPr>
+                      <a:r>
+                        <a:rPr lang="en-US" sz="2800" dirty="0">
+                          <a:effectLst/>
+                        </a:rPr>
+                        <a:t>No</a:t>
+                      </a:r>
+                      <a:endParaRPr lang="en-US" sz="2800" dirty="0">
+                        <a:solidFill>
+                          <a:srgbClr val="000000"/>
+                        </a:solidFill>
+                        <a:effectLst/>
+                        <a:latin typeface="Calibri" panose="020F0502020204030204" pitchFamily="34" charset="0"/>
+                      </a:endParaRPr>
+                    </a:p>
+                  </a:txBody>
+                  <a:tcPr marL="50800" marR="50800" marT="50800" marB="50800"/>
+                </a:tc>
+                <a:tc>
+                  <a:txBody>
+                    <a:bodyPr/>
+                    <a:lstStyle/>
+                    <a:p>
+                      <a:pPr marL="0" marR="0" fontAlgn="t">
+                        <a:spcBef>
+                          <a:spcPts val="0"/>
+                        </a:spcBef>
+                        <a:spcAft>
+                          <a:spcPts val="0"/>
+                        </a:spcAft>
+                      </a:pPr>
+                      <a:r>
+                        <a:rPr lang="en-US" sz="2800">
+                          <a:effectLst/>
+                        </a:rPr>
+                        <a:t>Yes</a:t>
+                      </a:r>
+                      <a:endParaRPr lang="en-US" sz="2800">
+                        <a:solidFill>
+                          <a:srgbClr val="000000"/>
+                        </a:solidFill>
+                        <a:effectLst/>
+                        <a:latin typeface="Calibri" panose="020F0502020204030204" pitchFamily="34" charset="0"/>
+                      </a:endParaRPr>
+                    </a:p>
+                  </a:txBody>
+                  <a:tcPr marL="50800" marR="50800" marT="50800" marB="50800"/>
+                </a:tc>
+                <a:tc>
+                  <a:txBody>
+                    <a:bodyPr/>
+                    <a:lstStyle/>
+                    <a:p>
+                      <a:pPr marL="0" marR="0" fontAlgn="t">
+                        <a:spcBef>
+                          <a:spcPts val="0"/>
+                        </a:spcBef>
+                        <a:spcAft>
+                          <a:spcPts val="0"/>
+                        </a:spcAft>
+                      </a:pPr>
+                      <a:r>
+                        <a:rPr lang="en-US" sz="2800" dirty="0">
+                          <a:effectLst/>
+                        </a:rPr>
+                        <a:t>No</a:t>
+                      </a:r>
+                      <a:endParaRPr lang="en-US" sz="2800" dirty="0">
+                        <a:solidFill>
+                          <a:srgbClr val="000000"/>
+                        </a:solidFill>
+                        <a:effectLst/>
+                        <a:latin typeface="Calibri" panose="020F0502020204030204" pitchFamily="34" charset="0"/>
+                      </a:endParaRPr>
+                    </a:p>
+                  </a:txBody>
+                  <a:tcPr marL="50800" marR="50800" marT="50800" marB="50800"/>
+                </a:tc>
+              </a:tr>
+            </a:tbl>
+          </a:graphicData>
+        </a:graphic>
+      </p:graphicFrame>
+    </p:spTree>
+    <p:extLst>
+      <p:ext uri="{BB962C8B-B14F-4D97-AF65-F5344CB8AC3E}">
+        <p14:creationId xmlns:p14="http://schemas.microsoft.com/office/powerpoint/2010/main" val="2266722440"/>
+      </p:ext>
+    </p:extLst>
+  </p:cSld>
+  <p:clrMapOvr>
+    <a:masterClrMapping/>
+  </p:clrMapOvr>
+  <p:timing>
+    <p:tnLst>
+      <p:par>
+        <p:cTn id="1" dur="indefinite" restart="never" nodeType="tmRoot">
+          <p:childTnLst>
+            <p:seq concurrent="1" nextAc="seek">
+              <p:cTn id="2" dur="indefinite" nodeType="mainSeq">
+                <p:childTnLst>
+                  <p:par>
+                    <p:cTn id="3" fill="hold">
+                      <p:stCondLst>
+                        <p:cond delay="indefinite"/>
+                      </p:stCondLst>
+                      <p:childTnLst>
+                        <p:par>
+                          <p:cTn id="4" fill="hold">
+                            <p:stCondLst>
+                              <p:cond delay="0"/>
+                            </p:stCondLst>
+                            <p:childTnLst>
+                              <p:par>
+                                <p:cTn id="5" presetID="42" presetClass="entr" presetSubtype="0" fill="hold" nodeType="clickEffect">
+                                  <p:stCondLst>
+                                    <p:cond delay="0"/>
+                                  </p:stCondLst>
+                                  <p:childTnLst>
+                                    <p:set>
+                                      <p:cBhvr>
+                                        <p:cTn id="6" dur="1" fill="hold">
+                                          <p:stCondLst>
+                                            <p:cond delay="0"/>
+                                          </p:stCondLst>
+                                        </p:cTn>
+                                        <p:tgtEl>
+                                          <p:spTgt spid="4"/>
+                                        </p:tgtEl>
+                                        <p:attrNameLst>
+                                          <p:attrName>style.visibility</p:attrName>
+                                        </p:attrNameLst>
+                                      </p:cBhvr>
+                                      <p:to>
+                                        <p:strVal val="visible"/>
+                                      </p:to>
+                                    </p:set>
+                                    <p:animEffect transition="in" filter="fade">
+                                      <p:cBhvr>
+                                        <p:cTn id="7" dur="1000"/>
+                                        <p:tgtEl>
+                                          <p:spTgt spid="4"/>
+                                        </p:tgtEl>
+                                      </p:cBhvr>
+                                    </p:animEffect>
+                                    <p:anim calcmode="lin" valueType="num">
+                                      <p:cBhvr>
+                                        <p:cTn id="8" dur="1000" fill="hold"/>
+                                        <p:tgtEl>
+                                          <p:spTgt spid="4"/>
+                                        </p:tgtEl>
+                                        <p:attrNameLst>
+                                          <p:attrName>ppt_x</p:attrName>
+                                        </p:attrNameLst>
+                                      </p:cBhvr>
+                                      <p:tavLst>
+                                        <p:tav tm="0">
+                                          <p:val>
+                                            <p:strVal val="#ppt_x"/>
+                                          </p:val>
+                                        </p:tav>
+                                        <p:tav tm="100000">
+                                          <p:val>
+                                            <p:strVal val="#ppt_x"/>
+                                          </p:val>
+                                        </p:tav>
+                                      </p:tavLst>
+                                    </p:anim>
+                                    <p:anim calcmode="lin" valueType="num">
+                                      <p:cBhvr>
+                                        <p:cTn id="9" dur="1000" fill="hold"/>
+                                        <p:tgtEl>
+                                          <p:spTgt spid="4"/>
+                                        </p:tgtEl>
+                                        <p:attrNameLst>
+                                          <p:attrName>ppt_y</p:attrName>
+                                        </p:attrNameLst>
+                                      </p:cBhvr>
+                                      <p:tavLst>
+                                        <p:tav tm="0">
+                                          <p:val>
+                                            <p:strVal val="#ppt_y+.1"/>
+                                          </p:val>
+                                        </p:tav>
+                                        <p:tav tm="100000">
+                                          <p:val>
+                                            <p:strVal val="#ppt_y"/>
+                                          </p:val>
+                                        </p:tav>
+                                      </p:tavLst>
+                                    </p:anim>
+                                  </p:childTnLst>
+                                </p:cTn>
+                              </p:par>
+                            </p:childTnLst>
+                          </p:cTn>
+                        </p:par>
+                      </p:childTnLst>
+                    </p:cTn>
+                  </p:par>
+                </p:childTnLst>
+              </p:cTn>
+              <p:prevCondLst>
+                <p:cond evt="onPrev" delay="0">
+                  <p:tgtEl>
+                    <p:sldTgt/>
+                  </p:tgtEl>
+                </p:cond>
+              </p:prevCondLst>
+              <p:nextCondLst>
+                <p:cond evt="onNext" delay="0">
+                  <p:tgtEl>
+                    <p:sldTgt/>
+                  </p:tgtEl>
+                </p:cond>
+              </p:nextCondLst>
+            </p:seq>
+          </p:childTnLst>
+        </p:cTn>
+      </p:par>
+    </p:tnLst>
+  </p:timing>
+</p:sld>
+</file>
+
+<file path=ppt/slides/slide21.xml><?xml version="1.0" encoding="utf-8"?>
+<p:sld xmlns:a="http://schemas.openxmlformats.org/drawingml/2006/main" xmlns:r="http://schemas.openxmlformats.org/officeDocument/2006/relationships" xmlns:p="http://schemas.openxmlformats.org/presentationml/2006/main">
+  <p:cSld>
+    <p:spTree>
+      <p:nvGrpSpPr>
+        <p:cNvPr id="1" name=""/>
+        <p:cNvGrpSpPr/>
+        <p:nvPr/>
+      </p:nvGrpSpPr>
+      <p:grpSpPr>
+        <a:xfrm>
+          <a:off x="0" y="0"/>
+          <a:ext cx="0" cy="0"/>
+          <a:chOff x="0" y="0"/>
+          <a:chExt cx="0" cy="0"/>
+        </a:xfrm>
+      </p:grpSpPr>
+      <p:sp>
+        <p:nvSpPr>
+          <p:cNvPr id="2" name="Title 1"/>
+          <p:cNvSpPr>
+            <a:spLocks noGrp="1"/>
+          </p:cNvSpPr>
+          <p:nvPr>
+            <p:ph type="title"/>
+          </p:nvPr>
+        </p:nvSpPr>
+        <p:spPr/>
+        <p:txBody>
+          <a:bodyPr/>
+          <a:lstStyle/>
+          <a:p>
+            <a:r>
+              <a:rPr lang="en-US" dirty="0" smtClean="0"/>
+              <a:t>API Design</a:t>
+            </a:r>
+            <a:endParaRPr lang="en-US" dirty="0"/>
+          </a:p>
+        </p:txBody>
+      </p:sp>
+      <p:sp>
+        <p:nvSpPr>
+          <p:cNvPr id="3" name="Content Placeholder 2"/>
+          <p:cNvSpPr>
+            <a:spLocks noGrp="1"/>
+          </p:cNvSpPr>
+          <p:nvPr>
+            <p:ph idx="1"/>
+          </p:nvPr>
+        </p:nvSpPr>
+        <p:spPr/>
+        <p:txBody>
+          <a:bodyPr/>
+          <a:lstStyle/>
+          <a:p>
+            <a:r>
+              <a:rPr lang="en-US" dirty="0" smtClean="0"/>
+              <a:t>URIs</a:t>
+            </a:r>
+          </a:p>
+          <a:p>
+            <a:pPr lvl="1"/>
+            <a:r>
+              <a:rPr lang="en-US" dirty="0" smtClean="0"/>
+              <a:t>Sensible names – using nouns</a:t>
+            </a:r>
+          </a:p>
+          <a:p>
+            <a:pPr lvl="1"/>
+            <a:r>
+              <a:rPr lang="en-US" dirty="0" smtClean="0"/>
+              <a:t>Forward slashes for hierarchical relationships</a:t>
+            </a:r>
+          </a:p>
+          <a:p>
+            <a:pPr lvl="1"/>
+            <a:r>
+              <a:rPr lang="en-US" dirty="0" smtClean="0"/>
+              <a:t>Use dashes in multi-word resource names for readability</a:t>
+            </a:r>
+          </a:p>
+          <a:p>
+            <a:pPr lvl="1"/>
+            <a:r>
+              <a:rPr lang="en-US" dirty="0" smtClean="0"/>
+              <a:t>Consistent use of lowercase resource names</a:t>
+            </a:r>
+          </a:p>
+          <a:p>
+            <a:pPr lvl="1"/>
+            <a:r>
+              <a:rPr lang="en-US" dirty="0" smtClean="0"/>
+              <a:t>Avoid file extensions</a:t>
+            </a:r>
+          </a:p>
+          <a:p>
+            <a:pPr lvl="1"/>
+            <a:r>
+              <a:rPr lang="en-US" dirty="0" smtClean="0"/>
+              <a:t>Fine grained to support caching</a:t>
+            </a:r>
+            <a:endParaRPr lang="en-US" dirty="0"/>
+          </a:p>
+        </p:txBody>
+      </p:sp>
+    </p:spTree>
+    <p:extLst>
+      <p:ext uri="{BB962C8B-B14F-4D97-AF65-F5344CB8AC3E}">
+        <p14:creationId xmlns:p14="http://schemas.microsoft.com/office/powerpoint/2010/main" val="3397459472"/>
+      </p:ext>
+    </p:extLst>
+  </p:cSld>
+  <p:clrMapOvr>
+    <a:masterClrMapping/>
+  </p:clrMapOvr>
+  <p:timing>
+    <p:tnLst>
+      <p:par>
+        <p:cTn id="1" dur="indefinite" restart="never" nodeType="tmRoot"/>
+      </p:par>
+    </p:tnLst>
+  </p:timing>
+</p:sld>
+</file>
+
+<file path=ppt/slides/slide22.xml><?xml version="1.0" encoding="utf-8"?>
+<p:sld xmlns:a="http://schemas.openxmlformats.org/drawingml/2006/main" xmlns:r="http://schemas.openxmlformats.org/officeDocument/2006/relationships" xmlns:p="http://schemas.openxmlformats.org/presentationml/2006/main">
+  <p:cSld>
+    <p:spTree>
+      <p:nvGrpSpPr>
+        <p:cNvPr id="1" name=""/>
+        <p:cNvGrpSpPr/>
+        <p:nvPr/>
+      </p:nvGrpSpPr>
+      <p:grpSpPr>
+        <a:xfrm>
+          <a:off x="0" y="0"/>
+          <a:ext cx="0" cy="0"/>
+          <a:chOff x="0" y="0"/>
+          <a:chExt cx="0" cy="0"/>
+        </a:xfrm>
+      </p:grpSpPr>
+      <p:sp>
+        <p:nvSpPr>
+          <p:cNvPr id="2" name="Title 1"/>
+          <p:cNvSpPr>
+            <a:spLocks noGrp="1"/>
+          </p:cNvSpPr>
+          <p:nvPr>
+            <p:ph type="title"/>
+          </p:nvPr>
+        </p:nvSpPr>
+        <p:spPr/>
+        <p:txBody>
+          <a:bodyPr/>
+          <a:lstStyle/>
+          <a:p>
+            <a:r>
+              <a:rPr lang="en-US" dirty="0" smtClean="0"/>
+              <a:t>API Design</a:t>
+            </a:r>
+            <a:endParaRPr lang="en-US" dirty="0"/>
+          </a:p>
+        </p:txBody>
+      </p:sp>
+      <p:sp>
+        <p:nvSpPr>
+          <p:cNvPr id="3" name="Content Placeholder 2"/>
+          <p:cNvSpPr>
+            <a:spLocks noGrp="1"/>
+          </p:cNvSpPr>
+          <p:nvPr>
+            <p:ph idx="1"/>
+          </p:nvPr>
+        </p:nvSpPr>
+        <p:spPr/>
+        <p:txBody>
+          <a:bodyPr/>
+          <a:lstStyle/>
+          <a:p>
+            <a:r>
+              <a:rPr lang="en-US" dirty="0" smtClean="0"/>
+              <a:t>Representation Formats</a:t>
+            </a:r>
+          </a:p>
+          <a:p>
+            <a:pPr lvl="1"/>
+            <a:r>
+              <a:rPr lang="en-US" dirty="0" smtClean="0"/>
+              <a:t>Choose appropriate media types</a:t>
+            </a:r>
+          </a:p>
+          <a:p>
+            <a:pPr lvl="2"/>
+            <a:r>
+              <a:rPr lang="en-US" dirty="0" smtClean="0"/>
+              <a:t>JSON, XML, domain specific</a:t>
+            </a:r>
+          </a:p>
+          <a:p>
+            <a:pPr lvl="2"/>
+            <a:r>
+              <a:rPr lang="en-US" dirty="0" smtClean="0"/>
+              <a:t>Client indicates preference via Accept header</a:t>
+            </a:r>
+          </a:p>
+          <a:p>
+            <a:pPr lvl="2"/>
+            <a:endParaRPr lang="en-US" dirty="0"/>
+          </a:p>
+        </p:txBody>
+      </p:sp>
+    </p:spTree>
+    <p:extLst>
+      <p:ext uri="{BB962C8B-B14F-4D97-AF65-F5344CB8AC3E}">
+        <p14:creationId xmlns:p14="http://schemas.microsoft.com/office/powerpoint/2010/main" val="4176635382"/>
+      </p:ext>
+    </p:extLst>
+  </p:cSld>
+  <p:clrMapOvr>
+    <a:masterClrMapping/>
+  </p:clrMapOvr>
+  <p:timing>
+    <p:tnLst>
+      <p:par>
+        <p:cTn id="1" dur="indefinite" restart="never" nodeType="tmRoot"/>
+      </p:par>
+    </p:tnLst>
+  </p:timing>
+</p:sld>
+</file>
+
+<file path=ppt/slides/slide23.xml><?xml version="1.0" encoding="utf-8"?>
+<p:sld xmlns:a="http://schemas.openxmlformats.org/drawingml/2006/main" xmlns:r="http://schemas.openxmlformats.org/officeDocument/2006/relationships" xmlns:p="http://schemas.openxmlformats.org/presentationml/2006/main">
+  <p:cSld>
+    <p:spTree>
+      <p:nvGrpSpPr>
+        <p:cNvPr id="1" name=""/>
+        <p:cNvGrpSpPr/>
+        <p:nvPr/>
+      </p:nvGrpSpPr>
+      <p:grpSpPr>
+        <a:xfrm>
+          <a:off x="0" y="0"/>
+          <a:ext cx="0" cy="0"/>
+          <a:chOff x="0" y="0"/>
+          <a:chExt cx="0" cy="0"/>
+        </a:xfrm>
+      </p:grpSpPr>
+      <p:sp>
+        <p:nvSpPr>
+          <p:cNvPr id="2" name="Title 1"/>
+          <p:cNvSpPr>
+            <a:spLocks noGrp="1"/>
+          </p:cNvSpPr>
+          <p:nvPr>
+            <p:ph type="title"/>
+          </p:nvPr>
+        </p:nvSpPr>
+        <p:spPr/>
+        <p:txBody>
+          <a:bodyPr/>
+          <a:lstStyle/>
+          <a:p>
+            <a:r>
+              <a:rPr lang="en-US" dirty="0" smtClean="0"/>
+              <a:t>Caching</a:t>
+            </a:r>
+            <a:endParaRPr lang="en-US" dirty="0"/>
+          </a:p>
+        </p:txBody>
+      </p:sp>
+      <p:sp>
+        <p:nvSpPr>
+          <p:cNvPr id="3" name="Content Placeholder 2"/>
+          <p:cNvSpPr>
+            <a:spLocks noGrp="1"/>
+          </p:cNvSpPr>
+          <p:nvPr>
+            <p:ph idx="1"/>
+          </p:nvPr>
+        </p:nvSpPr>
+        <p:spPr/>
+        <p:txBody>
+          <a:bodyPr/>
+          <a:lstStyle/>
+          <a:p>
+            <a:r>
+              <a:rPr lang="en-US" dirty="0" smtClean="0"/>
+              <a:t>Responses indicate </a:t>
+            </a:r>
+            <a:r>
+              <a:rPr lang="en-US" dirty="0" err="1" smtClean="0"/>
+              <a:t>cachability</a:t>
+            </a:r>
+            <a:r>
+              <a:rPr lang="en-US" dirty="0" smtClean="0"/>
+              <a:t> of result</a:t>
+            </a:r>
+          </a:p>
+          <a:p>
+            <a:pPr lvl="1"/>
+            <a:r>
+              <a:rPr lang="en-US" dirty="0" smtClean="0"/>
+              <a:t>Use Cache-Control header</a:t>
+            </a:r>
+          </a:p>
+          <a:p>
+            <a:pPr lvl="1"/>
+            <a:r>
+              <a:rPr lang="en-US" dirty="0" smtClean="0"/>
+              <a:t>Use Expires header</a:t>
+            </a:r>
+          </a:p>
+          <a:p>
+            <a:pPr lvl="1"/>
+            <a:r>
+              <a:rPr lang="en-US" dirty="0" smtClean="0"/>
+              <a:t>Generate </a:t>
+            </a:r>
+            <a:r>
+              <a:rPr lang="en-US" dirty="0" err="1" smtClean="0"/>
+              <a:t>ETag</a:t>
+            </a:r>
+            <a:r>
+              <a:rPr lang="en-US" dirty="0" smtClean="0"/>
+              <a:t> header</a:t>
+            </a:r>
+          </a:p>
+          <a:p>
+            <a:pPr lvl="1"/>
+            <a:endParaRPr lang="en-US" dirty="0" smtClean="0"/>
+          </a:p>
+          <a:p>
+            <a:pPr lvl="1"/>
+            <a:r>
+              <a:rPr lang="en-US" dirty="0" smtClean="0">
+                <a:hlinkClick r:id="rId2" action="ppaction://hlinkfile"/>
+              </a:rPr>
+              <a:t>Using an </a:t>
+            </a:r>
+            <a:r>
+              <a:rPr lang="en-US" dirty="0" err="1" smtClean="0">
+                <a:hlinkClick r:id="rId2" action="ppaction://hlinkfile"/>
+              </a:rPr>
+              <a:t>ETag</a:t>
+            </a:r>
+            <a:endParaRPr lang="en-US" dirty="0" smtClean="0"/>
+          </a:p>
+        </p:txBody>
+      </p:sp>
+    </p:spTree>
+    <p:extLst>
+      <p:ext uri="{BB962C8B-B14F-4D97-AF65-F5344CB8AC3E}">
+        <p14:creationId xmlns:p14="http://schemas.microsoft.com/office/powerpoint/2010/main" val="3655208942"/>
+      </p:ext>
+    </p:extLst>
+  </p:cSld>
+  <p:clrMapOvr>
+    <a:masterClrMapping/>
+  </p:clrMapOvr>
+  <p:timing>
+    <p:tnLst>
+      <p:par>
+        <p:cTn id="1" dur="indefinite" restart="never" nodeType="tmRoot"/>
+      </p:par>
+    </p:tnLst>
+  </p:timing>
+</p:sld>
+</file>
+
 <file path=ppt/slides/slide3.xml><?xml version="1.0" encoding="utf-8"?>
 <p:sld xmlns:a="http://schemas.openxmlformats.org/drawingml/2006/main" xmlns:r="http://schemas.openxmlformats.org/officeDocument/2006/relationships" xmlns:p="http://schemas.openxmlformats.org/presentationml/2006/main">
   <p:cSld>

</xml_diff>

<commit_message>
Added related information info to presentation
</commit_message>
<xml_diff>
--- a/Presentation/RESTful APIs.pptx
+++ b/Presentation/RESTful APIs.pptx
@@ -28,6 +28,8 @@
     <p:sldId id="276" r:id="rId22"/>
     <p:sldId id="277" r:id="rId23"/>
     <p:sldId id="278" r:id="rId24"/>
+    <p:sldId id="279" r:id="rId25"/>
+    <p:sldId id="280" r:id="rId26"/>
   </p:sldIdLst>
   <p:sldSz cx="12192000" cy="6858000"/>
   <p:notesSz cx="6858000" cy="9144000"/>
@@ -29669,7 +29671,7 @@
                             </p:stCondLst>
                             <p:childTnLst>
                               <p:par>
-                                <p:cTn id="5" presetID="10" presetClass="entr" presetSubtype="0" fill="hold" nodeType="clickEffect">
+                                <p:cTn id="5" presetID="1" presetClass="entr" presetSubtype="0" fill="hold" nodeType="clickEffect">
                                   <p:stCondLst>
                                     <p:cond delay="0"/>
                                   </p:stCondLst>
@@ -29677,6 +29679,153 @@
                                     <p:set>
                                       <p:cBhvr>
                                         <p:cTn id="6" dur="1" fill="hold">
+                                          <p:stCondLst>
+                                            <p:cond delay="0"/>
+                                          </p:stCondLst>
+                                        </p:cTn>
+                                        <p:tgtEl>
+                                          <p:spTgt spid="3">
+                                            <p:txEl>
+                                              <p:pRg st="1" end="1"/>
+                                            </p:txEl>
+                                          </p:spTgt>
+                                        </p:tgtEl>
+                                        <p:attrNameLst>
+                                          <p:attrName>style.visibility</p:attrName>
+                                        </p:attrNameLst>
+                                      </p:cBhvr>
+                                      <p:to>
+                                        <p:strVal val="visible"/>
+                                      </p:to>
+                                    </p:set>
+                                  </p:childTnLst>
+                                </p:cTn>
+                              </p:par>
+                            </p:childTnLst>
+                          </p:cTn>
+                        </p:par>
+                      </p:childTnLst>
+                    </p:cTn>
+                  </p:par>
+                  <p:par>
+                    <p:cTn id="7" fill="hold">
+                      <p:stCondLst>
+                        <p:cond delay="indefinite"/>
+                      </p:stCondLst>
+                      <p:childTnLst>
+                        <p:par>
+                          <p:cTn id="8" fill="hold">
+                            <p:stCondLst>
+                              <p:cond delay="0"/>
+                            </p:stCondLst>
+                            <p:childTnLst>
+                              <p:par>
+                                <p:cTn id="9" presetID="1" presetClass="entr" presetSubtype="0" fill="hold" nodeType="clickEffect">
+                                  <p:stCondLst>
+                                    <p:cond delay="0"/>
+                                  </p:stCondLst>
+                                  <p:childTnLst>
+                                    <p:set>
+                                      <p:cBhvr>
+                                        <p:cTn id="10" dur="1" fill="hold">
+                                          <p:stCondLst>
+                                            <p:cond delay="0"/>
+                                          </p:stCondLst>
+                                        </p:cTn>
+                                        <p:tgtEl>
+                                          <p:spTgt spid="3">
+                                            <p:txEl>
+                                              <p:pRg st="2" end="2"/>
+                                            </p:txEl>
+                                          </p:spTgt>
+                                        </p:tgtEl>
+                                        <p:attrNameLst>
+                                          <p:attrName>style.visibility</p:attrName>
+                                        </p:attrNameLst>
+                                      </p:cBhvr>
+                                      <p:to>
+                                        <p:strVal val="visible"/>
+                                      </p:to>
+                                    </p:set>
+                                  </p:childTnLst>
+                                </p:cTn>
+                              </p:par>
+                            </p:childTnLst>
+                          </p:cTn>
+                        </p:par>
+                      </p:childTnLst>
+                    </p:cTn>
+                  </p:par>
+                  <p:par>
+                    <p:cTn id="11" fill="hold">
+                      <p:stCondLst>
+                        <p:cond delay="indefinite"/>
+                      </p:stCondLst>
+                      <p:childTnLst>
+                        <p:par>
+                          <p:cTn id="12" fill="hold">
+                            <p:stCondLst>
+                              <p:cond delay="0"/>
+                            </p:stCondLst>
+                            <p:childTnLst>
+                              <p:par>
+                                <p:cTn id="13" presetID="1" presetClass="entr" presetSubtype="0" fill="hold" nodeType="clickEffect">
+                                  <p:stCondLst>
+                                    <p:cond delay="0"/>
+                                  </p:stCondLst>
+                                  <p:childTnLst>
+                                    <p:set>
+                                      <p:cBhvr>
+                                        <p:cTn id="14" dur="1" fill="hold">
+                                          <p:stCondLst>
+                                            <p:cond delay="0"/>
+                                          </p:stCondLst>
+                                        </p:cTn>
+                                        <p:tgtEl>
+                                          <p:spTgt spid="3">
+                                            <p:txEl>
+                                              <p:pRg st="3" end="3"/>
+                                            </p:txEl>
+                                          </p:spTgt>
+                                        </p:tgtEl>
+                                        <p:attrNameLst>
+                                          <p:attrName>style.visibility</p:attrName>
+                                        </p:attrNameLst>
+                                      </p:cBhvr>
+                                      <p:to>
+                                        <p:strVal val="visible"/>
+                                      </p:to>
+                                    </p:set>
+                                  </p:childTnLst>
+                                </p:cTn>
+                              </p:par>
+                            </p:childTnLst>
+                          </p:cTn>
+                        </p:par>
+                      </p:childTnLst>
+                    </p:cTn>
+                  </p:par>
+                  <p:par>
+                    <p:cTn id="15" fill="hold">
+                      <p:stCondLst>
+                        <p:cond delay="indefinite"/>
+                      </p:stCondLst>
+                      <p:childTnLst>
+                        <p:par>
+                          <p:cTn id="16" fill="hold">
+                            <p:stCondLst>
+                              <p:cond delay="0"/>
+                            </p:stCondLst>
+                            <p:childTnLst>
+                              <p:par>
+                                <p:cTn id="17" presetID="10" presetClass="entr" presetSubtype="0" fill="hold" nodeType="clickEffect">
+                                  <p:stCondLst>
+                                    <p:cond delay="0"/>
+                                  </p:stCondLst>
+                                  <p:childTnLst>
+                                    <p:set>
+                                      <p:cBhvr>
+                                        <p:cTn id="18" dur="1" fill="hold">
                                           <p:stCondLst>
                                             <p:cond delay="0"/>
                                           </p:stCondLst>
@@ -29694,7 +29843,7 @@
                                     </p:set>
                                     <p:animEffect transition="in" filter="fade">
                                       <p:cBhvr>
-                                        <p:cTn id="7" dur="500"/>
+                                        <p:cTn id="19" dur="500"/>
                                         <p:tgtEl>
                                           <p:spTgt spid="1026"/>
                                         </p:tgtEl>
@@ -29836,7 +29985,177 @@
   <p:timing>
     <p:tnLst>
       <p:par>
-        <p:cTn id="1" dur="indefinite" restart="never" nodeType="tmRoot"/>
+        <p:cTn id="1" dur="indefinite" restart="never" nodeType="tmRoot">
+          <p:childTnLst>
+            <p:seq concurrent="1" nextAc="seek">
+              <p:cTn id="2" dur="indefinite" nodeType="mainSeq">
+                <p:childTnLst>
+                  <p:par>
+                    <p:cTn id="3" fill="hold">
+                      <p:stCondLst>
+                        <p:cond delay="indefinite"/>
+                      </p:stCondLst>
+                      <p:childTnLst>
+                        <p:par>
+                          <p:cTn id="4" fill="hold">
+                            <p:stCondLst>
+                              <p:cond delay="0"/>
+                            </p:stCondLst>
+                            <p:childTnLst>
+                              <p:par>
+                                <p:cTn id="5" presetID="1" presetClass="entr" presetSubtype="0" fill="hold" nodeType="clickEffect">
+                                  <p:stCondLst>
+                                    <p:cond delay="0"/>
+                                  </p:stCondLst>
+                                  <p:childTnLst>
+                                    <p:set>
+                                      <p:cBhvr>
+                                        <p:cTn id="6" dur="1" fill="hold">
+                                          <p:stCondLst>
+                                            <p:cond delay="0"/>
+                                          </p:stCondLst>
+                                        </p:cTn>
+                                        <p:tgtEl>
+                                          <p:spTgt spid="3">
+                                            <p:txEl>
+                                              <p:pRg st="1" end="1"/>
+                                            </p:txEl>
+                                          </p:spTgt>
+                                        </p:tgtEl>
+                                        <p:attrNameLst>
+                                          <p:attrName>style.visibility</p:attrName>
+                                        </p:attrNameLst>
+                                      </p:cBhvr>
+                                      <p:to>
+                                        <p:strVal val="visible"/>
+                                      </p:to>
+                                    </p:set>
+                                  </p:childTnLst>
+                                </p:cTn>
+                              </p:par>
+                            </p:childTnLst>
+                          </p:cTn>
+                        </p:par>
+                      </p:childTnLst>
+                    </p:cTn>
+                  </p:par>
+                  <p:par>
+                    <p:cTn id="7" fill="hold">
+                      <p:stCondLst>
+                        <p:cond delay="indefinite"/>
+                      </p:stCondLst>
+                      <p:childTnLst>
+                        <p:par>
+                          <p:cTn id="8" fill="hold">
+                            <p:stCondLst>
+                              <p:cond delay="0"/>
+                            </p:stCondLst>
+                            <p:childTnLst>
+                              <p:par>
+                                <p:cTn id="9" presetID="1" presetClass="entr" presetSubtype="0" fill="hold" nodeType="clickEffect">
+                                  <p:stCondLst>
+                                    <p:cond delay="0"/>
+                                  </p:stCondLst>
+                                  <p:childTnLst>
+                                    <p:set>
+                                      <p:cBhvr>
+                                        <p:cTn id="10" dur="1" fill="hold">
+                                          <p:stCondLst>
+                                            <p:cond delay="0"/>
+                                          </p:stCondLst>
+                                        </p:cTn>
+                                        <p:tgtEl>
+                                          <p:spTgt spid="3">
+                                            <p:txEl>
+                                              <p:pRg st="2" end="2"/>
+                                            </p:txEl>
+                                          </p:spTgt>
+                                        </p:tgtEl>
+                                        <p:attrNameLst>
+                                          <p:attrName>style.visibility</p:attrName>
+                                        </p:attrNameLst>
+                                      </p:cBhvr>
+                                      <p:to>
+                                        <p:strVal val="visible"/>
+                                      </p:to>
+                                    </p:set>
+                                  </p:childTnLst>
+                                </p:cTn>
+                              </p:par>
+                            </p:childTnLst>
+                          </p:cTn>
+                        </p:par>
+                      </p:childTnLst>
+                    </p:cTn>
+                  </p:par>
+                  <p:par>
+                    <p:cTn id="11" fill="hold">
+                      <p:stCondLst>
+                        <p:cond delay="indefinite"/>
+                      </p:stCondLst>
+                      <p:childTnLst>
+                        <p:par>
+                          <p:cTn id="12" fill="hold">
+                            <p:stCondLst>
+                              <p:cond delay="0"/>
+                            </p:stCondLst>
+                            <p:childTnLst>
+                              <p:par>
+                                <p:cTn id="13" presetID="1" presetClass="entr" presetSubtype="0" fill="hold" nodeType="clickEffect">
+                                  <p:stCondLst>
+                                    <p:cond delay="0"/>
+                                  </p:stCondLst>
+                                  <p:childTnLst>
+                                    <p:set>
+                                      <p:cBhvr>
+                                        <p:cTn id="14" dur="1" fill="hold">
+                                          <p:stCondLst>
+                                            <p:cond delay="0"/>
+                                          </p:stCondLst>
+                                        </p:cTn>
+                                        <p:tgtEl>
+                                          <p:spTgt spid="3">
+                                            <p:txEl>
+                                              <p:pRg st="3" end="3"/>
+                                            </p:txEl>
+                                          </p:spTgt>
+                                        </p:tgtEl>
+                                        <p:attrNameLst>
+                                          <p:attrName>style.visibility</p:attrName>
+                                        </p:attrNameLst>
+                                      </p:cBhvr>
+                                      <p:to>
+                                        <p:strVal val="visible"/>
+                                      </p:to>
+                                    </p:set>
+                                  </p:childTnLst>
+                                </p:cTn>
+                              </p:par>
+                            </p:childTnLst>
+                          </p:cTn>
+                        </p:par>
+                      </p:childTnLst>
+                    </p:cTn>
+                  </p:par>
+                </p:childTnLst>
+              </p:cTn>
+              <p:prevCondLst>
+                <p:cond evt="onPrev" delay="0">
+                  <p:tgtEl>
+                    <p:sldTgt/>
+                  </p:tgtEl>
+                </p:cond>
+              </p:prevCondLst>
+              <p:nextCondLst>
+                <p:cond evt="onNext" delay="0">
+                  <p:tgtEl>
+                    <p:sldTgt/>
+                  </p:tgtEl>
+                </p:cond>
+              </p:nextCondLst>
+            </p:seq>
+          </p:childTnLst>
+        </p:cTn>
       </p:par>
     </p:tnLst>
   </p:timing>
@@ -30360,9 +30679,10 @@
           <a:lstStyle/>
           <a:p>
             <a:r>
-              <a:rPr lang="en-US" dirty="0"/>
-              <a:t>SOAP methods</a:t>
+              <a:rPr lang="en-US" dirty="0" smtClean="0"/>
+              <a:t>REST Requests</a:t>
             </a:r>
+            <a:endParaRPr lang="en-US" dirty="0"/>
           </a:p>
           <a:p>
             <a:pPr marL="400050" lvl="1" indent="0">
@@ -32810,7 +33130,371 @@
               <a:rPr lang="en-US" dirty="0" err="1" smtClean="0">
                 <a:hlinkClick r:id="rId2" action="ppaction://hlinkfile"/>
               </a:rPr>
-              <a:t>ETag</a:t>
+              <a:t>Etag</a:t>
+            </a:r>
+            <a:endParaRPr lang="en-US" dirty="0" smtClean="0"/>
+          </a:p>
+          <a:p>
+            <a:pPr lvl="1"/>
+            <a:endParaRPr lang="en-US" dirty="0"/>
+          </a:p>
+          <a:p>
+            <a:pPr lvl="1"/>
+            <a:r>
+              <a:rPr lang="en-US" dirty="0" smtClean="0"/>
+              <a:t>Use for GET &amp; PUT</a:t>
+            </a:r>
+          </a:p>
+        </p:txBody>
+      </p:sp>
+    </p:spTree>
+    <p:extLst>
+      <p:ext uri="{BB962C8B-B14F-4D97-AF65-F5344CB8AC3E}">
+        <p14:creationId xmlns:p14="http://schemas.microsoft.com/office/powerpoint/2010/main" val="3655208942"/>
+      </p:ext>
+    </p:extLst>
+  </p:cSld>
+  <p:clrMapOvr>
+    <a:masterClrMapping/>
+  </p:clrMapOvr>
+  <p:timing>
+    <p:tnLst>
+      <p:par>
+        <p:cTn id="1" dur="indefinite" restart="never" nodeType="tmRoot"/>
+      </p:par>
+    </p:tnLst>
+  </p:timing>
+</p:sld>
+</file>
+
+<file path=ppt/slides/slide24.xml><?xml version="1.0" encoding="utf-8"?>
+<p:sld xmlns:a="http://schemas.openxmlformats.org/drawingml/2006/main" xmlns:r="http://schemas.openxmlformats.org/officeDocument/2006/relationships" xmlns:p="http://schemas.openxmlformats.org/presentationml/2006/main">
+  <p:cSld>
+    <p:spTree>
+      <p:nvGrpSpPr>
+        <p:cNvPr id="1" name=""/>
+        <p:cNvGrpSpPr/>
+        <p:nvPr/>
+      </p:nvGrpSpPr>
+      <p:grpSpPr>
+        <a:xfrm>
+          <a:off x="0" y="0"/>
+          <a:ext cx="0" cy="0"/>
+          <a:chOff x="0" y="0"/>
+          <a:chExt cx="0" cy="0"/>
+        </a:xfrm>
+      </p:grpSpPr>
+      <p:sp>
+        <p:nvSpPr>
+          <p:cNvPr id="2" name="Title 1"/>
+          <p:cNvSpPr>
+            <a:spLocks noGrp="1"/>
+          </p:cNvSpPr>
+          <p:nvPr>
+            <p:ph type="title"/>
+          </p:nvPr>
+        </p:nvSpPr>
+        <p:spPr/>
+        <p:txBody>
+          <a:bodyPr/>
+          <a:lstStyle/>
+          <a:p>
+            <a:r>
+              <a:rPr lang="en-US" dirty="0" smtClean="0"/>
+              <a:t>Caching – Why??</a:t>
+            </a:r>
+            <a:endParaRPr lang="en-US" dirty="0"/>
+          </a:p>
+        </p:txBody>
+      </p:sp>
+      <p:sp>
+        <p:nvSpPr>
+          <p:cNvPr id="3" name="Content Placeholder 2"/>
+          <p:cNvSpPr>
+            <a:spLocks noGrp="1"/>
+          </p:cNvSpPr>
+          <p:nvPr>
+            <p:ph idx="1"/>
+          </p:nvPr>
+        </p:nvSpPr>
+        <p:spPr/>
+        <p:txBody>
+          <a:bodyPr/>
+          <a:lstStyle/>
+          <a:p>
+            <a:r>
+              <a:rPr lang="en-US" dirty="0" smtClean="0"/>
+              <a:t>The internet caches</a:t>
+            </a:r>
+          </a:p>
+          <a:p>
+            <a:r>
+              <a:rPr lang="en-US" dirty="0" smtClean="0"/>
+              <a:t>Some requests are expensive</a:t>
+            </a:r>
+          </a:p>
+          <a:p>
+            <a:r>
+              <a:rPr lang="en-US" dirty="0" smtClean="0"/>
+              <a:t>Increase throughput</a:t>
+            </a:r>
+            <a:endParaRPr lang="en-US" dirty="0"/>
+          </a:p>
+        </p:txBody>
+      </p:sp>
+    </p:spTree>
+    <p:extLst>
+      <p:ext uri="{BB962C8B-B14F-4D97-AF65-F5344CB8AC3E}">
+        <p14:creationId xmlns:p14="http://schemas.microsoft.com/office/powerpoint/2010/main" val="197168919"/>
+      </p:ext>
+    </p:extLst>
+  </p:cSld>
+  <p:clrMapOvr>
+    <a:masterClrMapping/>
+  </p:clrMapOvr>
+  <p:timing>
+    <p:tnLst>
+      <p:par>
+        <p:cTn id="1" dur="indefinite" restart="never" nodeType="tmRoot">
+          <p:childTnLst>
+            <p:seq concurrent="1" nextAc="seek">
+              <p:cTn id="2" dur="indefinite" nodeType="mainSeq">
+                <p:childTnLst>
+                  <p:par>
+                    <p:cTn id="3" fill="hold">
+                      <p:stCondLst>
+                        <p:cond delay="indefinite"/>
+                      </p:stCondLst>
+                      <p:childTnLst>
+                        <p:par>
+                          <p:cTn id="4" fill="hold">
+                            <p:stCondLst>
+                              <p:cond delay="0"/>
+                            </p:stCondLst>
+                            <p:childTnLst>
+                              <p:par>
+                                <p:cTn id="5" presetID="1" presetClass="entr" presetSubtype="0" fill="hold" grpId="0" nodeType="clickEffect">
+                                  <p:stCondLst>
+                                    <p:cond delay="0"/>
+                                  </p:stCondLst>
+                                  <p:childTnLst>
+                                    <p:set>
+                                      <p:cBhvr>
+                                        <p:cTn id="6" dur="1" fill="hold">
+                                          <p:stCondLst>
+                                            <p:cond delay="0"/>
+                                          </p:stCondLst>
+                                        </p:cTn>
+                                        <p:tgtEl>
+                                          <p:spTgt spid="3">
+                                            <p:txEl>
+                                              <p:pRg st="0" end="0"/>
+                                            </p:txEl>
+                                          </p:spTgt>
+                                        </p:tgtEl>
+                                        <p:attrNameLst>
+                                          <p:attrName>style.visibility</p:attrName>
+                                        </p:attrNameLst>
+                                      </p:cBhvr>
+                                      <p:to>
+                                        <p:strVal val="visible"/>
+                                      </p:to>
+                                    </p:set>
+                                  </p:childTnLst>
+                                </p:cTn>
+                              </p:par>
+                            </p:childTnLst>
+                          </p:cTn>
+                        </p:par>
+                      </p:childTnLst>
+                    </p:cTn>
+                  </p:par>
+                  <p:par>
+                    <p:cTn id="7" fill="hold">
+                      <p:stCondLst>
+                        <p:cond delay="indefinite"/>
+                      </p:stCondLst>
+                      <p:childTnLst>
+                        <p:par>
+                          <p:cTn id="8" fill="hold">
+                            <p:stCondLst>
+                              <p:cond delay="0"/>
+                            </p:stCondLst>
+                            <p:childTnLst>
+                              <p:par>
+                                <p:cTn id="9" presetID="1" presetClass="entr" presetSubtype="0" fill="hold" grpId="0" nodeType="clickEffect">
+                                  <p:stCondLst>
+                                    <p:cond delay="0"/>
+                                  </p:stCondLst>
+                                  <p:childTnLst>
+                                    <p:set>
+                                      <p:cBhvr>
+                                        <p:cTn id="10" dur="1" fill="hold">
+                                          <p:stCondLst>
+                                            <p:cond delay="0"/>
+                                          </p:stCondLst>
+                                        </p:cTn>
+                                        <p:tgtEl>
+                                          <p:spTgt spid="3">
+                                            <p:txEl>
+                                              <p:pRg st="1" end="1"/>
+                                            </p:txEl>
+                                          </p:spTgt>
+                                        </p:tgtEl>
+                                        <p:attrNameLst>
+                                          <p:attrName>style.visibility</p:attrName>
+                                        </p:attrNameLst>
+                                      </p:cBhvr>
+                                      <p:to>
+                                        <p:strVal val="visible"/>
+                                      </p:to>
+                                    </p:set>
+                                  </p:childTnLst>
+                                </p:cTn>
+                              </p:par>
+                            </p:childTnLst>
+                          </p:cTn>
+                        </p:par>
+                      </p:childTnLst>
+                    </p:cTn>
+                  </p:par>
+                  <p:par>
+                    <p:cTn id="11" fill="hold">
+                      <p:stCondLst>
+                        <p:cond delay="indefinite"/>
+                      </p:stCondLst>
+                      <p:childTnLst>
+                        <p:par>
+                          <p:cTn id="12" fill="hold">
+                            <p:stCondLst>
+                              <p:cond delay="0"/>
+                            </p:stCondLst>
+                            <p:childTnLst>
+                              <p:par>
+                                <p:cTn id="13" presetID="1" presetClass="entr" presetSubtype="0" fill="hold" grpId="0" nodeType="clickEffect">
+                                  <p:stCondLst>
+                                    <p:cond delay="0"/>
+                                  </p:stCondLst>
+                                  <p:childTnLst>
+                                    <p:set>
+                                      <p:cBhvr>
+                                        <p:cTn id="14" dur="1" fill="hold">
+                                          <p:stCondLst>
+                                            <p:cond delay="0"/>
+                                          </p:stCondLst>
+                                        </p:cTn>
+                                        <p:tgtEl>
+                                          <p:spTgt spid="3">
+                                            <p:txEl>
+                                              <p:pRg st="2" end="2"/>
+                                            </p:txEl>
+                                          </p:spTgt>
+                                        </p:tgtEl>
+                                        <p:attrNameLst>
+                                          <p:attrName>style.visibility</p:attrName>
+                                        </p:attrNameLst>
+                                      </p:cBhvr>
+                                      <p:to>
+                                        <p:strVal val="visible"/>
+                                      </p:to>
+                                    </p:set>
+                                  </p:childTnLst>
+                                </p:cTn>
+                              </p:par>
+                            </p:childTnLst>
+                          </p:cTn>
+                        </p:par>
+                      </p:childTnLst>
+                    </p:cTn>
+                  </p:par>
+                </p:childTnLst>
+              </p:cTn>
+              <p:prevCondLst>
+                <p:cond evt="onPrev" delay="0">
+                  <p:tgtEl>
+                    <p:sldTgt/>
+                  </p:tgtEl>
+                </p:cond>
+              </p:prevCondLst>
+              <p:nextCondLst>
+                <p:cond evt="onNext" delay="0">
+                  <p:tgtEl>
+                    <p:sldTgt/>
+                  </p:tgtEl>
+                </p:cond>
+              </p:nextCondLst>
+            </p:seq>
+          </p:childTnLst>
+        </p:cTn>
+      </p:par>
+    </p:tnLst>
+    <p:bldLst>
+      <p:bldP spid="3" grpId="0" build="p"/>
+    </p:bldLst>
+  </p:timing>
+</p:sld>
+</file>
+
+<file path=ppt/slides/slide25.xml><?xml version="1.0" encoding="utf-8"?>
+<p:sld xmlns:a="http://schemas.openxmlformats.org/drawingml/2006/main" xmlns:r="http://schemas.openxmlformats.org/officeDocument/2006/relationships" xmlns:p="http://schemas.openxmlformats.org/presentationml/2006/main">
+  <p:cSld>
+    <p:spTree>
+      <p:nvGrpSpPr>
+        <p:cNvPr id="1" name=""/>
+        <p:cNvGrpSpPr/>
+        <p:nvPr/>
+      </p:nvGrpSpPr>
+      <p:grpSpPr>
+        <a:xfrm>
+          <a:off x="0" y="0"/>
+          <a:ext cx="0" cy="0"/>
+          <a:chOff x="0" y="0"/>
+          <a:chExt cx="0" cy="0"/>
+        </a:xfrm>
+      </p:grpSpPr>
+      <p:sp>
+        <p:nvSpPr>
+          <p:cNvPr id="2" name="Title 1"/>
+          <p:cNvSpPr>
+            <a:spLocks noGrp="1"/>
+          </p:cNvSpPr>
+          <p:nvPr>
+            <p:ph type="title"/>
+          </p:nvPr>
+        </p:nvSpPr>
+        <p:spPr/>
+        <p:txBody>
+          <a:bodyPr/>
+          <a:lstStyle/>
+          <a:p>
+            <a:r>
+              <a:rPr lang="en-US" dirty="0" smtClean="0"/>
+              <a:t>Related Info In Results</a:t>
+            </a:r>
+            <a:endParaRPr lang="en-US" dirty="0"/>
+          </a:p>
+        </p:txBody>
+      </p:sp>
+      <p:sp>
+        <p:nvSpPr>
+          <p:cNvPr id="3" name="Content Placeholder 2"/>
+          <p:cNvSpPr>
+            <a:spLocks noGrp="1"/>
+          </p:cNvSpPr>
+          <p:nvPr>
+            <p:ph idx="1"/>
+          </p:nvPr>
+        </p:nvSpPr>
+        <p:spPr/>
+        <p:txBody>
+          <a:bodyPr/>
+          <a:lstStyle/>
+          <a:p>
+            <a:r>
+              <a:rPr lang="en-US" dirty="0" smtClean="0">
+                <a:hlinkClick r:id="rId2" action="ppaction://hlinkfile"/>
+              </a:rPr>
+              <a:t>Favor links instead of related keys</a:t>
             </a:r>
             <a:endParaRPr lang="en-US" dirty="0" smtClean="0"/>
           </a:p>
@@ -32819,7 +33503,7 @@
     </p:spTree>
     <p:extLst>
       <p:ext uri="{BB962C8B-B14F-4D97-AF65-F5344CB8AC3E}">
-        <p14:creationId xmlns:p14="http://schemas.microsoft.com/office/powerpoint/2010/main" val="3655208942"/>
+        <p14:creationId xmlns:p14="http://schemas.microsoft.com/office/powerpoint/2010/main" val="3896238050"/>
       </p:ext>
     </p:extLst>
   </p:cSld>

</xml_diff>

<commit_message>
Added video to presentation
</commit_message>
<xml_diff>
--- a/Presentation/RESTful APIs.pptx
+++ b/Presentation/RESTful APIs.pptx
@@ -8,28 +8,29 @@
     <p:sldId id="256" r:id="rId2"/>
     <p:sldId id="270" r:id="rId3"/>
     <p:sldId id="257" r:id="rId4"/>
-    <p:sldId id="258" r:id="rId5"/>
-    <p:sldId id="259" r:id="rId6"/>
-    <p:sldId id="260" r:id="rId7"/>
-    <p:sldId id="261" r:id="rId8"/>
-    <p:sldId id="262" r:id="rId9"/>
-    <p:sldId id="263" r:id="rId10"/>
-    <p:sldId id="264" r:id="rId11"/>
-    <p:sldId id="265" r:id="rId12"/>
-    <p:sldId id="266" r:id="rId13"/>
-    <p:sldId id="267" r:id="rId14"/>
-    <p:sldId id="268" r:id="rId15"/>
-    <p:sldId id="269" r:id="rId16"/>
-    <p:sldId id="271" r:id="rId17"/>
-    <p:sldId id="272" r:id="rId18"/>
-    <p:sldId id="273" r:id="rId19"/>
-    <p:sldId id="274" r:id="rId20"/>
-    <p:sldId id="275" r:id="rId21"/>
-    <p:sldId id="276" r:id="rId22"/>
-    <p:sldId id="277" r:id="rId23"/>
-    <p:sldId id="278" r:id="rId24"/>
-    <p:sldId id="279" r:id="rId25"/>
-    <p:sldId id="280" r:id="rId26"/>
+    <p:sldId id="281" r:id="rId5"/>
+    <p:sldId id="258" r:id="rId6"/>
+    <p:sldId id="259" r:id="rId7"/>
+    <p:sldId id="260" r:id="rId8"/>
+    <p:sldId id="261" r:id="rId9"/>
+    <p:sldId id="262" r:id="rId10"/>
+    <p:sldId id="263" r:id="rId11"/>
+    <p:sldId id="264" r:id="rId12"/>
+    <p:sldId id="265" r:id="rId13"/>
+    <p:sldId id="266" r:id="rId14"/>
+    <p:sldId id="267" r:id="rId15"/>
+    <p:sldId id="268" r:id="rId16"/>
+    <p:sldId id="269" r:id="rId17"/>
+    <p:sldId id="271" r:id="rId18"/>
+    <p:sldId id="272" r:id="rId19"/>
+    <p:sldId id="273" r:id="rId20"/>
+    <p:sldId id="274" r:id="rId21"/>
+    <p:sldId id="275" r:id="rId22"/>
+    <p:sldId id="276" r:id="rId23"/>
+    <p:sldId id="277" r:id="rId24"/>
+    <p:sldId id="278" r:id="rId25"/>
+    <p:sldId id="279" r:id="rId26"/>
+    <p:sldId id="280" r:id="rId27"/>
   </p:sldIdLst>
   <p:sldSz cx="12192000" cy="6858000"/>
   <p:notesSz cx="6858000" cy="9144000"/>
@@ -29540,6 +29541,149 @@
           <a:lstStyle/>
           <a:p>
             <a:r>
+              <a:rPr lang="en-US" dirty="0"/>
+              <a:t>Uniform Interface</a:t>
+            </a:r>
+          </a:p>
+          <a:p>
+            <a:pPr lvl="1"/>
+            <a:r>
+              <a:rPr lang="en-US" dirty="0"/>
+              <a:t>Resource based</a:t>
+            </a:r>
+          </a:p>
+          <a:p>
+            <a:pPr lvl="2"/>
+            <a:r>
+              <a:rPr lang="en-US" dirty="0"/>
+              <a:t>HTTP verbs</a:t>
+            </a:r>
+          </a:p>
+          <a:p>
+            <a:pPr lvl="2"/>
+            <a:r>
+              <a:rPr lang="en-US" dirty="0"/>
+              <a:t>POST, PUT, GET, DELETE, HEAD (for conditional GETs)</a:t>
+            </a:r>
+          </a:p>
+          <a:p>
+            <a:pPr lvl="2"/>
+            <a:r>
+              <a:rPr lang="en-US" dirty="0"/>
+              <a:t>Generally ignore others, e.g. OPTIONS, PATCH and TRACE</a:t>
+            </a:r>
+          </a:p>
+          <a:p>
+            <a:pPr lvl="1"/>
+            <a:r>
+              <a:rPr lang="en-US" dirty="0"/>
+              <a:t>HTTP result codes</a:t>
+            </a:r>
+          </a:p>
+          <a:p>
+            <a:pPr lvl="1"/>
+            <a:r>
+              <a:rPr lang="en-US" dirty="0"/>
+              <a:t>Self-descriptive </a:t>
+            </a:r>
+            <a:r>
+              <a:rPr lang="en-US" dirty="0" smtClean="0"/>
+              <a:t>messages</a:t>
+            </a:r>
+          </a:p>
+          <a:p>
+            <a:pPr lvl="1"/>
+            <a:r>
+              <a:rPr lang="en-US" dirty="0" smtClean="0"/>
+              <a:t>Generalized media types</a:t>
+            </a:r>
+            <a:endParaRPr lang="en-US" dirty="0"/>
+          </a:p>
+          <a:p>
+            <a:pPr lvl="1"/>
+            <a:endParaRPr lang="en-US" dirty="0"/>
+          </a:p>
+          <a:p>
+            <a:endParaRPr lang="en-US" dirty="0"/>
+          </a:p>
+        </p:txBody>
+      </p:sp>
+    </p:spTree>
+    <p:extLst>
+      <p:ext uri="{BB962C8B-B14F-4D97-AF65-F5344CB8AC3E}">
+        <p14:creationId xmlns:p14="http://schemas.microsoft.com/office/powerpoint/2010/main" val="2136929217"/>
+      </p:ext>
+    </p:extLst>
+  </p:cSld>
+  <p:clrMapOvr>
+    <a:masterClrMapping/>
+  </p:clrMapOvr>
+  <p:timing>
+    <p:tnLst>
+      <p:par>
+        <p:cTn id="1" dur="indefinite" restart="never" nodeType="tmRoot"/>
+      </p:par>
+    </p:tnLst>
+  </p:timing>
+</p:sld>
+</file>
+
+<file path=ppt/slides/slide11.xml><?xml version="1.0" encoding="utf-8"?>
+<p:sld xmlns:a="http://schemas.openxmlformats.org/drawingml/2006/main" xmlns:r="http://schemas.openxmlformats.org/officeDocument/2006/relationships" xmlns:p="http://schemas.openxmlformats.org/presentationml/2006/main">
+  <p:cSld>
+    <p:spTree>
+      <p:nvGrpSpPr>
+        <p:cNvPr id="1" name=""/>
+        <p:cNvGrpSpPr/>
+        <p:nvPr/>
+      </p:nvGrpSpPr>
+      <p:grpSpPr>
+        <a:xfrm>
+          <a:off x="0" y="0"/>
+          <a:ext cx="0" cy="0"/>
+          <a:chOff x="0" y="0"/>
+          <a:chExt cx="0" cy="0"/>
+        </a:xfrm>
+      </p:grpSpPr>
+      <p:sp>
+        <p:nvSpPr>
+          <p:cNvPr id="2" name="Title 1"/>
+          <p:cNvSpPr>
+            <a:spLocks noGrp="1"/>
+          </p:cNvSpPr>
+          <p:nvPr>
+            <p:ph type="title"/>
+          </p:nvPr>
+        </p:nvSpPr>
+        <p:spPr/>
+        <p:txBody>
+          <a:bodyPr/>
+          <a:lstStyle/>
+          <a:p>
+            <a:r>
+              <a:rPr lang="en-US" dirty="0" smtClean="0"/>
+              <a:t>Constraints</a:t>
+            </a:r>
+            <a:endParaRPr lang="en-US" dirty="0"/>
+          </a:p>
+        </p:txBody>
+      </p:sp>
+      <p:sp>
+        <p:nvSpPr>
+          <p:cNvPr id="3" name="Content Placeholder 2"/>
+          <p:cNvSpPr>
+            <a:spLocks noGrp="1"/>
+          </p:cNvSpPr>
+          <p:nvPr>
+            <p:ph idx="1"/>
+          </p:nvPr>
+        </p:nvSpPr>
+        <p:spPr/>
+        <p:txBody>
+          <a:bodyPr/>
+          <a:lstStyle/>
+          <a:p>
+            <a:r>
               <a:rPr lang="en-US" dirty="0" smtClean="0"/>
               <a:t>Layered System</a:t>
             </a:r>
@@ -29883,7 +30027,7 @@
 </p:sld>
 </file>
 
-<file path=ppt/slides/slide11.xml><?xml version="1.0" encoding="utf-8"?>
+<file path=ppt/slides/slide12.xml><?xml version="1.0" encoding="utf-8"?>
 <p:sld xmlns:a="http://schemas.openxmlformats.org/drawingml/2006/main" xmlns:r="http://schemas.openxmlformats.org/officeDocument/2006/relationships" xmlns:p="http://schemas.openxmlformats.org/presentationml/2006/main">
   <p:cSld>
     <p:spTree>
@@ -30162,7 +30306,7 @@
 </p:sld>
 </file>
 
-<file path=ppt/slides/slide12.xml><?xml version="1.0" encoding="utf-8"?>
+<file path=ppt/slides/slide13.xml><?xml version="1.0" encoding="utf-8"?>
 <p:sld xmlns:a="http://schemas.openxmlformats.org/drawingml/2006/main" xmlns:r="http://schemas.openxmlformats.org/officeDocument/2006/relationships" xmlns:p="http://schemas.openxmlformats.org/presentationml/2006/main">
   <p:cSld>
     <p:spTree>
@@ -30479,7 +30623,7 @@
 </p:sld>
 </file>
 
-<file path=ppt/slides/slide13.xml><?xml version="1.0" encoding="utf-8"?>
+<file path=ppt/slides/slide14.xml><?xml version="1.0" encoding="utf-8"?>
 <p:sld xmlns:a="http://schemas.openxmlformats.org/drawingml/2006/main" xmlns:r="http://schemas.openxmlformats.org/officeDocument/2006/relationships" xmlns:p="http://schemas.openxmlformats.org/presentationml/2006/main">
   <p:cSld>
     <p:spTree>
@@ -30620,7 +30764,7 @@
 </p:sld>
 </file>
 
-<file path=ppt/slides/slide14.xml><?xml version="1.0" encoding="utf-8"?>
+<file path=ppt/slides/slide15.xml><?xml version="1.0" encoding="utf-8"?>
 <p:sld xmlns:a="http://schemas.openxmlformats.org/drawingml/2006/main" xmlns:r="http://schemas.openxmlformats.org/officeDocument/2006/relationships" xmlns:p="http://schemas.openxmlformats.org/presentationml/2006/main">
   <p:cSld>
     <p:spTree>
@@ -30805,7 +30949,7 @@
 </p:sld>
 </file>
 
-<file path=ppt/slides/slide15.xml><?xml version="1.0" encoding="utf-8"?>
+<file path=ppt/slides/slide16.xml><?xml version="1.0" encoding="utf-8"?>
 <p:sld xmlns:a="http://schemas.openxmlformats.org/drawingml/2006/main" xmlns:r="http://schemas.openxmlformats.org/officeDocument/2006/relationships" xmlns:p="http://schemas.openxmlformats.org/presentationml/2006/main">
   <p:cSld>
     <p:spTree>
@@ -31287,7 +31431,7 @@
 </p:sld>
 </file>
 
-<file path=ppt/slides/slide16.xml><?xml version="1.0" encoding="utf-8"?>
+<file path=ppt/slides/slide17.xml><?xml version="1.0" encoding="utf-8"?>
 <p:sld xmlns:a="http://schemas.openxmlformats.org/drawingml/2006/main" xmlns:r="http://schemas.openxmlformats.org/officeDocument/2006/relationships" xmlns:p="http://schemas.openxmlformats.org/presentationml/2006/main">
   <p:cSld>
     <p:spTree>
@@ -31496,7 +31640,7 @@
 </p:sld>
 </file>
 
-<file path=ppt/slides/slide17.xml><?xml version="1.0" encoding="utf-8"?>
+<file path=ppt/slides/slide18.xml><?xml version="1.0" encoding="utf-8"?>
 <p:sld xmlns:a="http://schemas.openxmlformats.org/drawingml/2006/main" xmlns:r="http://schemas.openxmlformats.org/officeDocument/2006/relationships" xmlns:p="http://schemas.openxmlformats.org/presentationml/2006/main">
   <p:cSld>
     <p:spTree>
@@ -31603,7 +31747,7 @@
 </p:sld>
 </file>
 
-<file path=ppt/slides/slide18.xml><?xml version="1.0" encoding="utf-8"?>
+<file path=ppt/slides/slide19.xml><?xml version="1.0" encoding="utf-8"?>
 <p:sld xmlns:a="http://schemas.openxmlformats.org/drawingml/2006/main" xmlns:r="http://schemas.openxmlformats.org/officeDocument/2006/relationships" xmlns:p="http://schemas.openxmlformats.org/presentationml/2006/main">
   <p:cSld>
     <p:spTree>
@@ -31712,7 +31856,92 @@
 </p:sld>
 </file>
 
-<file path=ppt/slides/slide19.xml><?xml version="1.0" encoding="utf-8"?>
+<file path=ppt/slides/slide2.xml><?xml version="1.0" encoding="utf-8"?>
+<p:sld xmlns:a="http://schemas.openxmlformats.org/drawingml/2006/main" xmlns:r="http://schemas.openxmlformats.org/officeDocument/2006/relationships" xmlns:p="http://schemas.openxmlformats.org/presentationml/2006/main">
+  <p:cSld>
+    <p:spTree>
+      <p:nvGrpSpPr>
+        <p:cNvPr id="1" name=""/>
+        <p:cNvGrpSpPr/>
+        <p:nvPr/>
+      </p:nvGrpSpPr>
+      <p:grpSpPr>
+        <a:xfrm>
+          <a:off x="0" y="0"/>
+          <a:ext cx="0" cy="0"/>
+          <a:chOff x="0" y="0"/>
+          <a:chExt cx="0" cy="0"/>
+        </a:xfrm>
+      </p:grpSpPr>
+      <p:sp>
+        <p:nvSpPr>
+          <p:cNvPr id="2" name="Title 1"/>
+          <p:cNvSpPr>
+            <a:spLocks noGrp="1"/>
+          </p:cNvSpPr>
+          <p:nvPr>
+            <p:ph type="title"/>
+          </p:nvPr>
+        </p:nvSpPr>
+        <p:spPr/>
+        <p:txBody>
+          <a:bodyPr/>
+          <a:lstStyle/>
+          <a:p>
+            <a:r>
+              <a:rPr lang="en-US" dirty="0" smtClean="0"/>
+              <a:t>Assumptions</a:t>
+            </a:r>
+            <a:endParaRPr lang="en-US" dirty="0"/>
+          </a:p>
+        </p:txBody>
+      </p:sp>
+      <p:sp>
+        <p:nvSpPr>
+          <p:cNvPr id="3" name="Content Placeholder 2"/>
+          <p:cNvSpPr>
+            <a:spLocks noGrp="1"/>
+          </p:cNvSpPr>
+          <p:nvPr>
+            <p:ph idx="1"/>
+          </p:nvPr>
+        </p:nvSpPr>
+        <p:spPr/>
+        <p:txBody>
+          <a:bodyPr/>
+          <a:lstStyle/>
+          <a:p>
+            <a:r>
+              <a:rPr lang="en-US" dirty="0" smtClean="0"/>
+              <a:t>Basic understanding of HTTP</a:t>
+            </a:r>
+          </a:p>
+          <a:p>
+            <a:endParaRPr lang="en-US" dirty="0"/>
+          </a:p>
+        </p:txBody>
+      </p:sp>
+    </p:spTree>
+    <p:extLst>
+      <p:ext uri="{BB962C8B-B14F-4D97-AF65-F5344CB8AC3E}">
+        <p14:creationId xmlns:p14="http://schemas.microsoft.com/office/powerpoint/2010/main" val="2906641828"/>
+      </p:ext>
+    </p:extLst>
+  </p:cSld>
+  <p:clrMapOvr>
+    <a:masterClrMapping/>
+  </p:clrMapOvr>
+  <p:timing>
+    <p:tnLst>
+      <p:par>
+        <p:cTn id="1" dur="indefinite" restart="never" nodeType="tmRoot"/>
+      </p:par>
+    </p:tnLst>
+  </p:timing>
+</p:sld>
+</file>
+
+<file path=ppt/slides/slide20.xml><?xml version="1.0" encoding="utf-8"?>
 <p:sld xmlns:a="http://schemas.openxmlformats.org/drawingml/2006/main" xmlns:r="http://schemas.openxmlformats.org/officeDocument/2006/relationships" xmlns:p="http://schemas.openxmlformats.org/presentationml/2006/main">
   <p:cSld>
     <p:spTree>
@@ -31826,92 +32055,7 @@
 </p:sld>
 </file>
 
-<file path=ppt/slides/slide2.xml><?xml version="1.0" encoding="utf-8"?>
-<p:sld xmlns:a="http://schemas.openxmlformats.org/drawingml/2006/main" xmlns:r="http://schemas.openxmlformats.org/officeDocument/2006/relationships" xmlns:p="http://schemas.openxmlformats.org/presentationml/2006/main">
-  <p:cSld>
-    <p:spTree>
-      <p:nvGrpSpPr>
-        <p:cNvPr id="1" name=""/>
-        <p:cNvGrpSpPr/>
-        <p:nvPr/>
-      </p:nvGrpSpPr>
-      <p:grpSpPr>
-        <a:xfrm>
-          <a:off x="0" y="0"/>
-          <a:ext cx="0" cy="0"/>
-          <a:chOff x="0" y="0"/>
-          <a:chExt cx="0" cy="0"/>
-        </a:xfrm>
-      </p:grpSpPr>
-      <p:sp>
-        <p:nvSpPr>
-          <p:cNvPr id="2" name="Title 1"/>
-          <p:cNvSpPr>
-            <a:spLocks noGrp="1"/>
-          </p:cNvSpPr>
-          <p:nvPr>
-            <p:ph type="title"/>
-          </p:nvPr>
-        </p:nvSpPr>
-        <p:spPr/>
-        <p:txBody>
-          <a:bodyPr/>
-          <a:lstStyle/>
-          <a:p>
-            <a:r>
-              <a:rPr lang="en-US" dirty="0" smtClean="0"/>
-              <a:t>Assumptions</a:t>
-            </a:r>
-            <a:endParaRPr lang="en-US" dirty="0"/>
-          </a:p>
-        </p:txBody>
-      </p:sp>
-      <p:sp>
-        <p:nvSpPr>
-          <p:cNvPr id="3" name="Content Placeholder 2"/>
-          <p:cNvSpPr>
-            <a:spLocks noGrp="1"/>
-          </p:cNvSpPr>
-          <p:nvPr>
-            <p:ph idx="1"/>
-          </p:nvPr>
-        </p:nvSpPr>
-        <p:spPr/>
-        <p:txBody>
-          <a:bodyPr/>
-          <a:lstStyle/>
-          <a:p>
-            <a:r>
-              <a:rPr lang="en-US" dirty="0" smtClean="0"/>
-              <a:t>Basic understanding of HTTP</a:t>
-            </a:r>
-          </a:p>
-          <a:p>
-            <a:endParaRPr lang="en-US" dirty="0"/>
-          </a:p>
-        </p:txBody>
-      </p:sp>
-    </p:spTree>
-    <p:extLst>
-      <p:ext uri="{BB962C8B-B14F-4D97-AF65-F5344CB8AC3E}">
-        <p14:creationId xmlns:p14="http://schemas.microsoft.com/office/powerpoint/2010/main" val="2906641828"/>
-      </p:ext>
-    </p:extLst>
-  </p:cSld>
-  <p:clrMapOvr>
-    <a:masterClrMapping/>
-  </p:clrMapOvr>
-  <p:timing>
-    <p:tnLst>
-      <p:par>
-        <p:cTn id="1" dur="indefinite" restart="never" nodeType="tmRoot"/>
-      </p:par>
-    </p:tnLst>
-  </p:timing>
-</p:sld>
-</file>
-
-<file path=ppt/slides/slide20.xml><?xml version="1.0" encoding="utf-8"?>
+<file path=ppt/slides/slide21.xml><?xml version="1.0" encoding="utf-8"?>
 <p:sld xmlns:a="http://schemas.openxmlformats.org/drawingml/2006/main" xmlns:r="http://schemas.openxmlformats.org/officeDocument/2006/relationships" xmlns:p="http://schemas.openxmlformats.org/presentationml/2006/main">
   <p:cSld>
     <p:spTree>
@@ -32785,7 +32929,7 @@
 </p:sld>
 </file>
 
-<file path=ppt/slides/slide21.xml><?xml version="1.0" encoding="utf-8"?>
+<file path=ppt/slides/slide22.xml><?xml version="1.0" encoding="utf-8"?>
 <p:sld xmlns:a="http://schemas.openxmlformats.org/drawingml/2006/main" xmlns:r="http://schemas.openxmlformats.org/officeDocument/2006/relationships" xmlns:p="http://schemas.openxmlformats.org/presentationml/2006/main">
   <p:cSld>
     <p:spTree>
@@ -32910,7 +33054,7 @@
 </p:sld>
 </file>
 
-<file path=ppt/slides/slide22.xml><?xml version="1.0" encoding="utf-8"?>
+<file path=ppt/slides/slide23.xml><?xml version="1.0" encoding="utf-8"?>
 <p:sld xmlns:a="http://schemas.openxmlformats.org/drawingml/2006/main" xmlns:r="http://schemas.openxmlformats.org/officeDocument/2006/relationships" xmlns:p="http://schemas.openxmlformats.org/presentationml/2006/main">
   <p:cSld>
     <p:spTree>
@@ -33017,7 +33161,7 @@
 </p:sld>
 </file>
 
-<file path=ppt/slides/slide23.xml><?xml version="1.0" encoding="utf-8"?>
+<file path=ppt/slides/slide24.xml><?xml version="1.0" encoding="utf-8"?>
 <p:sld xmlns:a="http://schemas.openxmlformats.org/drawingml/2006/main" xmlns:r="http://schemas.openxmlformats.org/officeDocument/2006/relationships" xmlns:p="http://schemas.openxmlformats.org/presentationml/2006/main">
   <p:cSld>
     <p:spTree>
@@ -33115,6 +33259,13 @@
             </a:r>
           </a:p>
           <a:p>
+            <a:pPr lvl="2"/>
+            <a:r>
+              <a:rPr lang="en-US" dirty="0" smtClean="0"/>
+              <a:t>Unique for a resource version</a:t>
+            </a:r>
+          </a:p>
+          <a:p>
             <a:pPr lvl="1"/>
             <a:endParaRPr lang="en-US" dirty="0" smtClean="0"/>
           </a:p>
@@ -33167,7 +33318,7 @@
 </p:sld>
 </file>
 
-<file path=ppt/slides/slide24.xml><?xml version="1.0" encoding="utf-8"?>
+<file path=ppt/slides/slide25.xml><?xml version="1.0" encoding="utf-8"?>
 <p:sld xmlns:a="http://schemas.openxmlformats.org/drawingml/2006/main" xmlns:r="http://schemas.openxmlformats.org/officeDocument/2006/relationships" xmlns:p="http://schemas.openxmlformats.org/presentationml/2006/main">
   <p:cSld>
     <p:spTree>
@@ -33435,7 +33586,7 @@
 </p:sld>
 </file>
 
-<file path=ppt/slides/slide25.xml><?xml version="1.0" encoding="utf-8"?>
+<file path=ppt/slides/slide26.xml><?xml version="1.0" encoding="utf-8"?>
 <p:sld xmlns:a="http://schemas.openxmlformats.org/drawingml/2006/main" xmlns:r="http://schemas.openxmlformats.org/officeDocument/2006/relationships" xmlns:p="http://schemas.openxmlformats.org/presentationml/2006/main">
   <p:cSld>
     <p:spTree>
@@ -33633,6 +33784,47 @@
           </a:p>
         </p:txBody>
       </p:sp>
+      <p:pic>
+        <p:nvPicPr>
+          <p:cNvPr id="4" name="Can You Explain Internet">
+            <a:hlinkClick r:id="" action="ppaction://media"/>
+          </p:cNvPr>
+          <p:cNvPicPr>
+            <a:picLocks noChangeAspect="1"/>
+          </p:cNvPicPr>
+          <p:nvPr>
+            <a:videoFile r:link="rId2"/>
+            <p:extLst>
+              <p:ext uri="{DAA4B4D4-6D71-4841-9C94-3DE7FCFB9230}">
+                <p14:media xmlns:p14="http://schemas.microsoft.com/office/powerpoint/2010/main" r:embed="rId1"/>
+              </p:ext>
+            </p:extLst>
+          </p:nvPr>
+        </p:nvPicPr>
+        <p:blipFill>
+          <a:blip r:embed="rId4"/>
+          <a:stretch>
+            <a:fillRect/>
+          </a:stretch>
+        </p:blipFill>
+        <p:spPr bwMode="auto">
+          <a:xfrm>
+            <a:off x="2108649" y="707314"/>
+            <a:ext cx="7974703" cy="5981027"/>
+          </a:xfrm>
+          <a:prstGeom prst="rect">
+            <a:avLst/>
+          </a:prstGeom>
+          <a:noFill/>
+          <a:ln w="9525">
+            <a:noFill/>
+            <a:miter lim="800000"/>
+            <a:headEnd/>
+            <a:tailEnd/>
+          </a:ln>
+          <a:effectLst/>
+        </p:spPr>
+      </p:pic>
     </p:spTree>
     <p:extLst>
       <p:ext uri="{BB962C8B-B14F-4D97-AF65-F5344CB8AC3E}">
@@ -33953,6 +34145,77 @@
                       </p:childTnLst>
                     </p:cTn>
                   </p:par>
+                  <p:par>
+                    <p:cTn id="25" fill="hold">
+                      <p:stCondLst>
+                        <p:cond delay="indefinite"/>
+                      </p:stCondLst>
+                      <p:childTnLst>
+                        <p:par>
+                          <p:cTn id="26" fill="hold">
+                            <p:stCondLst>
+                              <p:cond delay="0"/>
+                            </p:stCondLst>
+                            <p:childTnLst>
+                              <p:par>
+                                <p:cTn id="27" presetID="1" presetClass="entr" presetSubtype="0" fill="hold" nodeType="clickEffect">
+                                  <p:stCondLst>
+                                    <p:cond delay="0"/>
+                                  </p:stCondLst>
+                                  <p:childTnLst>
+                                    <p:set>
+                                      <p:cBhvr>
+                                        <p:cTn id="28" dur="1" fill="hold">
+                                          <p:stCondLst>
+                                            <p:cond delay="0"/>
+                                          </p:stCondLst>
+                                        </p:cTn>
+                                        <p:tgtEl>
+                                          <p:spTgt spid="4"/>
+                                        </p:tgtEl>
+                                        <p:attrNameLst>
+                                          <p:attrName>style.visibility</p:attrName>
+                                        </p:attrNameLst>
+                                      </p:cBhvr>
+                                      <p:to>
+                                        <p:strVal val="visible"/>
+                                      </p:to>
+                                    </p:set>
+                                  </p:childTnLst>
+                                </p:cTn>
+                              </p:par>
+                            </p:childTnLst>
+                          </p:cTn>
+                        </p:par>
+                        <p:par>
+                          <p:cTn id="29" fill="hold">
+                            <p:stCondLst>
+                              <p:cond delay="0"/>
+                            </p:stCondLst>
+                            <p:childTnLst>
+                              <p:par>
+                                <p:cTn id="30" presetID="1" presetClass="mediacall" presetSubtype="0" fill="hold" nodeType="afterEffect">
+                                  <p:stCondLst>
+                                    <p:cond delay="0"/>
+                                  </p:stCondLst>
+                                  <p:childTnLst>
+                                    <p:cmd type="call" cmd="playFrom(0.0)">
+                                      <p:cBhvr>
+                                        <p:cTn id="31" dur="2986" fill="hold"/>
+                                        <p:tgtEl>
+                                          <p:spTgt spid="4"/>
+                                        </p:tgtEl>
+                                      </p:cBhvr>
+                                    </p:cmd>
+                                  </p:childTnLst>
+                                </p:cTn>
+                              </p:par>
+                            </p:childTnLst>
+                          </p:cTn>
+                        </p:par>
+                      </p:childTnLst>
+                    </p:cTn>
+                  </p:par>
                 </p:childTnLst>
               </p:cTn>
               <p:prevCondLst>
@@ -33970,18 +34233,163 @@
                 </p:cond>
               </p:nextCondLst>
             </p:seq>
+            <p:seq concurrent="1" nextAc="seek">
+              <p:cTn id="32" restart="whenNotActive" fill="hold" evtFilter="cancelBubble" nodeType="interactiveSeq">
+                <p:stCondLst>
+                  <p:cond evt="onClick" delay="0">
+                    <p:tgtEl>
+                      <p:spTgt spid="4"/>
+                    </p:tgtEl>
+                  </p:cond>
+                </p:stCondLst>
+                <p:endSync evt="end" delay="0">
+                  <p:rtn val="all"/>
+                </p:endSync>
+                <p:childTnLst>
+                  <p:par>
+                    <p:cTn id="33" fill="hold">
+                      <p:stCondLst>
+                        <p:cond delay="0"/>
+                      </p:stCondLst>
+                      <p:childTnLst>
+                        <p:par>
+                          <p:cTn id="34" fill="hold">
+                            <p:stCondLst>
+                              <p:cond delay="0"/>
+                            </p:stCondLst>
+                            <p:childTnLst>
+                              <p:par>
+                                <p:cTn id="35" presetID="2" presetClass="mediacall" presetSubtype="0" fill="hold" nodeType="clickEffect">
+                                  <p:stCondLst>
+                                    <p:cond delay="0"/>
+                                  </p:stCondLst>
+                                  <p:childTnLst>
+                                    <p:cmd type="call" cmd="togglePause">
+                                      <p:cBhvr>
+                                        <p:cTn id="36" dur="1" fill="hold"/>
+                                        <p:tgtEl>
+                                          <p:spTgt spid="4"/>
+                                        </p:tgtEl>
+                                      </p:cBhvr>
+                                    </p:cmd>
+                                  </p:childTnLst>
+                                </p:cTn>
+                              </p:par>
+                            </p:childTnLst>
+                          </p:cTn>
+                        </p:par>
+                      </p:childTnLst>
+                    </p:cTn>
+                  </p:par>
+                </p:childTnLst>
+              </p:cTn>
+              <p:nextCondLst>
+                <p:cond evt="onClick" delay="0">
+                  <p:tgtEl>
+                    <p:spTgt spid="4"/>
+                  </p:tgtEl>
+                </p:cond>
+              </p:nextCondLst>
+            </p:seq>
+            <p:video>
+              <p:cMediaNode vol="80000">
+                <p:cTn id="37" fill="hold" display="0">
+                  <p:stCondLst>
+                    <p:cond delay="indefinite"/>
+                  </p:stCondLst>
+                </p:cTn>
+                <p:tgtEl>
+                  <p:spTgt spid="4"/>
+                </p:tgtEl>
+              </p:cMediaNode>
+            </p:video>
           </p:childTnLst>
         </p:cTn>
       </p:par>
     </p:tnLst>
     <p:bldLst>
-      <p:bldP spid="3" grpId="0" build="p"/>
+      <p:bldP spid="3" grpId="0" uiExpand="1" build="p"/>
     </p:bldLst>
   </p:timing>
 </p:sld>
 </file>
 
 <file path=ppt/slides/slide4.xml><?xml version="1.0" encoding="utf-8"?>
+<p:sld xmlns:a="http://schemas.openxmlformats.org/drawingml/2006/main" xmlns:r="http://schemas.openxmlformats.org/officeDocument/2006/relationships" xmlns:p="http://schemas.openxmlformats.org/presentationml/2006/main">
+  <p:cSld>
+    <p:spTree>
+      <p:nvGrpSpPr>
+        <p:cNvPr id="1" name=""/>
+        <p:cNvGrpSpPr/>
+        <p:nvPr/>
+      </p:nvGrpSpPr>
+      <p:grpSpPr>
+        <a:xfrm>
+          <a:off x="0" y="0"/>
+          <a:ext cx="0" cy="0"/>
+          <a:chOff x="0" y="0"/>
+          <a:chExt cx="0" cy="0"/>
+        </a:xfrm>
+      </p:grpSpPr>
+      <p:sp>
+        <p:nvSpPr>
+          <p:cNvPr id="2" name="Title 1"/>
+          <p:cNvSpPr>
+            <a:spLocks noGrp="1"/>
+          </p:cNvSpPr>
+          <p:nvPr>
+            <p:ph type="title"/>
+          </p:nvPr>
+        </p:nvSpPr>
+        <p:spPr/>
+        <p:txBody>
+          <a:bodyPr/>
+          <a:lstStyle/>
+          <a:p>
+            <a:endParaRPr lang="en-US"/>
+          </a:p>
+        </p:txBody>
+      </p:sp>
+      <p:sp>
+        <p:nvSpPr>
+          <p:cNvPr id="5" name="Content Placeholder 4"/>
+          <p:cNvSpPr>
+            <a:spLocks noGrp="1"/>
+          </p:cNvSpPr>
+          <p:nvPr>
+            <p:ph idx="1"/>
+          </p:nvPr>
+        </p:nvSpPr>
+        <p:spPr/>
+        <p:txBody>
+          <a:bodyPr/>
+          <a:lstStyle/>
+          <a:p>
+            <a:endParaRPr lang="en-US"/>
+          </a:p>
+        </p:txBody>
+      </p:sp>
+    </p:spTree>
+    <p:extLst>
+      <p:ext uri="{BB962C8B-B14F-4D97-AF65-F5344CB8AC3E}">
+        <p14:creationId xmlns:p14="http://schemas.microsoft.com/office/powerpoint/2010/main" val="853814673"/>
+      </p:ext>
+    </p:extLst>
+  </p:cSld>
+  <p:clrMapOvr>
+    <a:masterClrMapping/>
+  </p:clrMapOvr>
+  <p:timing>
+    <p:tnLst>
+      <p:par>
+        <p:cTn id="1" dur="indefinite" restart="never" nodeType="tmRoot"/>
+      </p:par>
+    </p:tnLst>
+  </p:timing>
+</p:sld>
+</file>
+
+<file path=ppt/slides/slide5.xml><?xml version="1.0" encoding="utf-8"?>
 <p:sld xmlns:a="http://schemas.openxmlformats.org/drawingml/2006/main" xmlns:r="http://schemas.openxmlformats.org/officeDocument/2006/relationships" xmlns:p="http://schemas.openxmlformats.org/presentationml/2006/main">
   <p:cSld>
     <p:spTree>
@@ -34297,7 +34705,7 @@
 </p:sld>
 </file>
 
-<file path=ppt/slides/slide5.xml><?xml version="1.0" encoding="utf-8"?>
+<file path=ppt/slides/slide6.xml><?xml version="1.0" encoding="utf-8"?>
 <p:sld xmlns:a="http://schemas.openxmlformats.org/drawingml/2006/main" xmlns:r="http://schemas.openxmlformats.org/officeDocument/2006/relationships" xmlns:p="http://schemas.openxmlformats.org/presentationml/2006/main">
   <p:cSld>
     <p:spTree>
@@ -34629,7 +35037,7 @@
 </p:sld>
 </file>
 
-<file path=ppt/slides/slide6.xml><?xml version="1.0" encoding="utf-8"?>
+<file path=ppt/slides/slide7.xml><?xml version="1.0" encoding="utf-8"?>
 <p:sld xmlns:a="http://schemas.openxmlformats.org/drawingml/2006/main" xmlns:r="http://schemas.openxmlformats.org/officeDocument/2006/relationships" xmlns:p="http://schemas.openxmlformats.org/presentationml/2006/main">
   <p:cSld>
     <p:spTree>
@@ -34998,7 +35406,7 @@
 </p:sld>
 </file>
 
-<file path=ppt/slides/slide7.xml><?xml version="1.0" encoding="utf-8"?>
+<file path=ppt/slides/slide8.xml><?xml version="1.0" encoding="utf-8"?>
 <p:sld xmlns:a="http://schemas.openxmlformats.org/drawingml/2006/main" xmlns:r="http://schemas.openxmlformats.org/officeDocument/2006/relationships" xmlns:p="http://schemas.openxmlformats.org/presentationml/2006/main">
   <p:cSld>
     <p:spTree>
@@ -35408,7 +35816,7 @@
 </p:sld>
 </file>
 
-<file path=ppt/slides/slide8.xml><?xml version="1.0" encoding="utf-8"?>
+<file path=ppt/slides/slide9.xml><?xml version="1.0" encoding="utf-8"?>
 <p:sld xmlns:a="http://schemas.openxmlformats.org/drawingml/2006/main" xmlns:r="http://schemas.openxmlformats.org/officeDocument/2006/relationships" xmlns:p="http://schemas.openxmlformats.org/presentationml/2006/main">
   <p:cSld>
     <p:spTree>
@@ -35524,149 +35932,6 @@
     <p:extLst>
       <p:ext uri="{BB962C8B-B14F-4D97-AF65-F5344CB8AC3E}">
         <p14:creationId xmlns:p14="http://schemas.microsoft.com/office/powerpoint/2010/main" val="2938836956"/>
-      </p:ext>
-    </p:extLst>
-  </p:cSld>
-  <p:clrMapOvr>
-    <a:masterClrMapping/>
-  </p:clrMapOvr>
-  <p:timing>
-    <p:tnLst>
-      <p:par>
-        <p:cTn id="1" dur="indefinite" restart="never" nodeType="tmRoot"/>
-      </p:par>
-    </p:tnLst>
-  </p:timing>
-</p:sld>
-</file>
-
-<file path=ppt/slides/slide9.xml><?xml version="1.0" encoding="utf-8"?>
-<p:sld xmlns:a="http://schemas.openxmlformats.org/drawingml/2006/main" xmlns:r="http://schemas.openxmlformats.org/officeDocument/2006/relationships" xmlns:p="http://schemas.openxmlformats.org/presentationml/2006/main">
-  <p:cSld>
-    <p:spTree>
-      <p:nvGrpSpPr>
-        <p:cNvPr id="1" name=""/>
-        <p:cNvGrpSpPr/>
-        <p:nvPr/>
-      </p:nvGrpSpPr>
-      <p:grpSpPr>
-        <a:xfrm>
-          <a:off x="0" y="0"/>
-          <a:ext cx="0" cy="0"/>
-          <a:chOff x="0" y="0"/>
-          <a:chExt cx="0" cy="0"/>
-        </a:xfrm>
-      </p:grpSpPr>
-      <p:sp>
-        <p:nvSpPr>
-          <p:cNvPr id="2" name="Title 1"/>
-          <p:cNvSpPr>
-            <a:spLocks noGrp="1"/>
-          </p:cNvSpPr>
-          <p:nvPr>
-            <p:ph type="title"/>
-          </p:nvPr>
-        </p:nvSpPr>
-        <p:spPr/>
-        <p:txBody>
-          <a:bodyPr/>
-          <a:lstStyle/>
-          <a:p>
-            <a:r>
-              <a:rPr lang="en-US" dirty="0" smtClean="0"/>
-              <a:t>Constraints</a:t>
-            </a:r>
-            <a:endParaRPr lang="en-US" dirty="0"/>
-          </a:p>
-        </p:txBody>
-      </p:sp>
-      <p:sp>
-        <p:nvSpPr>
-          <p:cNvPr id="3" name="Content Placeholder 2"/>
-          <p:cNvSpPr>
-            <a:spLocks noGrp="1"/>
-          </p:cNvSpPr>
-          <p:nvPr>
-            <p:ph idx="1"/>
-          </p:nvPr>
-        </p:nvSpPr>
-        <p:spPr/>
-        <p:txBody>
-          <a:bodyPr/>
-          <a:lstStyle/>
-          <a:p>
-            <a:r>
-              <a:rPr lang="en-US" dirty="0"/>
-              <a:t>Uniform Interface</a:t>
-            </a:r>
-          </a:p>
-          <a:p>
-            <a:pPr lvl="1"/>
-            <a:r>
-              <a:rPr lang="en-US" dirty="0"/>
-              <a:t>Resource based</a:t>
-            </a:r>
-          </a:p>
-          <a:p>
-            <a:pPr lvl="2"/>
-            <a:r>
-              <a:rPr lang="en-US" dirty="0"/>
-              <a:t>HTTP verbs</a:t>
-            </a:r>
-          </a:p>
-          <a:p>
-            <a:pPr lvl="2"/>
-            <a:r>
-              <a:rPr lang="en-US" dirty="0"/>
-              <a:t>POST, PUT, GET, DELETE, HEAD (for conditional GETs)</a:t>
-            </a:r>
-          </a:p>
-          <a:p>
-            <a:pPr lvl="2"/>
-            <a:r>
-              <a:rPr lang="en-US" dirty="0"/>
-              <a:t>Generally ignore others, e.g. OPTIONS, PATCH and TRACE</a:t>
-            </a:r>
-          </a:p>
-          <a:p>
-            <a:pPr lvl="1"/>
-            <a:r>
-              <a:rPr lang="en-US" dirty="0"/>
-              <a:t>HTTP result codes</a:t>
-            </a:r>
-          </a:p>
-          <a:p>
-            <a:pPr lvl="1"/>
-            <a:r>
-              <a:rPr lang="en-US" dirty="0"/>
-              <a:t>Self-descriptive </a:t>
-            </a:r>
-            <a:r>
-              <a:rPr lang="en-US" dirty="0" smtClean="0"/>
-              <a:t>messages</a:t>
-            </a:r>
-          </a:p>
-          <a:p>
-            <a:pPr lvl="1"/>
-            <a:r>
-              <a:rPr lang="en-US" dirty="0" smtClean="0"/>
-              <a:t>Generalized media types</a:t>
-            </a:r>
-            <a:endParaRPr lang="en-US" dirty="0"/>
-          </a:p>
-          <a:p>
-            <a:pPr lvl="1"/>
-            <a:endParaRPr lang="en-US" dirty="0"/>
-          </a:p>
-          <a:p>
-            <a:endParaRPr lang="en-US" dirty="0"/>
-          </a:p>
-        </p:txBody>
-      </p:sp>
-    </p:spTree>
-    <p:extLst>
-      <p:ext uri="{BB962C8B-B14F-4D97-AF65-F5344CB8AC3E}">
-        <p14:creationId xmlns:p14="http://schemas.microsoft.com/office/powerpoint/2010/main" val="2136929217"/>
       </p:ext>
     </p:extLst>
   </p:cSld>

</xml_diff>

<commit_message>
Added info about REST api doc
</commit_message>
<xml_diff>
--- a/Presentation/RESTful APIs.pptx
+++ b/Presentation/RESTful APIs.pptx
@@ -31,9 +31,10 @@
     <p:sldId id="279" r:id="rId25"/>
     <p:sldId id="280" r:id="rId26"/>
     <p:sldId id="282" r:id="rId27"/>
-    <p:sldId id="281" r:id="rId28"/>
-    <p:sldId id="283" r:id="rId29"/>
-    <p:sldId id="284" r:id="rId30"/>
+    <p:sldId id="285" r:id="rId28"/>
+    <p:sldId id="281" r:id="rId29"/>
+    <p:sldId id="283" r:id="rId30"/>
+    <p:sldId id="284" r:id="rId31"/>
   </p:sldIdLst>
   <p:sldSz cx="12192000" cy="6858000"/>
   <p:notesSz cx="6858000" cy="9144000"/>
@@ -33722,6 +33723,248 @@
           <a:p>
             <a:r>
               <a:rPr lang="en-US" dirty="0" smtClean="0"/>
+              <a:t>Documentation</a:t>
+            </a:r>
+            <a:endParaRPr lang="en-US" dirty="0"/>
+          </a:p>
+        </p:txBody>
+      </p:sp>
+      <p:sp>
+        <p:nvSpPr>
+          <p:cNvPr id="3" name="Content Placeholder 2"/>
+          <p:cNvSpPr>
+            <a:spLocks noGrp="1"/>
+          </p:cNvSpPr>
+          <p:nvPr>
+            <p:ph idx="1"/>
+          </p:nvPr>
+        </p:nvSpPr>
+        <p:spPr/>
+        <p:txBody>
+          <a:bodyPr/>
+          <a:lstStyle/>
+          <a:p>
+            <a:r>
+              <a:rPr lang="en-US" dirty="0" smtClean="0"/>
+              <a:t>Doc needs are not unlike for any API</a:t>
+            </a:r>
+          </a:p>
+          <a:p>
+            <a:pPr lvl="1"/>
+            <a:r>
+              <a:rPr lang="en-US" dirty="0" smtClean="0"/>
+              <a:t>URIs</a:t>
+            </a:r>
+          </a:p>
+          <a:p>
+            <a:pPr lvl="1"/>
+            <a:r>
+              <a:rPr lang="en-US" dirty="0" smtClean="0"/>
+              <a:t>Methods</a:t>
+            </a:r>
+          </a:p>
+          <a:p>
+            <a:pPr lvl="1"/>
+            <a:r>
+              <a:rPr lang="en-US" dirty="0" smtClean="0"/>
+              <a:t>Parameters</a:t>
+            </a:r>
+          </a:p>
+          <a:p>
+            <a:pPr lvl="1"/>
+            <a:r>
+              <a:rPr lang="en-US" dirty="0" smtClean="0"/>
+              <a:t>Data formats</a:t>
+            </a:r>
+          </a:p>
+          <a:p>
+            <a:pPr lvl="1"/>
+            <a:r>
+              <a:rPr lang="en-US" dirty="0" smtClean="0"/>
+              <a:t>Response codes</a:t>
+            </a:r>
+          </a:p>
+          <a:p>
+            <a:pPr lvl="1"/>
+            <a:r>
+              <a:rPr lang="en-US" smtClean="0"/>
+              <a:t>Samples</a:t>
+            </a:r>
+            <a:endParaRPr lang="en-US" dirty="0"/>
+          </a:p>
+        </p:txBody>
+      </p:sp>
+      <p:pic>
+        <p:nvPicPr>
+          <p:cNvPr id="5122" name="Picture 2" descr="API"/>
+          <p:cNvPicPr>
+            <a:picLocks noChangeAspect="1" noChangeArrowheads="1"/>
+          </p:cNvPicPr>
+          <p:nvPr/>
+        </p:nvPicPr>
+        <p:blipFill>
+          <a:blip r:embed="rId2">
+            <a:extLst>
+              <a:ext uri="{28A0092B-C50C-407E-A947-70E740481C1C}">
+                <a14:useLocalDpi xmlns:a14="http://schemas.microsoft.com/office/drawing/2010/main" val="0"/>
+              </a:ext>
+            </a:extLst>
+          </a:blip>
+          <a:srcRect/>
+          <a:stretch>
+            <a:fillRect/>
+          </a:stretch>
+        </p:blipFill>
+        <p:spPr bwMode="auto">
+          <a:xfrm>
+            <a:off x="8080374" y="274638"/>
+            <a:ext cx="3400425" cy="6352733"/>
+          </a:xfrm>
+          <a:prstGeom prst="rect">
+            <a:avLst/>
+          </a:prstGeom>
+          <a:noFill/>
+          <a:extLst>
+            <a:ext uri="{909E8E84-426E-40DD-AFC4-6F175D3DCCD1}">
+              <a14:hiddenFill xmlns:a14="http://schemas.microsoft.com/office/drawing/2010/main">
+                <a:solidFill>
+                  <a:srgbClr val="FFFFFF"/>
+                </a:solidFill>
+              </a14:hiddenFill>
+            </a:ext>
+          </a:extLst>
+        </p:spPr>
+      </p:pic>
+    </p:spTree>
+    <p:extLst>
+      <p:ext uri="{BB962C8B-B14F-4D97-AF65-F5344CB8AC3E}">
+        <p14:creationId xmlns:p14="http://schemas.microsoft.com/office/powerpoint/2010/main" val="2385445058"/>
+      </p:ext>
+    </p:extLst>
+  </p:cSld>
+  <p:clrMapOvr>
+    <a:masterClrMapping/>
+  </p:clrMapOvr>
+  <p:timing>
+    <p:tnLst>
+      <p:par>
+        <p:cTn id="1" dur="indefinite" restart="never" nodeType="tmRoot">
+          <p:childTnLst>
+            <p:seq concurrent="1" nextAc="seek">
+              <p:cTn id="2" dur="indefinite" nodeType="mainSeq">
+                <p:childTnLst>
+                  <p:par>
+                    <p:cTn id="3" fill="hold">
+                      <p:stCondLst>
+                        <p:cond delay="indefinite"/>
+                      </p:stCondLst>
+                      <p:childTnLst>
+                        <p:par>
+                          <p:cTn id="4" fill="hold">
+                            <p:stCondLst>
+                              <p:cond delay="0"/>
+                            </p:stCondLst>
+                            <p:childTnLst>
+                              <p:par>
+                                <p:cTn id="5" presetID="10" presetClass="entr" presetSubtype="0" fill="hold" nodeType="clickEffect">
+                                  <p:stCondLst>
+                                    <p:cond delay="0"/>
+                                  </p:stCondLst>
+                                  <p:childTnLst>
+                                    <p:set>
+                                      <p:cBhvr>
+                                        <p:cTn id="6" dur="1" fill="hold">
+                                          <p:stCondLst>
+                                            <p:cond delay="0"/>
+                                          </p:stCondLst>
+                                        </p:cTn>
+                                        <p:tgtEl>
+                                          <p:spTgt spid="5122"/>
+                                        </p:tgtEl>
+                                        <p:attrNameLst>
+                                          <p:attrName>style.visibility</p:attrName>
+                                        </p:attrNameLst>
+                                      </p:cBhvr>
+                                      <p:to>
+                                        <p:strVal val="visible"/>
+                                      </p:to>
+                                    </p:set>
+                                    <p:animEffect transition="in" filter="fade">
+                                      <p:cBhvr>
+                                        <p:cTn id="7" dur="500"/>
+                                        <p:tgtEl>
+                                          <p:spTgt spid="5122"/>
+                                        </p:tgtEl>
+                                      </p:cBhvr>
+                                    </p:animEffect>
+                                  </p:childTnLst>
+                                </p:cTn>
+                              </p:par>
+                            </p:childTnLst>
+                          </p:cTn>
+                        </p:par>
+                      </p:childTnLst>
+                    </p:cTn>
+                  </p:par>
+                </p:childTnLst>
+              </p:cTn>
+              <p:prevCondLst>
+                <p:cond evt="onPrev" delay="0">
+                  <p:tgtEl>
+                    <p:sldTgt/>
+                  </p:tgtEl>
+                </p:cond>
+              </p:prevCondLst>
+              <p:nextCondLst>
+                <p:cond evt="onNext" delay="0">
+                  <p:tgtEl>
+                    <p:sldTgt/>
+                  </p:tgtEl>
+                </p:cond>
+              </p:nextCondLst>
+            </p:seq>
+          </p:childTnLst>
+        </p:cTn>
+      </p:par>
+    </p:tnLst>
+  </p:timing>
+</p:sld>
+</file>
+
+<file path=ppt/slides/slide28.xml><?xml version="1.0" encoding="utf-8"?>
+<p:sld xmlns:a="http://schemas.openxmlformats.org/drawingml/2006/main" xmlns:r="http://schemas.openxmlformats.org/officeDocument/2006/relationships" xmlns:p="http://schemas.openxmlformats.org/presentationml/2006/main">
+  <p:cSld>
+    <p:spTree>
+      <p:nvGrpSpPr>
+        <p:cNvPr id="1" name=""/>
+        <p:cNvGrpSpPr/>
+        <p:nvPr/>
+      </p:nvGrpSpPr>
+      <p:grpSpPr>
+        <a:xfrm>
+          <a:off x="0" y="0"/>
+          <a:ext cx="0" cy="0"/>
+          <a:chOff x="0" y="0"/>
+          <a:chExt cx="0" cy="0"/>
+        </a:xfrm>
+      </p:grpSpPr>
+      <p:sp>
+        <p:nvSpPr>
+          <p:cNvPr id="2" name="Title 1"/>
+          <p:cNvSpPr>
+            <a:spLocks noGrp="1"/>
+          </p:cNvSpPr>
+          <p:nvPr>
+            <p:ph type="title"/>
+          </p:nvPr>
+        </p:nvSpPr>
+        <p:spPr/>
+        <p:txBody>
+          <a:bodyPr/>
+          <a:lstStyle/>
+          <a:p>
+            <a:r>
+              <a:rPr lang="en-US" dirty="0" smtClean="0"/>
               <a:t>Why REST</a:t>
             </a:r>
             <a:endParaRPr lang="en-US" dirty="0"/>
@@ -33801,7 +34044,7 @@
 </p:sld>
 </file>
 
-<file path=ppt/slides/slide28.xml><?xml version="1.0" encoding="utf-8"?>
+<file path=ppt/slides/slide29.xml><?xml version="1.0" encoding="utf-8"?>
 <p:sld xmlns:a="http://schemas.openxmlformats.org/drawingml/2006/main" xmlns:r="http://schemas.openxmlformats.org/officeDocument/2006/relationships" xmlns:p="http://schemas.openxmlformats.org/presentationml/2006/main">
   <p:cSld>
     <p:spTree>
@@ -34004,138 +34247,6 @@
     <p:extLst>
       <p:ext uri="{BB962C8B-B14F-4D97-AF65-F5344CB8AC3E}">
         <p14:creationId xmlns:p14="http://schemas.microsoft.com/office/powerpoint/2010/main" val="2144024565"/>
-      </p:ext>
-    </p:extLst>
-  </p:cSld>
-  <p:clrMapOvr>
-    <a:masterClrMapping/>
-  </p:clrMapOvr>
-  <p:timing>
-    <p:tnLst>
-      <p:par>
-        <p:cTn id="1" dur="indefinite" restart="never" nodeType="tmRoot"/>
-      </p:par>
-    </p:tnLst>
-  </p:timing>
-</p:sld>
-</file>
-
-<file path=ppt/slides/slide29.xml><?xml version="1.0" encoding="utf-8"?>
-<p:sld xmlns:a="http://schemas.openxmlformats.org/drawingml/2006/main" xmlns:r="http://schemas.openxmlformats.org/officeDocument/2006/relationships" xmlns:p="http://schemas.openxmlformats.org/presentationml/2006/main">
-  <p:cSld>
-    <p:spTree>
-      <p:nvGrpSpPr>
-        <p:cNvPr id="1" name=""/>
-        <p:cNvGrpSpPr/>
-        <p:nvPr/>
-      </p:nvGrpSpPr>
-      <p:grpSpPr>
-        <a:xfrm>
-          <a:off x="0" y="0"/>
-          <a:ext cx="0" cy="0"/>
-          <a:chOff x="0" y="0"/>
-          <a:chExt cx="0" cy="0"/>
-        </a:xfrm>
-      </p:grpSpPr>
-      <p:sp>
-        <p:nvSpPr>
-          <p:cNvPr id="2" name="Title 1"/>
-          <p:cNvSpPr>
-            <a:spLocks noGrp="1"/>
-          </p:cNvSpPr>
-          <p:nvPr>
-            <p:ph type="title"/>
-          </p:nvPr>
-        </p:nvSpPr>
-        <p:spPr/>
-        <p:txBody>
-          <a:bodyPr/>
-          <a:lstStyle/>
-          <a:p>
-            <a:r>
-              <a:rPr lang="en-US" dirty="0" smtClean="0"/>
-              <a:t>Resources</a:t>
-            </a:r>
-            <a:endParaRPr lang="en-US" dirty="0"/>
-          </a:p>
-        </p:txBody>
-      </p:sp>
-      <p:sp>
-        <p:nvSpPr>
-          <p:cNvPr id="3" name="Content Placeholder 2"/>
-          <p:cNvSpPr>
-            <a:spLocks noGrp="1"/>
-          </p:cNvSpPr>
-          <p:nvPr>
-            <p:ph idx="1"/>
-          </p:nvPr>
-        </p:nvSpPr>
-        <p:spPr/>
-        <p:txBody>
-          <a:bodyPr/>
-          <a:lstStyle/>
-          <a:p>
-            <a:r>
-              <a:rPr lang="en-US" dirty="0">
-                <a:effectLst/>
-              </a:rPr>
-              <a:t>Courses</a:t>
-            </a:r>
-          </a:p>
-          <a:p>
-            <a:pPr lvl="1"/>
-            <a:r>
-              <a:rPr lang="en-US" dirty="0">
-                <a:effectLst/>
-                <a:hlinkClick r:id="rId2"/>
-              </a:rPr>
-              <a:t>http://www.pluralsight.com/courses/rest-fundamentals</a:t>
-            </a:r>
-            <a:endParaRPr lang="en-US" dirty="0">
-              <a:effectLst/>
-            </a:endParaRPr>
-          </a:p>
-          <a:p>
-            <a:pPr marL="0" indent="0">
-              <a:buNone/>
-            </a:pPr>
-            <a:r>
-              <a:rPr lang="en-US" dirty="0">
-                <a:effectLst/>
-              </a:rPr>
-              <a:t> </a:t>
-            </a:r>
-          </a:p>
-          <a:p>
-            <a:r>
-              <a:rPr lang="en-US" dirty="0">
-                <a:effectLst/>
-              </a:rPr>
-              <a:t>Caching Management Library - Cache Cow</a:t>
-            </a:r>
-          </a:p>
-          <a:p>
-            <a:pPr lvl="1"/>
-            <a:r>
-              <a:rPr lang="en-US" dirty="0">
-                <a:effectLst/>
-                <a:hlinkClick r:id="rId3"/>
-              </a:rPr>
-              <a:t>http://www.hanselman.com/blog/NuGetPackageOfTheWeekASPNETWebAPICachingWithCacheCowAndCacheOutput.aspx</a:t>
-            </a:r>
-            <a:endParaRPr lang="en-US" dirty="0">
-              <a:effectLst/>
-            </a:endParaRPr>
-          </a:p>
-          <a:p>
-            <a:endParaRPr lang="en-US" dirty="0"/>
-          </a:p>
-        </p:txBody>
-      </p:sp>
-    </p:spTree>
-    <p:extLst>
-      <p:ext uri="{BB962C8B-B14F-4D97-AF65-F5344CB8AC3E}">
-        <p14:creationId xmlns:p14="http://schemas.microsoft.com/office/powerpoint/2010/main" val="675560746"/>
       </p:ext>
     </p:extLst>
   </p:cSld>
@@ -34847,6 +34958,138 @@
     <p:bldLst>
       <p:bldP spid="3" grpId="0" uiExpand="1" build="p"/>
     </p:bldLst>
+  </p:timing>
+</p:sld>
+</file>
+
+<file path=ppt/slides/slide30.xml><?xml version="1.0" encoding="utf-8"?>
+<p:sld xmlns:a="http://schemas.openxmlformats.org/drawingml/2006/main" xmlns:r="http://schemas.openxmlformats.org/officeDocument/2006/relationships" xmlns:p="http://schemas.openxmlformats.org/presentationml/2006/main">
+  <p:cSld>
+    <p:spTree>
+      <p:nvGrpSpPr>
+        <p:cNvPr id="1" name=""/>
+        <p:cNvGrpSpPr/>
+        <p:nvPr/>
+      </p:nvGrpSpPr>
+      <p:grpSpPr>
+        <a:xfrm>
+          <a:off x="0" y="0"/>
+          <a:ext cx="0" cy="0"/>
+          <a:chOff x="0" y="0"/>
+          <a:chExt cx="0" cy="0"/>
+        </a:xfrm>
+      </p:grpSpPr>
+      <p:sp>
+        <p:nvSpPr>
+          <p:cNvPr id="2" name="Title 1"/>
+          <p:cNvSpPr>
+            <a:spLocks noGrp="1"/>
+          </p:cNvSpPr>
+          <p:nvPr>
+            <p:ph type="title"/>
+          </p:nvPr>
+        </p:nvSpPr>
+        <p:spPr/>
+        <p:txBody>
+          <a:bodyPr/>
+          <a:lstStyle/>
+          <a:p>
+            <a:r>
+              <a:rPr lang="en-US" dirty="0" smtClean="0"/>
+              <a:t>Resources</a:t>
+            </a:r>
+            <a:endParaRPr lang="en-US" dirty="0"/>
+          </a:p>
+        </p:txBody>
+      </p:sp>
+      <p:sp>
+        <p:nvSpPr>
+          <p:cNvPr id="3" name="Content Placeholder 2"/>
+          <p:cNvSpPr>
+            <a:spLocks noGrp="1"/>
+          </p:cNvSpPr>
+          <p:nvPr>
+            <p:ph idx="1"/>
+          </p:nvPr>
+        </p:nvSpPr>
+        <p:spPr/>
+        <p:txBody>
+          <a:bodyPr/>
+          <a:lstStyle/>
+          <a:p>
+            <a:r>
+              <a:rPr lang="en-US" dirty="0">
+                <a:effectLst/>
+              </a:rPr>
+              <a:t>Courses</a:t>
+            </a:r>
+          </a:p>
+          <a:p>
+            <a:pPr lvl="1"/>
+            <a:r>
+              <a:rPr lang="en-US" dirty="0">
+                <a:effectLst/>
+                <a:hlinkClick r:id="rId2"/>
+              </a:rPr>
+              <a:t>http://www.pluralsight.com/courses/rest-fundamentals</a:t>
+            </a:r>
+            <a:endParaRPr lang="en-US" dirty="0">
+              <a:effectLst/>
+            </a:endParaRPr>
+          </a:p>
+          <a:p>
+            <a:pPr marL="0" indent="0">
+              <a:buNone/>
+            </a:pPr>
+            <a:r>
+              <a:rPr lang="en-US" dirty="0">
+                <a:effectLst/>
+              </a:rPr>
+              <a:t> </a:t>
+            </a:r>
+          </a:p>
+          <a:p>
+            <a:r>
+              <a:rPr lang="en-US" dirty="0">
+                <a:effectLst/>
+              </a:rPr>
+              <a:t>Caching Management Library - Cache Cow</a:t>
+            </a:r>
+          </a:p>
+          <a:p>
+            <a:pPr lvl="1"/>
+            <a:r>
+              <a:rPr lang="en-US" dirty="0">
+                <a:effectLst/>
+                <a:hlinkClick r:id="rId3"/>
+              </a:rPr>
+              <a:t>http://www.hanselman.com/blog/NuGetPackageOfTheWeekASPNETWebAPICachingWithCacheCowAndCacheOutput.aspx</a:t>
+            </a:r>
+            <a:endParaRPr lang="en-US" dirty="0">
+              <a:effectLst/>
+            </a:endParaRPr>
+          </a:p>
+          <a:p>
+            <a:endParaRPr lang="en-US" dirty="0"/>
+          </a:p>
+        </p:txBody>
+      </p:sp>
+    </p:spTree>
+    <p:extLst>
+      <p:ext uri="{BB962C8B-B14F-4D97-AF65-F5344CB8AC3E}">
+        <p14:creationId xmlns:p14="http://schemas.microsoft.com/office/powerpoint/2010/main" val="675560746"/>
+      </p:ext>
+    </p:extLst>
+  </p:cSld>
+  <p:clrMapOvr>
+    <a:masterClrMapping/>
+  </p:clrMapOvr>
+  <p:timing>
+    <p:tnLst>
+      <p:par>
+        <p:cTn id="1" dur="indefinite" restart="never" nodeType="tmRoot"/>
+      </p:par>
+    </p:tnLst>
   </p:timing>
 </p:sld>
 </file>

</xml_diff>